<commit_message>
Update to add Mike's info
</commit_message>
<xml_diff>
--- a/slides/slides.pptx
+++ b/slides/slides.pptx
@@ -1,6 +1,6 @@
 
 <file path=ppt/presentation.xml><?xml version="1.0" encoding="utf-8"?>
-<p:presentation xmlns:a="http://schemas.openxmlformats.org/drawingml/2006/main" xmlns:r="http://schemas.openxmlformats.org/officeDocument/2006/relationships" xmlns:p="http://schemas.openxmlformats.org/presentationml/2006/main" saveSubsetFonts="1" autoCompressPictures="0">
+<p:presentation xmlns:a="http://schemas.openxmlformats.org/drawingml/2006/main" xmlns:r="http://schemas.openxmlformats.org/officeDocument/2006/relationships" xmlns:mc="http://schemas.openxmlformats.org/markup-compatibility/2006" xmlns:mv="urn:schemas-microsoft-com:mac:vml" xmlns:p="http://schemas.openxmlformats.org/presentationml/2006/main" mc:Ignorable="mv" mc:PreserveAttributes="mv:*" saveSubsetFonts="1" autoCompressPictures="0">
   <p:sldMasterIdLst>
     <p:sldMasterId id="2147483674" r:id="rId4"/>
   </p:sldMasterIdLst>
@@ -170,7 +170,7 @@
   </p:defaultTextStyle>
   <p:extLst>
     <p:ext uri="{EFAFB233-063F-42B5-8137-9DF3F51BA10A}">
-      <p15:sldGuideLst xmlns:p15="http://schemas.microsoft.com/office/powerpoint/2012/main">
+      <p15:sldGuideLst xmlns:p15="http://schemas.microsoft.com/office/powerpoint/2012/main" xmlns:p="http://schemas.openxmlformats.org/presentationml/2006/main" xmlns:r="http://schemas.openxmlformats.org/officeDocument/2006/relationships" xmlns:a="http://schemas.openxmlformats.org/drawingml/2006/main" xmlns="">
         <p15:guide id="1" orient="horz" pos="644">
           <p15:clr>
             <a:srgbClr val="A4A3A4"/>
@@ -313,14 +313,14 @@
 </file>
 
 <file path=ppt/commentAuthors.xml><?xml version="1.0" encoding="utf-8"?>
-<p:cmAuthorLst xmlns:a="http://schemas.openxmlformats.org/drawingml/2006/main" xmlns:r="http://schemas.openxmlformats.org/officeDocument/2006/relationships" xmlns:p="http://schemas.openxmlformats.org/presentationml/2006/main">
+<p:cmAuthorLst xmlns:a="http://schemas.openxmlformats.org/drawingml/2006/main" xmlns:r="http://schemas.openxmlformats.org/officeDocument/2006/relationships" xmlns:mc="http://schemas.openxmlformats.org/markup-compatibility/2006" xmlns:mv="urn:schemas-microsoft-com:mac:vml" xmlns:p="http://schemas.openxmlformats.org/presentationml/2006/main" mc:Ignorable="mv" mc:PreserveAttributes="mv:*">
   <p:cmAuthor id="0" name="Catalano, Alec" initials="" lastIdx="23" clrIdx="0"/>
   <p:cmAuthor id="1" name="Alec Catalano" initials="" lastIdx="1" clrIdx="1"/>
 </p:cmAuthorLst>
 </file>
 
 <file path=ppt/notesMasters/notesMaster1.xml><?xml version="1.0" encoding="utf-8"?>
-<p:notesMaster xmlns:a="http://schemas.openxmlformats.org/drawingml/2006/main" xmlns:r="http://schemas.openxmlformats.org/officeDocument/2006/relationships" xmlns:p="http://schemas.openxmlformats.org/presentationml/2006/main">
+<p:notesMaster xmlns:a="http://schemas.openxmlformats.org/drawingml/2006/main" xmlns:r="http://schemas.openxmlformats.org/officeDocument/2006/relationships" xmlns:mc="http://schemas.openxmlformats.org/markup-compatibility/2006" xmlns:mv="urn:schemas-microsoft-com:mac:vml" xmlns:p="http://schemas.openxmlformats.org/presentationml/2006/main" mc:Ignorable="mv" mc:PreserveAttributes="mv:*">
   <p:cSld>
     <p:bg>
       <p:bgRef idx="1001">
@@ -406,7 +406,7 @@
             <a:fld id="{0B25AC41-3BEC-9247-8322-91B80C013F2D}" type="datetimeFigureOut">
               <a:rPr lang="en-US" smtClean="0"/>
               <a:pPr/>
-              <a:t>9/15/15</a:t>
+              <a:t>9/25/15</a:t>
             </a:fld>
             <a:endParaRPr lang="en-US" dirty="0"/>
           </a:p>
@@ -579,7 +579,7 @@
     </p:spTree>
     <p:extLst>
       <p:ext uri="{BB962C8B-B14F-4D97-AF65-F5344CB8AC3E}">
-        <p14:creationId xmlns:p14="http://schemas.microsoft.com/office/powerpoint/2010/main" val="943536003"/>
+        <p14:creationId xmlns:p14="http://schemas.microsoft.com/office/powerpoint/2010/main" xmlns:p="http://schemas.openxmlformats.org/presentationml/2006/main" xmlns:r="http://schemas.openxmlformats.org/officeDocument/2006/relationships" xmlns:a="http://schemas.openxmlformats.org/drawingml/2006/main" xmlns="" val="943536003"/>
       </p:ext>
     </p:extLst>
   </p:cSld>
@@ -680,7 +680,7 @@
 </file>
 
 <file path=ppt/notesSlides/notesSlide1.xml><?xml version="1.0" encoding="utf-8"?>
-<p:notes xmlns:a="http://schemas.openxmlformats.org/drawingml/2006/main" xmlns:r="http://schemas.openxmlformats.org/officeDocument/2006/relationships" xmlns:p="http://schemas.openxmlformats.org/presentationml/2006/main">
+<p:notes xmlns:a="http://schemas.openxmlformats.org/drawingml/2006/main" xmlns:r="http://schemas.openxmlformats.org/officeDocument/2006/relationships" xmlns:mc="http://schemas.openxmlformats.org/markup-compatibility/2006" xmlns:mv="urn:schemas-microsoft-com:mac:vml" xmlns:p="http://schemas.openxmlformats.org/presentationml/2006/main" mc:Ignorable="mv" mc:PreserveAttributes="mv:*">
   <p:cSld>
     <p:spTree>
       <p:nvGrpSpPr>
@@ -770,7 +770,7 @@
     </p:spTree>
     <p:extLst>
       <p:ext uri="{BB962C8B-B14F-4D97-AF65-F5344CB8AC3E}">
-        <p14:creationId xmlns:p14="http://schemas.microsoft.com/office/powerpoint/2010/main" val="461632318"/>
+        <p14:creationId xmlns:p14="http://schemas.microsoft.com/office/powerpoint/2010/main" xmlns:p="http://schemas.openxmlformats.org/presentationml/2006/main" xmlns:r="http://schemas.openxmlformats.org/officeDocument/2006/relationships" xmlns:a="http://schemas.openxmlformats.org/drawingml/2006/main" xmlns="" val="461632318"/>
       </p:ext>
     </p:extLst>
   </p:cSld>
@@ -781,7 +781,7 @@
 </file>
 
 <file path=ppt/notesSlides/notesSlide10.xml><?xml version="1.0" encoding="utf-8"?>
-<p:notes xmlns:a="http://schemas.openxmlformats.org/drawingml/2006/main" xmlns:r="http://schemas.openxmlformats.org/officeDocument/2006/relationships" xmlns:p="http://schemas.openxmlformats.org/presentationml/2006/main">
+<p:notes xmlns:a="http://schemas.openxmlformats.org/drawingml/2006/main" xmlns:r="http://schemas.openxmlformats.org/officeDocument/2006/relationships" xmlns:mc="http://schemas.openxmlformats.org/markup-compatibility/2006" xmlns:mv="urn:schemas-microsoft-com:mac:vml" xmlns:p="http://schemas.openxmlformats.org/presentationml/2006/main" mc:Ignorable="mv" mc:PreserveAttributes="mv:*">
   <p:cSld>
     <p:spTree>
       <p:nvGrpSpPr>
@@ -871,7 +871,7 @@
     </p:spTree>
     <p:extLst>
       <p:ext uri="{BB962C8B-B14F-4D97-AF65-F5344CB8AC3E}">
-        <p14:creationId xmlns:p14="http://schemas.microsoft.com/office/powerpoint/2010/main" val="1838510240"/>
+        <p14:creationId xmlns:p14="http://schemas.microsoft.com/office/powerpoint/2010/main" xmlns:p="http://schemas.openxmlformats.org/presentationml/2006/main" xmlns:r="http://schemas.openxmlformats.org/officeDocument/2006/relationships" xmlns:a="http://schemas.openxmlformats.org/drawingml/2006/main" xmlns="" val="1838510240"/>
       </p:ext>
     </p:extLst>
   </p:cSld>
@@ -882,7 +882,7 @@
 </file>
 
 <file path=ppt/notesSlides/notesSlide11.xml><?xml version="1.0" encoding="utf-8"?>
-<p:notes xmlns:a="http://schemas.openxmlformats.org/drawingml/2006/main" xmlns:r="http://schemas.openxmlformats.org/officeDocument/2006/relationships" xmlns:p="http://schemas.openxmlformats.org/presentationml/2006/main">
+<p:notes xmlns:a="http://schemas.openxmlformats.org/drawingml/2006/main" xmlns:r="http://schemas.openxmlformats.org/officeDocument/2006/relationships" xmlns:mc="http://schemas.openxmlformats.org/markup-compatibility/2006" xmlns:mv="urn:schemas-microsoft-com:mac:vml" xmlns:p="http://schemas.openxmlformats.org/presentationml/2006/main" mc:Ignorable="mv" mc:PreserveAttributes="mv:*">
   <p:cSld>
     <p:spTree>
       <p:nvGrpSpPr>
@@ -1059,7 +1059,7 @@
     </p:spTree>
     <p:extLst>
       <p:ext uri="{BB962C8B-B14F-4D97-AF65-F5344CB8AC3E}">
-        <p14:creationId xmlns:p14="http://schemas.microsoft.com/office/powerpoint/2010/main" val="1023281219"/>
+        <p14:creationId xmlns:p14="http://schemas.microsoft.com/office/powerpoint/2010/main" xmlns:p="http://schemas.openxmlformats.org/presentationml/2006/main" xmlns:r="http://schemas.openxmlformats.org/officeDocument/2006/relationships" xmlns:a="http://schemas.openxmlformats.org/drawingml/2006/main" xmlns="" val="1023281219"/>
       </p:ext>
     </p:extLst>
   </p:cSld>
@@ -1070,7 +1070,7 @@
 </file>
 
 <file path=ppt/notesSlides/notesSlide12.xml><?xml version="1.0" encoding="utf-8"?>
-<p:notes xmlns:a="http://schemas.openxmlformats.org/drawingml/2006/main" xmlns:r="http://schemas.openxmlformats.org/officeDocument/2006/relationships" xmlns:p="http://schemas.openxmlformats.org/presentationml/2006/main">
+<p:notes xmlns:a="http://schemas.openxmlformats.org/drawingml/2006/main" xmlns:r="http://schemas.openxmlformats.org/officeDocument/2006/relationships" xmlns:mc="http://schemas.openxmlformats.org/markup-compatibility/2006" xmlns:mv="urn:schemas-microsoft-com:mac:vml" xmlns:p="http://schemas.openxmlformats.org/presentationml/2006/main" mc:Ignorable="mv" mc:PreserveAttributes="mv:*">
   <p:cSld>
     <p:spTree>
       <p:nvGrpSpPr>
@@ -1201,7 +1201,7 @@
     </p:spTree>
     <p:extLst>
       <p:ext uri="{BB962C8B-B14F-4D97-AF65-F5344CB8AC3E}">
-        <p14:creationId xmlns:p14="http://schemas.microsoft.com/office/powerpoint/2010/main" val="1120424473"/>
+        <p14:creationId xmlns:p14="http://schemas.microsoft.com/office/powerpoint/2010/main" xmlns:p="http://schemas.openxmlformats.org/presentationml/2006/main" xmlns:r="http://schemas.openxmlformats.org/officeDocument/2006/relationships" xmlns:a="http://schemas.openxmlformats.org/drawingml/2006/main" xmlns="" val="1120424473"/>
       </p:ext>
     </p:extLst>
   </p:cSld>
@@ -1212,7 +1212,7 @@
 </file>
 
 <file path=ppt/notesSlides/notesSlide13.xml><?xml version="1.0" encoding="utf-8"?>
-<p:notes xmlns:a="http://schemas.openxmlformats.org/drawingml/2006/main" xmlns:r="http://schemas.openxmlformats.org/officeDocument/2006/relationships" xmlns:p="http://schemas.openxmlformats.org/presentationml/2006/main">
+<p:notes xmlns:a="http://schemas.openxmlformats.org/drawingml/2006/main" xmlns:r="http://schemas.openxmlformats.org/officeDocument/2006/relationships" xmlns:mc="http://schemas.openxmlformats.org/markup-compatibility/2006" xmlns:mv="urn:schemas-microsoft-com:mac:vml" xmlns:p="http://schemas.openxmlformats.org/presentationml/2006/main" mc:Ignorable="mv" mc:PreserveAttributes="mv:*">
   <p:cSld>
     <p:spTree>
       <p:nvGrpSpPr>
@@ -1290,7 +1290,7 @@
     </p:spTree>
     <p:extLst>
       <p:ext uri="{BB962C8B-B14F-4D97-AF65-F5344CB8AC3E}">
-        <p14:creationId xmlns:p14="http://schemas.microsoft.com/office/powerpoint/2010/main" val="1407957544"/>
+        <p14:creationId xmlns:p14="http://schemas.microsoft.com/office/powerpoint/2010/main" xmlns:p="http://schemas.openxmlformats.org/presentationml/2006/main" xmlns:r="http://schemas.openxmlformats.org/officeDocument/2006/relationships" xmlns:a="http://schemas.openxmlformats.org/drawingml/2006/main" xmlns="" val="1407957544"/>
       </p:ext>
     </p:extLst>
   </p:cSld>
@@ -1301,7 +1301,7 @@
 </file>
 
 <file path=ppt/notesSlides/notesSlide14.xml><?xml version="1.0" encoding="utf-8"?>
-<p:notes xmlns:a="http://schemas.openxmlformats.org/drawingml/2006/main" xmlns:r="http://schemas.openxmlformats.org/officeDocument/2006/relationships" xmlns:p="http://schemas.openxmlformats.org/presentationml/2006/main">
+<p:notes xmlns:a="http://schemas.openxmlformats.org/drawingml/2006/main" xmlns:r="http://schemas.openxmlformats.org/officeDocument/2006/relationships" xmlns:mc="http://schemas.openxmlformats.org/markup-compatibility/2006" xmlns:mv="urn:schemas-microsoft-com:mac:vml" xmlns:p="http://schemas.openxmlformats.org/presentationml/2006/main" mc:Ignorable="mv" mc:PreserveAttributes="mv:*">
   <p:cSld>
     <p:spTree>
       <p:nvGrpSpPr>
@@ -1399,7 +1399,7 @@
     </p:spTree>
     <p:extLst>
       <p:ext uri="{BB962C8B-B14F-4D97-AF65-F5344CB8AC3E}">
-        <p14:creationId xmlns:p14="http://schemas.microsoft.com/office/powerpoint/2010/main" val="728320368"/>
+        <p14:creationId xmlns:p14="http://schemas.microsoft.com/office/powerpoint/2010/main" xmlns:p="http://schemas.openxmlformats.org/presentationml/2006/main" xmlns:r="http://schemas.openxmlformats.org/officeDocument/2006/relationships" xmlns:a="http://schemas.openxmlformats.org/drawingml/2006/main" xmlns="" val="728320368"/>
       </p:ext>
     </p:extLst>
   </p:cSld>
@@ -1410,7 +1410,7 @@
 </file>
 
 <file path=ppt/notesSlides/notesSlide15.xml><?xml version="1.0" encoding="utf-8"?>
-<p:notes xmlns:a="http://schemas.openxmlformats.org/drawingml/2006/main" xmlns:r="http://schemas.openxmlformats.org/officeDocument/2006/relationships" xmlns:p="http://schemas.openxmlformats.org/presentationml/2006/main">
+<p:notes xmlns:a="http://schemas.openxmlformats.org/drawingml/2006/main" xmlns:r="http://schemas.openxmlformats.org/officeDocument/2006/relationships" xmlns:mc="http://schemas.openxmlformats.org/markup-compatibility/2006" xmlns:mv="urn:schemas-microsoft-com:mac:vml" xmlns:p="http://schemas.openxmlformats.org/presentationml/2006/main" mc:Ignorable="mv" mc:PreserveAttributes="mv:*">
   <p:cSld>
     <p:spTree>
       <p:nvGrpSpPr>
@@ -1492,7 +1492,7 @@
     </p:spTree>
     <p:extLst>
       <p:ext uri="{BB962C8B-B14F-4D97-AF65-F5344CB8AC3E}">
-        <p14:creationId xmlns:p14="http://schemas.microsoft.com/office/powerpoint/2010/main" val="122903841"/>
+        <p14:creationId xmlns:p14="http://schemas.microsoft.com/office/powerpoint/2010/main" xmlns:p="http://schemas.openxmlformats.org/presentationml/2006/main" xmlns:r="http://schemas.openxmlformats.org/officeDocument/2006/relationships" xmlns:a="http://schemas.openxmlformats.org/drawingml/2006/main" xmlns="" val="122903841"/>
       </p:ext>
     </p:extLst>
   </p:cSld>
@@ -1503,7 +1503,7 @@
 </file>
 
 <file path=ppt/notesSlides/notesSlide16.xml><?xml version="1.0" encoding="utf-8"?>
-<p:notes xmlns:a="http://schemas.openxmlformats.org/drawingml/2006/main" xmlns:r="http://schemas.openxmlformats.org/officeDocument/2006/relationships" xmlns:p="http://schemas.openxmlformats.org/presentationml/2006/main">
+<p:notes xmlns:a="http://schemas.openxmlformats.org/drawingml/2006/main" xmlns:r="http://schemas.openxmlformats.org/officeDocument/2006/relationships" xmlns:mc="http://schemas.openxmlformats.org/markup-compatibility/2006" xmlns:mv="urn:schemas-microsoft-com:mac:vml" xmlns:p="http://schemas.openxmlformats.org/presentationml/2006/main" mc:Ignorable="mv" mc:PreserveAttributes="mv:*">
   <p:cSld>
     <p:spTree>
       <p:nvGrpSpPr>
@@ -1774,7 +1774,7 @@
     </p:spTree>
     <p:extLst>
       <p:ext uri="{BB962C8B-B14F-4D97-AF65-F5344CB8AC3E}">
-        <p14:creationId xmlns:p14="http://schemas.microsoft.com/office/powerpoint/2010/main" val="522038541"/>
+        <p14:creationId xmlns:p14="http://schemas.microsoft.com/office/powerpoint/2010/main" xmlns:p="http://schemas.openxmlformats.org/presentationml/2006/main" xmlns:r="http://schemas.openxmlformats.org/officeDocument/2006/relationships" xmlns:a="http://schemas.openxmlformats.org/drawingml/2006/main" xmlns="" val="522038541"/>
       </p:ext>
     </p:extLst>
   </p:cSld>
@@ -1785,7 +1785,7 @@
 </file>
 
 <file path=ppt/notesSlides/notesSlide17.xml><?xml version="1.0" encoding="utf-8"?>
-<p:notes xmlns:a="http://schemas.openxmlformats.org/drawingml/2006/main" xmlns:r="http://schemas.openxmlformats.org/officeDocument/2006/relationships" xmlns:p="http://schemas.openxmlformats.org/presentationml/2006/main">
+<p:notes xmlns:a="http://schemas.openxmlformats.org/drawingml/2006/main" xmlns:r="http://schemas.openxmlformats.org/officeDocument/2006/relationships" xmlns:mc="http://schemas.openxmlformats.org/markup-compatibility/2006" xmlns:mv="urn:schemas-microsoft-com:mac:vml" xmlns:p="http://schemas.openxmlformats.org/presentationml/2006/main" mc:Ignorable="mv" mc:PreserveAttributes="mv:*">
   <p:cSld>
     <p:spTree>
       <p:nvGrpSpPr>
@@ -1891,7 +1891,7 @@
     </p:spTree>
     <p:extLst>
       <p:ext uri="{BB962C8B-B14F-4D97-AF65-F5344CB8AC3E}">
-        <p14:creationId xmlns:p14="http://schemas.microsoft.com/office/powerpoint/2010/main" val="527839127"/>
+        <p14:creationId xmlns:p14="http://schemas.microsoft.com/office/powerpoint/2010/main" xmlns:p="http://schemas.openxmlformats.org/presentationml/2006/main" xmlns:r="http://schemas.openxmlformats.org/officeDocument/2006/relationships" xmlns:a="http://schemas.openxmlformats.org/drawingml/2006/main" xmlns="" val="527839127"/>
       </p:ext>
     </p:extLst>
   </p:cSld>
@@ -1902,7 +1902,7 @@
 </file>
 
 <file path=ppt/notesSlides/notesSlide18.xml><?xml version="1.0" encoding="utf-8"?>
-<p:notes xmlns:a="http://schemas.openxmlformats.org/drawingml/2006/main" xmlns:r="http://schemas.openxmlformats.org/officeDocument/2006/relationships" xmlns:p="http://schemas.openxmlformats.org/presentationml/2006/main">
+<p:notes xmlns:a="http://schemas.openxmlformats.org/drawingml/2006/main" xmlns:r="http://schemas.openxmlformats.org/officeDocument/2006/relationships" xmlns:mc="http://schemas.openxmlformats.org/markup-compatibility/2006" xmlns:mv="urn:schemas-microsoft-com:mac:vml" xmlns:p="http://schemas.openxmlformats.org/presentationml/2006/main" mc:Ignorable="mv" mc:PreserveAttributes="mv:*">
   <p:cSld>
     <p:spTree>
       <p:nvGrpSpPr>
@@ -2035,7 +2035,7 @@
     </p:spTree>
     <p:extLst>
       <p:ext uri="{BB962C8B-B14F-4D97-AF65-F5344CB8AC3E}">
-        <p14:creationId xmlns:p14="http://schemas.microsoft.com/office/powerpoint/2010/main" val="978342375"/>
+        <p14:creationId xmlns:p14="http://schemas.microsoft.com/office/powerpoint/2010/main" xmlns:p="http://schemas.openxmlformats.org/presentationml/2006/main" xmlns:r="http://schemas.openxmlformats.org/officeDocument/2006/relationships" xmlns:a="http://schemas.openxmlformats.org/drawingml/2006/main" xmlns="" val="978342375"/>
       </p:ext>
     </p:extLst>
   </p:cSld>
@@ -2046,7 +2046,7 @@
 </file>
 
 <file path=ppt/notesSlides/notesSlide19.xml><?xml version="1.0" encoding="utf-8"?>
-<p:notes xmlns:a="http://schemas.openxmlformats.org/drawingml/2006/main" xmlns:r="http://schemas.openxmlformats.org/officeDocument/2006/relationships" xmlns:p="http://schemas.openxmlformats.org/presentationml/2006/main">
+<p:notes xmlns:a="http://schemas.openxmlformats.org/drawingml/2006/main" xmlns:r="http://schemas.openxmlformats.org/officeDocument/2006/relationships" xmlns:mc="http://schemas.openxmlformats.org/markup-compatibility/2006" xmlns:mv="urn:schemas-microsoft-com:mac:vml" xmlns:p="http://schemas.openxmlformats.org/presentationml/2006/main" mc:Ignorable="mv" mc:PreserveAttributes="mv:*">
   <p:cSld>
     <p:spTree>
       <p:nvGrpSpPr>
@@ -2128,7 +2128,7 @@
     </p:spTree>
     <p:extLst>
       <p:ext uri="{BB962C8B-B14F-4D97-AF65-F5344CB8AC3E}">
-        <p14:creationId xmlns:p14="http://schemas.microsoft.com/office/powerpoint/2010/main" val="2082005316"/>
+        <p14:creationId xmlns:p14="http://schemas.microsoft.com/office/powerpoint/2010/main" xmlns:p="http://schemas.openxmlformats.org/presentationml/2006/main" xmlns:r="http://schemas.openxmlformats.org/officeDocument/2006/relationships" xmlns:a="http://schemas.openxmlformats.org/drawingml/2006/main" xmlns="" val="2082005316"/>
       </p:ext>
     </p:extLst>
   </p:cSld>
@@ -2139,7 +2139,7 @@
 </file>
 
 <file path=ppt/notesSlides/notesSlide2.xml><?xml version="1.0" encoding="utf-8"?>
-<p:notes xmlns:a="http://schemas.openxmlformats.org/drawingml/2006/main" xmlns:r="http://schemas.openxmlformats.org/officeDocument/2006/relationships" xmlns:p="http://schemas.openxmlformats.org/presentationml/2006/main">
+<p:notes xmlns:a="http://schemas.openxmlformats.org/drawingml/2006/main" xmlns:r="http://schemas.openxmlformats.org/officeDocument/2006/relationships" xmlns:mc="http://schemas.openxmlformats.org/markup-compatibility/2006" xmlns:mv="urn:schemas-microsoft-com:mac:vml" xmlns:p="http://schemas.openxmlformats.org/presentationml/2006/main" mc:Ignorable="mv" mc:PreserveAttributes="mv:*">
   <p:cSld>
     <p:spTree>
       <p:nvGrpSpPr>
@@ -2276,7 +2276,7 @@
     </p:spTree>
     <p:extLst>
       <p:ext uri="{BB962C8B-B14F-4D97-AF65-F5344CB8AC3E}">
-        <p14:creationId xmlns:p14="http://schemas.microsoft.com/office/powerpoint/2010/main" val="1689963030"/>
+        <p14:creationId xmlns:p14="http://schemas.microsoft.com/office/powerpoint/2010/main" xmlns:p="http://schemas.openxmlformats.org/presentationml/2006/main" xmlns:r="http://schemas.openxmlformats.org/officeDocument/2006/relationships" xmlns:a="http://schemas.openxmlformats.org/drawingml/2006/main" xmlns="" val="1689963030"/>
       </p:ext>
     </p:extLst>
   </p:cSld>
@@ -2287,7 +2287,7 @@
 </file>
 
 <file path=ppt/notesSlides/notesSlide20.xml><?xml version="1.0" encoding="utf-8"?>
-<p:notes xmlns:a="http://schemas.openxmlformats.org/drawingml/2006/main" xmlns:r="http://schemas.openxmlformats.org/officeDocument/2006/relationships" xmlns:p="http://schemas.openxmlformats.org/presentationml/2006/main">
+<p:notes xmlns:a="http://schemas.openxmlformats.org/drawingml/2006/main" xmlns:r="http://schemas.openxmlformats.org/officeDocument/2006/relationships" xmlns:mc="http://schemas.openxmlformats.org/markup-compatibility/2006" xmlns:mv="urn:schemas-microsoft-com:mac:vml" xmlns:p="http://schemas.openxmlformats.org/presentationml/2006/main" mc:Ignorable="mv" mc:PreserveAttributes="mv:*">
   <p:cSld>
     <p:spTree>
       <p:nvGrpSpPr>
@@ -2378,7 +2378,7 @@
     </p:spTree>
     <p:extLst>
       <p:ext uri="{BB962C8B-B14F-4D97-AF65-F5344CB8AC3E}">
-        <p14:creationId xmlns:p14="http://schemas.microsoft.com/office/powerpoint/2010/main" val="527881731"/>
+        <p14:creationId xmlns:p14="http://schemas.microsoft.com/office/powerpoint/2010/main" xmlns:p="http://schemas.openxmlformats.org/presentationml/2006/main" xmlns:r="http://schemas.openxmlformats.org/officeDocument/2006/relationships" xmlns:a="http://schemas.openxmlformats.org/drawingml/2006/main" xmlns="" val="527881731"/>
       </p:ext>
     </p:extLst>
   </p:cSld>
@@ -2389,7 +2389,7 @@
 </file>
 
 <file path=ppt/notesSlides/notesSlide21.xml><?xml version="1.0" encoding="utf-8"?>
-<p:notes xmlns:a="http://schemas.openxmlformats.org/drawingml/2006/main" xmlns:r="http://schemas.openxmlformats.org/officeDocument/2006/relationships" xmlns:p="http://schemas.openxmlformats.org/presentationml/2006/main">
+<p:notes xmlns:a="http://schemas.openxmlformats.org/drawingml/2006/main" xmlns:r="http://schemas.openxmlformats.org/officeDocument/2006/relationships" xmlns:mc="http://schemas.openxmlformats.org/markup-compatibility/2006" xmlns:mv="urn:schemas-microsoft-com:mac:vml" xmlns:p="http://schemas.openxmlformats.org/presentationml/2006/main" mc:Ignorable="mv" mc:PreserveAttributes="mv:*">
   <p:cSld>
     <p:spTree>
       <p:nvGrpSpPr>
@@ -2479,7 +2479,7 @@
     </p:spTree>
     <p:extLst>
       <p:ext uri="{BB962C8B-B14F-4D97-AF65-F5344CB8AC3E}">
-        <p14:creationId xmlns:p14="http://schemas.microsoft.com/office/powerpoint/2010/main" val="1480234258"/>
+        <p14:creationId xmlns:p14="http://schemas.microsoft.com/office/powerpoint/2010/main" xmlns:p="http://schemas.openxmlformats.org/presentationml/2006/main" xmlns:r="http://schemas.openxmlformats.org/officeDocument/2006/relationships" xmlns:a="http://schemas.openxmlformats.org/drawingml/2006/main" xmlns="" val="1480234258"/>
       </p:ext>
     </p:extLst>
   </p:cSld>
@@ -2490,7 +2490,7 @@
 </file>
 
 <file path=ppt/notesSlides/notesSlide22.xml><?xml version="1.0" encoding="utf-8"?>
-<p:notes xmlns:a="http://schemas.openxmlformats.org/drawingml/2006/main" xmlns:r="http://schemas.openxmlformats.org/officeDocument/2006/relationships" xmlns:p="http://schemas.openxmlformats.org/presentationml/2006/main">
+<p:notes xmlns:a="http://schemas.openxmlformats.org/drawingml/2006/main" xmlns:r="http://schemas.openxmlformats.org/officeDocument/2006/relationships" xmlns:mc="http://schemas.openxmlformats.org/markup-compatibility/2006" xmlns:mv="urn:schemas-microsoft-com:mac:vml" xmlns:p="http://schemas.openxmlformats.org/presentationml/2006/main" mc:Ignorable="mv" mc:PreserveAttributes="mv:*">
   <p:cSld>
     <p:spTree>
       <p:nvGrpSpPr>
@@ -2576,7 +2576,7 @@
     </p:spTree>
     <p:extLst>
       <p:ext uri="{BB962C8B-B14F-4D97-AF65-F5344CB8AC3E}">
-        <p14:creationId xmlns:p14="http://schemas.microsoft.com/office/powerpoint/2010/main" val="788776861"/>
+        <p14:creationId xmlns:p14="http://schemas.microsoft.com/office/powerpoint/2010/main" xmlns:p="http://schemas.openxmlformats.org/presentationml/2006/main" xmlns:r="http://schemas.openxmlformats.org/officeDocument/2006/relationships" xmlns:a="http://schemas.openxmlformats.org/drawingml/2006/main" xmlns="" val="788776861"/>
       </p:ext>
     </p:extLst>
   </p:cSld>
@@ -2587,7 +2587,7 @@
 </file>
 
 <file path=ppt/notesSlides/notesSlide23.xml><?xml version="1.0" encoding="utf-8"?>
-<p:notes xmlns:a="http://schemas.openxmlformats.org/drawingml/2006/main" xmlns:r="http://schemas.openxmlformats.org/officeDocument/2006/relationships" xmlns:p="http://schemas.openxmlformats.org/presentationml/2006/main">
+<p:notes xmlns:a="http://schemas.openxmlformats.org/drawingml/2006/main" xmlns:r="http://schemas.openxmlformats.org/officeDocument/2006/relationships" xmlns:mc="http://schemas.openxmlformats.org/markup-compatibility/2006" xmlns:mv="urn:schemas-microsoft-com:mac:vml" xmlns:p="http://schemas.openxmlformats.org/presentationml/2006/main" mc:Ignorable="mv" mc:PreserveAttributes="mv:*">
   <p:cSld>
     <p:spTree>
       <p:nvGrpSpPr>
@@ -2678,7 +2678,7 @@
     </p:spTree>
     <p:extLst>
       <p:ext uri="{BB962C8B-B14F-4D97-AF65-F5344CB8AC3E}">
-        <p14:creationId xmlns:p14="http://schemas.microsoft.com/office/powerpoint/2010/main" val="881273466"/>
+        <p14:creationId xmlns:p14="http://schemas.microsoft.com/office/powerpoint/2010/main" xmlns:p="http://schemas.openxmlformats.org/presentationml/2006/main" xmlns:r="http://schemas.openxmlformats.org/officeDocument/2006/relationships" xmlns:a="http://schemas.openxmlformats.org/drawingml/2006/main" xmlns="" val="881273466"/>
       </p:ext>
     </p:extLst>
   </p:cSld>
@@ -2689,7 +2689,7 @@
 </file>
 
 <file path=ppt/notesSlides/notesSlide24.xml><?xml version="1.0" encoding="utf-8"?>
-<p:notes xmlns:a="http://schemas.openxmlformats.org/drawingml/2006/main" xmlns:r="http://schemas.openxmlformats.org/officeDocument/2006/relationships" xmlns:p="http://schemas.openxmlformats.org/presentationml/2006/main">
+<p:notes xmlns:a="http://schemas.openxmlformats.org/drawingml/2006/main" xmlns:r="http://schemas.openxmlformats.org/officeDocument/2006/relationships" xmlns:mc="http://schemas.openxmlformats.org/markup-compatibility/2006" xmlns:mv="urn:schemas-microsoft-com:mac:vml" xmlns:p="http://schemas.openxmlformats.org/presentationml/2006/main" mc:Ignorable="mv" mc:PreserveAttributes="mv:*">
   <p:cSld>
     <p:spTree>
       <p:nvGrpSpPr>
@@ -2795,7 +2795,7 @@
     </p:spTree>
     <p:extLst>
       <p:ext uri="{BB962C8B-B14F-4D97-AF65-F5344CB8AC3E}">
-        <p14:creationId xmlns:p14="http://schemas.microsoft.com/office/powerpoint/2010/main" val="368429703"/>
+        <p14:creationId xmlns:p14="http://schemas.microsoft.com/office/powerpoint/2010/main" xmlns:p="http://schemas.openxmlformats.org/presentationml/2006/main" xmlns:r="http://schemas.openxmlformats.org/officeDocument/2006/relationships" xmlns:a="http://schemas.openxmlformats.org/drawingml/2006/main" xmlns="" val="368429703"/>
       </p:ext>
     </p:extLst>
   </p:cSld>
@@ -2806,7 +2806,7 @@
 </file>
 
 <file path=ppt/notesSlides/notesSlide25.xml><?xml version="1.0" encoding="utf-8"?>
-<p:notes xmlns:a="http://schemas.openxmlformats.org/drawingml/2006/main" xmlns:r="http://schemas.openxmlformats.org/officeDocument/2006/relationships" xmlns:p="http://schemas.openxmlformats.org/presentationml/2006/main">
+<p:notes xmlns:a="http://schemas.openxmlformats.org/drawingml/2006/main" xmlns:r="http://schemas.openxmlformats.org/officeDocument/2006/relationships" xmlns:mc="http://schemas.openxmlformats.org/markup-compatibility/2006" xmlns:mv="urn:schemas-microsoft-com:mac:vml" xmlns:p="http://schemas.openxmlformats.org/presentationml/2006/main" mc:Ignorable="mv" mc:PreserveAttributes="mv:*">
   <p:cSld>
     <p:spTree>
       <p:nvGrpSpPr>
@@ -2888,7 +2888,7 @@
     </p:spTree>
     <p:extLst>
       <p:ext uri="{BB962C8B-B14F-4D97-AF65-F5344CB8AC3E}">
-        <p14:creationId xmlns:p14="http://schemas.microsoft.com/office/powerpoint/2010/main" val="1058275855"/>
+        <p14:creationId xmlns:p14="http://schemas.microsoft.com/office/powerpoint/2010/main" xmlns:p="http://schemas.openxmlformats.org/presentationml/2006/main" xmlns:r="http://schemas.openxmlformats.org/officeDocument/2006/relationships" xmlns:a="http://schemas.openxmlformats.org/drawingml/2006/main" xmlns="" val="1058275855"/>
       </p:ext>
     </p:extLst>
   </p:cSld>
@@ -2899,7 +2899,7 @@
 </file>
 
 <file path=ppt/notesSlides/notesSlide26.xml><?xml version="1.0" encoding="utf-8"?>
-<p:notes xmlns:a="http://schemas.openxmlformats.org/drawingml/2006/main" xmlns:r="http://schemas.openxmlformats.org/officeDocument/2006/relationships" xmlns:p="http://schemas.openxmlformats.org/presentationml/2006/main">
+<p:notes xmlns:a="http://schemas.openxmlformats.org/drawingml/2006/main" xmlns:r="http://schemas.openxmlformats.org/officeDocument/2006/relationships" xmlns:mc="http://schemas.openxmlformats.org/markup-compatibility/2006" xmlns:mv="urn:schemas-microsoft-com:mac:vml" xmlns:p="http://schemas.openxmlformats.org/presentationml/2006/main" mc:Ignorable="mv" mc:PreserveAttributes="mv:*">
   <p:cSld>
     <p:spTree>
       <p:nvGrpSpPr>
@@ -3021,7 +3021,7 @@
     </p:spTree>
     <p:extLst>
       <p:ext uri="{BB962C8B-B14F-4D97-AF65-F5344CB8AC3E}">
-        <p14:creationId xmlns:p14="http://schemas.microsoft.com/office/powerpoint/2010/main" val="284401046"/>
+        <p14:creationId xmlns:p14="http://schemas.microsoft.com/office/powerpoint/2010/main" xmlns:p="http://schemas.openxmlformats.org/presentationml/2006/main" xmlns:r="http://schemas.openxmlformats.org/officeDocument/2006/relationships" xmlns:a="http://schemas.openxmlformats.org/drawingml/2006/main" xmlns="" val="284401046"/>
       </p:ext>
     </p:extLst>
   </p:cSld>
@@ -3032,7 +3032,7 @@
 </file>
 
 <file path=ppt/notesSlides/notesSlide27.xml><?xml version="1.0" encoding="utf-8"?>
-<p:notes xmlns:a="http://schemas.openxmlformats.org/drawingml/2006/main" xmlns:r="http://schemas.openxmlformats.org/officeDocument/2006/relationships" xmlns:p="http://schemas.openxmlformats.org/presentationml/2006/main">
+<p:notes xmlns:a="http://schemas.openxmlformats.org/drawingml/2006/main" xmlns:r="http://schemas.openxmlformats.org/officeDocument/2006/relationships" xmlns:mc="http://schemas.openxmlformats.org/markup-compatibility/2006" xmlns:mv="urn:schemas-microsoft-com:mac:vml" xmlns:p="http://schemas.openxmlformats.org/presentationml/2006/main" mc:Ignorable="mv" mc:PreserveAttributes="mv:*">
   <p:cSld>
     <p:spTree>
       <p:nvGrpSpPr>
@@ -3130,7 +3130,7 @@
     </p:spTree>
     <p:extLst>
       <p:ext uri="{BB962C8B-B14F-4D97-AF65-F5344CB8AC3E}">
-        <p14:creationId xmlns:p14="http://schemas.microsoft.com/office/powerpoint/2010/main" val="2107302263"/>
+        <p14:creationId xmlns:p14="http://schemas.microsoft.com/office/powerpoint/2010/main" xmlns:p="http://schemas.openxmlformats.org/presentationml/2006/main" xmlns:r="http://schemas.openxmlformats.org/officeDocument/2006/relationships" xmlns:a="http://schemas.openxmlformats.org/drawingml/2006/main" xmlns="" val="2107302263"/>
       </p:ext>
     </p:extLst>
   </p:cSld>
@@ -3141,7 +3141,7 @@
 </file>
 
 <file path=ppt/notesSlides/notesSlide28.xml><?xml version="1.0" encoding="utf-8"?>
-<p:notes xmlns:a="http://schemas.openxmlformats.org/drawingml/2006/main" xmlns:r="http://schemas.openxmlformats.org/officeDocument/2006/relationships" xmlns:p="http://schemas.openxmlformats.org/presentationml/2006/main">
+<p:notes xmlns:a="http://schemas.openxmlformats.org/drawingml/2006/main" xmlns:r="http://schemas.openxmlformats.org/officeDocument/2006/relationships" xmlns:mc="http://schemas.openxmlformats.org/markup-compatibility/2006" xmlns:mv="urn:schemas-microsoft-com:mac:vml" xmlns:p="http://schemas.openxmlformats.org/presentationml/2006/main" mc:Ignorable="mv" mc:PreserveAttributes="mv:*">
   <p:cSld>
     <p:spTree>
       <p:nvGrpSpPr>
@@ -3272,7 +3272,7 @@
     </p:spTree>
     <p:extLst>
       <p:ext uri="{BB962C8B-B14F-4D97-AF65-F5344CB8AC3E}">
-        <p14:creationId xmlns:p14="http://schemas.microsoft.com/office/powerpoint/2010/main" val="1980234669"/>
+        <p14:creationId xmlns:p14="http://schemas.microsoft.com/office/powerpoint/2010/main" xmlns:p="http://schemas.openxmlformats.org/presentationml/2006/main" xmlns:r="http://schemas.openxmlformats.org/officeDocument/2006/relationships" xmlns:a="http://schemas.openxmlformats.org/drawingml/2006/main" xmlns="" val="1980234669"/>
       </p:ext>
     </p:extLst>
   </p:cSld>
@@ -3283,7 +3283,7 @@
 </file>
 
 <file path=ppt/notesSlides/notesSlide29.xml><?xml version="1.0" encoding="utf-8"?>
-<p:notes xmlns:a="http://schemas.openxmlformats.org/drawingml/2006/main" xmlns:r="http://schemas.openxmlformats.org/officeDocument/2006/relationships" xmlns:p="http://schemas.openxmlformats.org/presentationml/2006/main">
+<p:notes xmlns:a="http://schemas.openxmlformats.org/drawingml/2006/main" xmlns:r="http://schemas.openxmlformats.org/officeDocument/2006/relationships" xmlns:mc="http://schemas.openxmlformats.org/markup-compatibility/2006" xmlns:mv="urn:schemas-microsoft-com:mac:vml" xmlns:p="http://schemas.openxmlformats.org/presentationml/2006/main" mc:Ignorable="mv" mc:PreserveAttributes="mv:*">
   <p:cSld>
     <p:spTree>
       <p:nvGrpSpPr>
@@ -3382,7 +3382,7 @@
     </p:spTree>
     <p:extLst>
       <p:ext uri="{BB962C8B-B14F-4D97-AF65-F5344CB8AC3E}">
-        <p14:creationId xmlns:p14="http://schemas.microsoft.com/office/powerpoint/2010/main" val="482006622"/>
+        <p14:creationId xmlns:p14="http://schemas.microsoft.com/office/powerpoint/2010/main" xmlns:p="http://schemas.openxmlformats.org/presentationml/2006/main" xmlns:r="http://schemas.openxmlformats.org/officeDocument/2006/relationships" xmlns:a="http://schemas.openxmlformats.org/drawingml/2006/main" xmlns="" val="482006622"/>
       </p:ext>
     </p:extLst>
   </p:cSld>
@@ -3393,7 +3393,7 @@
 </file>
 
 <file path=ppt/notesSlides/notesSlide3.xml><?xml version="1.0" encoding="utf-8"?>
-<p:notes xmlns:a="http://schemas.openxmlformats.org/drawingml/2006/main" xmlns:r="http://schemas.openxmlformats.org/officeDocument/2006/relationships" xmlns:p="http://schemas.openxmlformats.org/presentationml/2006/main">
+<p:notes xmlns:a="http://schemas.openxmlformats.org/drawingml/2006/main" xmlns:r="http://schemas.openxmlformats.org/officeDocument/2006/relationships" xmlns:mc="http://schemas.openxmlformats.org/markup-compatibility/2006" xmlns:mv="urn:schemas-microsoft-com:mac:vml" xmlns:p="http://schemas.openxmlformats.org/presentationml/2006/main" mc:Ignorable="mv" mc:PreserveAttributes="mv:*">
   <p:cSld>
     <p:spTree>
       <p:nvGrpSpPr>
@@ -3506,7 +3506,7 @@
     </p:spTree>
     <p:extLst>
       <p:ext uri="{BB962C8B-B14F-4D97-AF65-F5344CB8AC3E}">
-        <p14:creationId xmlns:p14="http://schemas.microsoft.com/office/powerpoint/2010/main" val="1764799602"/>
+        <p14:creationId xmlns:p14="http://schemas.microsoft.com/office/powerpoint/2010/main" xmlns:p="http://schemas.openxmlformats.org/presentationml/2006/main" xmlns:r="http://schemas.openxmlformats.org/officeDocument/2006/relationships" xmlns:a="http://schemas.openxmlformats.org/drawingml/2006/main" xmlns="" val="1764799602"/>
       </p:ext>
     </p:extLst>
   </p:cSld>
@@ -3517,7 +3517,7 @@
 </file>
 
 <file path=ppt/notesSlides/notesSlide30.xml><?xml version="1.0" encoding="utf-8"?>
-<p:notes xmlns:a="http://schemas.openxmlformats.org/drawingml/2006/main" xmlns:r="http://schemas.openxmlformats.org/officeDocument/2006/relationships" xmlns:p="http://schemas.openxmlformats.org/presentationml/2006/main">
+<p:notes xmlns:a="http://schemas.openxmlformats.org/drawingml/2006/main" xmlns:r="http://schemas.openxmlformats.org/officeDocument/2006/relationships" xmlns:mc="http://schemas.openxmlformats.org/markup-compatibility/2006" xmlns:mv="urn:schemas-microsoft-com:mac:vml" xmlns:p="http://schemas.openxmlformats.org/presentationml/2006/main" mc:Ignorable="mv" mc:PreserveAttributes="mv:*">
   <p:cSld>
     <p:spTree>
       <p:nvGrpSpPr>
@@ -3607,7 +3607,7 @@
     </p:spTree>
     <p:extLst>
       <p:ext uri="{BB962C8B-B14F-4D97-AF65-F5344CB8AC3E}">
-        <p14:creationId xmlns:p14="http://schemas.microsoft.com/office/powerpoint/2010/main" val="1449030827"/>
+        <p14:creationId xmlns:p14="http://schemas.microsoft.com/office/powerpoint/2010/main" xmlns:p="http://schemas.openxmlformats.org/presentationml/2006/main" xmlns:r="http://schemas.openxmlformats.org/officeDocument/2006/relationships" xmlns:a="http://schemas.openxmlformats.org/drawingml/2006/main" xmlns="" val="1449030827"/>
       </p:ext>
     </p:extLst>
   </p:cSld>
@@ -3618,7 +3618,7 @@
 </file>
 
 <file path=ppt/notesSlides/notesSlide31.xml><?xml version="1.0" encoding="utf-8"?>
-<p:notes xmlns:a="http://schemas.openxmlformats.org/drawingml/2006/main" xmlns:r="http://schemas.openxmlformats.org/officeDocument/2006/relationships" xmlns:p="http://schemas.openxmlformats.org/presentationml/2006/main">
+<p:notes xmlns:a="http://schemas.openxmlformats.org/drawingml/2006/main" xmlns:r="http://schemas.openxmlformats.org/officeDocument/2006/relationships" xmlns:mc="http://schemas.openxmlformats.org/markup-compatibility/2006" xmlns:mv="urn:schemas-microsoft-com:mac:vml" xmlns:p="http://schemas.openxmlformats.org/presentationml/2006/main" mc:Ignorable="mv" mc:PreserveAttributes="mv:*">
   <p:cSld>
     <p:spTree>
       <p:nvGrpSpPr>
@@ -3724,7 +3724,7 @@
     </p:spTree>
     <p:extLst>
       <p:ext uri="{BB962C8B-B14F-4D97-AF65-F5344CB8AC3E}">
-        <p14:creationId xmlns:p14="http://schemas.microsoft.com/office/powerpoint/2010/main" val="757552106"/>
+        <p14:creationId xmlns:p14="http://schemas.microsoft.com/office/powerpoint/2010/main" xmlns:p="http://schemas.openxmlformats.org/presentationml/2006/main" xmlns:r="http://schemas.openxmlformats.org/officeDocument/2006/relationships" xmlns:a="http://schemas.openxmlformats.org/drawingml/2006/main" xmlns="" val="757552106"/>
       </p:ext>
     </p:extLst>
   </p:cSld>
@@ -3735,7 +3735,7 @@
 </file>
 
 <file path=ppt/notesSlides/notesSlide32.xml><?xml version="1.0" encoding="utf-8"?>
-<p:notes xmlns:a="http://schemas.openxmlformats.org/drawingml/2006/main" xmlns:r="http://schemas.openxmlformats.org/officeDocument/2006/relationships" xmlns:p="http://schemas.openxmlformats.org/presentationml/2006/main">
+<p:notes xmlns:a="http://schemas.openxmlformats.org/drawingml/2006/main" xmlns:r="http://schemas.openxmlformats.org/officeDocument/2006/relationships" xmlns:mc="http://schemas.openxmlformats.org/markup-compatibility/2006" xmlns:mv="urn:schemas-microsoft-com:mac:vml" xmlns:p="http://schemas.openxmlformats.org/presentationml/2006/main" mc:Ignorable="mv" mc:PreserveAttributes="mv:*">
   <p:cSld>
     <p:spTree>
       <p:nvGrpSpPr>
@@ -3833,7 +3833,7 @@
     </p:spTree>
     <p:extLst>
       <p:ext uri="{BB962C8B-B14F-4D97-AF65-F5344CB8AC3E}">
-        <p14:creationId xmlns:p14="http://schemas.microsoft.com/office/powerpoint/2010/main" val="505885279"/>
+        <p14:creationId xmlns:p14="http://schemas.microsoft.com/office/powerpoint/2010/main" xmlns:p="http://schemas.openxmlformats.org/presentationml/2006/main" xmlns:r="http://schemas.openxmlformats.org/officeDocument/2006/relationships" xmlns:a="http://schemas.openxmlformats.org/drawingml/2006/main" xmlns="" val="505885279"/>
       </p:ext>
     </p:extLst>
   </p:cSld>
@@ -3844,7 +3844,7 @@
 </file>
 
 <file path=ppt/notesSlides/notesSlide33.xml><?xml version="1.0" encoding="utf-8"?>
-<p:notes xmlns:a="http://schemas.openxmlformats.org/drawingml/2006/main" xmlns:r="http://schemas.openxmlformats.org/officeDocument/2006/relationships" xmlns:p="http://schemas.openxmlformats.org/presentationml/2006/main">
+<p:notes xmlns:a="http://schemas.openxmlformats.org/drawingml/2006/main" xmlns:r="http://schemas.openxmlformats.org/officeDocument/2006/relationships" xmlns:mc="http://schemas.openxmlformats.org/markup-compatibility/2006" xmlns:mv="urn:schemas-microsoft-com:mac:vml" xmlns:p="http://schemas.openxmlformats.org/presentationml/2006/main" mc:Ignorable="mv" mc:PreserveAttributes="mv:*">
   <p:cSld>
     <p:spTree>
       <p:nvGrpSpPr>
@@ -3966,7 +3966,7 @@
     </p:spTree>
     <p:extLst>
       <p:ext uri="{BB962C8B-B14F-4D97-AF65-F5344CB8AC3E}">
-        <p14:creationId xmlns:p14="http://schemas.microsoft.com/office/powerpoint/2010/main" val="1124783118"/>
+        <p14:creationId xmlns:p14="http://schemas.microsoft.com/office/powerpoint/2010/main" xmlns:p="http://schemas.openxmlformats.org/presentationml/2006/main" xmlns:r="http://schemas.openxmlformats.org/officeDocument/2006/relationships" xmlns:a="http://schemas.openxmlformats.org/drawingml/2006/main" xmlns="" val="1124783118"/>
       </p:ext>
     </p:extLst>
   </p:cSld>
@@ -3977,7 +3977,7 @@
 </file>
 
 <file path=ppt/notesSlides/notesSlide34.xml><?xml version="1.0" encoding="utf-8"?>
-<p:notes xmlns:a="http://schemas.openxmlformats.org/drawingml/2006/main" xmlns:r="http://schemas.openxmlformats.org/officeDocument/2006/relationships" xmlns:p="http://schemas.openxmlformats.org/presentationml/2006/main">
+<p:notes xmlns:a="http://schemas.openxmlformats.org/drawingml/2006/main" xmlns:r="http://schemas.openxmlformats.org/officeDocument/2006/relationships" xmlns:mc="http://schemas.openxmlformats.org/markup-compatibility/2006" xmlns:mv="urn:schemas-microsoft-com:mac:vml" xmlns:p="http://schemas.openxmlformats.org/presentationml/2006/main" mc:Ignorable="mv" mc:PreserveAttributes="mv:*">
   <p:cSld>
     <p:spTree>
       <p:nvGrpSpPr>
@@ -4059,7 +4059,7 @@
     </p:spTree>
     <p:extLst>
       <p:ext uri="{BB962C8B-B14F-4D97-AF65-F5344CB8AC3E}">
-        <p14:creationId xmlns:p14="http://schemas.microsoft.com/office/powerpoint/2010/main" val="163846026"/>
+        <p14:creationId xmlns:p14="http://schemas.microsoft.com/office/powerpoint/2010/main" xmlns:p="http://schemas.openxmlformats.org/presentationml/2006/main" xmlns:r="http://schemas.openxmlformats.org/officeDocument/2006/relationships" xmlns:a="http://schemas.openxmlformats.org/drawingml/2006/main" xmlns="" val="163846026"/>
       </p:ext>
     </p:extLst>
   </p:cSld>
@@ -4070,7 +4070,7 @@
 </file>
 
 <file path=ppt/notesSlides/notesSlide35.xml><?xml version="1.0" encoding="utf-8"?>
-<p:notes xmlns:a="http://schemas.openxmlformats.org/drawingml/2006/main" xmlns:r="http://schemas.openxmlformats.org/officeDocument/2006/relationships" xmlns:p="http://schemas.openxmlformats.org/presentationml/2006/main">
+<p:notes xmlns:a="http://schemas.openxmlformats.org/drawingml/2006/main" xmlns:r="http://schemas.openxmlformats.org/officeDocument/2006/relationships" xmlns:mc="http://schemas.openxmlformats.org/markup-compatibility/2006" xmlns:mv="urn:schemas-microsoft-com:mac:vml" xmlns:p="http://schemas.openxmlformats.org/presentationml/2006/main" mc:Ignorable="mv" mc:PreserveAttributes="mv:*">
   <p:cSld>
     <p:spTree>
       <p:nvGrpSpPr>
@@ -4177,7 +4177,7 @@
     </p:spTree>
     <p:extLst>
       <p:ext uri="{BB962C8B-B14F-4D97-AF65-F5344CB8AC3E}">
-        <p14:creationId xmlns:p14="http://schemas.microsoft.com/office/powerpoint/2010/main" val="2080801414"/>
+        <p14:creationId xmlns:p14="http://schemas.microsoft.com/office/powerpoint/2010/main" xmlns:p="http://schemas.openxmlformats.org/presentationml/2006/main" xmlns:r="http://schemas.openxmlformats.org/officeDocument/2006/relationships" xmlns:a="http://schemas.openxmlformats.org/drawingml/2006/main" xmlns="" val="2080801414"/>
       </p:ext>
     </p:extLst>
   </p:cSld>
@@ -4188,7 +4188,7 @@
 </file>
 
 <file path=ppt/notesSlides/notesSlide36.xml><?xml version="1.0" encoding="utf-8"?>
-<p:notes xmlns:a="http://schemas.openxmlformats.org/drawingml/2006/main" xmlns:r="http://schemas.openxmlformats.org/officeDocument/2006/relationships" xmlns:p="http://schemas.openxmlformats.org/presentationml/2006/main">
+<p:notes xmlns:a="http://schemas.openxmlformats.org/drawingml/2006/main" xmlns:r="http://schemas.openxmlformats.org/officeDocument/2006/relationships" xmlns:mc="http://schemas.openxmlformats.org/markup-compatibility/2006" xmlns:mv="urn:schemas-microsoft-com:mac:vml" xmlns:p="http://schemas.openxmlformats.org/presentationml/2006/main" mc:Ignorable="mv" mc:PreserveAttributes="mv:*">
   <p:cSld>
     <p:spTree>
       <p:nvGrpSpPr>
@@ -4298,7 +4298,7 @@
     </p:spTree>
     <p:extLst>
       <p:ext uri="{BB962C8B-B14F-4D97-AF65-F5344CB8AC3E}">
-        <p14:creationId xmlns:p14="http://schemas.microsoft.com/office/powerpoint/2010/main" val="1199116108"/>
+        <p14:creationId xmlns:p14="http://schemas.microsoft.com/office/powerpoint/2010/main" xmlns:p="http://schemas.openxmlformats.org/presentationml/2006/main" xmlns:r="http://schemas.openxmlformats.org/officeDocument/2006/relationships" xmlns:a="http://schemas.openxmlformats.org/drawingml/2006/main" xmlns="" val="1199116108"/>
       </p:ext>
     </p:extLst>
   </p:cSld>
@@ -4309,7 +4309,7 @@
 </file>
 
 <file path=ppt/notesSlides/notesSlide37.xml><?xml version="1.0" encoding="utf-8"?>
-<p:notes xmlns:a="http://schemas.openxmlformats.org/drawingml/2006/main" xmlns:r="http://schemas.openxmlformats.org/officeDocument/2006/relationships" xmlns:p="http://schemas.openxmlformats.org/presentationml/2006/main">
+<p:notes xmlns:a="http://schemas.openxmlformats.org/drawingml/2006/main" xmlns:r="http://schemas.openxmlformats.org/officeDocument/2006/relationships" xmlns:mc="http://schemas.openxmlformats.org/markup-compatibility/2006" xmlns:mv="urn:schemas-microsoft-com:mac:vml" xmlns:p="http://schemas.openxmlformats.org/presentationml/2006/main" mc:Ignorable="mv" mc:PreserveAttributes="mv:*">
   <p:cSld>
     <p:spTree>
       <p:nvGrpSpPr>
@@ -4463,7 +4463,7 @@
     </p:spTree>
     <p:extLst>
       <p:ext uri="{BB962C8B-B14F-4D97-AF65-F5344CB8AC3E}">
-        <p14:creationId xmlns:p14="http://schemas.microsoft.com/office/powerpoint/2010/main" val="985019265"/>
+        <p14:creationId xmlns:p14="http://schemas.microsoft.com/office/powerpoint/2010/main" xmlns:p="http://schemas.openxmlformats.org/presentationml/2006/main" xmlns:r="http://schemas.openxmlformats.org/officeDocument/2006/relationships" xmlns:a="http://schemas.openxmlformats.org/drawingml/2006/main" xmlns="" val="985019265"/>
       </p:ext>
     </p:extLst>
   </p:cSld>
@@ -4474,7 +4474,7 @@
 </file>
 
 <file path=ppt/notesSlides/notesSlide38.xml><?xml version="1.0" encoding="utf-8"?>
-<p:notes xmlns:a="http://schemas.openxmlformats.org/drawingml/2006/main" xmlns:r="http://schemas.openxmlformats.org/officeDocument/2006/relationships" xmlns:p="http://schemas.openxmlformats.org/presentationml/2006/main">
+<p:notes xmlns:a="http://schemas.openxmlformats.org/drawingml/2006/main" xmlns:r="http://schemas.openxmlformats.org/officeDocument/2006/relationships" xmlns:mc="http://schemas.openxmlformats.org/markup-compatibility/2006" xmlns:mv="urn:schemas-microsoft-com:mac:vml" xmlns:p="http://schemas.openxmlformats.org/presentationml/2006/main" mc:Ignorable="mv" mc:PreserveAttributes="mv:*">
   <p:cSld>
     <p:spTree>
       <p:nvGrpSpPr>
@@ -4574,7 +4574,7 @@
     </p:spTree>
     <p:extLst>
       <p:ext uri="{BB962C8B-B14F-4D97-AF65-F5344CB8AC3E}">
-        <p14:creationId xmlns:p14="http://schemas.microsoft.com/office/powerpoint/2010/main" val="1651491368"/>
+        <p14:creationId xmlns:p14="http://schemas.microsoft.com/office/powerpoint/2010/main" xmlns:p="http://schemas.openxmlformats.org/presentationml/2006/main" xmlns:r="http://schemas.openxmlformats.org/officeDocument/2006/relationships" xmlns:a="http://schemas.openxmlformats.org/drawingml/2006/main" xmlns="" val="1651491368"/>
       </p:ext>
     </p:extLst>
   </p:cSld>
@@ -4585,7 +4585,7 @@
 </file>
 
 <file path=ppt/notesSlides/notesSlide39.xml><?xml version="1.0" encoding="utf-8"?>
-<p:notes xmlns:a="http://schemas.openxmlformats.org/drawingml/2006/main" xmlns:r="http://schemas.openxmlformats.org/officeDocument/2006/relationships" xmlns:p="http://schemas.openxmlformats.org/presentationml/2006/main">
+<p:notes xmlns:a="http://schemas.openxmlformats.org/drawingml/2006/main" xmlns:r="http://schemas.openxmlformats.org/officeDocument/2006/relationships" xmlns:mc="http://schemas.openxmlformats.org/markup-compatibility/2006" xmlns:mv="urn:schemas-microsoft-com:mac:vml" xmlns:p="http://schemas.openxmlformats.org/presentationml/2006/main" mc:Ignorable="mv" mc:PreserveAttributes="mv:*">
   <p:cSld>
     <p:spTree>
       <p:nvGrpSpPr>
@@ -4687,7 +4687,7 @@
     </p:spTree>
     <p:extLst>
       <p:ext uri="{BB962C8B-B14F-4D97-AF65-F5344CB8AC3E}">
-        <p14:creationId xmlns:p14="http://schemas.microsoft.com/office/powerpoint/2010/main" val="1264428276"/>
+        <p14:creationId xmlns:p14="http://schemas.microsoft.com/office/powerpoint/2010/main" xmlns:p="http://schemas.openxmlformats.org/presentationml/2006/main" xmlns:r="http://schemas.openxmlformats.org/officeDocument/2006/relationships" xmlns:a="http://schemas.openxmlformats.org/drawingml/2006/main" xmlns="" val="1264428276"/>
       </p:ext>
     </p:extLst>
   </p:cSld>
@@ -4698,7 +4698,7 @@
 </file>
 
 <file path=ppt/notesSlides/notesSlide4.xml><?xml version="1.0" encoding="utf-8"?>
-<p:notes xmlns:a="http://schemas.openxmlformats.org/drawingml/2006/main" xmlns:r="http://schemas.openxmlformats.org/officeDocument/2006/relationships" xmlns:p="http://schemas.openxmlformats.org/presentationml/2006/main">
+<p:notes xmlns:a="http://schemas.openxmlformats.org/drawingml/2006/main" xmlns:r="http://schemas.openxmlformats.org/officeDocument/2006/relationships" xmlns:mc="http://schemas.openxmlformats.org/markup-compatibility/2006" xmlns:mv="urn:schemas-microsoft-com:mac:vml" xmlns:p="http://schemas.openxmlformats.org/presentationml/2006/main" mc:Ignorable="mv" mc:PreserveAttributes="mv:*">
   <p:cSld>
     <p:spTree>
       <p:nvGrpSpPr>
@@ -4809,7 +4809,7 @@
     </p:spTree>
     <p:extLst>
       <p:ext uri="{BB962C8B-B14F-4D97-AF65-F5344CB8AC3E}">
-        <p14:creationId xmlns:p14="http://schemas.microsoft.com/office/powerpoint/2010/main" val="1887372709"/>
+        <p14:creationId xmlns:p14="http://schemas.microsoft.com/office/powerpoint/2010/main" xmlns:p="http://schemas.openxmlformats.org/presentationml/2006/main" xmlns:r="http://schemas.openxmlformats.org/officeDocument/2006/relationships" xmlns:a="http://schemas.openxmlformats.org/drawingml/2006/main" xmlns="" val="1887372709"/>
       </p:ext>
     </p:extLst>
   </p:cSld>
@@ -4820,7 +4820,7 @@
 </file>
 
 <file path=ppt/notesSlides/notesSlide40.xml><?xml version="1.0" encoding="utf-8"?>
-<p:notes xmlns:a="http://schemas.openxmlformats.org/drawingml/2006/main" xmlns:r="http://schemas.openxmlformats.org/officeDocument/2006/relationships" xmlns:p="http://schemas.openxmlformats.org/presentationml/2006/main">
+<p:notes xmlns:a="http://schemas.openxmlformats.org/drawingml/2006/main" xmlns:r="http://schemas.openxmlformats.org/officeDocument/2006/relationships" xmlns:mc="http://schemas.openxmlformats.org/markup-compatibility/2006" xmlns:mv="urn:schemas-microsoft-com:mac:vml" xmlns:p="http://schemas.openxmlformats.org/presentationml/2006/main" mc:Ignorable="mv" mc:PreserveAttributes="mv:*">
   <p:cSld>
     <p:spTree>
       <p:nvGrpSpPr>
@@ -4949,7 +4949,7 @@
     </p:spTree>
     <p:extLst>
       <p:ext uri="{BB962C8B-B14F-4D97-AF65-F5344CB8AC3E}">
-        <p14:creationId xmlns:p14="http://schemas.microsoft.com/office/powerpoint/2010/main" val="52196230"/>
+        <p14:creationId xmlns:p14="http://schemas.microsoft.com/office/powerpoint/2010/main" xmlns:p="http://schemas.openxmlformats.org/presentationml/2006/main" xmlns:r="http://schemas.openxmlformats.org/officeDocument/2006/relationships" xmlns:a="http://schemas.openxmlformats.org/drawingml/2006/main" xmlns="" val="52196230"/>
       </p:ext>
     </p:extLst>
   </p:cSld>
@@ -4960,7 +4960,7 @@
 </file>
 
 <file path=ppt/notesSlides/notesSlide41.xml><?xml version="1.0" encoding="utf-8"?>
-<p:notes xmlns:a="http://schemas.openxmlformats.org/drawingml/2006/main" xmlns:r="http://schemas.openxmlformats.org/officeDocument/2006/relationships" xmlns:p="http://schemas.openxmlformats.org/presentationml/2006/main">
+<p:notes xmlns:a="http://schemas.openxmlformats.org/drawingml/2006/main" xmlns:r="http://schemas.openxmlformats.org/officeDocument/2006/relationships" xmlns:mc="http://schemas.openxmlformats.org/markup-compatibility/2006" xmlns:mv="urn:schemas-microsoft-com:mac:vml" xmlns:p="http://schemas.openxmlformats.org/presentationml/2006/main" mc:Ignorable="mv" mc:PreserveAttributes="mv:*">
   <p:cSld>
     <p:spTree>
       <p:nvGrpSpPr>
@@ -5041,7 +5041,7 @@
     </p:spTree>
     <p:extLst>
       <p:ext uri="{BB962C8B-B14F-4D97-AF65-F5344CB8AC3E}">
-        <p14:creationId xmlns:p14="http://schemas.microsoft.com/office/powerpoint/2010/main" val="2096419307"/>
+        <p14:creationId xmlns:p14="http://schemas.microsoft.com/office/powerpoint/2010/main" xmlns:p="http://schemas.openxmlformats.org/presentationml/2006/main" xmlns:r="http://schemas.openxmlformats.org/officeDocument/2006/relationships" xmlns:a="http://schemas.openxmlformats.org/drawingml/2006/main" xmlns="" val="2096419307"/>
       </p:ext>
     </p:extLst>
   </p:cSld>
@@ -5052,7 +5052,7 @@
 </file>
 
 <file path=ppt/notesSlides/notesSlide5.xml><?xml version="1.0" encoding="utf-8"?>
-<p:notes xmlns:a="http://schemas.openxmlformats.org/drawingml/2006/main" xmlns:r="http://schemas.openxmlformats.org/officeDocument/2006/relationships" xmlns:p="http://schemas.openxmlformats.org/presentationml/2006/main">
+<p:notes xmlns:a="http://schemas.openxmlformats.org/drawingml/2006/main" xmlns:r="http://schemas.openxmlformats.org/officeDocument/2006/relationships" xmlns:mc="http://schemas.openxmlformats.org/markup-compatibility/2006" xmlns:mv="urn:schemas-microsoft-com:mac:vml" xmlns:p="http://schemas.openxmlformats.org/presentationml/2006/main" mc:Ignorable="mv" mc:PreserveAttributes="mv:*">
   <p:cSld>
     <p:spTree>
       <p:nvGrpSpPr>
@@ -5126,7 +5126,7 @@
     </p:spTree>
     <p:extLst>
       <p:ext uri="{BB962C8B-B14F-4D97-AF65-F5344CB8AC3E}">
-        <p14:creationId xmlns:p14="http://schemas.microsoft.com/office/powerpoint/2010/main" val="1418377824"/>
+        <p14:creationId xmlns:p14="http://schemas.microsoft.com/office/powerpoint/2010/main" xmlns:p="http://schemas.openxmlformats.org/presentationml/2006/main" xmlns:r="http://schemas.openxmlformats.org/officeDocument/2006/relationships" xmlns:a="http://schemas.openxmlformats.org/drawingml/2006/main" xmlns="" val="1418377824"/>
       </p:ext>
     </p:extLst>
   </p:cSld>
@@ -5137,7 +5137,7 @@
 </file>
 
 <file path=ppt/notesSlides/notesSlide6.xml><?xml version="1.0" encoding="utf-8"?>
-<p:notes xmlns:a="http://schemas.openxmlformats.org/drawingml/2006/main" xmlns:r="http://schemas.openxmlformats.org/officeDocument/2006/relationships" xmlns:p="http://schemas.openxmlformats.org/presentationml/2006/main">
+<p:notes xmlns:a="http://schemas.openxmlformats.org/drawingml/2006/main" xmlns:r="http://schemas.openxmlformats.org/officeDocument/2006/relationships" xmlns:mc="http://schemas.openxmlformats.org/markup-compatibility/2006" xmlns:mv="urn:schemas-microsoft-com:mac:vml" xmlns:p="http://schemas.openxmlformats.org/presentationml/2006/main" mc:Ignorable="mv" mc:PreserveAttributes="mv:*">
   <p:cSld>
     <p:spTree>
       <p:nvGrpSpPr>
@@ -5245,7 +5245,7 @@
     </p:spTree>
     <p:extLst>
       <p:ext uri="{BB962C8B-B14F-4D97-AF65-F5344CB8AC3E}">
-        <p14:creationId xmlns:p14="http://schemas.microsoft.com/office/powerpoint/2010/main" val="2086426095"/>
+        <p14:creationId xmlns:p14="http://schemas.microsoft.com/office/powerpoint/2010/main" xmlns:p="http://schemas.openxmlformats.org/presentationml/2006/main" xmlns:r="http://schemas.openxmlformats.org/officeDocument/2006/relationships" xmlns:a="http://schemas.openxmlformats.org/drawingml/2006/main" xmlns="" val="2086426095"/>
       </p:ext>
     </p:extLst>
   </p:cSld>
@@ -5256,7 +5256,7 @@
 </file>
 
 <file path=ppt/notesSlides/notesSlide7.xml><?xml version="1.0" encoding="utf-8"?>
-<p:notes xmlns:a="http://schemas.openxmlformats.org/drawingml/2006/main" xmlns:r="http://schemas.openxmlformats.org/officeDocument/2006/relationships" xmlns:p="http://schemas.openxmlformats.org/presentationml/2006/main">
+<p:notes xmlns:a="http://schemas.openxmlformats.org/drawingml/2006/main" xmlns:r="http://schemas.openxmlformats.org/officeDocument/2006/relationships" xmlns:mc="http://schemas.openxmlformats.org/markup-compatibility/2006" xmlns:mv="urn:schemas-microsoft-com:mac:vml" xmlns:p="http://schemas.openxmlformats.org/presentationml/2006/main" mc:Ignorable="mv" mc:PreserveAttributes="mv:*">
   <p:cSld>
     <p:spTree>
       <p:nvGrpSpPr>
@@ -5409,7 +5409,7 @@
     </p:spTree>
     <p:extLst>
       <p:ext uri="{BB962C8B-B14F-4D97-AF65-F5344CB8AC3E}">
-        <p14:creationId xmlns:p14="http://schemas.microsoft.com/office/powerpoint/2010/main" val="801220236"/>
+        <p14:creationId xmlns:p14="http://schemas.microsoft.com/office/powerpoint/2010/main" xmlns:p="http://schemas.openxmlformats.org/presentationml/2006/main" xmlns:r="http://schemas.openxmlformats.org/officeDocument/2006/relationships" xmlns:a="http://schemas.openxmlformats.org/drawingml/2006/main" xmlns="" val="801220236"/>
       </p:ext>
     </p:extLst>
   </p:cSld>
@@ -5420,7 +5420,7 @@
 </file>
 
 <file path=ppt/notesSlides/notesSlide8.xml><?xml version="1.0" encoding="utf-8"?>
-<p:notes xmlns:a="http://schemas.openxmlformats.org/drawingml/2006/main" xmlns:r="http://schemas.openxmlformats.org/officeDocument/2006/relationships" xmlns:p="http://schemas.openxmlformats.org/presentationml/2006/main">
+<p:notes xmlns:a="http://schemas.openxmlformats.org/drawingml/2006/main" xmlns:r="http://schemas.openxmlformats.org/officeDocument/2006/relationships" xmlns:mc="http://schemas.openxmlformats.org/markup-compatibility/2006" xmlns:mv="urn:schemas-microsoft-com:mac:vml" xmlns:p="http://schemas.openxmlformats.org/presentationml/2006/main" mc:Ignorable="mv" mc:PreserveAttributes="mv:*">
   <p:cSld>
     <p:spTree>
       <p:nvGrpSpPr>
@@ -5571,7 +5571,7 @@
     </p:spTree>
     <p:extLst>
       <p:ext uri="{BB962C8B-B14F-4D97-AF65-F5344CB8AC3E}">
-        <p14:creationId xmlns:p14="http://schemas.microsoft.com/office/powerpoint/2010/main" val="1448925256"/>
+        <p14:creationId xmlns:p14="http://schemas.microsoft.com/office/powerpoint/2010/main" xmlns:p="http://schemas.openxmlformats.org/presentationml/2006/main" xmlns:r="http://schemas.openxmlformats.org/officeDocument/2006/relationships" xmlns:a="http://schemas.openxmlformats.org/drawingml/2006/main" xmlns="" val="1448925256"/>
       </p:ext>
     </p:extLst>
   </p:cSld>
@@ -5582,7 +5582,7 @@
 </file>
 
 <file path=ppt/notesSlides/notesSlide9.xml><?xml version="1.0" encoding="utf-8"?>
-<p:notes xmlns:a="http://schemas.openxmlformats.org/drawingml/2006/main" xmlns:r="http://schemas.openxmlformats.org/officeDocument/2006/relationships" xmlns:p="http://schemas.openxmlformats.org/presentationml/2006/main">
+<p:notes xmlns:a="http://schemas.openxmlformats.org/drawingml/2006/main" xmlns:r="http://schemas.openxmlformats.org/officeDocument/2006/relationships" xmlns:mc="http://schemas.openxmlformats.org/markup-compatibility/2006" xmlns:mv="urn:schemas-microsoft-com:mac:vml" xmlns:p="http://schemas.openxmlformats.org/presentationml/2006/main" mc:Ignorable="mv" mc:PreserveAttributes="mv:*">
   <p:cSld>
     <p:spTree>
       <p:nvGrpSpPr>
@@ -5736,7 +5736,7 @@
     </p:spTree>
     <p:extLst>
       <p:ext uri="{BB962C8B-B14F-4D97-AF65-F5344CB8AC3E}">
-        <p14:creationId xmlns:p14="http://schemas.microsoft.com/office/powerpoint/2010/main" val="2031048549"/>
+        <p14:creationId xmlns:p14="http://schemas.microsoft.com/office/powerpoint/2010/main" xmlns:p="http://schemas.openxmlformats.org/presentationml/2006/main" xmlns:r="http://schemas.openxmlformats.org/officeDocument/2006/relationships" xmlns:a="http://schemas.openxmlformats.org/drawingml/2006/main" xmlns="" val="2031048549"/>
       </p:ext>
     </p:extLst>
   </p:cSld>
@@ -5747,7 +5747,7 @@
 </file>
 
 <file path=ppt/slideLayouts/slideLayout1.xml><?xml version="1.0" encoding="utf-8"?>
-<p:sldLayout xmlns:a="http://schemas.openxmlformats.org/drawingml/2006/main" xmlns:r="http://schemas.openxmlformats.org/officeDocument/2006/relationships" xmlns:p="http://schemas.openxmlformats.org/presentationml/2006/main" preserve="1" userDrawn="1">
+<p:sldLayout xmlns:a="http://schemas.openxmlformats.org/drawingml/2006/main" xmlns:r="http://schemas.openxmlformats.org/officeDocument/2006/relationships" xmlns:mc="http://schemas.openxmlformats.org/markup-compatibility/2006" xmlns:mv="urn:schemas-microsoft-com:mac:vml" xmlns:p="http://schemas.openxmlformats.org/presentationml/2006/main" mc:Ignorable="mv" mc:PreserveAttributes="mv:*" preserve="1" userDrawn="1">
   <p:cSld name="Title Slide">
     <p:bg>
       <p:bgPr>
@@ -6000,7 +6000,7 @@
           <a:blip r:embed="rId3">
             <a:extLst>
               <a:ext uri="{28A0092B-C50C-407E-A947-70E740481C1C}">
-                <a14:useLocalDpi xmlns:a14="http://schemas.microsoft.com/office/drawing/2010/main" val="0"/>
+                <a14:useLocalDpi xmlns:a14="http://schemas.microsoft.com/office/drawing/2010/main" xmlns:p="http://schemas.openxmlformats.org/presentationml/2006/main" xmlns:r="http://schemas.openxmlformats.org/officeDocument/2006/relationships" xmlns:a="http://schemas.openxmlformats.org/drawingml/2006/main" xmlns="" val="0"/>
               </a:ext>
             </a:extLst>
           </a:blip>
@@ -6021,7 +6021,7 @@
     </p:spTree>
     <p:extLst>
       <p:ext uri="{BB962C8B-B14F-4D97-AF65-F5344CB8AC3E}">
-        <p14:creationId xmlns:p14="http://schemas.microsoft.com/office/powerpoint/2010/main" val="2005314365"/>
+        <p14:creationId xmlns:p14="http://schemas.microsoft.com/office/powerpoint/2010/main" xmlns:p="http://schemas.openxmlformats.org/presentationml/2006/main" xmlns:r="http://schemas.openxmlformats.org/officeDocument/2006/relationships" xmlns:a="http://schemas.openxmlformats.org/drawingml/2006/main" xmlns="" val="2005314365"/>
       </p:ext>
     </p:extLst>
   </p:cSld>
@@ -6032,7 +6032,7 @@
 </file>
 
 <file path=ppt/slideLayouts/slideLayout10.xml><?xml version="1.0" encoding="utf-8"?>
-<p:sldLayout xmlns:a="http://schemas.openxmlformats.org/drawingml/2006/main" xmlns:r="http://schemas.openxmlformats.org/officeDocument/2006/relationships" xmlns:p="http://schemas.openxmlformats.org/presentationml/2006/main" preserve="1" userDrawn="1">
+<p:sldLayout xmlns:a="http://schemas.openxmlformats.org/drawingml/2006/main" xmlns:r="http://schemas.openxmlformats.org/officeDocument/2006/relationships" xmlns:mc="http://schemas.openxmlformats.org/markup-compatibility/2006" xmlns:mv="urn:schemas-microsoft-com:mac:vml" xmlns:p="http://schemas.openxmlformats.org/presentationml/2006/main" mc:Ignorable="mv" mc:PreserveAttributes="mv:*" preserve="1" userDrawn="1">
   <p:cSld name="Six Content - Graphics">
     <p:spTree>
       <p:nvGrpSpPr>
@@ -6733,7 +6733,7 @@
     </p:spTree>
     <p:extLst>
       <p:ext uri="{BB962C8B-B14F-4D97-AF65-F5344CB8AC3E}">
-        <p14:creationId xmlns:p14="http://schemas.microsoft.com/office/powerpoint/2010/main" val="3273093039"/>
+        <p14:creationId xmlns:p14="http://schemas.microsoft.com/office/powerpoint/2010/main" xmlns:p="http://schemas.openxmlformats.org/presentationml/2006/main" xmlns:r="http://schemas.openxmlformats.org/officeDocument/2006/relationships" xmlns:a="http://schemas.openxmlformats.org/drawingml/2006/main" xmlns="" val="3273093039"/>
       </p:ext>
     </p:extLst>
   </p:cSld>
@@ -6744,7 +6744,7 @@
 </file>
 
 <file path=ppt/slideLayouts/slideLayout11.xml><?xml version="1.0" encoding="utf-8"?>
-<p:sldLayout xmlns:a="http://schemas.openxmlformats.org/drawingml/2006/main" xmlns:r="http://schemas.openxmlformats.org/officeDocument/2006/relationships" xmlns:p="http://schemas.openxmlformats.org/presentationml/2006/main" type="titleOnly" preserve="1">
+<p:sldLayout xmlns:a="http://schemas.openxmlformats.org/drawingml/2006/main" xmlns:r="http://schemas.openxmlformats.org/officeDocument/2006/relationships" xmlns:mc="http://schemas.openxmlformats.org/markup-compatibility/2006" xmlns:mv="urn:schemas-microsoft-com:mac:vml" xmlns:p="http://schemas.openxmlformats.org/presentationml/2006/main" mc:Ignorable="mv" mc:PreserveAttributes="mv:*" type="titleOnly" preserve="1">
   <p:cSld name="Title Only">
     <p:spTree>
       <p:nvGrpSpPr>
@@ -6791,7 +6791,7 @@
     </p:spTree>
     <p:extLst>
       <p:ext uri="{BB962C8B-B14F-4D97-AF65-F5344CB8AC3E}">
-        <p14:creationId xmlns:p14="http://schemas.microsoft.com/office/powerpoint/2010/main" val="467069072"/>
+        <p14:creationId xmlns:p14="http://schemas.microsoft.com/office/powerpoint/2010/main" xmlns:p="http://schemas.openxmlformats.org/presentationml/2006/main" xmlns:r="http://schemas.openxmlformats.org/officeDocument/2006/relationships" xmlns:a="http://schemas.openxmlformats.org/drawingml/2006/main" xmlns="" val="467069072"/>
       </p:ext>
     </p:extLst>
   </p:cSld>
@@ -6802,7 +6802,7 @@
 </file>
 
 <file path=ppt/slideLayouts/slideLayout12.xml><?xml version="1.0" encoding="utf-8"?>
-<p:sldLayout xmlns:a="http://schemas.openxmlformats.org/drawingml/2006/main" xmlns:r="http://schemas.openxmlformats.org/officeDocument/2006/relationships" xmlns:p="http://schemas.openxmlformats.org/presentationml/2006/main" preserve="1">
+<p:sldLayout xmlns:a="http://schemas.openxmlformats.org/drawingml/2006/main" xmlns:r="http://schemas.openxmlformats.org/officeDocument/2006/relationships" xmlns:mc="http://schemas.openxmlformats.org/markup-compatibility/2006" xmlns:mv="urn:schemas-microsoft-com:mac:vml" xmlns:p="http://schemas.openxmlformats.org/presentationml/2006/main" mc:Ignorable="mv" mc:PreserveAttributes="mv:*" preserve="1">
   <p:cSld name="Section Header 2">
     <p:spTree>
       <p:nvGrpSpPr>
@@ -6855,7 +6855,7 @@
     </p:spTree>
     <p:extLst>
       <p:ext uri="{BB962C8B-B14F-4D97-AF65-F5344CB8AC3E}">
-        <p14:creationId xmlns:p14="http://schemas.microsoft.com/office/powerpoint/2010/main" val="4006882603"/>
+        <p14:creationId xmlns:p14="http://schemas.microsoft.com/office/powerpoint/2010/main" xmlns:p="http://schemas.openxmlformats.org/presentationml/2006/main" xmlns:r="http://schemas.openxmlformats.org/officeDocument/2006/relationships" xmlns:a="http://schemas.openxmlformats.org/drawingml/2006/main" xmlns="" val="4006882603"/>
       </p:ext>
     </p:extLst>
   </p:cSld>
@@ -6866,7 +6866,7 @@
 </file>
 
 <file path=ppt/slideLayouts/slideLayout13.xml><?xml version="1.0" encoding="utf-8"?>
-<p:sldLayout xmlns:a="http://schemas.openxmlformats.org/drawingml/2006/main" xmlns:r="http://schemas.openxmlformats.org/officeDocument/2006/relationships" xmlns:p="http://schemas.openxmlformats.org/presentationml/2006/main" type="blank" preserve="1">
+<p:sldLayout xmlns:a="http://schemas.openxmlformats.org/drawingml/2006/main" xmlns:r="http://schemas.openxmlformats.org/officeDocument/2006/relationships" xmlns:mc="http://schemas.openxmlformats.org/markup-compatibility/2006" xmlns:mv="urn:schemas-microsoft-com:mac:vml" xmlns:p="http://schemas.openxmlformats.org/presentationml/2006/main" mc:Ignorable="mv" mc:PreserveAttributes="mv:*" type="blank" preserve="1">
   <p:cSld name="Blank">
     <p:spTree>
       <p:nvGrpSpPr>
@@ -6885,7 +6885,7 @@
     </p:spTree>
     <p:extLst>
       <p:ext uri="{BB962C8B-B14F-4D97-AF65-F5344CB8AC3E}">
-        <p14:creationId xmlns:p14="http://schemas.microsoft.com/office/powerpoint/2010/main" val="654024207"/>
+        <p14:creationId xmlns:p14="http://schemas.microsoft.com/office/powerpoint/2010/main" xmlns:p="http://schemas.openxmlformats.org/presentationml/2006/main" xmlns:r="http://schemas.openxmlformats.org/officeDocument/2006/relationships" xmlns:a="http://schemas.openxmlformats.org/drawingml/2006/main" xmlns="" val="654024207"/>
       </p:ext>
     </p:extLst>
   </p:cSld>
@@ -6896,7 +6896,7 @@
 </file>
 
 <file path=ppt/slideLayouts/slideLayout14.xml><?xml version="1.0" encoding="utf-8"?>
-<p:sldLayout xmlns:a="http://schemas.openxmlformats.org/drawingml/2006/main" xmlns:r="http://schemas.openxmlformats.org/officeDocument/2006/relationships" xmlns:p="http://schemas.openxmlformats.org/presentationml/2006/main" preserve="1" userDrawn="1">
+<p:sldLayout xmlns:a="http://schemas.openxmlformats.org/drawingml/2006/main" xmlns:r="http://schemas.openxmlformats.org/officeDocument/2006/relationships" xmlns:mc="http://schemas.openxmlformats.org/markup-compatibility/2006" xmlns:mv="urn:schemas-microsoft-com:mac:vml" xmlns:p="http://schemas.openxmlformats.org/presentationml/2006/main" mc:Ignorable="mv" mc:PreserveAttributes="mv:*" preserve="1" userDrawn="1">
   <p:cSld name="Thank You">
     <p:bg>
       <p:bgPr>
@@ -7005,7 +7005,7 @@
     </p:spTree>
     <p:extLst>
       <p:ext uri="{BB962C8B-B14F-4D97-AF65-F5344CB8AC3E}">
-        <p14:creationId xmlns:p14="http://schemas.microsoft.com/office/powerpoint/2010/main" val="2124837561"/>
+        <p14:creationId xmlns:p14="http://schemas.microsoft.com/office/powerpoint/2010/main" xmlns:p="http://schemas.openxmlformats.org/presentationml/2006/main" xmlns:r="http://schemas.openxmlformats.org/officeDocument/2006/relationships" xmlns:a="http://schemas.openxmlformats.org/drawingml/2006/main" xmlns="" val="2124837561"/>
       </p:ext>
     </p:extLst>
   </p:cSld>
@@ -7023,7 +7023,7 @@
 </file>
 
 <file path=ppt/slideLayouts/slideLayout15.xml><?xml version="1.0" encoding="utf-8"?>
-<p:sldLayout xmlns:a="http://schemas.openxmlformats.org/drawingml/2006/main" xmlns:r="http://schemas.openxmlformats.org/officeDocument/2006/relationships" xmlns:p="http://schemas.openxmlformats.org/presentationml/2006/main" preserve="1" userDrawn="1">
+<p:sldLayout xmlns:a="http://schemas.openxmlformats.org/drawingml/2006/main" xmlns:r="http://schemas.openxmlformats.org/officeDocument/2006/relationships" xmlns:mc="http://schemas.openxmlformats.org/markup-compatibility/2006" xmlns:mv="urn:schemas-microsoft-com:mac:vml" xmlns:p="http://schemas.openxmlformats.org/presentationml/2006/main" mc:Ignorable="mv" mc:PreserveAttributes="mv:*" preserve="1" userDrawn="1">
   <p:cSld name="Eval Reminder">
     <p:spTree>
       <p:nvGrpSpPr>
@@ -7105,7 +7105,7 @@
     </p:spTree>
     <p:extLst>
       <p:ext uri="{BB962C8B-B14F-4D97-AF65-F5344CB8AC3E}">
-        <p14:creationId xmlns:p14="http://schemas.microsoft.com/office/powerpoint/2010/main" val="65627032"/>
+        <p14:creationId xmlns:p14="http://schemas.microsoft.com/office/powerpoint/2010/main" xmlns:p="http://schemas.openxmlformats.org/presentationml/2006/main" xmlns:r="http://schemas.openxmlformats.org/officeDocument/2006/relationships" xmlns:a="http://schemas.openxmlformats.org/drawingml/2006/main" xmlns="" val="65627032"/>
       </p:ext>
     </p:extLst>
   </p:cSld>
@@ -7116,7 +7116,7 @@
 </file>
 
 <file path=ppt/slideLayouts/slideLayout16.xml><?xml version="1.0" encoding="utf-8"?>
-<p:sldLayout xmlns:a="http://schemas.openxmlformats.org/drawingml/2006/main" xmlns:r="http://schemas.openxmlformats.org/officeDocument/2006/relationships" xmlns:p="http://schemas.openxmlformats.org/presentationml/2006/main" preserve="1" userDrawn="1">
+<p:sldLayout xmlns:a="http://schemas.openxmlformats.org/drawingml/2006/main" xmlns:r="http://schemas.openxmlformats.org/officeDocument/2006/relationships" xmlns:mc="http://schemas.openxmlformats.org/markup-compatibility/2006" xmlns:mv="urn:schemas-microsoft-com:mac:vml" xmlns:p="http://schemas.openxmlformats.org/presentationml/2006/main" mc:Ignorable="mv" mc:PreserveAttributes="mv:*" preserve="1" userDrawn="1">
   <p:cSld name="Related Sessions">
     <p:spTree>
       <p:nvGrpSpPr>
@@ -7272,7 +7272,7 @@
     </p:spTree>
     <p:extLst>
       <p:ext uri="{BB962C8B-B14F-4D97-AF65-F5344CB8AC3E}">
-        <p14:creationId xmlns:p14="http://schemas.microsoft.com/office/powerpoint/2010/main" val="3750702607"/>
+        <p14:creationId xmlns:p14="http://schemas.microsoft.com/office/powerpoint/2010/main" xmlns:p="http://schemas.openxmlformats.org/presentationml/2006/main" xmlns:r="http://schemas.openxmlformats.org/officeDocument/2006/relationships" xmlns:a="http://schemas.openxmlformats.org/drawingml/2006/main" xmlns="" val="3750702607"/>
       </p:ext>
     </p:extLst>
   </p:cSld>
@@ -7283,7 +7283,7 @@
 </file>
 
 <file path=ppt/slideLayouts/slideLayout2.xml><?xml version="1.0" encoding="utf-8"?>
-<p:sldLayout xmlns:a="http://schemas.openxmlformats.org/drawingml/2006/main" xmlns:r="http://schemas.openxmlformats.org/officeDocument/2006/relationships" xmlns:p="http://schemas.openxmlformats.org/presentationml/2006/main" preserve="1" userDrawn="1">
+<p:sldLayout xmlns:a="http://schemas.openxmlformats.org/drawingml/2006/main" xmlns:r="http://schemas.openxmlformats.org/officeDocument/2006/relationships" xmlns:mc="http://schemas.openxmlformats.org/markup-compatibility/2006" xmlns:mv="urn:schemas-microsoft-com:mac:vml" xmlns:p="http://schemas.openxmlformats.org/presentationml/2006/main" mc:Ignorable="mv" mc:PreserveAttributes="mv:*" preserve="1" userDrawn="1">
   <p:cSld name="Session Pre-reqs">
     <p:spTree>
       <p:nvGrpSpPr>
@@ -7442,7 +7442,7 @@
     </p:spTree>
     <p:extLst>
       <p:ext uri="{BB962C8B-B14F-4D97-AF65-F5344CB8AC3E}">
-        <p14:creationId xmlns:p14="http://schemas.microsoft.com/office/powerpoint/2010/main" val="2008725742"/>
+        <p14:creationId xmlns:p14="http://schemas.microsoft.com/office/powerpoint/2010/main" xmlns:p="http://schemas.openxmlformats.org/presentationml/2006/main" xmlns:r="http://schemas.openxmlformats.org/officeDocument/2006/relationships" xmlns:a="http://schemas.openxmlformats.org/drawingml/2006/main" xmlns="" val="2008725742"/>
       </p:ext>
     </p:extLst>
   </p:cSld>
@@ -7453,7 +7453,7 @@
 </file>
 
 <file path=ppt/slideLayouts/slideLayout3.xml><?xml version="1.0" encoding="utf-8"?>
-<p:sldLayout xmlns:a="http://schemas.openxmlformats.org/drawingml/2006/main" xmlns:r="http://schemas.openxmlformats.org/officeDocument/2006/relationships" xmlns:p="http://schemas.openxmlformats.org/presentationml/2006/main" type="obj" preserve="1">
+<p:sldLayout xmlns:a="http://schemas.openxmlformats.org/drawingml/2006/main" xmlns:r="http://schemas.openxmlformats.org/officeDocument/2006/relationships" xmlns:mc="http://schemas.openxmlformats.org/markup-compatibility/2006" xmlns:mv="urn:schemas-microsoft-com:mac:vml" xmlns:p="http://schemas.openxmlformats.org/presentationml/2006/main" mc:Ignorable="mv" mc:PreserveAttributes="mv:*" type="obj" preserve="1">
   <p:cSld name="Title and Content">
     <p:spTree>
       <p:nvGrpSpPr>
@@ -7601,7 +7601,7 @@
     </p:spTree>
     <p:extLst>
       <p:ext uri="{BB962C8B-B14F-4D97-AF65-F5344CB8AC3E}">
-        <p14:creationId xmlns:p14="http://schemas.microsoft.com/office/powerpoint/2010/main" val="3508459060"/>
+        <p14:creationId xmlns:p14="http://schemas.microsoft.com/office/powerpoint/2010/main" xmlns:p="http://schemas.openxmlformats.org/presentationml/2006/main" xmlns:r="http://schemas.openxmlformats.org/officeDocument/2006/relationships" xmlns:a="http://schemas.openxmlformats.org/drawingml/2006/main" xmlns="" val="3508459060"/>
       </p:ext>
     </p:extLst>
   </p:cSld>
@@ -7612,7 +7612,7 @@
 </file>
 
 <file path=ppt/slideLayouts/slideLayout4.xml><?xml version="1.0" encoding="utf-8"?>
-<p:sldLayout xmlns:a="http://schemas.openxmlformats.org/drawingml/2006/main" xmlns:r="http://schemas.openxmlformats.org/officeDocument/2006/relationships" xmlns:p="http://schemas.openxmlformats.org/presentationml/2006/main" preserve="1" userDrawn="1">
+<p:sldLayout xmlns:a="http://schemas.openxmlformats.org/drawingml/2006/main" xmlns:r="http://schemas.openxmlformats.org/officeDocument/2006/relationships" xmlns:mc="http://schemas.openxmlformats.org/markup-compatibility/2006" xmlns:mv="urn:schemas-microsoft-com:mac:vml" xmlns:p="http://schemas.openxmlformats.org/presentationml/2006/main" mc:Ignorable="mv" mc:PreserveAttributes="mv:*" preserve="1" userDrawn="1">
   <p:cSld name="Code Snippet">
     <p:spTree>
       <p:nvGrpSpPr>
@@ -7801,7 +7801,7 @@
     </p:spTree>
     <p:extLst>
       <p:ext uri="{BB962C8B-B14F-4D97-AF65-F5344CB8AC3E}">
-        <p14:creationId xmlns:p14="http://schemas.microsoft.com/office/powerpoint/2010/main" val="2636968817"/>
+        <p14:creationId xmlns:p14="http://schemas.microsoft.com/office/powerpoint/2010/main" xmlns:p="http://schemas.openxmlformats.org/presentationml/2006/main" xmlns:r="http://schemas.openxmlformats.org/officeDocument/2006/relationships" xmlns:a="http://schemas.openxmlformats.org/drawingml/2006/main" xmlns="" val="2636968817"/>
       </p:ext>
     </p:extLst>
   </p:cSld>
@@ -7812,7 +7812,7 @@
 </file>
 
 <file path=ppt/slideLayouts/slideLayout5.xml><?xml version="1.0" encoding="utf-8"?>
-<p:sldLayout xmlns:a="http://schemas.openxmlformats.org/drawingml/2006/main" xmlns:r="http://schemas.openxmlformats.org/officeDocument/2006/relationships" xmlns:p="http://schemas.openxmlformats.org/presentationml/2006/main" preserve="1">
+<p:sldLayout xmlns:a="http://schemas.openxmlformats.org/drawingml/2006/main" xmlns:r="http://schemas.openxmlformats.org/officeDocument/2006/relationships" xmlns:mc="http://schemas.openxmlformats.org/markup-compatibility/2006" xmlns:mv="urn:schemas-microsoft-com:mac:vml" xmlns:p="http://schemas.openxmlformats.org/presentationml/2006/main" mc:Ignorable="mv" mc:PreserveAttributes="mv:*" preserve="1">
   <p:cSld name="Section Header 1">
     <p:spTree>
       <p:nvGrpSpPr>
@@ -7869,7 +7869,7 @@
     </p:spTree>
     <p:extLst>
       <p:ext uri="{BB962C8B-B14F-4D97-AF65-F5344CB8AC3E}">
-        <p14:creationId xmlns:p14="http://schemas.microsoft.com/office/powerpoint/2010/main" val="2124837561"/>
+        <p14:creationId xmlns:p14="http://schemas.microsoft.com/office/powerpoint/2010/main" xmlns:p="http://schemas.openxmlformats.org/presentationml/2006/main" xmlns:r="http://schemas.openxmlformats.org/officeDocument/2006/relationships" xmlns:a="http://schemas.openxmlformats.org/drawingml/2006/main" xmlns="" val="2124837561"/>
       </p:ext>
     </p:extLst>
   </p:cSld>
@@ -7887,7 +7887,7 @@
 </file>
 
 <file path=ppt/slideLayouts/slideLayout6.xml><?xml version="1.0" encoding="utf-8"?>
-<p:sldLayout xmlns:a="http://schemas.openxmlformats.org/drawingml/2006/main" xmlns:r="http://schemas.openxmlformats.org/officeDocument/2006/relationships" xmlns:p="http://schemas.openxmlformats.org/presentationml/2006/main" type="twoObj" preserve="1">
+<p:sldLayout xmlns:a="http://schemas.openxmlformats.org/drawingml/2006/main" xmlns:r="http://schemas.openxmlformats.org/officeDocument/2006/relationships" xmlns:mc="http://schemas.openxmlformats.org/markup-compatibility/2006" xmlns:mv="urn:schemas-microsoft-com:mac:vml" xmlns:p="http://schemas.openxmlformats.org/presentationml/2006/main" mc:Ignorable="mv" mc:PreserveAttributes="mv:*" type="twoObj" preserve="1">
   <p:cSld name="Two Content">
     <p:spTree>
       <p:nvGrpSpPr>
@@ -8154,7 +8154,7 @@
     </p:spTree>
     <p:extLst>
       <p:ext uri="{BB962C8B-B14F-4D97-AF65-F5344CB8AC3E}">
-        <p14:creationId xmlns:p14="http://schemas.microsoft.com/office/powerpoint/2010/main" val="3833519293"/>
+        <p14:creationId xmlns:p14="http://schemas.microsoft.com/office/powerpoint/2010/main" xmlns:p="http://schemas.openxmlformats.org/presentationml/2006/main" xmlns:r="http://schemas.openxmlformats.org/officeDocument/2006/relationships" xmlns:a="http://schemas.openxmlformats.org/drawingml/2006/main" xmlns="" val="3833519293"/>
       </p:ext>
     </p:extLst>
   </p:cSld>
@@ -8165,7 +8165,7 @@
 </file>
 
 <file path=ppt/slideLayouts/slideLayout7.xml><?xml version="1.0" encoding="utf-8"?>
-<p:sldLayout xmlns:a="http://schemas.openxmlformats.org/drawingml/2006/main" xmlns:r="http://schemas.openxmlformats.org/officeDocument/2006/relationships" xmlns:p="http://schemas.openxmlformats.org/presentationml/2006/main" preserve="1" userDrawn="1">
+<p:sldLayout xmlns:a="http://schemas.openxmlformats.org/drawingml/2006/main" xmlns:r="http://schemas.openxmlformats.org/officeDocument/2006/relationships" xmlns:mc="http://schemas.openxmlformats.org/markup-compatibility/2006" xmlns:mv="urn:schemas-microsoft-com:mac:vml" xmlns:p="http://schemas.openxmlformats.org/presentationml/2006/main" mc:Ignorable="mv" mc:PreserveAttributes="mv:*" preserve="1" userDrawn="1">
   <p:cSld name="Comparison">
     <p:spTree>
       <p:nvGrpSpPr>
@@ -8526,7 +8526,7 @@
     </p:spTree>
     <p:extLst>
       <p:ext uri="{BB962C8B-B14F-4D97-AF65-F5344CB8AC3E}">
-        <p14:creationId xmlns:p14="http://schemas.microsoft.com/office/powerpoint/2010/main" val="2901287801"/>
+        <p14:creationId xmlns:p14="http://schemas.microsoft.com/office/powerpoint/2010/main" xmlns:p="http://schemas.openxmlformats.org/presentationml/2006/main" xmlns:r="http://schemas.openxmlformats.org/officeDocument/2006/relationships" xmlns:a="http://schemas.openxmlformats.org/drawingml/2006/main" xmlns="" val="2901287801"/>
       </p:ext>
     </p:extLst>
   </p:cSld>
@@ -8537,7 +8537,7 @@
 </file>
 
 <file path=ppt/slideLayouts/slideLayout8.xml><?xml version="1.0" encoding="utf-8"?>
-<p:sldLayout xmlns:a="http://schemas.openxmlformats.org/drawingml/2006/main" xmlns:r="http://schemas.openxmlformats.org/officeDocument/2006/relationships" xmlns:p="http://schemas.openxmlformats.org/presentationml/2006/main" preserve="1" userDrawn="1">
+<p:sldLayout xmlns:a="http://schemas.openxmlformats.org/drawingml/2006/main" xmlns:r="http://schemas.openxmlformats.org/officeDocument/2006/relationships" xmlns:mc="http://schemas.openxmlformats.org/markup-compatibility/2006" xmlns:mv="urn:schemas-microsoft-com:mac:vml" xmlns:p="http://schemas.openxmlformats.org/presentationml/2006/main" mc:Ignorable="mv" mc:PreserveAttributes="mv:*" preserve="1" userDrawn="1">
   <p:cSld name="Three Content">
     <p:spTree>
       <p:nvGrpSpPr>
@@ -8824,7 +8824,7 @@
     </p:spTree>
     <p:extLst>
       <p:ext uri="{BB962C8B-B14F-4D97-AF65-F5344CB8AC3E}">
-        <p14:creationId xmlns:p14="http://schemas.microsoft.com/office/powerpoint/2010/main" val="826396584"/>
+        <p14:creationId xmlns:p14="http://schemas.microsoft.com/office/powerpoint/2010/main" xmlns:p="http://schemas.openxmlformats.org/presentationml/2006/main" xmlns:r="http://schemas.openxmlformats.org/officeDocument/2006/relationships" xmlns:a="http://schemas.openxmlformats.org/drawingml/2006/main" xmlns="" val="826396584"/>
       </p:ext>
     </p:extLst>
   </p:cSld>
@@ -8835,7 +8835,7 @@
 </file>
 
 <file path=ppt/slideLayouts/slideLayout9.xml><?xml version="1.0" encoding="utf-8"?>
-<p:sldLayout xmlns:a="http://schemas.openxmlformats.org/drawingml/2006/main" xmlns:r="http://schemas.openxmlformats.org/officeDocument/2006/relationships" xmlns:p="http://schemas.openxmlformats.org/presentationml/2006/main" preserve="1" userDrawn="1">
+<p:sldLayout xmlns:a="http://schemas.openxmlformats.org/drawingml/2006/main" xmlns:r="http://schemas.openxmlformats.org/officeDocument/2006/relationships" xmlns:mc="http://schemas.openxmlformats.org/markup-compatibility/2006" xmlns:mv="urn:schemas-microsoft-com:mac:vml" xmlns:p="http://schemas.openxmlformats.org/presentationml/2006/main" mc:Ignorable="mv" mc:PreserveAttributes="mv:*" preserve="1" userDrawn="1">
   <p:cSld name="Four Content - Graphics">
     <p:spTree>
       <p:nvGrpSpPr>
@@ -9330,7 +9330,7 @@
     </p:spTree>
     <p:extLst>
       <p:ext uri="{BB962C8B-B14F-4D97-AF65-F5344CB8AC3E}">
-        <p14:creationId xmlns:p14="http://schemas.microsoft.com/office/powerpoint/2010/main" val="2302505678"/>
+        <p14:creationId xmlns:p14="http://schemas.microsoft.com/office/powerpoint/2010/main" xmlns:p="http://schemas.openxmlformats.org/presentationml/2006/main" xmlns:r="http://schemas.openxmlformats.org/officeDocument/2006/relationships" xmlns:a="http://schemas.openxmlformats.org/drawingml/2006/main" xmlns="" val="2302505678"/>
       </p:ext>
     </p:extLst>
   </p:cSld>
@@ -9341,7 +9341,7 @@
 </file>
 
 <file path=ppt/slideMasters/slideMaster1.xml><?xml version="1.0" encoding="utf-8"?>
-<p:sldMaster xmlns:a="http://schemas.openxmlformats.org/drawingml/2006/main" xmlns:r="http://schemas.openxmlformats.org/officeDocument/2006/relationships" xmlns:p="http://schemas.openxmlformats.org/presentationml/2006/main">
+<p:sldMaster xmlns:a="http://schemas.openxmlformats.org/drawingml/2006/main" xmlns:r="http://schemas.openxmlformats.org/officeDocument/2006/relationships" xmlns:mc="http://schemas.openxmlformats.org/markup-compatibility/2006" xmlns:mv="urn:schemas-microsoft-com:mac:vml" xmlns:p="http://schemas.openxmlformats.org/presentationml/2006/main" mc:Ignorable="mv" mc:PreserveAttributes="mv:*">
   <p:cSld>
     <p:bg>
       <p:bgPr>
@@ -9467,7 +9467,7 @@
     </p:spTree>
     <p:extLst>
       <p:ext uri="{BB962C8B-B14F-4D97-AF65-F5344CB8AC3E}">
-        <p14:creationId xmlns:p14="http://schemas.microsoft.com/office/powerpoint/2010/main" val="14311777"/>
+        <p14:creationId xmlns:p14="http://schemas.microsoft.com/office/powerpoint/2010/main" xmlns:p="http://schemas.openxmlformats.org/presentationml/2006/main" xmlns:r="http://schemas.openxmlformats.org/officeDocument/2006/relationships" xmlns:a="http://schemas.openxmlformats.org/drawingml/2006/main" xmlns="" val="14311777"/>
       </p:ext>
     </p:extLst>
   </p:cSld>
@@ -9744,7 +9744,7 @@
 </file>
 
 <file path=ppt/slides/slide1.xml><?xml version="1.0" encoding="utf-8"?>
-<p:sld xmlns:a="http://schemas.openxmlformats.org/drawingml/2006/main" xmlns:r="http://schemas.openxmlformats.org/officeDocument/2006/relationships" xmlns:p="http://schemas.openxmlformats.org/presentationml/2006/main">
+<p:sld xmlns:a="http://schemas.openxmlformats.org/drawingml/2006/main" xmlns:r="http://schemas.openxmlformats.org/officeDocument/2006/relationships" xmlns:mc="http://schemas.openxmlformats.org/markup-compatibility/2006" xmlns:mv="urn:schemas-microsoft-com:mac:vml" xmlns:p="http://schemas.openxmlformats.org/presentationml/2006/main" mc:Ignorable="mv" mc:PreserveAttributes="mv:*">
   <p:cSld>
     <p:spTree>
       <p:nvGrpSpPr>
@@ -9772,12 +9772,22 @@
         </p:nvSpPr>
         <p:spPr/>
         <p:txBody>
-          <a:bodyPr/>
+          <a:bodyPr>
+            <a:normAutofit fontScale="92500"/>
+          </a:bodyPr>
           <a:lstStyle/>
           <a:p>
             <a:r>
               <a:rPr lang="en-US" dirty="0" smtClean="0"/>
-              <a:t>Eric Holmes, Remind</a:t>
+              <a:t>Eric </a:t>
+            </a:r>
+            <a:r>
+              <a:rPr lang="en-US" dirty="0" smtClean="0"/>
+              <a:t>Holmes &amp; Michael Barrett, </a:t>
+            </a:r>
+            <a:r>
+              <a:rPr lang="en-US" dirty="0" smtClean="0"/>
+              <a:t>Remind</a:t>
             </a:r>
             <a:endParaRPr lang="en-US" dirty="0"/>
           </a:p>
@@ -9863,7 +9873,7 @@
     </p:spTree>
     <p:extLst>
       <p:ext uri="{BB962C8B-B14F-4D97-AF65-F5344CB8AC3E}">
-        <p14:creationId xmlns:p14="http://schemas.microsoft.com/office/powerpoint/2010/main" val="215277738"/>
+        <p14:creationId xmlns:p14="http://schemas.microsoft.com/office/powerpoint/2010/main" xmlns:p="http://schemas.openxmlformats.org/presentationml/2006/main" xmlns:r="http://schemas.openxmlformats.org/officeDocument/2006/relationships" xmlns:a="http://schemas.openxmlformats.org/drawingml/2006/main" xmlns="" val="215277738"/>
       </p:ext>
     </p:extLst>
   </p:cSld>
@@ -9881,7 +9891,7 @@
 </file>
 
 <file path=ppt/slides/slide10.xml><?xml version="1.0" encoding="utf-8"?>
-<p:sld xmlns:a="http://schemas.openxmlformats.org/drawingml/2006/main" xmlns:r="http://schemas.openxmlformats.org/officeDocument/2006/relationships" xmlns:p="http://schemas.openxmlformats.org/presentationml/2006/main">
+<p:sld xmlns:a="http://schemas.openxmlformats.org/drawingml/2006/main" xmlns:r="http://schemas.openxmlformats.org/officeDocument/2006/relationships" xmlns:mc="http://schemas.openxmlformats.org/markup-compatibility/2006" xmlns:mv="urn:schemas-microsoft-com:mac:vml" xmlns:p="http://schemas.openxmlformats.org/presentationml/2006/main" mc:Ignorable="mv" mc:PreserveAttributes="mv:*">
   <p:cSld>
     <p:spTree>
       <p:nvGrpSpPr>
@@ -9914,11 +9924,7 @@
           <a:p>
             <a:r>
               <a:rPr lang="en-US" smtClean="0"/>
-              <a:t>Building </a:t>
-            </a:r>
-            <a:r>
-              <a:rPr lang="en-US" smtClean="0"/>
-              <a:t>an </a:t>
+              <a:t>Building an </a:t>
             </a:r>
             <a:r>
               <a:rPr lang="en-US" dirty="0" smtClean="0"/>
@@ -9931,7 +9937,7 @@
     </p:spTree>
     <p:extLst>
       <p:ext uri="{BB962C8B-B14F-4D97-AF65-F5344CB8AC3E}">
-        <p14:creationId xmlns:p14="http://schemas.microsoft.com/office/powerpoint/2010/main" val="2005060300"/>
+        <p14:creationId xmlns:p14="http://schemas.microsoft.com/office/powerpoint/2010/main" xmlns:p="http://schemas.openxmlformats.org/presentationml/2006/main" xmlns:r="http://schemas.openxmlformats.org/officeDocument/2006/relationships" xmlns:a="http://schemas.openxmlformats.org/drawingml/2006/main" xmlns="" val="2005060300"/>
       </p:ext>
     </p:extLst>
   </p:cSld>
@@ -9949,7 +9955,7 @@
 </file>
 
 <file path=ppt/slides/slide11.xml><?xml version="1.0" encoding="utf-8"?>
-<p:sld xmlns:a="http://schemas.openxmlformats.org/drawingml/2006/main" xmlns:r="http://schemas.openxmlformats.org/officeDocument/2006/relationships" xmlns:p="http://schemas.openxmlformats.org/presentationml/2006/main">
+<p:sld xmlns:a="http://schemas.openxmlformats.org/drawingml/2006/main" xmlns:r="http://schemas.openxmlformats.org/officeDocument/2006/relationships" xmlns:mc="http://schemas.openxmlformats.org/markup-compatibility/2006" xmlns:mv="urn:schemas-microsoft-com:mac:vml" xmlns:p="http://schemas.openxmlformats.org/presentationml/2006/main" mc:Ignorable="mv" mc:PreserveAttributes="mv:*">
   <p:cSld>
     <p:spTree>
       <p:nvGrpSpPr>
@@ -10082,7 +10088,7 @@
     </p:spTree>
     <p:extLst>
       <p:ext uri="{BB962C8B-B14F-4D97-AF65-F5344CB8AC3E}">
-        <p14:creationId xmlns:p14="http://schemas.microsoft.com/office/powerpoint/2010/main" val="904526595"/>
+        <p14:creationId xmlns:p14="http://schemas.microsoft.com/office/powerpoint/2010/main" xmlns:p="http://schemas.openxmlformats.org/presentationml/2006/main" xmlns:r="http://schemas.openxmlformats.org/officeDocument/2006/relationships" xmlns:a="http://schemas.openxmlformats.org/drawingml/2006/main" xmlns="" val="904526595"/>
       </p:ext>
     </p:extLst>
   </p:cSld>
@@ -10100,7 +10106,7 @@
 </file>
 
 <file path=ppt/slides/slide12.xml><?xml version="1.0" encoding="utf-8"?>
-<p:sld xmlns:a="http://schemas.openxmlformats.org/drawingml/2006/main" xmlns:r="http://schemas.openxmlformats.org/officeDocument/2006/relationships" xmlns:p="http://schemas.openxmlformats.org/presentationml/2006/main">
+<p:sld xmlns:a="http://schemas.openxmlformats.org/drawingml/2006/main" xmlns:r="http://schemas.openxmlformats.org/officeDocument/2006/relationships" xmlns:mc="http://schemas.openxmlformats.org/markup-compatibility/2006" xmlns:mv="urn:schemas-microsoft-com:mac:vml" xmlns:p="http://schemas.openxmlformats.org/presentationml/2006/main" mc:Ignorable="mv" mc:PreserveAttributes="mv:*">
   <p:cSld>
     <p:spTree>
       <p:nvGrpSpPr>
@@ -10227,7 +10233,7 @@
           <a:blip r:embed="rId3">
             <a:extLst>
               <a:ext uri="{28A0092B-C50C-407E-A947-70E740481C1C}">
-                <a14:useLocalDpi xmlns:a14="http://schemas.microsoft.com/office/drawing/2010/main" val="0"/>
+                <a14:useLocalDpi xmlns:a14="http://schemas.microsoft.com/office/drawing/2010/main" xmlns:p="http://schemas.openxmlformats.org/presentationml/2006/main" xmlns:r="http://schemas.openxmlformats.org/officeDocument/2006/relationships" xmlns:a="http://schemas.openxmlformats.org/drawingml/2006/main" xmlns="" val="0"/>
               </a:ext>
             </a:extLst>
           </a:blip>
@@ -10257,7 +10263,7 @@
           <a:blip r:embed="rId4">
             <a:extLst>
               <a:ext uri="{28A0092B-C50C-407E-A947-70E740481C1C}">
-                <a14:useLocalDpi xmlns:a14="http://schemas.microsoft.com/office/drawing/2010/main" val="0"/>
+                <a14:useLocalDpi xmlns:a14="http://schemas.microsoft.com/office/drawing/2010/main" xmlns:p="http://schemas.openxmlformats.org/presentationml/2006/main" xmlns:r="http://schemas.openxmlformats.org/officeDocument/2006/relationships" xmlns:a="http://schemas.openxmlformats.org/drawingml/2006/main" xmlns="" val="0"/>
               </a:ext>
             </a:extLst>
           </a:blip>
@@ -10287,7 +10293,7 @@
           <a:blip r:embed="rId5">
             <a:extLst>
               <a:ext uri="{28A0092B-C50C-407E-A947-70E740481C1C}">
-                <a14:useLocalDpi xmlns:a14="http://schemas.microsoft.com/office/drawing/2010/main" val="0"/>
+                <a14:useLocalDpi xmlns:a14="http://schemas.microsoft.com/office/drawing/2010/main" xmlns:p="http://schemas.openxmlformats.org/presentationml/2006/main" xmlns:r="http://schemas.openxmlformats.org/officeDocument/2006/relationships" xmlns:a="http://schemas.openxmlformats.org/drawingml/2006/main" xmlns="" val="0"/>
               </a:ext>
             </a:extLst>
           </a:blip>
@@ -10308,7 +10314,7 @@
     </p:spTree>
     <p:extLst>
       <p:ext uri="{BB962C8B-B14F-4D97-AF65-F5344CB8AC3E}">
-        <p14:creationId xmlns:p14="http://schemas.microsoft.com/office/powerpoint/2010/main" val="603589582"/>
+        <p14:creationId xmlns:p14="http://schemas.microsoft.com/office/powerpoint/2010/main" xmlns:p="http://schemas.openxmlformats.org/presentationml/2006/main" xmlns:r="http://schemas.openxmlformats.org/officeDocument/2006/relationships" xmlns:a="http://schemas.openxmlformats.org/drawingml/2006/main" xmlns="" val="603589582"/>
       </p:ext>
     </p:extLst>
   </p:cSld>
@@ -10326,7 +10332,7 @@
 </file>
 
 <file path=ppt/slides/slide13.xml><?xml version="1.0" encoding="utf-8"?>
-<p:sld xmlns:a="http://schemas.openxmlformats.org/drawingml/2006/main" xmlns:r="http://schemas.openxmlformats.org/officeDocument/2006/relationships" xmlns:p="http://schemas.openxmlformats.org/presentationml/2006/main">
+<p:sld xmlns:a="http://schemas.openxmlformats.org/drawingml/2006/main" xmlns:r="http://schemas.openxmlformats.org/officeDocument/2006/relationships" xmlns:mc="http://schemas.openxmlformats.org/markup-compatibility/2006" xmlns:mv="urn:schemas-microsoft-com:mac:vml" xmlns:p="http://schemas.openxmlformats.org/presentationml/2006/main" mc:Ignorable="mv" mc:PreserveAttributes="mv:*">
   <p:cSld>
     <p:spTree>
       <p:nvGrpSpPr>
@@ -10377,7 +10383,7 @@
           <a:blip r:embed="rId3">
             <a:extLst>
               <a:ext uri="{28A0092B-C50C-407E-A947-70E740481C1C}">
-                <a14:useLocalDpi xmlns:a14="http://schemas.microsoft.com/office/drawing/2010/main" val="0"/>
+                <a14:useLocalDpi xmlns:a14="http://schemas.microsoft.com/office/drawing/2010/main" xmlns:p="http://schemas.openxmlformats.org/presentationml/2006/main" xmlns:r="http://schemas.openxmlformats.org/officeDocument/2006/relationships" xmlns:a="http://schemas.openxmlformats.org/drawingml/2006/main" xmlns="" val="0"/>
               </a:ext>
             </a:extLst>
           </a:blip>
@@ -10407,7 +10413,7 @@
           <a:blip r:embed="rId4">
             <a:extLst>
               <a:ext uri="{28A0092B-C50C-407E-A947-70E740481C1C}">
-                <a14:useLocalDpi xmlns:a14="http://schemas.microsoft.com/office/drawing/2010/main" val="0"/>
+                <a14:useLocalDpi xmlns:a14="http://schemas.microsoft.com/office/drawing/2010/main" xmlns:p="http://schemas.openxmlformats.org/presentationml/2006/main" xmlns:r="http://schemas.openxmlformats.org/officeDocument/2006/relationships" xmlns:a="http://schemas.openxmlformats.org/drawingml/2006/main" xmlns="" val="0"/>
               </a:ext>
             </a:extLst>
           </a:blip>
@@ -10506,7 +10512,7 @@
           <a:blip r:embed="rId4">
             <a:extLst>
               <a:ext uri="{28A0092B-C50C-407E-A947-70E740481C1C}">
-                <a14:useLocalDpi xmlns:a14="http://schemas.microsoft.com/office/drawing/2010/main" val="0"/>
+                <a14:useLocalDpi xmlns:a14="http://schemas.microsoft.com/office/drawing/2010/main" xmlns:p="http://schemas.openxmlformats.org/presentationml/2006/main" xmlns:r="http://schemas.openxmlformats.org/officeDocument/2006/relationships" xmlns:a="http://schemas.openxmlformats.org/drawingml/2006/main" xmlns="" val="0"/>
               </a:ext>
             </a:extLst>
           </a:blip>
@@ -10587,7 +10593,7 @@
     </p:spTree>
     <p:extLst>
       <p:ext uri="{BB962C8B-B14F-4D97-AF65-F5344CB8AC3E}">
-        <p14:creationId xmlns:p14="http://schemas.microsoft.com/office/powerpoint/2010/main" val="1011663949"/>
+        <p14:creationId xmlns:p14="http://schemas.microsoft.com/office/powerpoint/2010/main" xmlns:p="http://schemas.openxmlformats.org/presentationml/2006/main" xmlns:r="http://schemas.openxmlformats.org/officeDocument/2006/relationships" xmlns:a="http://schemas.openxmlformats.org/drawingml/2006/main" xmlns="" val="1011663949"/>
       </p:ext>
     </p:extLst>
   </p:cSld>
@@ -10605,7 +10611,7 @@
 </file>
 
 <file path=ppt/slides/slide14.xml><?xml version="1.0" encoding="utf-8"?>
-<p:sld xmlns:a="http://schemas.openxmlformats.org/drawingml/2006/main" xmlns:r="http://schemas.openxmlformats.org/officeDocument/2006/relationships" xmlns:p="http://schemas.openxmlformats.org/presentationml/2006/main">
+<p:sld xmlns:a="http://schemas.openxmlformats.org/drawingml/2006/main" xmlns:r="http://schemas.openxmlformats.org/officeDocument/2006/relationships" xmlns:mc="http://schemas.openxmlformats.org/markup-compatibility/2006" xmlns:mv="urn:schemas-microsoft-com:mac:vml" xmlns:p="http://schemas.openxmlformats.org/presentationml/2006/main" mc:Ignorable="mv" mc:PreserveAttributes="mv:*">
   <p:cSld>
     <p:spTree>
       <p:nvGrpSpPr>
@@ -10656,7 +10662,7 @@
           <a:blip r:embed="rId3">
             <a:extLst>
               <a:ext uri="{28A0092B-C50C-407E-A947-70E740481C1C}">
-                <a14:useLocalDpi xmlns:a14="http://schemas.microsoft.com/office/drawing/2010/main" val="0"/>
+                <a14:useLocalDpi xmlns:a14="http://schemas.microsoft.com/office/drawing/2010/main" xmlns:p="http://schemas.openxmlformats.org/presentationml/2006/main" xmlns:r="http://schemas.openxmlformats.org/officeDocument/2006/relationships" xmlns:a="http://schemas.openxmlformats.org/drawingml/2006/main" xmlns="" val="0"/>
               </a:ext>
             </a:extLst>
           </a:blip>
@@ -10686,7 +10692,7 @@
           <a:blip r:embed="rId4">
             <a:extLst>
               <a:ext uri="{28A0092B-C50C-407E-A947-70E740481C1C}">
-                <a14:useLocalDpi xmlns:a14="http://schemas.microsoft.com/office/drawing/2010/main" val="0"/>
+                <a14:useLocalDpi xmlns:a14="http://schemas.microsoft.com/office/drawing/2010/main" xmlns:p="http://schemas.openxmlformats.org/presentationml/2006/main" xmlns:r="http://schemas.openxmlformats.org/officeDocument/2006/relationships" xmlns:a="http://schemas.openxmlformats.org/drawingml/2006/main" xmlns="" val="0"/>
               </a:ext>
             </a:extLst>
           </a:blip>
@@ -10716,7 +10722,7 @@
           <a:blip r:embed="rId5">
             <a:extLst>
               <a:ext uri="{28A0092B-C50C-407E-A947-70E740481C1C}">
-                <a14:useLocalDpi xmlns:a14="http://schemas.microsoft.com/office/drawing/2010/main" val="0"/>
+                <a14:useLocalDpi xmlns:a14="http://schemas.microsoft.com/office/drawing/2010/main" xmlns:p="http://schemas.openxmlformats.org/presentationml/2006/main" xmlns:r="http://schemas.openxmlformats.org/officeDocument/2006/relationships" xmlns:a="http://schemas.openxmlformats.org/drawingml/2006/main" xmlns="" val="0"/>
               </a:ext>
             </a:extLst>
           </a:blip>
@@ -10968,7 +10974,7 @@
     </p:spTree>
     <p:extLst>
       <p:ext uri="{BB962C8B-B14F-4D97-AF65-F5344CB8AC3E}">
-        <p14:creationId xmlns:p14="http://schemas.microsoft.com/office/powerpoint/2010/main" val="1221938147"/>
+        <p14:creationId xmlns:p14="http://schemas.microsoft.com/office/powerpoint/2010/main" xmlns:p="http://schemas.openxmlformats.org/presentationml/2006/main" xmlns:r="http://schemas.openxmlformats.org/officeDocument/2006/relationships" xmlns:a="http://schemas.openxmlformats.org/drawingml/2006/main" xmlns="" val="1221938147"/>
       </p:ext>
     </p:extLst>
   </p:cSld>
@@ -10986,7 +10992,7 @@
 </file>
 
 <file path=ppt/slides/slide15.xml><?xml version="1.0" encoding="utf-8"?>
-<p:sld xmlns:a="http://schemas.openxmlformats.org/drawingml/2006/main" xmlns:r="http://schemas.openxmlformats.org/officeDocument/2006/relationships" xmlns:p="http://schemas.openxmlformats.org/presentationml/2006/main">
+<p:sld xmlns:a="http://schemas.openxmlformats.org/drawingml/2006/main" xmlns:r="http://schemas.openxmlformats.org/officeDocument/2006/relationships" xmlns:mc="http://schemas.openxmlformats.org/markup-compatibility/2006" xmlns:mv="urn:schemas-microsoft-com:mac:vml" xmlns:p="http://schemas.openxmlformats.org/presentationml/2006/main" mc:Ignorable="mv" mc:PreserveAttributes="mv:*">
   <p:cSld>
     <p:spTree>
       <p:nvGrpSpPr>
@@ -11059,11 +11065,7 @@
             </a:r>
             <a:r>
               <a:rPr lang="en-US" dirty="0" smtClean="0"/>
-              <a:t>ype </a:t>
-            </a:r>
-            <a:r>
-              <a:rPr lang="en-US" dirty="0" smtClean="0"/>
-              <a:t>Scheduler interface {</a:t>
+              <a:t>ype Scheduler interface {</a:t>
             </a:r>
           </a:p>
           <a:p>
@@ -11136,7 +11138,7 @@
     </p:spTree>
     <p:extLst>
       <p:ext uri="{BB962C8B-B14F-4D97-AF65-F5344CB8AC3E}">
-        <p14:creationId xmlns:p14="http://schemas.microsoft.com/office/powerpoint/2010/main" val="2135493620"/>
+        <p14:creationId xmlns:p14="http://schemas.microsoft.com/office/powerpoint/2010/main" xmlns:p="http://schemas.openxmlformats.org/presentationml/2006/main" xmlns:r="http://schemas.openxmlformats.org/officeDocument/2006/relationships" xmlns:a="http://schemas.openxmlformats.org/drawingml/2006/main" xmlns="" val="2135493620"/>
       </p:ext>
     </p:extLst>
   </p:cSld>
@@ -11147,7 +11149,7 @@
 </file>
 
 <file path=ppt/slides/slide16.xml><?xml version="1.0" encoding="utf-8"?>
-<p:sld xmlns:a="http://schemas.openxmlformats.org/drawingml/2006/main" xmlns:r="http://schemas.openxmlformats.org/officeDocument/2006/relationships" xmlns:p="http://schemas.openxmlformats.org/presentationml/2006/main">
+<p:sld xmlns:a="http://schemas.openxmlformats.org/drawingml/2006/main" xmlns:r="http://schemas.openxmlformats.org/officeDocument/2006/relationships" xmlns:mc="http://schemas.openxmlformats.org/markup-compatibility/2006" xmlns:mv="urn:schemas-microsoft-com:mac:vml" xmlns:p="http://schemas.openxmlformats.org/presentationml/2006/main" mc:Ignorable="mv" mc:PreserveAttributes="mv:*">
   <p:cSld>
     <p:spTree>
       <p:nvGrpSpPr>
@@ -11274,7 +11276,7 @@
           <a:blip r:embed="rId3">
             <a:extLst>
               <a:ext uri="{28A0092B-C50C-407E-A947-70E740481C1C}">
-                <a14:useLocalDpi xmlns:a14="http://schemas.microsoft.com/office/drawing/2010/main" val="0"/>
+                <a14:useLocalDpi xmlns:a14="http://schemas.microsoft.com/office/drawing/2010/main" xmlns:p="http://schemas.openxmlformats.org/presentationml/2006/main" xmlns:r="http://schemas.openxmlformats.org/officeDocument/2006/relationships" xmlns:a="http://schemas.openxmlformats.org/drawingml/2006/main" xmlns="" val="0"/>
               </a:ext>
             </a:extLst>
           </a:blip>
@@ -11334,7 +11336,7 @@
           <a:blip r:embed="rId4">
             <a:extLst>
               <a:ext uri="{28A0092B-C50C-407E-A947-70E740481C1C}">
-                <a14:useLocalDpi xmlns:a14="http://schemas.microsoft.com/office/drawing/2010/main" val="0"/>
+                <a14:useLocalDpi xmlns:a14="http://schemas.microsoft.com/office/drawing/2010/main" xmlns:p="http://schemas.openxmlformats.org/presentationml/2006/main" xmlns:r="http://schemas.openxmlformats.org/officeDocument/2006/relationships" xmlns:a="http://schemas.openxmlformats.org/drawingml/2006/main" xmlns="" val="0"/>
               </a:ext>
             </a:extLst>
           </a:blip>
@@ -11464,7 +11466,7 @@
           <a:blip r:embed="rId5">
             <a:extLst>
               <a:ext uri="{28A0092B-C50C-407E-A947-70E740481C1C}">
-                <a14:useLocalDpi xmlns:a14="http://schemas.microsoft.com/office/drawing/2010/main" val="0"/>
+                <a14:useLocalDpi xmlns:a14="http://schemas.microsoft.com/office/drawing/2010/main" xmlns:p="http://schemas.openxmlformats.org/presentationml/2006/main" xmlns:r="http://schemas.openxmlformats.org/officeDocument/2006/relationships" xmlns:a="http://schemas.openxmlformats.org/drawingml/2006/main" xmlns="" val="0"/>
               </a:ext>
             </a:extLst>
           </a:blip>
@@ -11485,7 +11487,7 @@
     </p:spTree>
     <p:extLst>
       <p:ext uri="{BB962C8B-B14F-4D97-AF65-F5344CB8AC3E}">
-        <p14:creationId xmlns:p14="http://schemas.microsoft.com/office/powerpoint/2010/main" val="721009559"/>
+        <p14:creationId xmlns:p14="http://schemas.microsoft.com/office/powerpoint/2010/main" xmlns:p="http://schemas.openxmlformats.org/presentationml/2006/main" xmlns:r="http://schemas.openxmlformats.org/officeDocument/2006/relationships" xmlns:a="http://schemas.openxmlformats.org/drawingml/2006/main" xmlns="" val="721009559"/>
       </p:ext>
     </p:extLst>
   </p:cSld>
@@ -11503,7 +11505,7 @@
 </file>
 
 <file path=ppt/slides/slide17.xml><?xml version="1.0" encoding="utf-8"?>
-<p:sld xmlns:a="http://schemas.openxmlformats.org/drawingml/2006/main" xmlns:r="http://schemas.openxmlformats.org/officeDocument/2006/relationships" xmlns:p="http://schemas.openxmlformats.org/presentationml/2006/main">
+<p:sld xmlns:a="http://schemas.openxmlformats.org/drawingml/2006/main" xmlns:r="http://schemas.openxmlformats.org/officeDocument/2006/relationships" xmlns:mc="http://schemas.openxmlformats.org/markup-compatibility/2006" xmlns:mv="urn:schemas-microsoft-com:mac:vml" xmlns:p="http://schemas.openxmlformats.org/presentationml/2006/main" mc:Ignorable="mv" mc:PreserveAttributes="mv:*">
   <p:cSld>
     <p:spTree>
       <p:nvGrpSpPr>
@@ -11590,7 +11592,6 @@
               <a:rPr lang="en-US" dirty="0" smtClean="0"/>
               <a:t>Built-in service scheduler</a:t>
             </a:r>
-            <a:endParaRPr lang="en-US" dirty="0" smtClean="0"/>
           </a:p>
           <a:p>
             <a:pPr marL="342900" indent="-342900">
@@ -11608,7 +11609,7 @@
     </p:spTree>
     <p:extLst>
       <p:ext uri="{BB962C8B-B14F-4D97-AF65-F5344CB8AC3E}">
-        <p14:creationId xmlns:p14="http://schemas.microsoft.com/office/powerpoint/2010/main" val="1013969935"/>
+        <p14:creationId xmlns:p14="http://schemas.microsoft.com/office/powerpoint/2010/main" xmlns:p="http://schemas.openxmlformats.org/presentationml/2006/main" xmlns:r="http://schemas.openxmlformats.org/officeDocument/2006/relationships" xmlns:a="http://schemas.openxmlformats.org/drawingml/2006/main" xmlns="" val="1013969935"/>
       </p:ext>
     </p:extLst>
   </p:cSld>
@@ -11626,7 +11627,7 @@
 </file>
 
 <file path=ppt/slides/slide18.xml><?xml version="1.0" encoding="utf-8"?>
-<p:sld xmlns:a="http://schemas.openxmlformats.org/drawingml/2006/main" xmlns:r="http://schemas.openxmlformats.org/officeDocument/2006/relationships" xmlns:p="http://schemas.openxmlformats.org/presentationml/2006/main">
+<p:sld xmlns:a="http://schemas.openxmlformats.org/drawingml/2006/main" xmlns:r="http://schemas.openxmlformats.org/officeDocument/2006/relationships" xmlns:mc="http://schemas.openxmlformats.org/markup-compatibility/2006" xmlns:mv="urn:schemas-microsoft-com:mac:vml" xmlns:p="http://schemas.openxmlformats.org/presentationml/2006/main" mc:Ignorable="mv" mc:PreserveAttributes="mv:*">
   <p:cSld>
     <p:spTree>
       <p:nvGrpSpPr>
@@ -11725,7 +11726,7 @@
     </p:spTree>
     <p:extLst>
       <p:ext uri="{BB962C8B-B14F-4D97-AF65-F5344CB8AC3E}">
-        <p14:creationId xmlns:p14="http://schemas.microsoft.com/office/powerpoint/2010/main" val="557709769"/>
+        <p14:creationId xmlns:p14="http://schemas.microsoft.com/office/powerpoint/2010/main" xmlns:p="http://schemas.openxmlformats.org/presentationml/2006/main" xmlns:r="http://schemas.openxmlformats.org/officeDocument/2006/relationships" xmlns:a="http://schemas.openxmlformats.org/drawingml/2006/main" xmlns="" val="557709769"/>
       </p:ext>
     </p:extLst>
   </p:cSld>
@@ -11743,7 +11744,7 @@
 </file>
 
 <file path=ppt/slides/slide19.xml><?xml version="1.0" encoding="utf-8"?>
-<p:sld xmlns:a="http://schemas.openxmlformats.org/drawingml/2006/main" xmlns:r="http://schemas.openxmlformats.org/officeDocument/2006/relationships" xmlns:p="http://schemas.openxmlformats.org/presentationml/2006/main">
+<p:sld xmlns:a="http://schemas.openxmlformats.org/drawingml/2006/main" xmlns:r="http://schemas.openxmlformats.org/officeDocument/2006/relationships" xmlns:mc="http://schemas.openxmlformats.org/markup-compatibility/2006" xmlns:mv="urn:schemas-microsoft-com:mac:vml" xmlns:p="http://schemas.openxmlformats.org/presentationml/2006/main" mc:Ignorable="mv" mc:PreserveAttributes="mv:*">
   <p:cSld>
     <p:spTree>
       <p:nvGrpSpPr>
@@ -11954,7 +11955,7 @@
     </p:spTree>
     <p:extLst>
       <p:ext uri="{BB962C8B-B14F-4D97-AF65-F5344CB8AC3E}">
-        <p14:creationId xmlns:p14="http://schemas.microsoft.com/office/powerpoint/2010/main" val="178948511"/>
+        <p14:creationId xmlns:p14="http://schemas.microsoft.com/office/powerpoint/2010/main" xmlns:p="http://schemas.openxmlformats.org/presentationml/2006/main" xmlns:r="http://schemas.openxmlformats.org/officeDocument/2006/relationships" xmlns:a="http://schemas.openxmlformats.org/drawingml/2006/main" xmlns="" val="178948511"/>
       </p:ext>
     </p:extLst>
   </p:cSld>
@@ -11972,7 +11973,7 @@
 </file>
 
 <file path=ppt/slides/slide2.xml><?xml version="1.0" encoding="utf-8"?>
-<p:sld xmlns:a="http://schemas.openxmlformats.org/drawingml/2006/main" xmlns:r="http://schemas.openxmlformats.org/officeDocument/2006/relationships" xmlns:p="http://schemas.openxmlformats.org/presentationml/2006/main">
+<p:sld xmlns:a="http://schemas.openxmlformats.org/drawingml/2006/main" xmlns:r="http://schemas.openxmlformats.org/officeDocument/2006/relationships" xmlns:mc="http://schemas.openxmlformats.org/markup-compatibility/2006" xmlns:mv="urn:schemas-microsoft-com:mac:vml" xmlns:p="http://schemas.openxmlformats.org/presentationml/2006/main" mc:Ignorable="mv" mc:PreserveAttributes="mv:*">
   <p:cSld>
     <p:spTree>
       <p:nvGrpSpPr>
@@ -12062,7 +12063,7 @@
     </p:spTree>
     <p:extLst>
       <p:ext uri="{BB962C8B-B14F-4D97-AF65-F5344CB8AC3E}">
-        <p14:creationId xmlns:p14="http://schemas.microsoft.com/office/powerpoint/2010/main" val="67347756"/>
+        <p14:creationId xmlns:p14="http://schemas.microsoft.com/office/powerpoint/2010/main" xmlns:p="http://schemas.openxmlformats.org/presentationml/2006/main" xmlns:r="http://schemas.openxmlformats.org/officeDocument/2006/relationships" xmlns:a="http://schemas.openxmlformats.org/drawingml/2006/main" xmlns="" val="67347756"/>
       </p:ext>
     </p:extLst>
   </p:cSld>
@@ -12073,7 +12074,7 @@
 </file>
 
 <file path=ppt/slides/slide20.xml><?xml version="1.0" encoding="utf-8"?>
-<p:sld xmlns:a="http://schemas.openxmlformats.org/drawingml/2006/main" xmlns:r="http://schemas.openxmlformats.org/officeDocument/2006/relationships" xmlns:p="http://schemas.openxmlformats.org/presentationml/2006/main">
+<p:sld xmlns:a="http://schemas.openxmlformats.org/drawingml/2006/main" xmlns:r="http://schemas.openxmlformats.org/officeDocument/2006/relationships" xmlns:mc="http://schemas.openxmlformats.org/markup-compatibility/2006" xmlns:mv="urn:schemas-microsoft-com:mac:vml" xmlns:p="http://schemas.openxmlformats.org/presentationml/2006/main" mc:Ignorable="mv" mc:PreserveAttributes="mv:*">
   <p:cSld>
     <p:spTree>
       <p:nvGrpSpPr>
@@ -12196,7 +12197,7 @@
           <a:blip r:embed="rId3">
             <a:extLst>
               <a:ext uri="{28A0092B-C50C-407E-A947-70E740481C1C}">
-                <a14:useLocalDpi xmlns:a14="http://schemas.microsoft.com/office/drawing/2010/main" val="0"/>
+                <a14:useLocalDpi xmlns:a14="http://schemas.microsoft.com/office/drawing/2010/main" xmlns:p="http://schemas.openxmlformats.org/presentationml/2006/main" xmlns:r="http://schemas.openxmlformats.org/officeDocument/2006/relationships" xmlns:a="http://schemas.openxmlformats.org/drawingml/2006/main" xmlns="" val="0"/>
               </a:ext>
             </a:extLst>
           </a:blip>
@@ -12256,7 +12257,7 @@
           <a:blip r:embed="rId3">
             <a:extLst>
               <a:ext uri="{28A0092B-C50C-407E-A947-70E740481C1C}">
-                <a14:useLocalDpi xmlns:a14="http://schemas.microsoft.com/office/drawing/2010/main" val="0"/>
+                <a14:useLocalDpi xmlns:a14="http://schemas.microsoft.com/office/drawing/2010/main" xmlns:p="http://schemas.openxmlformats.org/presentationml/2006/main" xmlns:r="http://schemas.openxmlformats.org/officeDocument/2006/relationships" xmlns:a="http://schemas.openxmlformats.org/drawingml/2006/main" xmlns="" val="0"/>
               </a:ext>
             </a:extLst>
           </a:blip>
@@ -12366,7 +12367,7 @@
           <a:blip r:embed="rId4">
             <a:extLst>
               <a:ext uri="{28A0092B-C50C-407E-A947-70E740481C1C}">
-                <a14:useLocalDpi xmlns:a14="http://schemas.microsoft.com/office/drawing/2010/main" val="0"/>
+                <a14:useLocalDpi xmlns:a14="http://schemas.microsoft.com/office/drawing/2010/main" xmlns:p="http://schemas.openxmlformats.org/presentationml/2006/main" xmlns:r="http://schemas.openxmlformats.org/officeDocument/2006/relationships" xmlns:a="http://schemas.openxmlformats.org/drawingml/2006/main" xmlns="" val="0"/>
               </a:ext>
             </a:extLst>
           </a:blip>
@@ -12387,7 +12388,7 @@
     </p:spTree>
     <p:extLst>
       <p:ext uri="{BB962C8B-B14F-4D97-AF65-F5344CB8AC3E}">
-        <p14:creationId xmlns:p14="http://schemas.microsoft.com/office/powerpoint/2010/main" val="1705604458"/>
+        <p14:creationId xmlns:p14="http://schemas.microsoft.com/office/powerpoint/2010/main" xmlns:p="http://schemas.openxmlformats.org/presentationml/2006/main" xmlns:r="http://schemas.openxmlformats.org/officeDocument/2006/relationships" xmlns:a="http://schemas.openxmlformats.org/drawingml/2006/main" xmlns="" val="1705604458"/>
       </p:ext>
     </p:extLst>
   </p:cSld>
@@ -12405,7 +12406,7 @@
 </file>
 
 <file path=ppt/slides/slide21.xml><?xml version="1.0" encoding="utf-8"?>
-<p:sld xmlns:a="http://schemas.openxmlformats.org/drawingml/2006/main" xmlns:r="http://schemas.openxmlformats.org/officeDocument/2006/relationships" xmlns:p="http://schemas.openxmlformats.org/presentationml/2006/main">
+<p:sld xmlns:a="http://schemas.openxmlformats.org/drawingml/2006/main" xmlns:r="http://schemas.openxmlformats.org/officeDocument/2006/relationships" xmlns:mc="http://schemas.openxmlformats.org/markup-compatibility/2006" xmlns:mv="urn:schemas-microsoft-com:mac:vml" xmlns:p="http://schemas.openxmlformats.org/presentationml/2006/main" mc:Ignorable="mv" mc:PreserveAttributes="mv:*">
   <p:cSld>
     <p:spTree>
       <p:nvGrpSpPr>
@@ -12494,7 +12495,7 @@
     </p:spTree>
     <p:extLst>
       <p:ext uri="{BB962C8B-B14F-4D97-AF65-F5344CB8AC3E}">
-        <p14:creationId xmlns:p14="http://schemas.microsoft.com/office/powerpoint/2010/main" val="2045736504"/>
+        <p14:creationId xmlns:p14="http://schemas.microsoft.com/office/powerpoint/2010/main" xmlns:p="http://schemas.openxmlformats.org/presentationml/2006/main" xmlns:r="http://schemas.openxmlformats.org/officeDocument/2006/relationships" xmlns:a="http://schemas.openxmlformats.org/drawingml/2006/main" xmlns="" val="2045736504"/>
       </p:ext>
     </p:extLst>
   </p:cSld>
@@ -12512,7 +12513,7 @@
 </file>
 
 <file path=ppt/slides/slide22.xml><?xml version="1.0" encoding="utf-8"?>
-<p:sld xmlns:a="http://schemas.openxmlformats.org/drawingml/2006/main" xmlns:r="http://schemas.openxmlformats.org/officeDocument/2006/relationships" xmlns:p="http://schemas.openxmlformats.org/presentationml/2006/main">
+<p:sld xmlns:a="http://schemas.openxmlformats.org/drawingml/2006/main" xmlns:r="http://schemas.openxmlformats.org/officeDocument/2006/relationships" xmlns:mc="http://schemas.openxmlformats.org/markup-compatibility/2006" xmlns:mv="urn:schemas-microsoft-com:mac:vml" xmlns:p="http://schemas.openxmlformats.org/presentationml/2006/main" mc:Ignorable="mv" mc:PreserveAttributes="mv:*">
   <p:cSld>
     <p:spTree>
       <p:nvGrpSpPr>
@@ -12540,7 +12541,7 @@
           <a:blip r:embed="rId3">
             <a:extLst>
               <a:ext uri="{28A0092B-C50C-407E-A947-70E740481C1C}">
-                <a14:useLocalDpi xmlns:a14="http://schemas.microsoft.com/office/drawing/2010/main" val="0"/>
+                <a14:useLocalDpi xmlns:a14="http://schemas.microsoft.com/office/drawing/2010/main" xmlns:p="http://schemas.openxmlformats.org/presentationml/2006/main" xmlns:r="http://schemas.openxmlformats.org/officeDocument/2006/relationships" xmlns:a="http://schemas.openxmlformats.org/drawingml/2006/main" xmlns="" val="0"/>
               </a:ext>
             </a:extLst>
           </a:blip>
@@ -12570,7 +12571,7 @@
           <a:blip r:embed="rId4">
             <a:extLst>
               <a:ext uri="{28A0092B-C50C-407E-A947-70E740481C1C}">
-                <a14:useLocalDpi xmlns:a14="http://schemas.microsoft.com/office/drawing/2010/main" val="0"/>
+                <a14:useLocalDpi xmlns:a14="http://schemas.microsoft.com/office/drawing/2010/main" xmlns:p="http://schemas.openxmlformats.org/presentationml/2006/main" xmlns:r="http://schemas.openxmlformats.org/officeDocument/2006/relationships" xmlns:a="http://schemas.openxmlformats.org/drawingml/2006/main" xmlns="" val="0"/>
               </a:ext>
             </a:extLst>
           </a:blip>
@@ -12630,7 +12631,7 @@
           <a:blip r:embed="rId5">
             <a:extLst>
               <a:ext uri="{28A0092B-C50C-407E-A947-70E740481C1C}">
-                <a14:useLocalDpi xmlns:a14="http://schemas.microsoft.com/office/drawing/2010/main" val="0"/>
+                <a14:useLocalDpi xmlns:a14="http://schemas.microsoft.com/office/drawing/2010/main" xmlns:p="http://schemas.openxmlformats.org/presentationml/2006/main" xmlns:r="http://schemas.openxmlformats.org/officeDocument/2006/relationships" xmlns:a="http://schemas.openxmlformats.org/drawingml/2006/main" xmlns="" val="0"/>
               </a:ext>
             </a:extLst>
           </a:blip>
@@ -12651,7 +12652,7 @@
     </p:spTree>
     <p:extLst>
       <p:ext uri="{BB962C8B-B14F-4D97-AF65-F5344CB8AC3E}">
-        <p14:creationId xmlns:p14="http://schemas.microsoft.com/office/powerpoint/2010/main" val="231676306"/>
+        <p14:creationId xmlns:p14="http://schemas.microsoft.com/office/powerpoint/2010/main" xmlns:p="http://schemas.openxmlformats.org/presentationml/2006/main" xmlns:r="http://schemas.openxmlformats.org/officeDocument/2006/relationships" xmlns:a="http://schemas.openxmlformats.org/drawingml/2006/main" xmlns="" val="231676306"/>
       </p:ext>
     </p:extLst>
   </p:cSld>
@@ -12669,7 +12670,7 @@
 </file>
 
 <file path=ppt/slides/slide23.xml><?xml version="1.0" encoding="utf-8"?>
-<p:sld xmlns:a="http://schemas.openxmlformats.org/drawingml/2006/main" xmlns:r="http://schemas.openxmlformats.org/officeDocument/2006/relationships" xmlns:p="http://schemas.openxmlformats.org/presentationml/2006/main">
+<p:sld xmlns:a="http://schemas.openxmlformats.org/drawingml/2006/main" xmlns:r="http://schemas.openxmlformats.org/officeDocument/2006/relationships" xmlns:mc="http://schemas.openxmlformats.org/markup-compatibility/2006" xmlns:mv="urn:schemas-microsoft-com:mac:vml" xmlns:p="http://schemas.openxmlformats.org/presentationml/2006/main" mc:Ignorable="mv" mc:PreserveAttributes="mv:*">
   <p:cSld>
     <p:spTree>
       <p:nvGrpSpPr>
@@ -12902,7 +12903,7 @@
     </p:spTree>
     <p:extLst>
       <p:ext uri="{BB962C8B-B14F-4D97-AF65-F5344CB8AC3E}">
-        <p14:creationId xmlns:p14="http://schemas.microsoft.com/office/powerpoint/2010/main" val="701688603"/>
+        <p14:creationId xmlns:p14="http://schemas.microsoft.com/office/powerpoint/2010/main" xmlns:p="http://schemas.openxmlformats.org/presentationml/2006/main" xmlns:r="http://schemas.openxmlformats.org/officeDocument/2006/relationships" xmlns:a="http://schemas.openxmlformats.org/drawingml/2006/main" xmlns="" val="701688603"/>
       </p:ext>
     </p:extLst>
   </p:cSld>
@@ -12920,7 +12921,7 @@
 </file>
 
 <file path=ppt/slides/slide24.xml><?xml version="1.0" encoding="utf-8"?>
-<p:sld xmlns:a="http://schemas.openxmlformats.org/drawingml/2006/main" xmlns:r="http://schemas.openxmlformats.org/officeDocument/2006/relationships" xmlns:p="http://schemas.openxmlformats.org/presentationml/2006/main">
+<p:sld xmlns:a="http://schemas.openxmlformats.org/drawingml/2006/main" xmlns:r="http://schemas.openxmlformats.org/officeDocument/2006/relationships" xmlns:mc="http://schemas.openxmlformats.org/markup-compatibility/2006" xmlns:mv="urn:schemas-microsoft-com:mac:vml" xmlns:p="http://schemas.openxmlformats.org/presentationml/2006/main" mc:Ignorable="mv" mc:PreserveAttributes="mv:*">
   <p:cSld>
     <p:spTree>
       <p:nvGrpSpPr>
@@ -12987,11 +12988,6 @@
               </a:rPr>
               <a:t>“Explicitly declare and isolate dependencies”</a:t>
             </a:r>
-            <a:endParaRPr lang="en-US" i="1" dirty="0">
-              <a:solidFill>
-                <a:schemeClr val="accent6"/>
-              </a:solidFill>
-            </a:endParaRPr>
           </a:p>
         </p:txBody>
       </p:sp>
@@ -13110,7 +13106,7 @@
     </p:spTree>
     <p:extLst>
       <p:ext uri="{BB962C8B-B14F-4D97-AF65-F5344CB8AC3E}">
-        <p14:creationId xmlns:p14="http://schemas.microsoft.com/office/powerpoint/2010/main" val="2114367108"/>
+        <p14:creationId xmlns:p14="http://schemas.microsoft.com/office/powerpoint/2010/main" xmlns:p="http://schemas.openxmlformats.org/presentationml/2006/main" xmlns:r="http://schemas.openxmlformats.org/officeDocument/2006/relationships" xmlns:a="http://schemas.openxmlformats.org/drawingml/2006/main" xmlns="" val="2114367108"/>
       </p:ext>
     </p:extLst>
   </p:cSld>
@@ -13128,7 +13124,7 @@
 </file>
 
 <file path=ppt/slides/slide25.xml><?xml version="1.0" encoding="utf-8"?>
-<p:sld xmlns:a="http://schemas.openxmlformats.org/drawingml/2006/main" xmlns:r="http://schemas.openxmlformats.org/officeDocument/2006/relationships" xmlns:p="http://schemas.openxmlformats.org/presentationml/2006/main">
+<p:sld xmlns:a="http://schemas.openxmlformats.org/drawingml/2006/main" xmlns:r="http://schemas.openxmlformats.org/officeDocument/2006/relationships" xmlns:mc="http://schemas.openxmlformats.org/markup-compatibility/2006" xmlns:mv="urn:schemas-microsoft-com:mac:vml" xmlns:p="http://schemas.openxmlformats.org/presentationml/2006/main" mc:Ignorable="mv" mc:PreserveAttributes="mv:*">
   <p:cSld>
     <p:spTree>
       <p:nvGrpSpPr>
@@ -13195,11 +13191,6 @@
               </a:rPr>
               <a:t>“Strictly separate build and run stages”</a:t>
             </a:r>
-            <a:endParaRPr lang="en-US" i="1" dirty="0">
-              <a:solidFill>
-                <a:schemeClr val="accent6"/>
-              </a:solidFill>
-            </a:endParaRPr>
           </a:p>
         </p:txBody>
       </p:sp>
@@ -13215,7 +13206,7 @@
           <a:blip r:embed="rId3">
             <a:extLst>
               <a:ext uri="{28A0092B-C50C-407E-A947-70E740481C1C}">
-                <a14:useLocalDpi xmlns:a14="http://schemas.microsoft.com/office/drawing/2010/main" val="0"/>
+                <a14:useLocalDpi xmlns:a14="http://schemas.microsoft.com/office/drawing/2010/main" xmlns:p="http://schemas.openxmlformats.org/presentationml/2006/main" xmlns:r="http://schemas.openxmlformats.org/officeDocument/2006/relationships" xmlns:a="http://schemas.openxmlformats.org/drawingml/2006/main" xmlns="" val="0"/>
               </a:ext>
             </a:extLst>
           </a:blip>
@@ -13245,7 +13236,7 @@
           <a:blip r:embed="rId4">
             <a:extLst>
               <a:ext uri="{28A0092B-C50C-407E-A947-70E740481C1C}">
-                <a14:useLocalDpi xmlns:a14="http://schemas.microsoft.com/office/drawing/2010/main" val="0"/>
+                <a14:useLocalDpi xmlns:a14="http://schemas.microsoft.com/office/drawing/2010/main" xmlns:p="http://schemas.openxmlformats.org/presentationml/2006/main" xmlns:r="http://schemas.openxmlformats.org/officeDocument/2006/relationships" xmlns:a="http://schemas.openxmlformats.org/drawingml/2006/main" xmlns="" val="0"/>
               </a:ext>
             </a:extLst>
           </a:blip>
@@ -13368,7 +13359,7 @@
     </p:spTree>
     <p:extLst>
       <p:ext uri="{BB962C8B-B14F-4D97-AF65-F5344CB8AC3E}">
-        <p14:creationId xmlns:p14="http://schemas.microsoft.com/office/powerpoint/2010/main" val="2069377225"/>
+        <p14:creationId xmlns:p14="http://schemas.microsoft.com/office/powerpoint/2010/main" xmlns:p="http://schemas.openxmlformats.org/presentationml/2006/main" xmlns:r="http://schemas.openxmlformats.org/officeDocument/2006/relationships" xmlns:a="http://schemas.openxmlformats.org/drawingml/2006/main" xmlns="" val="2069377225"/>
       </p:ext>
     </p:extLst>
   </p:cSld>
@@ -13386,7 +13377,7 @@
 </file>
 
 <file path=ppt/slides/slide26.xml><?xml version="1.0" encoding="utf-8"?>
-<p:sld xmlns:a="http://schemas.openxmlformats.org/drawingml/2006/main" xmlns:r="http://schemas.openxmlformats.org/officeDocument/2006/relationships" xmlns:p="http://schemas.openxmlformats.org/presentationml/2006/main">
+<p:sld xmlns:a="http://schemas.openxmlformats.org/drawingml/2006/main" xmlns:r="http://schemas.openxmlformats.org/officeDocument/2006/relationships" xmlns:mc="http://schemas.openxmlformats.org/markup-compatibility/2006" xmlns:mv="urn:schemas-microsoft-com:mac:vml" xmlns:p="http://schemas.openxmlformats.org/presentationml/2006/main" mc:Ignorable="mv" mc:PreserveAttributes="mv:*">
   <p:cSld>
     <p:spTree>
       <p:nvGrpSpPr>
@@ -13629,7 +13620,7 @@
           <a:blip r:embed="rId3">
             <a:extLst>
               <a:ext uri="{28A0092B-C50C-407E-A947-70E740481C1C}">
-                <a14:useLocalDpi xmlns:a14="http://schemas.microsoft.com/office/drawing/2010/main" val="0"/>
+                <a14:useLocalDpi xmlns:a14="http://schemas.microsoft.com/office/drawing/2010/main" xmlns:p="http://schemas.openxmlformats.org/presentationml/2006/main" xmlns:r="http://schemas.openxmlformats.org/officeDocument/2006/relationships" xmlns:a="http://schemas.openxmlformats.org/drawingml/2006/main" xmlns="" val="0"/>
               </a:ext>
             </a:extLst>
           </a:blip>
@@ -13650,7 +13641,7 @@
     </p:spTree>
     <p:extLst>
       <p:ext uri="{BB962C8B-B14F-4D97-AF65-F5344CB8AC3E}">
-        <p14:creationId xmlns:p14="http://schemas.microsoft.com/office/powerpoint/2010/main" val="746424979"/>
+        <p14:creationId xmlns:p14="http://schemas.microsoft.com/office/powerpoint/2010/main" xmlns:p="http://schemas.openxmlformats.org/presentationml/2006/main" xmlns:r="http://schemas.openxmlformats.org/officeDocument/2006/relationships" xmlns:a="http://schemas.openxmlformats.org/drawingml/2006/main" xmlns="" val="746424979"/>
       </p:ext>
     </p:extLst>
   </p:cSld>
@@ -13668,7 +13659,7 @@
 </file>
 
 <file path=ppt/slides/slide27.xml><?xml version="1.0" encoding="utf-8"?>
-<p:sld xmlns:a="http://schemas.openxmlformats.org/drawingml/2006/main" xmlns:r="http://schemas.openxmlformats.org/officeDocument/2006/relationships" xmlns:p="http://schemas.openxmlformats.org/presentationml/2006/main">
+<p:sld xmlns:a="http://schemas.openxmlformats.org/drawingml/2006/main" xmlns:r="http://schemas.openxmlformats.org/officeDocument/2006/relationships" xmlns:mc="http://schemas.openxmlformats.org/markup-compatibility/2006" xmlns:mv="urn:schemas-microsoft-com:mac:vml" xmlns:p="http://schemas.openxmlformats.org/presentationml/2006/main" mc:Ignorable="mv" mc:PreserveAttributes="mv:*">
   <p:cSld>
     <p:spTree>
       <p:nvGrpSpPr>
@@ -13719,7 +13710,7 @@
           <a:blip r:embed="rId3">
             <a:extLst>
               <a:ext uri="{28A0092B-C50C-407E-A947-70E740481C1C}">
-                <a14:useLocalDpi xmlns:a14="http://schemas.microsoft.com/office/drawing/2010/main" val="0"/>
+                <a14:useLocalDpi xmlns:a14="http://schemas.microsoft.com/office/drawing/2010/main" xmlns:p="http://schemas.openxmlformats.org/presentationml/2006/main" xmlns:r="http://schemas.openxmlformats.org/officeDocument/2006/relationships" xmlns:a="http://schemas.openxmlformats.org/drawingml/2006/main" xmlns="" val="0"/>
               </a:ext>
             </a:extLst>
           </a:blip>
@@ -13907,7 +13898,7 @@
           <a:blip r:embed="rId4">
             <a:extLst>
               <a:ext uri="{28A0092B-C50C-407E-A947-70E740481C1C}">
-                <a14:useLocalDpi xmlns:a14="http://schemas.microsoft.com/office/drawing/2010/main" val="0"/>
+                <a14:useLocalDpi xmlns:a14="http://schemas.microsoft.com/office/drawing/2010/main" xmlns:p="http://schemas.openxmlformats.org/presentationml/2006/main" xmlns:r="http://schemas.openxmlformats.org/officeDocument/2006/relationships" xmlns:a="http://schemas.openxmlformats.org/drawingml/2006/main" xmlns="" val="0"/>
               </a:ext>
             </a:extLst>
           </a:blip>
@@ -13937,7 +13928,7 @@
           <a:blip r:embed="rId5">
             <a:extLst>
               <a:ext uri="{28A0092B-C50C-407E-A947-70E740481C1C}">
-                <a14:useLocalDpi xmlns:a14="http://schemas.microsoft.com/office/drawing/2010/main" val="0"/>
+                <a14:useLocalDpi xmlns:a14="http://schemas.microsoft.com/office/drawing/2010/main" xmlns:p="http://schemas.openxmlformats.org/presentationml/2006/main" xmlns:r="http://schemas.openxmlformats.org/officeDocument/2006/relationships" xmlns:a="http://schemas.openxmlformats.org/drawingml/2006/main" xmlns="" val="0"/>
               </a:ext>
             </a:extLst>
           </a:blip>
@@ -14018,7 +14009,7 @@
     </p:spTree>
     <p:extLst>
       <p:ext uri="{BB962C8B-B14F-4D97-AF65-F5344CB8AC3E}">
-        <p14:creationId xmlns:p14="http://schemas.microsoft.com/office/powerpoint/2010/main" val="1429079060"/>
+        <p14:creationId xmlns:p14="http://schemas.microsoft.com/office/powerpoint/2010/main" xmlns:p="http://schemas.openxmlformats.org/presentationml/2006/main" xmlns:r="http://schemas.openxmlformats.org/officeDocument/2006/relationships" xmlns:a="http://schemas.openxmlformats.org/drawingml/2006/main" xmlns="" val="1429079060"/>
       </p:ext>
     </p:extLst>
   </p:cSld>
@@ -14036,7 +14027,7 @@
 </file>
 
 <file path=ppt/slides/slide28.xml><?xml version="1.0" encoding="utf-8"?>
-<p:sld xmlns:a="http://schemas.openxmlformats.org/drawingml/2006/main" xmlns:r="http://schemas.openxmlformats.org/officeDocument/2006/relationships" xmlns:p="http://schemas.openxmlformats.org/presentationml/2006/main">
+<p:sld xmlns:a="http://schemas.openxmlformats.org/drawingml/2006/main" xmlns:r="http://schemas.openxmlformats.org/officeDocument/2006/relationships" xmlns:mc="http://schemas.openxmlformats.org/markup-compatibility/2006" xmlns:mv="urn:schemas-microsoft-com:mac:vml" xmlns:p="http://schemas.openxmlformats.org/presentationml/2006/main" mc:Ignorable="mv" mc:PreserveAttributes="mv:*">
   <p:cSld>
     <p:spTree>
       <p:nvGrpSpPr>
@@ -14394,7 +14385,7 @@
     </p:spTree>
     <p:extLst>
       <p:ext uri="{BB962C8B-B14F-4D97-AF65-F5344CB8AC3E}">
-        <p14:creationId xmlns:p14="http://schemas.microsoft.com/office/powerpoint/2010/main" val="1697602590"/>
+        <p14:creationId xmlns:p14="http://schemas.microsoft.com/office/powerpoint/2010/main" xmlns:p="http://schemas.openxmlformats.org/presentationml/2006/main" xmlns:r="http://schemas.openxmlformats.org/officeDocument/2006/relationships" xmlns:a="http://schemas.openxmlformats.org/drawingml/2006/main" xmlns="" val="1697602590"/>
       </p:ext>
     </p:extLst>
   </p:cSld>
@@ -14412,7 +14403,7 @@
 </file>
 
 <file path=ppt/slides/slide29.xml><?xml version="1.0" encoding="utf-8"?>
-<p:sld xmlns:a="http://schemas.openxmlformats.org/drawingml/2006/main" xmlns:r="http://schemas.openxmlformats.org/officeDocument/2006/relationships" xmlns:p="http://schemas.openxmlformats.org/presentationml/2006/main">
+<p:sld xmlns:a="http://schemas.openxmlformats.org/drawingml/2006/main" xmlns:r="http://schemas.openxmlformats.org/officeDocument/2006/relationships" xmlns:mc="http://schemas.openxmlformats.org/markup-compatibility/2006" xmlns:mv="urn:schemas-microsoft-com:mac:vml" xmlns:p="http://schemas.openxmlformats.org/presentationml/2006/main" mc:Ignorable="mv" mc:PreserveAttributes="mv:*">
   <p:cSld>
     <p:spTree>
       <p:nvGrpSpPr>
@@ -14773,7 +14764,7 @@
     </p:spTree>
     <p:extLst>
       <p:ext uri="{BB962C8B-B14F-4D97-AF65-F5344CB8AC3E}">
-        <p14:creationId xmlns:p14="http://schemas.microsoft.com/office/powerpoint/2010/main" val="247700720"/>
+        <p14:creationId xmlns:p14="http://schemas.microsoft.com/office/powerpoint/2010/main" xmlns:p="http://schemas.openxmlformats.org/presentationml/2006/main" xmlns:r="http://schemas.openxmlformats.org/officeDocument/2006/relationships" xmlns:a="http://schemas.openxmlformats.org/drawingml/2006/main" xmlns="" val="247700720"/>
       </p:ext>
     </p:extLst>
   </p:cSld>
@@ -14791,7 +14782,7 @@
 </file>
 
 <file path=ppt/slides/slide3.xml><?xml version="1.0" encoding="utf-8"?>
-<p:sld xmlns:a="http://schemas.openxmlformats.org/drawingml/2006/main" xmlns:r="http://schemas.openxmlformats.org/officeDocument/2006/relationships" xmlns:p="http://schemas.openxmlformats.org/presentationml/2006/main">
+<p:sld xmlns:a="http://schemas.openxmlformats.org/drawingml/2006/main" xmlns:r="http://schemas.openxmlformats.org/officeDocument/2006/relationships" xmlns:mc="http://schemas.openxmlformats.org/markup-compatibility/2006" xmlns:mv="urn:schemas-microsoft-com:mac:vml" xmlns:p="http://schemas.openxmlformats.org/presentationml/2006/main" mc:Ignorable="mv" mc:PreserveAttributes="mv:*">
   <p:cSld>
     <p:spTree>
       <p:nvGrpSpPr>
@@ -14824,7 +14815,15 @@
           <a:p>
             <a:r>
               <a:rPr lang="en-US" dirty="0" smtClean="0"/>
-              <a:t>About me</a:t>
+              <a:t>About</a:t>
+            </a:r>
+            <a:r>
+              <a:rPr lang="en-US" dirty="0" smtClean="0"/>
+              <a:t> </a:t>
+            </a:r>
+            <a:r>
+              <a:rPr lang="en-US" dirty="0" smtClean="0"/>
+              <a:t>Us</a:t>
             </a:r>
             <a:endParaRPr lang="en-US" dirty="0"/>
           </a:p>
@@ -14851,7 +14850,11 @@
             </a:pPr>
             <a:r>
               <a:rPr lang="en-US" dirty="0" smtClean="0"/>
-              <a:t>Eric Holmes</a:t>
+              <a:t>Eric </a:t>
+            </a:r>
+            <a:r>
+              <a:rPr lang="en-US" dirty="0" smtClean="0"/>
+              <a:t>Holmes &amp; Michael Barrett</a:t>
             </a:r>
           </a:p>
           <a:p>
@@ -14861,8 +14864,17 @@
             </a:pPr>
             <a:r>
               <a:rPr lang="en-US" dirty="0" smtClean="0"/>
-              <a:t>Infrastructure Engineer at Remind</a:t>
-            </a:r>
+              <a:t>Infrastructure </a:t>
+            </a:r>
+            <a:r>
+              <a:rPr lang="en-US" dirty="0" smtClean="0"/>
+              <a:t>Engineers </a:t>
+            </a:r>
+            <a:r>
+              <a:rPr lang="en-US" dirty="0" smtClean="0"/>
+              <a:t>at Remind</a:t>
+            </a:r>
+            <a:endParaRPr lang="en-US" dirty="0" smtClean="0"/>
           </a:p>
           <a:p>
             <a:pPr marL="342900" indent="-342900">
@@ -14871,7 +14883,7 @@
             </a:pPr>
             <a:r>
               <a:rPr lang="en-US" dirty="0" smtClean="0"/>
-              <a:t>I like building things for other developers</a:t>
+              <a:t>We build things for developers</a:t>
             </a:r>
           </a:p>
           <a:p>
@@ -14881,24 +14893,49 @@
             </a:pPr>
             <a:r>
               <a:rPr lang="en-US" dirty="0" smtClean="0"/>
-              <a:t>Work mostly with Go and Ruby</a:t>
-            </a:r>
+              <a:t>You </a:t>
+            </a:r>
+            <a:r>
+              <a:rPr lang="en-US" dirty="0" smtClean="0"/>
+              <a:t>can find</a:t>
+            </a:r>
+            <a:r>
+              <a:rPr lang="en-US" dirty="0" smtClean="0"/>
+              <a:t> our open </a:t>
+            </a:r>
+            <a:r>
+              <a:rPr lang="en-US" dirty="0" smtClean="0"/>
+              <a:t>source stuff at </a:t>
+            </a:r>
+            <a:r>
+              <a:rPr lang="en-US" dirty="0" smtClean="0">
+                <a:hlinkClick r:id="rId3"/>
+              </a:rPr>
+              <a:t>https://github.com/</a:t>
+            </a:r>
+            <a:r>
+              <a:rPr lang="en-US" dirty="0" smtClean="0">
+                <a:hlinkClick r:id="rId3"/>
+              </a:rPr>
+              <a:t>ejholmes</a:t>
+            </a:r>
+            <a:r>
+              <a:rPr lang="en-US" dirty="0" smtClean="0"/>
+              <a:t> &amp; </a:t>
+            </a:r>
+            <a:r>
+              <a:rPr lang="en-US" dirty="0" smtClean="0">
+                <a:hlinkClick r:id="rId4"/>
+              </a:rPr>
+              <a:t>https://github.com/phobologic</a:t>
+            </a:r>
+            <a:endParaRPr lang="en-US" dirty="0" smtClean="0"/>
           </a:p>
           <a:p>
             <a:pPr marL="342900" indent="-342900">
               <a:buFont typeface="Arial" charset="0"/>
               <a:buChar char="•"/>
             </a:pPr>
-            <a:r>
-              <a:rPr lang="en-US" dirty="0" smtClean="0"/>
-              <a:t>You can find my open source stuff at </a:t>
-            </a:r>
-            <a:r>
-              <a:rPr lang="en-US" dirty="0" smtClean="0">
-                <a:hlinkClick r:id="rId3"/>
-              </a:rPr>
-              <a:t>https://github.com/ejholmes</a:t>
-            </a:r>
             <a:endParaRPr lang="en-US" dirty="0" smtClean="0"/>
           </a:p>
           <a:p>
@@ -14910,40 +14947,10 @@
           </a:p>
         </p:txBody>
       </p:sp>
-      <p:pic>
-        <p:nvPicPr>
-          <p:cNvPr id="4" name="Picture 3"/>
-          <p:cNvPicPr>
-            <a:picLocks noChangeAspect="1"/>
-          </p:cNvPicPr>
-          <p:nvPr/>
-        </p:nvPicPr>
-        <p:blipFill>
-          <a:blip r:embed="rId4">
-            <a:extLst>
-              <a:ext uri="{28A0092B-C50C-407E-A947-70E740481C1C}">
-                <a14:useLocalDpi xmlns:a14="http://schemas.microsoft.com/office/drawing/2010/main" val="0"/>
-              </a:ext>
-            </a:extLst>
-          </a:blip>
-          <a:stretch>
-            <a:fillRect/>
-          </a:stretch>
-        </p:blipFill>
-        <p:spPr>
-          <a:xfrm>
-            <a:off x="6565299" y="1009332"/>
-            <a:ext cx="1976794" cy="1976794"/>
-          </a:xfrm>
-          <a:prstGeom prst="rect">
-            <a:avLst/>
-          </a:prstGeom>
-        </p:spPr>
-      </p:pic>
     </p:spTree>
     <p:extLst>
       <p:ext uri="{BB962C8B-B14F-4D97-AF65-F5344CB8AC3E}">
-        <p14:creationId xmlns:p14="http://schemas.microsoft.com/office/powerpoint/2010/main" val="681947218"/>
+        <p14:creationId xmlns:p14="http://schemas.microsoft.com/office/powerpoint/2010/main" xmlns:p="http://schemas.openxmlformats.org/presentationml/2006/main" xmlns:r="http://schemas.openxmlformats.org/officeDocument/2006/relationships" xmlns:a="http://schemas.openxmlformats.org/drawingml/2006/main" xmlns="" val="681947218"/>
       </p:ext>
     </p:extLst>
   </p:cSld>
@@ -14961,7 +14968,7 @@
 </file>
 
 <file path=ppt/slides/slide30.xml><?xml version="1.0" encoding="utf-8"?>
-<p:sld xmlns:a="http://schemas.openxmlformats.org/drawingml/2006/main" xmlns:r="http://schemas.openxmlformats.org/officeDocument/2006/relationships" xmlns:p="http://schemas.openxmlformats.org/presentationml/2006/main">
+<p:sld xmlns:a="http://schemas.openxmlformats.org/drawingml/2006/main" xmlns:r="http://schemas.openxmlformats.org/officeDocument/2006/relationships" xmlns:mc="http://schemas.openxmlformats.org/markup-compatibility/2006" xmlns:mv="urn:schemas-microsoft-com:mac:vml" xmlns:p="http://schemas.openxmlformats.org/presentationml/2006/main" mc:Ignorable="mv" mc:PreserveAttributes="mv:*">
   <p:cSld>
     <p:spTree>
       <p:nvGrpSpPr>
@@ -15028,11 +15035,6 @@
               </a:rPr>
               <a:t>“Scale out via the process model”</a:t>
             </a:r>
-            <a:endParaRPr lang="en-US" i="1" dirty="0">
-              <a:solidFill>
-                <a:schemeClr val="accent6"/>
-              </a:solidFill>
-            </a:endParaRPr>
           </a:p>
         </p:txBody>
       </p:sp>
@@ -15465,7 +15467,7 @@
     </p:spTree>
     <p:extLst>
       <p:ext uri="{BB962C8B-B14F-4D97-AF65-F5344CB8AC3E}">
-        <p14:creationId xmlns:p14="http://schemas.microsoft.com/office/powerpoint/2010/main" val="916509501"/>
+        <p14:creationId xmlns:p14="http://schemas.microsoft.com/office/powerpoint/2010/main" xmlns:p="http://schemas.openxmlformats.org/presentationml/2006/main" xmlns:r="http://schemas.openxmlformats.org/officeDocument/2006/relationships" xmlns:a="http://schemas.openxmlformats.org/drawingml/2006/main" xmlns="" val="916509501"/>
       </p:ext>
     </p:extLst>
   </p:cSld>
@@ -15483,7 +15485,7 @@
 </file>
 
 <file path=ppt/slides/slide31.xml><?xml version="1.0" encoding="utf-8"?>
-<p:sld xmlns:a="http://schemas.openxmlformats.org/drawingml/2006/main" xmlns:r="http://schemas.openxmlformats.org/officeDocument/2006/relationships" xmlns:p="http://schemas.openxmlformats.org/presentationml/2006/main">
+<p:sld xmlns:a="http://schemas.openxmlformats.org/drawingml/2006/main" xmlns:r="http://schemas.openxmlformats.org/officeDocument/2006/relationships" xmlns:mc="http://schemas.openxmlformats.org/markup-compatibility/2006" xmlns:mv="urn:schemas-microsoft-com:mac:vml" xmlns:p="http://schemas.openxmlformats.org/presentationml/2006/main" mc:Ignorable="mv" mc:PreserveAttributes="mv:*">
   <p:cSld>
     <p:spTree>
       <p:nvGrpSpPr>
@@ -15550,11 +15552,6 @@
               </a:rPr>
               <a:t>“Keep development, staging, and production as similar as possible”</a:t>
             </a:r>
-            <a:endParaRPr lang="en-US" i="1" dirty="0">
-              <a:solidFill>
-                <a:schemeClr val="accent6"/>
-              </a:solidFill>
-            </a:endParaRPr>
           </a:p>
         </p:txBody>
       </p:sp>
@@ -15825,7 +15822,7 @@
     </p:spTree>
     <p:extLst>
       <p:ext uri="{BB962C8B-B14F-4D97-AF65-F5344CB8AC3E}">
-        <p14:creationId xmlns:p14="http://schemas.microsoft.com/office/powerpoint/2010/main" val="1698253457"/>
+        <p14:creationId xmlns:p14="http://schemas.microsoft.com/office/powerpoint/2010/main" xmlns:p="http://schemas.openxmlformats.org/presentationml/2006/main" xmlns:r="http://schemas.openxmlformats.org/officeDocument/2006/relationships" xmlns:a="http://schemas.openxmlformats.org/drawingml/2006/main" xmlns="" val="1698253457"/>
       </p:ext>
     </p:extLst>
   </p:cSld>
@@ -15843,7 +15840,7 @@
 </file>
 
 <file path=ppt/slides/slide32.xml><?xml version="1.0" encoding="utf-8"?>
-<p:sld xmlns:a="http://schemas.openxmlformats.org/drawingml/2006/main" xmlns:r="http://schemas.openxmlformats.org/officeDocument/2006/relationships" xmlns:p="http://schemas.openxmlformats.org/presentationml/2006/main">
+<p:sld xmlns:a="http://schemas.openxmlformats.org/drawingml/2006/main" xmlns:r="http://schemas.openxmlformats.org/officeDocument/2006/relationships" xmlns:mc="http://schemas.openxmlformats.org/markup-compatibility/2006" xmlns:mv="urn:schemas-microsoft-com:mac:vml" xmlns:p="http://schemas.openxmlformats.org/presentationml/2006/main" mc:Ignorable="mv" mc:PreserveAttributes="mv:*">
   <p:cSld>
     <p:spTree>
       <p:nvGrpSpPr>
@@ -15910,11 +15907,6 @@
               </a:rPr>
               <a:t>“Treat logs as event streams”</a:t>
             </a:r>
-            <a:endParaRPr lang="en-US" i="1" dirty="0">
-              <a:solidFill>
-                <a:schemeClr val="accent6"/>
-              </a:solidFill>
-            </a:endParaRPr>
           </a:p>
         </p:txBody>
       </p:sp>
@@ -16247,7 +16239,7 @@
     </p:spTree>
     <p:extLst>
       <p:ext uri="{BB962C8B-B14F-4D97-AF65-F5344CB8AC3E}">
-        <p14:creationId xmlns:p14="http://schemas.microsoft.com/office/powerpoint/2010/main" val="1139894538"/>
+        <p14:creationId xmlns:p14="http://schemas.microsoft.com/office/powerpoint/2010/main" xmlns:p="http://schemas.openxmlformats.org/presentationml/2006/main" xmlns:r="http://schemas.openxmlformats.org/officeDocument/2006/relationships" xmlns:a="http://schemas.openxmlformats.org/drawingml/2006/main" xmlns="" val="1139894538"/>
       </p:ext>
     </p:extLst>
   </p:cSld>
@@ -16265,7 +16257,7 @@
 </file>
 
 <file path=ppt/slides/slide33.xml><?xml version="1.0" encoding="utf-8"?>
-<p:sld xmlns:a="http://schemas.openxmlformats.org/drawingml/2006/main" xmlns:r="http://schemas.openxmlformats.org/officeDocument/2006/relationships" xmlns:p="http://schemas.openxmlformats.org/presentationml/2006/main">
+<p:sld xmlns:a="http://schemas.openxmlformats.org/drawingml/2006/main" xmlns:r="http://schemas.openxmlformats.org/officeDocument/2006/relationships" xmlns:mc="http://schemas.openxmlformats.org/markup-compatibility/2006" xmlns:mv="urn:schemas-microsoft-com:mac:vml" xmlns:p="http://schemas.openxmlformats.org/presentationml/2006/main" mc:Ignorable="mv" mc:PreserveAttributes="mv:*">
   <p:cSld>
     <p:spTree>
       <p:nvGrpSpPr>
@@ -16332,11 +16324,6 @@
               </a:rPr>
               <a:t>“Run admin/management tasks as one-off processes”</a:t>
             </a:r>
-            <a:endParaRPr lang="en-US" i="1" dirty="0">
-              <a:solidFill>
-                <a:schemeClr val="accent6"/>
-              </a:solidFill>
-            </a:endParaRPr>
           </a:p>
         </p:txBody>
       </p:sp>
@@ -16558,7 +16545,7 @@
     </p:spTree>
     <p:extLst>
       <p:ext uri="{BB962C8B-B14F-4D97-AF65-F5344CB8AC3E}">
-        <p14:creationId xmlns:p14="http://schemas.microsoft.com/office/powerpoint/2010/main" val="1007558359"/>
+        <p14:creationId xmlns:p14="http://schemas.microsoft.com/office/powerpoint/2010/main" xmlns:p="http://schemas.openxmlformats.org/presentationml/2006/main" xmlns:r="http://schemas.openxmlformats.org/officeDocument/2006/relationships" xmlns:a="http://schemas.openxmlformats.org/drawingml/2006/main" xmlns="" val="1007558359"/>
       </p:ext>
     </p:extLst>
   </p:cSld>
@@ -16576,7 +16563,7 @@
 </file>
 
 <file path=ppt/slides/slide34.xml><?xml version="1.0" encoding="utf-8"?>
-<p:sld xmlns:a="http://schemas.openxmlformats.org/drawingml/2006/main" xmlns:r="http://schemas.openxmlformats.org/officeDocument/2006/relationships" xmlns:p="http://schemas.openxmlformats.org/presentationml/2006/main">
+<p:sld xmlns:a="http://schemas.openxmlformats.org/drawingml/2006/main" xmlns:r="http://schemas.openxmlformats.org/officeDocument/2006/relationships" xmlns:mc="http://schemas.openxmlformats.org/markup-compatibility/2006" xmlns:mv="urn:schemas-microsoft-com:mac:vml" xmlns:p="http://schemas.openxmlformats.org/presentationml/2006/main" mc:Ignorable="mv" mc:PreserveAttributes="mv:*">
   <p:cSld>
     <p:spTree>
       <p:nvGrpSpPr>
@@ -16618,7 +16605,7 @@
     </p:spTree>
     <p:extLst>
       <p:ext uri="{BB962C8B-B14F-4D97-AF65-F5344CB8AC3E}">
-        <p14:creationId xmlns:p14="http://schemas.microsoft.com/office/powerpoint/2010/main" val="1047632536"/>
+        <p14:creationId xmlns:p14="http://schemas.microsoft.com/office/powerpoint/2010/main" xmlns:p="http://schemas.openxmlformats.org/presentationml/2006/main" xmlns:r="http://schemas.openxmlformats.org/officeDocument/2006/relationships" xmlns:a="http://schemas.openxmlformats.org/drawingml/2006/main" xmlns="" val="1047632536"/>
       </p:ext>
     </p:extLst>
   </p:cSld>
@@ -16636,7 +16623,7 @@
 </file>
 
 <file path=ppt/slides/slide35.xml><?xml version="1.0" encoding="utf-8"?>
-<p:sld xmlns:a="http://schemas.openxmlformats.org/drawingml/2006/main" xmlns:r="http://schemas.openxmlformats.org/officeDocument/2006/relationships" xmlns:p="http://schemas.openxmlformats.org/presentationml/2006/main">
+<p:sld xmlns:a="http://schemas.openxmlformats.org/drawingml/2006/main" xmlns:r="http://schemas.openxmlformats.org/officeDocument/2006/relationships" xmlns:mc="http://schemas.openxmlformats.org/markup-compatibility/2006" xmlns:mv="urn:schemas-microsoft-com:mac:vml" xmlns:p="http://schemas.openxmlformats.org/presentationml/2006/main" mc:Ignorable="mv" mc:PreserveAttributes="mv:*">
   <p:cSld>
     <p:spTree>
       <p:nvGrpSpPr>
@@ -16678,7 +16665,7 @@
     </p:spTree>
     <p:extLst>
       <p:ext uri="{BB962C8B-B14F-4D97-AF65-F5344CB8AC3E}">
-        <p14:creationId xmlns:p14="http://schemas.microsoft.com/office/powerpoint/2010/main" val="1065250353"/>
+        <p14:creationId xmlns:p14="http://schemas.microsoft.com/office/powerpoint/2010/main" xmlns:p="http://schemas.openxmlformats.org/presentationml/2006/main" xmlns:r="http://schemas.openxmlformats.org/officeDocument/2006/relationships" xmlns:a="http://schemas.openxmlformats.org/drawingml/2006/main" xmlns="" val="1065250353"/>
       </p:ext>
     </p:extLst>
   </p:cSld>
@@ -16696,7 +16683,7 @@
 </file>
 
 <file path=ppt/slides/slide36.xml><?xml version="1.0" encoding="utf-8"?>
-<p:sld xmlns:a="http://schemas.openxmlformats.org/drawingml/2006/main" xmlns:r="http://schemas.openxmlformats.org/officeDocument/2006/relationships" xmlns:p="http://schemas.openxmlformats.org/presentationml/2006/main">
+<p:sld xmlns:a="http://schemas.openxmlformats.org/drawingml/2006/main" xmlns:r="http://schemas.openxmlformats.org/officeDocument/2006/relationships" xmlns:mc="http://schemas.openxmlformats.org/markup-compatibility/2006" xmlns:mv="urn:schemas-microsoft-com:mac:vml" xmlns:p="http://schemas.openxmlformats.org/presentationml/2006/main" mc:Ignorable="mv" mc:PreserveAttributes="mv:*">
   <p:cSld>
     <p:spTree>
       <p:nvGrpSpPr>
@@ -16803,7 +16790,7 @@
     </p:spTree>
     <p:extLst>
       <p:ext uri="{BB962C8B-B14F-4D97-AF65-F5344CB8AC3E}">
-        <p14:creationId xmlns:p14="http://schemas.microsoft.com/office/powerpoint/2010/main" val="1188070149"/>
+        <p14:creationId xmlns:p14="http://schemas.microsoft.com/office/powerpoint/2010/main" xmlns:p="http://schemas.openxmlformats.org/presentationml/2006/main" xmlns:r="http://schemas.openxmlformats.org/officeDocument/2006/relationships" xmlns:a="http://schemas.openxmlformats.org/drawingml/2006/main" xmlns="" val="1188070149"/>
       </p:ext>
     </p:extLst>
   </p:cSld>
@@ -16821,7 +16808,7 @@
 </file>
 
 <file path=ppt/slides/slide37.xml><?xml version="1.0" encoding="utf-8"?>
-<p:sld xmlns:a="http://schemas.openxmlformats.org/drawingml/2006/main" xmlns:r="http://schemas.openxmlformats.org/officeDocument/2006/relationships" xmlns:p="http://schemas.openxmlformats.org/presentationml/2006/main">
+<p:sld xmlns:a="http://schemas.openxmlformats.org/drawingml/2006/main" xmlns:r="http://schemas.openxmlformats.org/officeDocument/2006/relationships" xmlns:mc="http://schemas.openxmlformats.org/markup-compatibility/2006" xmlns:mv="urn:schemas-microsoft-com:mac:vml" xmlns:p="http://schemas.openxmlformats.org/presentationml/2006/main" mc:Ignorable="mv" mc:PreserveAttributes="mv:*">
   <p:cSld>
     <p:spTree>
       <p:nvGrpSpPr>
@@ -16872,7 +16859,7 @@
           <a:blip r:embed="rId3">
             <a:extLst>
               <a:ext uri="{28A0092B-C50C-407E-A947-70E740481C1C}">
-                <a14:useLocalDpi xmlns:a14="http://schemas.microsoft.com/office/drawing/2010/main" val="0"/>
+                <a14:useLocalDpi xmlns:a14="http://schemas.microsoft.com/office/drawing/2010/main" xmlns:p="http://schemas.openxmlformats.org/presentationml/2006/main" xmlns:r="http://schemas.openxmlformats.org/officeDocument/2006/relationships" xmlns:a="http://schemas.openxmlformats.org/drawingml/2006/main" xmlns="" val="0"/>
               </a:ext>
             </a:extLst>
           </a:blip>
@@ -16941,7 +16928,7 @@
           <a:blip r:embed="rId4">
             <a:extLst>
               <a:ext uri="{28A0092B-C50C-407E-A947-70E740481C1C}">
-                <a14:useLocalDpi xmlns:a14="http://schemas.microsoft.com/office/drawing/2010/main" val="0"/>
+                <a14:useLocalDpi xmlns:a14="http://schemas.microsoft.com/office/drawing/2010/main" xmlns:p="http://schemas.openxmlformats.org/presentationml/2006/main" xmlns:r="http://schemas.openxmlformats.org/officeDocument/2006/relationships" xmlns:a="http://schemas.openxmlformats.org/drawingml/2006/main" xmlns="" val="0"/>
               </a:ext>
             </a:extLst>
           </a:blip>
@@ -17031,7 +17018,7 @@
     </p:spTree>
     <p:extLst>
       <p:ext uri="{BB962C8B-B14F-4D97-AF65-F5344CB8AC3E}">
-        <p14:creationId xmlns:p14="http://schemas.microsoft.com/office/powerpoint/2010/main" val="420560106"/>
+        <p14:creationId xmlns:p14="http://schemas.microsoft.com/office/powerpoint/2010/main" xmlns:p="http://schemas.openxmlformats.org/presentationml/2006/main" xmlns:r="http://schemas.openxmlformats.org/officeDocument/2006/relationships" xmlns:a="http://schemas.openxmlformats.org/drawingml/2006/main" xmlns="" val="420560106"/>
       </p:ext>
     </p:extLst>
   </p:cSld>
@@ -17049,7 +17036,7 @@
 </file>
 
 <file path=ppt/slides/slide38.xml><?xml version="1.0" encoding="utf-8"?>
-<p:sld xmlns:a="http://schemas.openxmlformats.org/drawingml/2006/main" xmlns:r="http://schemas.openxmlformats.org/officeDocument/2006/relationships" xmlns:p="http://schemas.openxmlformats.org/presentationml/2006/main">
+<p:sld xmlns:a="http://schemas.openxmlformats.org/drawingml/2006/main" xmlns:r="http://schemas.openxmlformats.org/officeDocument/2006/relationships" xmlns:mc="http://schemas.openxmlformats.org/markup-compatibility/2006" xmlns:mv="urn:schemas-microsoft-com:mac:vml" xmlns:p="http://schemas.openxmlformats.org/presentationml/2006/main" mc:Ignorable="mv" mc:PreserveAttributes="mv:*">
   <p:cSld>
     <p:spTree>
       <p:nvGrpSpPr>
@@ -17100,7 +17087,7 @@
           <a:blip r:embed="rId3">
             <a:extLst>
               <a:ext uri="{28A0092B-C50C-407E-A947-70E740481C1C}">
-                <a14:useLocalDpi xmlns:a14="http://schemas.microsoft.com/office/drawing/2010/main" val="0"/>
+                <a14:useLocalDpi xmlns:a14="http://schemas.microsoft.com/office/drawing/2010/main" xmlns:p="http://schemas.openxmlformats.org/presentationml/2006/main" xmlns:r="http://schemas.openxmlformats.org/officeDocument/2006/relationships" xmlns:a="http://schemas.openxmlformats.org/drawingml/2006/main" xmlns="" val="0"/>
               </a:ext>
             </a:extLst>
           </a:blip>
@@ -17301,7 +17288,7 @@
     </p:spTree>
     <p:extLst>
       <p:ext uri="{BB962C8B-B14F-4D97-AF65-F5344CB8AC3E}">
-        <p14:creationId xmlns:p14="http://schemas.microsoft.com/office/powerpoint/2010/main" val="1585635513"/>
+        <p14:creationId xmlns:p14="http://schemas.microsoft.com/office/powerpoint/2010/main" xmlns:p="http://schemas.openxmlformats.org/presentationml/2006/main" xmlns:r="http://schemas.openxmlformats.org/officeDocument/2006/relationships" xmlns:a="http://schemas.openxmlformats.org/drawingml/2006/main" xmlns="" val="1585635513"/>
       </p:ext>
     </p:extLst>
   </p:cSld>
@@ -17319,7 +17306,7 @@
 </file>
 
 <file path=ppt/slides/slide39.xml><?xml version="1.0" encoding="utf-8"?>
-<p:sld xmlns:a="http://schemas.openxmlformats.org/drawingml/2006/main" xmlns:r="http://schemas.openxmlformats.org/officeDocument/2006/relationships" xmlns:p="http://schemas.openxmlformats.org/presentationml/2006/main">
+<p:sld xmlns:a="http://schemas.openxmlformats.org/drawingml/2006/main" xmlns:r="http://schemas.openxmlformats.org/officeDocument/2006/relationships" xmlns:mc="http://schemas.openxmlformats.org/markup-compatibility/2006" xmlns:mv="urn:schemas-microsoft-com:mac:vml" xmlns:p="http://schemas.openxmlformats.org/presentationml/2006/main" mc:Ignorable="mv" mc:PreserveAttributes="mv:*">
   <p:cSld>
     <p:spTree>
       <p:nvGrpSpPr>
@@ -17413,7 +17400,7 @@
           <a:blip r:embed="rId3">
             <a:extLst>
               <a:ext uri="{28A0092B-C50C-407E-A947-70E740481C1C}">
-                <a14:useLocalDpi xmlns:a14="http://schemas.microsoft.com/office/drawing/2010/main" val="0"/>
+                <a14:useLocalDpi xmlns:a14="http://schemas.microsoft.com/office/drawing/2010/main" xmlns:p="http://schemas.openxmlformats.org/presentationml/2006/main" xmlns:r="http://schemas.openxmlformats.org/officeDocument/2006/relationships" xmlns:a="http://schemas.openxmlformats.org/drawingml/2006/main" xmlns="" val="0"/>
               </a:ext>
             </a:extLst>
           </a:blip>
@@ -17443,7 +17430,7 @@
           <a:blip r:embed="rId4">
             <a:extLst>
               <a:ext uri="{28A0092B-C50C-407E-A947-70E740481C1C}">
-                <a14:useLocalDpi xmlns:a14="http://schemas.microsoft.com/office/drawing/2010/main" val="0"/>
+                <a14:useLocalDpi xmlns:a14="http://schemas.microsoft.com/office/drawing/2010/main" xmlns:p="http://schemas.openxmlformats.org/presentationml/2006/main" xmlns:r="http://schemas.openxmlformats.org/officeDocument/2006/relationships" xmlns:a="http://schemas.openxmlformats.org/drawingml/2006/main" xmlns="" val="0"/>
               </a:ext>
             </a:extLst>
           </a:blip>
@@ -17524,7 +17511,7 @@
     </p:spTree>
     <p:extLst>
       <p:ext uri="{BB962C8B-B14F-4D97-AF65-F5344CB8AC3E}">
-        <p14:creationId xmlns:p14="http://schemas.microsoft.com/office/powerpoint/2010/main" val="190712800"/>
+        <p14:creationId xmlns:p14="http://schemas.microsoft.com/office/powerpoint/2010/main" xmlns:p="http://schemas.openxmlformats.org/presentationml/2006/main" xmlns:r="http://schemas.openxmlformats.org/officeDocument/2006/relationships" xmlns:a="http://schemas.openxmlformats.org/drawingml/2006/main" xmlns="" val="190712800"/>
       </p:ext>
     </p:extLst>
   </p:cSld>
@@ -17542,7 +17529,7 @@
 </file>
 
 <file path=ppt/slides/slide4.xml><?xml version="1.0" encoding="utf-8"?>
-<p:sld xmlns:a="http://schemas.openxmlformats.org/drawingml/2006/main" xmlns:r="http://schemas.openxmlformats.org/officeDocument/2006/relationships" xmlns:p="http://schemas.openxmlformats.org/presentationml/2006/main">
+<p:sld xmlns:a="http://schemas.openxmlformats.org/drawingml/2006/main" xmlns:r="http://schemas.openxmlformats.org/officeDocument/2006/relationships" xmlns:mc="http://schemas.openxmlformats.org/markup-compatibility/2006" xmlns:mv="urn:schemas-microsoft-com:mac:vml" xmlns:p="http://schemas.openxmlformats.org/presentationml/2006/main" mc:Ignorable="mv" mc:PreserveAttributes="mv:*">
   <p:cSld>
     <p:spTree>
       <p:nvGrpSpPr>
@@ -17670,7 +17657,7 @@
           <a:blip r:embed="rId3">
             <a:extLst>
               <a:ext uri="{28A0092B-C50C-407E-A947-70E740481C1C}">
-                <a14:useLocalDpi xmlns:a14="http://schemas.microsoft.com/office/drawing/2010/main" val="0"/>
+                <a14:useLocalDpi xmlns:a14="http://schemas.microsoft.com/office/drawing/2010/main" xmlns:p="http://schemas.openxmlformats.org/presentationml/2006/main" xmlns:r="http://schemas.openxmlformats.org/officeDocument/2006/relationships" xmlns:a="http://schemas.openxmlformats.org/drawingml/2006/main" xmlns="" val="0"/>
               </a:ext>
             </a:extLst>
           </a:blip>
@@ -17691,7 +17678,7 @@
     </p:spTree>
     <p:extLst>
       <p:ext uri="{BB962C8B-B14F-4D97-AF65-F5344CB8AC3E}">
-        <p14:creationId xmlns:p14="http://schemas.microsoft.com/office/powerpoint/2010/main" val="589906508"/>
+        <p14:creationId xmlns:p14="http://schemas.microsoft.com/office/powerpoint/2010/main" xmlns:p="http://schemas.openxmlformats.org/presentationml/2006/main" xmlns:r="http://schemas.openxmlformats.org/officeDocument/2006/relationships" xmlns:a="http://schemas.openxmlformats.org/drawingml/2006/main" xmlns="" val="589906508"/>
       </p:ext>
     </p:extLst>
   </p:cSld>
@@ -17709,7 +17696,7 @@
 </file>
 
 <file path=ppt/slides/slide40.xml><?xml version="1.0" encoding="utf-8"?>
-<p:sld xmlns:a="http://schemas.openxmlformats.org/drawingml/2006/main" xmlns:r="http://schemas.openxmlformats.org/officeDocument/2006/relationships" xmlns:p="http://schemas.openxmlformats.org/presentationml/2006/main">
+<p:sld xmlns:a="http://schemas.openxmlformats.org/drawingml/2006/main" xmlns:r="http://schemas.openxmlformats.org/officeDocument/2006/relationships" xmlns:mc="http://schemas.openxmlformats.org/markup-compatibility/2006" xmlns:mv="urn:schemas-microsoft-com:mac:vml" xmlns:p="http://schemas.openxmlformats.org/presentationml/2006/main" mc:Ignorable="mv" mc:PreserveAttributes="mv:*">
   <p:cSld>
     <p:spTree>
       <p:nvGrpSpPr>
@@ -17842,7 +17829,7 @@
     </p:spTree>
     <p:extLst>
       <p:ext uri="{BB962C8B-B14F-4D97-AF65-F5344CB8AC3E}">
-        <p14:creationId xmlns:p14="http://schemas.microsoft.com/office/powerpoint/2010/main" val="1962145869"/>
+        <p14:creationId xmlns:p14="http://schemas.microsoft.com/office/powerpoint/2010/main" xmlns:p="http://schemas.openxmlformats.org/presentationml/2006/main" xmlns:r="http://schemas.openxmlformats.org/officeDocument/2006/relationships" xmlns:a="http://schemas.openxmlformats.org/drawingml/2006/main" xmlns="" val="1962145869"/>
       </p:ext>
     </p:extLst>
   </p:cSld>
@@ -17860,7 +17847,7 @@
 </file>
 
 <file path=ppt/slides/slide41.xml><?xml version="1.0" encoding="utf-8"?>
-<p:sld xmlns:a="http://schemas.openxmlformats.org/drawingml/2006/main" xmlns:r="http://schemas.openxmlformats.org/officeDocument/2006/relationships" xmlns:p="http://schemas.openxmlformats.org/presentationml/2006/main">
+<p:sld xmlns:a="http://schemas.openxmlformats.org/drawingml/2006/main" xmlns:r="http://schemas.openxmlformats.org/officeDocument/2006/relationships" xmlns:mc="http://schemas.openxmlformats.org/markup-compatibility/2006" xmlns:mv="urn:schemas-microsoft-com:mac:vml" xmlns:p="http://schemas.openxmlformats.org/presentationml/2006/main" mc:Ignorable="mv" mc:PreserveAttributes="mv:*">
   <p:cSld>
     <p:spTree>
       <p:nvGrpSpPr>
@@ -17963,7 +17950,7 @@
     </p:spTree>
     <p:extLst>
       <p:ext uri="{BB962C8B-B14F-4D97-AF65-F5344CB8AC3E}">
-        <p14:creationId xmlns:p14="http://schemas.microsoft.com/office/powerpoint/2010/main" val="407593370"/>
+        <p14:creationId xmlns:p14="http://schemas.microsoft.com/office/powerpoint/2010/main" xmlns:p="http://schemas.openxmlformats.org/presentationml/2006/main" xmlns:r="http://schemas.openxmlformats.org/officeDocument/2006/relationships" xmlns:a="http://schemas.openxmlformats.org/drawingml/2006/main" xmlns="" val="407593370"/>
       </p:ext>
     </p:extLst>
   </p:cSld>
@@ -17981,7 +17968,7 @@
 </file>
 
 <file path=ppt/slides/slide42.xml><?xml version="1.0" encoding="utf-8"?>
-<p:sld xmlns:a="http://schemas.openxmlformats.org/drawingml/2006/main" xmlns:r="http://schemas.openxmlformats.org/officeDocument/2006/relationships" xmlns:p="http://schemas.openxmlformats.org/presentationml/2006/main">
+<p:sld xmlns:a="http://schemas.openxmlformats.org/drawingml/2006/main" xmlns:r="http://schemas.openxmlformats.org/officeDocument/2006/relationships" xmlns:mc="http://schemas.openxmlformats.org/markup-compatibility/2006" xmlns:mv="urn:schemas-microsoft-com:mac:vml" xmlns:p="http://schemas.openxmlformats.org/presentationml/2006/main" mc:Ignorable="mv" mc:PreserveAttributes="mv:*">
   <p:cSld>
     <p:spTree>
       <p:nvGrpSpPr>
@@ -18019,7 +18006,7 @@
     </p:spTree>
     <p:extLst>
       <p:ext uri="{BB962C8B-B14F-4D97-AF65-F5344CB8AC3E}">
-        <p14:creationId xmlns:p14="http://schemas.microsoft.com/office/powerpoint/2010/main" val="1954272061"/>
+        <p14:creationId xmlns:p14="http://schemas.microsoft.com/office/powerpoint/2010/main" xmlns:p="http://schemas.openxmlformats.org/presentationml/2006/main" xmlns:r="http://schemas.openxmlformats.org/officeDocument/2006/relationships" xmlns:a="http://schemas.openxmlformats.org/drawingml/2006/main" xmlns="" val="1954272061"/>
       </p:ext>
     </p:extLst>
   </p:cSld>
@@ -18037,7 +18024,7 @@
 </file>
 
 <file path=ppt/slides/slide43.xml><?xml version="1.0" encoding="utf-8"?>
-<p:sld xmlns:a="http://schemas.openxmlformats.org/drawingml/2006/main" xmlns:r="http://schemas.openxmlformats.org/officeDocument/2006/relationships" xmlns:p="http://schemas.openxmlformats.org/presentationml/2006/main">
+<p:sld xmlns:a="http://schemas.openxmlformats.org/drawingml/2006/main" xmlns:r="http://schemas.openxmlformats.org/officeDocument/2006/relationships" xmlns:mc="http://schemas.openxmlformats.org/markup-compatibility/2006" xmlns:mv="urn:schemas-microsoft-com:mac:vml" xmlns:p="http://schemas.openxmlformats.org/presentationml/2006/main" mc:Ignorable="mv" mc:PreserveAttributes="mv:*">
   <p:cSld>
     <p:spTree>
       <p:nvGrpSpPr>
@@ -18056,7 +18043,7 @@
     </p:spTree>
     <p:extLst>
       <p:ext uri="{BB962C8B-B14F-4D97-AF65-F5344CB8AC3E}">
-        <p14:creationId xmlns:p14="http://schemas.microsoft.com/office/powerpoint/2010/main" val="1835632009"/>
+        <p14:creationId xmlns:p14="http://schemas.microsoft.com/office/powerpoint/2010/main" xmlns:p="http://schemas.openxmlformats.org/presentationml/2006/main" xmlns:r="http://schemas.openxmlformats.org/officeDocument/2006/relationships" xmlns:a="http://schemas.openxmlformats.org/drawingml/2006/main" xmlns="" val="1835632009"/>
       </p:ext>
     </p:extLst>
   </p:cSld>
@@ -18074,7 +18061,7 @@
 </file>
 
 <file path=ppt/slides/slide44.xml><?xml version="1.0" encoding="utf-8"?>
-<p:sld xmlns:a="http://schemas.openxmlformats.org/drawingml/2006/main" xmlns:r="http://schemas.openxmlformats.org/officeDocument/2006/relationships" xmlns:p="http://schemas.openxmlformats.org/presentationml/2006/main">
+<p:sld xmlns:a="http://schemas.openxmlformats.org/drawingml/2006/main" xmlns:r="http://schemas.openxmlformats.org/officeDocument/2006/relationships" xmlns:mc="http://schemas.openxmlformats.org/markup-compatibility/2006" xmlns:mv="urn:schemas-microsoft-com:mac:vml" xmlns:p="http://schemas.openxmlformats.org/presentationml/2006/main" mc:Ignorable="mv" mc:PreserveAttributes="mv:*">
   <p:cSld>
     <p:spTree>
       <p:nvGrpSpPr>
@@ -18441,7 +18428,7 @@
     </p:spTree>
     <p:extLst>
       <p:ext uri="{BB962C8B-B14F-4D97-AF65-F5344CB8AC3E}">
-        <p14:creationId xmlns:p14="http://schemas.microsoft.com/office/powerpoint/2010/main" val="4193510302"/>
+        <p14:creationId xmlns:p14="http://schemas.microsoft.com/office/powerpoint/2010/main" xmlns:p="http://schemas.openxmlformats.org/presentationml/2006/main" xmlns:r="http://schemas.openxmlformats.org/officeDocument/2006/relationships" xmlns:a="http://schemas.openxmlformats.org/drawingml/2006/main" xmlns="" val="4193510302"/>
       </p:ext>
     </p:extLst>
   </p:cSld>
@@ -18459,7 +18446,7 @@
 </file>
 
 <file path=ppt/slides/slide45.xml><?xml version="1.0" encoding="utf-8"?>
-<p:sld xmlns:a="http://schemas.openxmlformats.org/drawingml/2006/main" xmlns:r="http://schemas.openxmlformats.org/officeDocument/2006/relationships" xmlns:p="http://schemas.openxmlformats.org/presentationml/2006/main">
+<p:sld xmlns:a="http://schemas.openxmlformats.org/drawingml/2006/main" xmlns:r="http://schemas.openxmlformats.org/officeDocument/2006/relationships" xmlns:mc="http://schemas.openxmlformats.org/markup-compatibility/2006" xmlns:mv="urn:schemas-microsoft-com:mac:vml" xmlns:p="http://schemas.openxmlformats.org/presentationml/2006/main" mc:Ignorable="mv" mc:PreserveAttributes="mv:*">
   <p:cSld>
     <p:spTree>
       <p:nvGrpSpPr>
@@ -18927,7 +18914,7 @@
           <a:blip r:embed="rId3">
             <a:extLst>
               <a:ext uri="{28A0092B-C50C-407E-A947-70E740481C1C}">
-                <a14:useLocalDpi xmlns:a14="http://schemas.microsoft.com/office/drawing/2010/main" val="0"/>
+                <a14:useLocalDpi xmlns:a14="http://schemas.microsoft.com/office/drawing/2010/main" xmlns:p="http://schemas.openxmlformats.org/presentationml/2006/main" xmlns:r="http://schemas.openxmlformats.org/officeDocument/2006/relationships" xmlns:a="http://schemas.openxmlformats.org/drawingml/2006/main" xmlns="" val="0"/>
               </a:ext>
             </a:extLst>
           </a:blip>
@@ -18992,7 +18979,7 @@
     </p:spTree>
     <p:extLst>
       <p:ext uri="{BB962C8B-B14F-4D97-AF65-F5344CB8AC3E}">
-        <p14:creationId xmlns:p14="http://schemas.microsoft.com/office/powerpoint/2010/main" val="4184592893"/>
+        <p14:creationId xmlns:p14="http://schemas.microsoft.com/office/powerpoint/2010/main" xmlns:p="http://schemas.openxmlformats.org/presentationml/2006/main" xmlns:r="http://schemas.openxmlformats.org/officeDocument/2006/relationships" xmlns:a="http://schemas.openxmlformats.org/drawingml/2006/main" xmlns="" val="4184592893"/>
       </p:ext>
     </p:extLst>
   </p:cSld>
@@ -19010,7 +18997,7 @@
 </file>
 
 <file path=ppt/slides/slide46.xml><?xml version="1.0" encoding="utf-8"?>
-<p:sld xmlns:a="http://schemas.openxmlformats.org/drawingml/2006/main" xmlns:r="http://schemas.openxmlformats.org/officeDocument/2006/relationships" xmlns:p="http://schemas.openxmlformats.org/presentationml/2006/main">
+<p:sld xmlns:a="http://schemas.openxmlformats.org/drawingml/2006/main" xmlns:r="http://schemas.openxmlformats.org/officeDocument/2006/relationships" xmlns:mc="http://schemas.openxmlformats.org/markup-compatibility/2006" xmlns:mv="urn:schemas-microsoft-com:mac:vml" xmlns:p="http://schemas.openxmlformats.org/presentationml/2006/main" mc:Ignorable="mv" mc:PreserveAttributes="mv:*">
   <p:cSld>
     <p:spTree>
       <p:nvGrpSpPr>
@@ -19320,7 +19307,7 @@
           <a:blip r:embed="rId3">
             <a:extLst>
               <a:ext uri="{28A0092B-C50C-407E-A947-70E740481C1C}">
-                <a14:useLocalDpi xmlns:a14="http://schemas.microsoft.com/office/drawing/2010/main" val="0"/>
+                <a14:useLocalDpi xmlns:a14="http://schemas.microsoft.com/office/drawing/2010/main" xmlns:p="http://schemas.openxmlformats.org/presentationml/2006/main" xmlns:r="http://schemas.openxmlformats.org/officeDocument/2006/relationships" xmlns:a="http://schemas.openxmlformats.org/drawingml/2006/main" xmlns="" val="0"/>
               </a:ext>
             </a:extLst>
           </a:blip>
@@ -19385,7 +19372,7 @@
     </p:spTree>
     <p:extLst>
       <p:ext uri="{BB962C8B-B14F-4D97-AF65-F5344CB8AC3E}">
-        <p14:creationId xmlns:p14="http://schemas.microsoft.com/office/powerpoint/2010/main" val="4042946778"/>
+        <p14:creationId xmlns:p14="http://schemas.microsoft.com/office/powerpoint/2010/main" xmlns:p="http://schemas.openxmlformats.org/presentationml/2006/main" xmlns:r="http://schemas.openxmlformats.org/officeDocument/2006/relationships" xmlns:a="http://schemas.openxmlformats.org/drawingml/2006/main" xmlns="" val="4042946778"/>
       </p:ext>
     </p:extLst>
   </p:cSld>
@@ -19403,7 +19390,7 @@
 </file>
 
 <file path=ppt/slides/slide47.xml><?xml version="1.0" encoding="utf-8"?>
-<p:sld xmlns:a="http://schemas.openxmlformats.org/drawingml/2006/main" xmlns:r="http://schemas.openxmlformats.org/officeDocument/2006/relationships" xmlns:p="http://schemas.openxmlformats.org/presentationml/2006/main">
+<p:sld xmlns:a="http://schemas.openxmlformats.org/drawingml/2006/main" xmlns:r="http://schemas.openxmlformats.org/officeDocument/2006/relationships" xmlns:mc="http://schemas.openxmlformats.org/markup-compatibility/2006" xmlns:mv="urn:schemas-microsoft-com:mac:vml" xmlns:p="http://schemas.openxmlformats.org/presentationml/2006/main" mc:Ignorable="mv" mc:PreserveAttributes="mv:*">
   <p:cSld>
     <p:spTree>
       <p:nvGrpSpPr>
@@ -19468,7 +19455,7 @@
             <a:blip r:embed="rId2">
               <a:extLst>
                 <a:ext uri="{28A0092B-C50C-407E-A947-70E740481C1C}">
-                  <a14:useLocalDpi xmlns:a14="http://schemas.microsoft.com/office/drawing/2010/main" val="0"/>
+                  <a14:useLocalDpi xmlns:a14="http://schemas.microsoft.com/office/drawing/2010/main" xmlns:p="http://schemas.openxmlformats.org/presentationml/2006/main" xmlns:r="http://schemas.openxmlformats.org/officeDocument/2006/relationships" xmlns:a="http://schemas.openxmlformats.org/drawingml/2006/main" xmlns="" val="0"/>
                 </a:ext>
               </a:extLst>
             </a:blip>
@@ -19498,7 +19485,7 @@
             <a:blip r:embed="rId3">
               <a:extLst>
                 <a:ext uri="{28A0092B-C50C-407E-A947-70E740481C1C}">
-                  <a14:useLocalDpi xmlns:a14="http://schemas.microsoft.com/office/drawing/2010/main" val="0"/>
+                  <a14:useLocalDpi xmlns:a14="http://schemas.microsoft.com/office/drawing/2010/main" xmlns:p="http://schemas.openxmlformats.org/presentationml/2006/main" xmlns:r="http://schemas.openxmlformats.org/officeDocument/2006/relationships" xmlns:a="http://schemas.openxmlformats.org/drawingml/2006/main" xmlns="" val="0"/>
                 </a:ext>
               </a:extLst>
             </a:blip>
@@ -19543,7 +19530,7 @@
             <a:blip r:embed="rId4">
               <a:extLst>
                 <a:ext uri="{28A0092B-C50C-407E-A947-70E740481C1C}">
-                  <a14:useLocalDpi xmlns:a14="http://schemas.microsoft.com/office/drawing/2010/main" val="0"/>
+                  <a14:useLocalDpi xmlns:a14="http://schemas.microsoft.com/office/drawing/2010/main" xmlns:p="http://schemas.openxmlformats.org/presentationml/2006/main" xmlns:r="http://schemas.openxmlformats.org/officeDocument/2006/relationships" xmlns:a="http://schemas.openxmlformats.org/drawingml/2006/main" xmlns="" val="0"/>
                 </a:ext>
               </a:extLst>
             </a:blip>
@@ -19573,7 +19560,7 @@
             <a:blip r:embed="rId5">
               <a:extLst>
                 <a:ext uri="{28A0092B-C50C-407E-A947-70E740481C1C}">
-                  <a14:useLocalDpi xmlns:a14="http://schemas.microsoft.com/office/drawing/2010/main" val="0"/>
+                  <a14:useLocalDpi xmlns:a14="http://schemas.microsoft.com/office/drawing/2010/main" xmlns:p="http://schemas.openxmlformats.org/presentationml/2006/main" xmlns:r="http://schemas.openxmlformats.org/officeDocument/2006/relationships" xmlns:a="http://schemas.openxmlformats.org/drawingml/2006/main" xmlns="" val="0"/>
                 </a:ext>
               </a:extLst>
             </a:blip>
@@ -19603,7 +19590,7 @@
             <a:blip r:embed="rId6">
               <a:extLst>
                 <a:ext uri="{28A0092B-C50C-407E-A947-70E740481C1C}">
-                  <a14:useLocalDpi xmlns:a14="http://schemas.microsoft.com/office/drawing/2010/main" val="0"/>
+                  <a14:useLocalDpi xmlns:a14="http://schemas.microsoft.com/office/drawing/2010/main" xmlns:p="http://schemas.openxmlformats.org/presentationml/2006/main" xmlns:r="http://schemas.openxmlformats.org/officeDocument/2006/relationships" xmlns:a="http://schemas.openxmlformats.org/drawingml/2006/main" xmlns="" val="0"/>
                 </a:ext>
               </a:extLst>
             </a:blip>
@@ -19648,7 +19635,7 @@
             <a:blip r:embed="rId7">
               <a:extLst>
                 <a:ext uri="{28A0092B-C50C-407E-A947-70E740481C1C}">
-                  <a14:useLocalDpi xmlns:a14="http://schemas.microsoft.com/office/drawing/2010/main" val="0"/>
+                  <a14:useLocalDpi xmlns:a14="http://schemas.microsoft.com/office/drawing/2010/main" xmlns:p="http://schemas.openxmlformats.org/presentationml/2006/main" xmlns:r="http://schemas.openxmlformats.org/officeDocument/2006/relationships" xmlns:a="http://schemas.openxmlformats.org/drawingml/2006/main" xmlns="" val="0"/>
                 </a:ext>
               </a:extLst>
             </a:blip>
@@ -19678,7 +19665,7 @@
             <a:blip r:embed="rId8">
               <a:extLst>
                 <a:ext uri="{28A0092B-C50C-407E-A947-70E740481C1C}">
-                  <a14:useLocalDpi xmlns:a14="http://schemas.microsoft.com/office/drawing/2010/main" val="0"/>
+                  <a14:useLocalDpi xmlns:a14="http://schemas.microsoft.com/office/drawing/2010/main" xmlns:p="http://schemas.openxmlformats.org/presentationml/2006/main" xmlns:r="http://schemas.openxmlformats.org/officeDocument/2006/relationships" xmlns:a="http://schemas.openxmlformats.org/drawingml/2006/main" xmlns="" val="0"/>
                 </a:ext>
               </a:extLst>
             </a:blip>
@@ -19723,7 +19710,7 @@
             <a:blip r:embed="rId9">
               <a:extLst>
                 <a:ext uri="{28A0092B-C50C-407E-A947-70E740481C1C}">
-                  <a14:useLocalDpi xmlns:a14="http://schemas.microsoft.com/office/drawing/2010/main" val="0"/>
+                  <a14:useLocalDpi xmlns:a14="http://schemas.microsoft.com/office/drawing/2010/main" xmlns:p="http://schemas.openxmlformats.org/presentationml/2006/main" xmlns:r="http://schemas.openxmlformats.org/officeDocument/2006/relationships" xmlns:a="http://schemas.openxmlformats.org/drawingml/2006/main" xmlns="" val="0"/>
                 </a:ext>
               </a:extLst>
             </a:blip>
@@ -19753,7 +19740,7 @@
             <a:blip r:embed="rId10">
               <a:extLst>
                 <a:ext uri="{28A0092B-C50C-407E-A947-70E740481C1C}">
-                  <a14:useLocalDpi xmlns:a14="http://schemas.microsoft.com/office/drawing/2010/main" val="0"/>
+                  <a14:useLocalDpi xmlns:a14="http://schemas.microsoft.com/office/drawing/2010/main" xmlns:p="http://schemas.openxmlformats.org/presentationml/2006/main" xmlns:r="http://schemas.openxmlformats.org/officeDocument/2006/relationships" xmlns:a="http://schemas.openxmlformats.org/drawingml/2006/main" xmlns="" val="0"/>
                 </a:ext>
               </a:extLst>
             </a:blip>
@@ -19967,7 +19954,7 @@
           <a:blip r:embed="rId2">
             <a:extLst>
               <a:ext uri="{28A0092B-C50C-407E-A947-70E740481C1C}">
-                <a14:useLocalDpi xmlns:a14="http://schemas.microsoft.com/office/drawing/2010/main" val="0"/>
+                <a14:useLocalDpi xmlns:a14="http://schemas.microsoft.com/office/drawing/2010/main" xmlns:p="http://schemas.openxmlformats.org/presentationml/2006/main" xmlns:r="http://schemas.openxmlformats.org/officeDocument/2006/relationships" xmlns:a="http://schemas.openxmlformats.org/drawingml/2006/main" xmlns="" val="0"/>
               </a:ext>
             </a:extLst>
           </a:blip>
@@ -19997,7 +19984,7 @@
           <a:blip r:embed="rId3">
             <a:extLst>
               <a:ext uri="{28A0092B-C50C-407E-A947-70E740481C1C}">
-                <a14:useLocalDpi xmlns:a14="http://schemas.microsoft.com/office/drawing/2010/main" val="0"/>
+                <a14:useLocalDpi xmlns:a14="http://schemas.microsoft.com/office/drawing/2010/main" xmlns:p="http://schemas.openxmlformats.org/presentationml/2006/main" xmlns:r="http://schemas.openxmlformats.org/officeDocument/2006/relationships" xmlns:a="http://schemas.openxmlformats.org/drawingml/2006/main" xmlns="" val="0"/>
               </a:ext>
             </a:extLst>
           </a:blip>
@@ -20027,7 +20014,7 @@
           <a:blip r:embed="rId4">
             <a:extLst>
               <a:ext uri="{28A0092B-C50C-407E-A947-70E740481C1C}">
-                <a14:useLocalDpi xmlns:a14="http://schemas.microsoft.com/office/drawing/2010/main" val="0"/>
+                <a14:useLocalDpi xmlns:a14="http://schemas.microsoft.com/office/drawing/2010/main" xmlns:p="http://schemas.openxmlformats.org/presentationml/2006/main" xmlns:r="http://schemas.openxmlformats.org/officeDocument/2006/relationships" xmlns:a="http://schemas.openxmlformats.org/drawingml/2006/main" xmlns="" val="0"/>
               </a:ext>
             </a:extLst>
           </a:blip>
@@ -20057,7 +20044,7 @@
           <a:blip r:embed="rId5">
             <a:extLst>
               <a:ext uri="{28A0092B-C50C-407E-A947-70E740481C1C}">
-                <a14:useLocalDpi xmlns:a14="http://schemas.microsoft.com/office/drawing/2010/main" val="0"/>
+                <a14:useLocalDpi xmlns:a14="http://schemas.microsoft.com/office/drawing/2010/main" xmlns:p="http://schemas.openxmlformats.org/presentationml/2006/main" xmlns:r="http://schemas.openxmlformats.org/officeDocument/2006/relationships" xmlns:a="http://schemas.openxmlformats.org/drawingml/2006/main" xmlns="" val="0"/>
               </a:ext>
             </a:extLst>
           </a:blip>
@@ -20087,7 +20074,7 @@
           <a:blip r:embed="rId6">
             <a:extLst>
               <a:ext uri="{28A0092B-C50C-407E-A947-70E740481C1C}">
-                <a14:useLocalDpi xmlns:a14="http://schemas.microsoft.com/office/drawing/2010/main" val="0"/>
+                <a14:useLocalDpi xmlns:a14="http://schemas.microsoft.com/office/drawing/2010/main" xmlns:p="http://schemas.openxmlformats.org/presentationml/2006/main" xmlns:r="http://schemas.openxmlformats.org/officeDocument/2006/relationships" xmlns:a="http://schemas.openxmlformats.org/drawingml/2006/main" xmlns="" val="0"/>
               </a:ext>
             </a:extLst>
           </a:blip>
@@ -20117,7 +20104,7 @@
           <a:blip r:embed="rId7">
             <a:extLst>
               <a:ext uri="{28A0092B-C50C-407E-A947-70E740481C1C}">
-                <a14:useLocalDpi xmlns:a14="http://schemas.microsoft.com/office/drawing/2010/main" val="0"/>
+                <a14:useLocalDpi xmlns:a14="http://schemas.microsoft.com/office/drawing/2010/main" xmlns:p="http://schemas.openxmlformats.org/presentationml/2006/main" xmlns:r="http://schemas.openxmlformats.org/officeDocument/2006/relationships" xmlns:a="http://schemas.openxmlformats.org/drawingml/2006/main" xmlns="" val="0"/>
               </a:ext>
             </a:extLst>
           </a:blip>
@@ -20147,7 +20134,7 @@
           <a:blip r:embed="rId8">
             <a:extLst>
               <a:ext uri="{28A0092B-C50C-407E-A947-70E740481C1C}">
-                <a14:useLocalDpi xmlns:a14="http://schemas.microsoft.com/office/drawing/2010/main" val="0"/>
+                <a14:useLocalDpi xmlns:a14="http://schemas.microsoft.com/office/drawing/2010/main" xmlns:p="http://schemas.openxmlformats.org/presentationml/2006/main" xmlns:r="http://schemas.openxmlformats.org/officeDocument/2006/relationships" xmlns:a="http://schemas.openxmlformats.org/drawingml/2006/main" xmlns="" val="0"/>
               </a:ext>
             </a:extLst>
           </a:blip>
@@ -20177,7 +20164,7 @@
           <a:blip r:embed="rId9">
             <a:extLst>
               <a:ext uri="{28A0092B-C50C-407E-A947-70E740481C1C}">
-                <a14:useLocalDpi xmlns:a14="http://schemas.microsoft.com/office/drawing/2010/main" val="0"/>
+                <a14:useLocalDpi xmlns:a14="http://schemas.microsoft.com/office/drawing/2010/main" xmlns:p="http://schemas.openxmlformats.org/presentationml/2006/main" xmlns:r="http://schemas.openxmlformats.org/officeDocument/2006/relationships" xmlns:a="http://schemas.openxmlformats.org/drawingml/2006/main" xmlns="" val="0"/>
               </a:ext>
             </a:extLst>
           </a:blip>
@@ -20207,7 +20194,7 @@
           <a:blip r:embed="rId10">
             <a:extLst>
               <a:ext uri="{28A0092B-C50C-407E-A947-70E740481C1C}">
-                <a14:useLocalDpi xmlns:a14="http://schemas.microsoft.com/office/drawing/2010/main" val="0"/>
+                <a14:useLocalDpi xmlns:a14="http://schemas.microsoft.com/office/drawing/2010/main" xmlns:p="http://schemas.openxmlformats.org/presentationml/2006/main" xmlns:r="http://schemas.openxmlformats.org/officeDocument/2006/relationships" xmlns:a="http://schemas.openxmlformats.org/drawingml/2006/main" xmlns="" val="0"/>
               </a:ext>
             </a:extLst>
           </a:blip>
@@ -21848,7 +21835,7 @@
     </p:spTree>
     <p:extLst>
       <p:ext uri="{BB962C8B-B14F-4D97-AF65-F5344CB8AC3E}">
-        <p14:creationId xmlns:p14="http://schemas.microsoft.com/office/powerpoint/2010/main" val="1030899907"/>
+        <p14:creationId xmlns:p14="http://schemas.microsoft.com/office/powerpoint/2010/main" xmlns:p="http://schemas.openxmlformats.org/presentationml/2006/main" xmlns:r="http://schemas.openxmlformats.org/officeDocument/2006/relationships" xmlns:a="http://schemas.openxmlformats.org/drawingml/2006/main" xmlns="" val="1030899907"/>
       </p:ext>
     </p:extLst>
   </p:cSld>
@@ -21866,7 +21853,7 @@
 </file>
 
 <file path=ppt/slides/slide48.xml><?xml version="1.0" encoding="utf-8"?>
-<p:sld xmlns:a="http://schemas.openxmlformats.org/drawingml/2006/main" xmlns:r="http://schemas.openxmlformats.org/officeDocument/2006/relationships" xmlns:p="http://schemas.openxmlformats.org/presentationml/2006/main">
+<p:sld xmlns:a="http://schemas.openxmlformats.org/drawingml/2006/main" xmlns:r="http://schemas.openxmlformats.org/officeDocument/2006/relationships" xmlns:mc="http://schemas.openxmlformats.org/markup-compatibility/2006" xmlns:mv="urn:schemas-microsoft-com:mac:vml" xmlns:p="http://schemas.openxmlformats.org/presentationml/2006/main" mc:Ignorable="mv" mc:PreserveAttributes="mv:*">
   <p:cSld>
     <p:spTree>
       <p:nvGrpSpPr>
@@ -22100,7 +22087,7 @@
           <a:blip r:embed="rId2">
             <a:extLst>
               <a:ext uri="{28A0092B-C50C-407E-A947-70E740481C1C}">
-                <a14:useLocalDpi xmlns:a14="http://schemas.microsoft.com/office/drawing/2010/main" val="0"/>
+                <a14:useLocalDpi xmlns:a14="http://schemas.microsoft.com/office/drawing/2010/main" xmlns:p="http://schemas.openxmlformats.org/presentationml/2006/main" xmlns:r="http://schemas.openxmlformats.org/officeDocument/2006/relationships" xmlns:a="http://schemas.openxmlformats.org/drawingml/2006/main" xmlns="" val="0"/>
               </a:ext>
             </a:extLst>
           </a:blip>
@@ -22130,7 +22117,7 @@
           <a:blip r:embed="rId2">
             <a:extLst>
               <a:ext uri="{28A0092B-C50C-407E-A947-70E740481C1C}">
-                <a14:useLocalDpi xmlns:a14="http://schemas.microsoft.com/office/drawing/2010/main" val="0"/>
+                <a14:useLocalDpi xmlns:a14="http://schemas.microsoft.com/office/drawing/2010/main" xmlns:p="http://schemas.openxmlformats.org/presentationml/2006/main" xmlns:r="http://schemas.openxmlformats.org/officeDocument/2006/relationships" xmlns:a="http://schemas.openxmlformats.org/drawingml/2006/main" xmlns="" val="0"/>
               </a:ext>
             </a:extLst>
           </a:blip>
@@ -22533,7 +22520,7 @@
     </p:spTree>
     <p:extLst>
       <p:ext uri="{BB962C8B-B14F-4D97-AF65-F5344CB8AC3E}">
-        <p14:creationId xmlns:p14="http://schemas.microsoft.com/office/powerpoint/2010/main" val="2088642547"/>
+        <p14:creationId xmlns:p14="http://schemas.microsoft.com/office/powerpoint/2010/main" xmlns:p="http://schemas.openxmlformats.org/presentationml/2006/main" xmlns:r="http://schemas.openxmlformats.org/officeDocument/2006/relationships" xmlns:a="http://schemas.openxmlformats.org/drawingml/2006/main" xmlns="" val="2088642547"/>
       </p:ext>
     </p:extLst>
   </p:cSld>
@@ -22551,7 +22538,7 @@
 </file>
 
 <file path=ppt/slides/slide49.xml><?xml version="1.0" encoding="utf-8"?>
-<p:sld xmlns:a="http://schemas.openxmlformats.org/drawingml/2006/main" xmlns:r="http://schemas.openxmlformats.org/officeDocument/2006/relationships" xmlns:p="http://schemas.openxmlformats.org/presentationml/2006/main">
+<p:sld xmlns:a="http://schemas.openxmlformats.org/drawingml/2006/main" xmlns:r="http://schemas.openxmlformats.org/officeDocument/2006/relationships" xmlns:mc="http://schemas.openxmlformats.org/markup-compatibility/2006" xmlns:mv="urn:schemas-microsoft-com:mac:vml" xmlns:p="http://schemas.openxmlformats.org/presentationml/2006/main" mc:Ignorable="mv" mc:PreserveAttributes="mv:*">
   <p:cSld>
     <p:spTree>
       <p:nvGrpSpPr>
@@ -22650,7 +22637,7 @@
     </p:spTree>
     <p:extLst>
       <p:ext uri="{BB962C8B-B14F-4D97-AF65-F5344CB8AC3E}">
-        <p14:creationId xmlns:p14="http://schemas.microsoft.com/office/powerpoint/2010/main" val="1060988173"/>
+        <p14:creationId xmlns:p14="http://schemas.microsoft.com/office/powerpoint/2010/main" xmlns:p="http://schemas.openxmlformats.org/presentationml/2006/main" xmlns:r="http://schemas.openxmlformats.org/officeDocument/2006/relationships" xmlns:a="http://schemas.openxmlformats.org/drawingml/2006/main" xmlns="" val="1060988173"/>
       </p:ext>
     </p:extLst>
   </p:cSld>
@@ -22668,7 +22655,7 @@
 </file>
 
 <file path=ppt/slides/slide5.xml><?xml version="1.0" encoding="utf-8"?>
-<p:sld xmlns:a="http://schemas.openxmlformats.org/drawingml/2006/main" xmlns:r="http://schemas.openxmlformats.org/officeDocument/2006/relationships" xmlns:p="http://schemas.openxmlformats.org/presentationml/2006/main">
+<p:sld xmlns:a="http://schemas.openxmlformats.org/drawingml/2006/main" xmlns:r="http://schemas.openxmlformats.org/officeDocument/2006/relationships" xmlns:mc="http://schemas.openxmlformats.org/markup-compatibility/2006" xmlns:mv="urn:schemas-microsoft-com:mac:vml" xmlns:p="http://schemas.openxmlformats.org/presentationml/2006/main" mc:Ignorable="mv" mc:PreserveAttributes="mv:*">
   <p:cSld>
     <p:spTree>
       <p:nvGrpSpPr>
@@ -22718,7 +22705,7 @@
     </p:spTree>
     <p:extLst>
       <p:ext uri="{BB962C8B-B14F-4D97-AF65-F5344CB8AC3E}">
-        <p14:creationId xmlns:p14="http://schemas.microsoft.com/office/powerpoint/2010/main" val="730746052"/>
+        <p14:creationId xmlns:p14="http://schemas.microsoft.com/office/powerpoint/2010/main" xmlns:p="http://schemas.openxmlformats.org/presentationml/2006/main" xmlns:r="http://schemas.openxmlformats.org/officeDocument/2006/relationships" xmlns:a="http://schemas.openxmlformats.org/drawingml/2006/main" xmlns="" val="730746052"/>
       </p:ext>
     </p:extLst>
   </p:cSld>
@@ -22736,7 +22723,7 @@
 </file>
 
 <file path=ppt/slides/slide50.xml><?xml version="1.0" encoding="utf-8"?>
-<p:sld xmlns:a="http://schemas.openxmlformats.org/drawingml/2006/main" xmlns:r="http://schemas.openxmlformats.org/officeDocument/2006/relationships" xmlns:p="http://schemas.openxmlformats.org/presentationml/2006/main">
+<p:sld xmlns:a="http://schemas.openxmlformats.org/drawingml/2006/main" xmlns:r="http://schemas.openxmlformats.org/officeDocument/2006/relationships" xmlns:mc="http://schemas.openxmlformats.org/markup-compatibility/2006" xmlns:mv="urn:schemas-microsoft-com:mac:vml" xmlns:p="http://schemas.openxmlformats.org/presentationml/2006/main" mc:Ignorable="mv" mc:PreserveAttributes="mv:*">
   <p:cSld>
     <p:spTree>
       <p:nvGrpSpPr>
@@ -22774,7 +22761,7 @@
     </p:spTree>
     <p:extLst>
       <p:ext uri="{BB962C8B-B14F-4D97-AF65-F5344CB8AC3E}">
-        <p14:creationId xmlns:p14="http://schemas.microsoft.com/office/powerpoint/2010/main" val="2403161794"/>
+        <p14:creationId xmlns:p14="http://schemas.microsoft.com/office/powerpoint/2010/main" xmlns:p="http://schemas.openxmlformats.org/presentationml/2006/main" xmlns:r="http://schemas.openxmlformats.org/officeDocument/2006/relationships" xmlns:a="http://schemas.openxmlformats.org/drawingml/2006/main" xmlns="" val="2403161794"/>
       </p:ext>
     </p:extLst>
   </p:cSld>
@@ -22785,7 +22772,7 @@
 </file>
 
 <file path=ppt/slides/slide51.xml><?xml version="1.0" encoding="utf-8"?>
-<p:sld xmlns:a="http://schemas.openxmlformats.org/drawingml/2006/main" xmlns:r="http://schemas.openxmlformats.org/officeDocument/2006/relationships" xmlns:p="http://schemas.openxmlformats.org/presentationml/2006/main">
+<p:sld xmlns:a="http://schemas.openxmlformats.org/drawingml/2006/main" xmlns:r="http://schemas.openxmlformats.org/officeDocument/2006/relationships" xmlns:mc="http://schemas.openxmlformats.org/markup-compatibility/2006" xmlns:mv="urn:schemas-microsoft-com:mac:vml" xmlns:p="http://schemas.openxmlformats.org/presentationml/2006/main" mc:Ignorable="mv" mc:PreserveAttributes="mv:*">
   <p:cSld>
     <p:spTree>
       <p:nvGrpSpPr>
@@ -22827,7 +22814,7 @@
     </p:spTree>
     <p:extLst>
       <p:ext uri="{BB962C8B-B14F-4D97-AF65-F5344CB8AC3E}">
-        <p14:creationId xmlns:p14="http://schemas.microsoft.com/office/powerpoint/2010/main" val="1522136710"/>
+        <p14:creationId xmlns:p14="http://schemas.microsoft.com/office/powerpoint/2010/main" xmlns:p="http://schemas.openxmlformats.org/presentationml/2006/main" xmlns:r="http://schemas.openxmlformats.org/officeDocument/2006/relationships" xmlns:a="http://schemas.openxmlformats.org/drawingml/2006/main" xmlns="" val="1522136710"/>
       </p:ext>
     </p:extLst>
   </p:cSld>
@@ -22845,7 +22832,7 @@
 </file>
 
 <file path=ppt/slides/slide52.xml><?xml version="1.0" encoding="utf-8"?>
-<p:sld xmlns:a="http://schemas.openxmlformats.org/drawingml/2006/main" xmlns:r="http://schemas.openxmlformats.org/officeDocument/2006/relationships" xmlns:p="http://schemas.openxmlformats.org/presentationml/2006/main">
+<p:sld xmlns:a="http://schemas.openxmlformats.org/drawingml/2006/main" xmlns:r="http://schemas.openxmlformats.org/officeDocument/2006/relationships" xmlns:mc="http://schemas.openxmlformats.org/markup-compatibility/2006" xmlns:mv="urn:schemas-microsoft-com:mac:vml" xmlns:p="http://schemas.openxmlformats.org/presentationml/2006/main" mc:Ignorable="mv" mc:PreserveAttributes="mv:*">
   <p:cSld>
     <p:spTree>
       <p:nvGrpSpPr>
@@ -22906,7 +22893,7 @@
     </p:spTree>
     <p:extLst>
       <p:ext uri="{BB962C8B-B14F-4D97-AF65-F5344CB8AC3E}">
-        <p14:creationId xmlns:p14="http://schemas.microsoft.com/office/powerpoint/2010/main" val="2399798731"/>
+        <p14:creationId xmlns:p14="http://schemas.microsoft.com/office/powerpoint/2010/main" xmlns:p="http://schemas.openxmlformats.org/presentationml/2006/main" xmlns:r="http://schemas.openxmlformats.org/officeDocument/2006/relationships" xmlns:a="http://schemas.openxmlformats.org/drawingml/2006/main" xmlns="" val="2399798731"/>
       </p:ext>
     </p:extLst>
   </p:cSld>
@@ -22924,7 +22911,7 @@
 </file>
 
 <file path=ppt/slides/slide53.xml><?xml version="1.0" encoding="utf-8"?>
-<p:sld xmlns:a="http://schemas.openxmlformats.org/drawingml/2006/main" xmlns:r="http://schemas.openxmlformats.org/officeDocument/2006/relationships" xmlns:p="http://schemas.openxmlformats.org/presentationml/2006/main">
+<p:sld xmlns:a="http://schemas.openxmlformats.org/drawingml/2006/main" xmlns:r="http://schemas.openxmlformats.org/officeDocument/2006/relationships" xmlns:mc="http://schemas.openxmlformats.org/markup-compatibility/2006" xmlns:mv="urn:schemas-microsoft-com:mac:vml" xmlns:p="http://schemas.openxmlformats.org/presentationml/2006/main" mc:Ignorable="mv" mc:PreserveAttributes="mv:*">
   <p:cSld>
     <p:spTree>
       <p:nvGrpSpPr>
@@ -22981,7 +22968,7 @@
     </p:spTree>
     <p:extLst>
       <p:ext uri="{BB962C8B-B14F-4D97-AF65-F5344CB8AC3E}">
-        <p14:creationId xmlns:p14="http://schemas.microsoft.com/office/powerpoint/2010/main" val="2607461392"/>
+        <p14:creationId xmlns:p14="http://schemas.microsoft.com/office/powerpoint/2010/main" xmlns:p="http://schemas.openxmlformats.org/presentationml/2006/main" xmlns:r="http://schemas.openxmlformats.org/officeDocument/2006/relationships" xmlns:a="http://schemas.openxmlformats.org/drawingml/2006/main" xmlns="" val="2607461392"/>
       </p:ext>
     </p:extLst>
   </p:cSld>
@@ -22992,7 +22979,7 @@
 </file>
 
 <file path=ppt/slides/slide54.xml><?xml version="1.0" encoding="utf-8"?>
-<p:sld xmlns:a="http://schemas.openxmlformats.org/drawingml/2006/main" xmlns:r="http://schemas.openxmlformats.org/officeDocument/2006/relationships" xmlns:p="http://schemas.openxmlformats.org/presentationml/2006/main">
+<p:sld xmlns:a="http://schemas.openxmlformats.org/drawingml/2006/main" xmlns:r="http://schemas.openxmlformats.org/officeDocument/2006/relationships" xmlns:mc="http://schemas.openxmlformats.org/markup-compatibility/2006" xmlns:mv="urn:schemas-microsoft-com:mac:vml" xmlns:p="http://schemas.openxmlformats.org/presentationml/2006/main" mc:Ignorable="mv" mc:PreserveAttributes="mv:*">
   <p:cSld>
     <p:spTree>
       <p:nvGrpSpPr>
@@ -23034,7 +23021,7 @@
     </p:spTree>
     <p:extLst>
       <p:ext uri="{BB962C8B-B14F-4D97-AF65-F5344CB8AC3E}">
-        <p14:creationId xmlns:p14="http://schemas.microsoft.com/office/powerpoint/2010/main" val="1916182223"/>
+        <p14:creationId xmlns:p14="http://schemas.microsoft.com/office/powerpoint/2010/main" xmlns:p="http://schemas.openxmlformats.org/presentationml/2006/main" xmlns:r="http://schemas.openxmlformats.org/officeDocument/2006/relationships" xmlns:a="http://schemas.openxmlformats.org/drawingml/2006/main" xmlns="" val="1916182223"/>
       </p:ext>
     </p:extLst>
   </p:cSld>
@@ -23052,7 +23039,7 @@
 </file>
 
 <file path=ppt/slides/slide55.xml><?xml version="1.0" encoding="utf-8"?>
-<p:sld xmlns:a="http://schemas.openxmlformats.org/drawingml/2006/main" xmlns:r="http://schemas.openxmlformats.org/officeDocument/2006/relationships" xmlns:p="http://schemas.openxmlformats.org/presentationml/2006/main">
+<p:sld xmlns:a="http://schemas.openxmlformats.org/drawingml/2006/main" xmlns:r="http://schemas.openxmlformats.org/officeDocument/2006/relationships" xmlns:mc="http://schemas.openxmlformats.org/markup-compatibility/2006" xmlns:mv="urn:schemas-microsoft-com:mac:vml" xmlns:p="http://schemas.openxmlformats.org/presentationml/2006/main" mc:Ignorable="mv" mc:PreserveAttributes="mv:*">
   <p:cSld>
     <p:spTree>
       <p:nvGrpSpPr>
@@ -23132,7 +23119,7 @@
     </p:spTree>
     <p:extLst>
       <p:ext uri="{BB962C8B-B14F-4D97-AF65-F5344CB8AC3E}">
-        <p14:creationId xmlns:p14="http://schemas.microsoft.com/office/powerpoint/2010/main" val="8609580"/>
+        <p14:creationId xmlns:p14="http://schemas.microsoft.com/office/powerpoint/2010/main" xmlns:p="http://schemas.openxmlformats.org/presentationml/2006/main" xmlns:r="http://schemas.openxmlformats.org/officeDocument/2006/relationships" xmlns:a="http://schemas.openxmlformats.org/drawingml/2006/main" xmlns="" val="8609580"/>
       </p:ext>
     </p:extLst>
   </p:cSld>
@@ -23150,7 +23137,7 @@
 </file>
 
 <file path=ppt/slides/slide56.xml><?xml version="1.0" encoding="utf-8"?>
-<p:sld xmlns:a="http://schemas.openxmlformats.org/drawingml/2006/main" xmlns:r="http://schemas.openxmlformats.org/officeDocument/2006/relationships" xmlns:p="http://schemas.openxmlformats.org/presentationml/2006/main">
+<p:sld xmlns:a="http://schemas.openxmlformats.org/drawingml/2006/main" xmlns:r="http://schemas.openxmlformats.org/officeDocument/2006/relationships" xmlns:mc="http://schemas.openxmlformats.org/markup-compatibility/2006" xmlns:mv="urn:schemas-microsoft-com:mac:vml" xmlns:p="http://schemas.openxmlformats.org/presentationml/2006/main" mc:Ignorable="mv" mc:PreserveAttributes="mv:*">
   <p:cSld>
     <p:spTree>
       <p:nvGrpSpPr>
@@ -23268,7 +23255,7 @@
     </p:spTree>
     <p:extLst>
       <p:ext uri="{BB962C8B-B14F-4D97-AF65-F5344CB8AC3E}">
-        <p14:creationId xmlns:p14="http://schemas.microsoft.com/office/powerpoint/2010/main" val="1795932434"/>
+        <p14:creationId xmlns:p14="http://schemas.microsoft.com/office/powerpoint/2010/main" xmlns:p="http://schemas.openxmlformats.org/presentationml/2006/main" xmlns:r="http://schemas.openxmlformats.org/officeDocument/2006/relationships" xmlns:a="http://schemas.openxmlformats.org/drawingml/2006/main" xmlns="" val="1795932434"/>
       </p:ext>
     </p:extLst>
   </p:cSld>
@@ -23286,7 +23273,7 @@
 </file>
 
 <file path=ppt/slides/slide57.xml><?xml version="1.0" encoding="utf-8"?>
-<p:sld xmlns:a="http://schemas.openxmlformats.org/drawingml/2006/main" xmlns:r="http://schemas.openxmlformats.org/officeDocument/2006/relationships" xmlns:p="http://schemas.openxmlformats.org/presentationml/2006/main">
+<p:sld xmlns:a="http://schemas.openxmlformats.org/drawingml/2006/main" xmlns:r="http://schemas.openxmlformats.org/officeDocument/2006/relationships" xmlns:mc="http://schemas.openxmlformats.org/markup-compatibility/2006" xmlns:mv="urn:schemas-microsoft-com:mac:vml" xmlns:p="http://schemas.openxmlformats.org/presentationml/2006/main" mc:Ignorable="mv" mc:PreserveAttributes="mv:*">
   <p:cSld>
     <p:spTree>
       <p:nvGrpSpPr>
@@ -23385,7 +23372,7 @@
     </p:spTree>
     <p:extLst>
       <p:ext uri="{BB962C8B-B14F-4D97-AF65-F5344CB8AC3E}">
-        <p14:creationId xmlns:p14="http://schemas.microsoft.com/office/powerpoint/2010/main" val="4033552047"/>
+        <p14:creationId xmlns:p14="http://schemas.microsoft.com/office/powerpoint/2010/main" xmlns:p="http://schemas.openxmlformats.org/presentationml/2006/main" xmlns:r="http://schemas.openxmlformats.org/officeDocument/2006/relationships" xmlns:a="http://schemas.openxmlformats.org/drawingml/2006/main" xmlns="" val="4033552047"/>
       </p:ext>
     </p:extLst>
   </p:cSld>
@@ -23403,7 +23390,7 @@
 </file>
 
 <file path=ppt/slides/slide58.xml><?xml version="1.0" encoding="utf-8"?>
-<p:sld xmlns:a="http://schemas.openxmlformats.org/drawingml/2006/main" xmlns:r="http://schemas.openxmlformats.org/officeDocument/2006/relationships" xmlns:p="http://schemas.openxmlformats.org/presentationml/2006/main">
+<p:sld xmlns:a="http://schemas.openxmlformats.org/drawingml/2006/main" xmlns:r="http://schemas.openxmlformats.org/officeDocument/2006/relationships" xmlns:mc="http://schemas.openxmlformats.org/markup-compatibility/2006" xmlns:mv="urn:schemas-microsoft-com:mac:vml" xmlns:p="http://schemas.openxmlformats.org/presentationml/2006/main" mc:Ignorable="mv" mc:PreserveAttributes="mv:*">
   <p:cSld>
     <p:spTree>
       <p:nvGrpSpPr>
@@ -23569,7 +23556,7 @@
     </p:spTree>
     <p:extLst>
       <p:ext uri="{BB962C8B-B14F-4D97-AF65-F5344CB8AC3E}">
-        <p14:creationId xmlns:p14="http://schemas.microsoft.com/office/powerpoint/2010/main" val="220248659"/>
+        <p14:creationId xmlns:p14="http://schemas.microsoft.com/office/powerpoint/2010/main" xmlns:p="http://schemas.openxmlformats.org/presentationml/2006/main" xmlns:r="http://schemas.openxmlformats.org/officeDocument/2006/relationships" xmlns:a="http://schemas.openxmlformats.org/drawingml/2006/main" xmlns="" val="220248659"/>
       </p:ext>
     </p:extLst>
   </p:cSld>
@@ -23587,7 +23574,7 @@
 </file>
 
 <file path=ppt/slides/slide59.xml><?xml version="1.0" encoding="utf-8"?>
-<p:sld xmlns:a="http://schemas.openxmlformats.org/drawingml/2006/main" xmlns:r="http://schemas.openxmlformats.org/officeDocument/2006/relationships" xmlns:p="http://schemas.openxmlformats.org/presentationml/2006/main">
+<p:sld xmlns:a="http://schemas.openxmlformats.org/drawingml/2006/main" xmlns:r="http://schemas.openxmlformats.org/officeDocument/2006/relationships" xmlns:mc="http://schemas.openxmlformats.org/markup-compatibility/2006" xmlns:mv="urn:schemas-microsoft-com:mac:vml" xmlns:p="http://schemas.openxmlformats.org/presentationml/2006/main" mc:Ignorable="mv" mc:PreserveAttributes="mv:*">
   <p:cSld>
     <p:spTree>
       <p:nvGrpSpPr>
@@ -23815,7 +23802,7 @@
     </p:spTree>
     <p:extLst>
       <p:ext uri="{BB962C8B-B14F-4D97-AF65-F5344CB8AC3E}">
-        <p14:creationId xmlns:p14="http://schemas.microsoft.com/office/powerpoint/2010/main" val="3284264482"/>
+        <p14:creationId xmlns:p14="http://schemas.microsoft.com/office/powerpoint/2010/main" xmlns:p="http://schemas.openxmlformats.org/presentationml/2006/main" xmlns:r="http://schemas.openxmlformats.org/officeDocument/2006/relationships" xmlns:a="http://schemas.openxmlformats.org/drawingml/2006/main" xmlns="" val="3284264482"/>
       </p:ext>
     </p:extLst>
   </p:cSld>
@@ -23833,7 +23820,7 @@
 </file>
 
 <file path=ppt/slides/slide6.xml><?xml version="1.0" encoding="utf-8"?>
-<p:sld xmlns:a="http://schemas.openxmlformats.org/drawingml/2006/main" xmlns:r="http://schemas.openxmlformats.org/officeDocument/2006/relationships" xmlns:p="http://schemas.openxmlformats.org/presentationml/2006/main">
+<p:sld xmlns:a="http://schemas.openxmlformats.org/drawingml/2006/main" xmlns:r="http://schemas.openxmlformats.org/officeDocument/2006/relationships" xmlns:mc="http://schemas.openxmlformats.org/markup-compatibility/2006" xmlns:mv="urn:schemas-microsoft-com:mac:vml" xmlns:p="http://schemas.openxmlformats.org/presentationml/2006/main" mc:Ignorable="mv" mc:PreserveAttributes="mv:*">
   <p:cSld>
     <p:spTree>
       <p:nvGrpSpPr>
@@ -23922,7 +23909,7 @@
     </p:spTree>
     <p:extLst>
       <p:ext uri="{BB962C8B-B14F-4D97-AF65-F5344CB8AC3E}">
-        <p14:creationId xmlns:p14="http://schemas.microsoft.com/office/powerpoint/2010/main" val="1108981616"/>
+        <p14:creationId xmlns:p14="http://schemas.microsoft.com/office/powerpoint/2010/main" xmlns:p="http://schemas.openxmlformats.org/presentationml/2006/main" xmlns:r="http://schemas.openxmlformats.org/officeDocument/2006/relationships" xmlns:a="http://schemas.openxmlformats.org/drawingml/2006/main" xmlns="" val="1108981616"/>
       </p:ext>
     </p:extLst>
   </p:cSld>
@@ -23940,7 +23927,7 @@
 </file>
 
 <file path=ppt/slides/slide60.xml><?xml version="1.0" encoding="utf-8"?>
-<p:sld xmlns:a="http://schemas.openxmlformats.org/drawingml/2006/main" xmlns:r="http://schemas.openxmlformats.org/officeDocument/2006/relationships" xmlns:p="http://schemas.openxmlformats.org/presentationml/2006/main">
+<p:sld xmlns:a="http://schemas.openxmlformats.org/drawingml/2006/main" xmlns:r="http://schemas.openxmlformats.org/officeDocument/2006/relationships" xmlns:mc="http://schemas.openxmlformats.org/markup-compatibility/2006" xmlns:mv="urn:schemas-microsoft-com:mac:vml" xmlns:p="http://schemas.openxmlformats.org/presentationml/2006/main" mc:Ignorable="mv" mc:PreserveAttributes="mv:*">
   <p:cSld>
     <p:spTree>
       <p:nvGrpSpPr>
@@ -23978,7 +23965,7 @@
     </p:spTree>
     <p:extLst>
       <p:ext uri="{BB962C8B-B14F-4D97-AF65-F5344CB8AC3E}">
-        <p14:creationId xmlns:p14="http://schemas.microsoft.com/office/powerpoint/2010/main" val="1682920946"/>
+        <p14:creationId xmlns:p14="http://schemas.microsoft.com/office/powerpoint/2010/main" xmlns:p="http://schemas.openxmlformats.org/presentationml/2006/main" xmlns:r="http://schemas.openxmlformats.org/officeDocument/2006/relationships" xmlns:a="http://schemas.openxmlformats.org/drawingml/2006/main" xmlns="" val="1682920946"/>
       </p:ext>
     </p:extLst>
   </p:cSld>
@@ -23996,7 +23983,7 @@
 </file>
 
 <file path=ppt/slides/slide61.xml><?xml version="1.0" encoding="utf-8"?>
-<p:sld xmlns:a="http://schemas.openxmlformats.org/drawingml/2006/main" xmlns:r="http://schemas.openxmlformats.org/officeDocument/2006/relationships" xmlns:p="http://schemas.openxmlformats.org/presentationml/2006/main">
+<p:sld xmlns:a="http://schemas.openxmlformats.org/drawingml/2006/main" xmlns:r="http://schemas.openxmlformats.org/officeDocument/2006/relationships" xmlns:mc="http://schemas.openxmlformats.org/markup-compatibility/2006" xmlns:mv="urn:schemas-microsoft-com:mac:vml" xmlns:p="http://schemas.openxmlformats.org/presentationml/2006/main" mc:Ignorable="mv" mc:PreserveAttributes="mv:*">
   <p:cSld>
     <p:spTree>
       <p:nvGrpSpPr>
@@ -24015,7 +24002,7 @@
     </p:spTree>
     <p:extLst>
       <p:ext uri="{BB962C8B-B14F-4D97-AF65-F5344CB8AC3E}">
-        <p14:creationId xmlns:p14="http://schemas.microsoft.com/office/powerpoint/2010/main" val="3718186732"/>
+        <p14:creationId xmlns:p14="http://schemas.microsoft.com/office/powerpoint/2010/main" xmlns:p="http://schemas.openxmlformats.org/presentationml/2006/main" xmlns:r="http://schemas.openxmlformats.org/officeDocument/2006/relationships" xmlns:a="http://schemas.openxmlformats.org/drawingml/2006/main" xmlns="" val="3718186732"/>
       </p:ext>
     </p:extLst>
   </p:cSld>
@@ -24033,7 +24020,7 @@
 </file>
 
 <file path=ppt/slides/slide62.xml><?xml version="1.0" encoding="utf-8"?>
-<p:sld xmlns:a="http://schemas.openxmlformats.org/drawingml/2006/main" xmlns:r="http://schemas.openxmlformats.org/officeDocument/2006/relationships" xmlns:p="http://schemas.openxmlformats.org/presentationml/2006/main">
+<p:sld xmlns:a="http://schemas.openxmlformats.org/drawingml/2006/main" xmlns:r="http://schemas.openxmlformats.org/officeDocument/2006/relationships" xmlns:mc="http://schemas.openxmlformats.org/markup-compatibility/2006" xmlns:mv="urn:schemas-microsoft-com:mac:vml" xmlns:p="http://schemas.openxmlformats.org/presentationml/2006/main" mc:Ignorable="mv" mc:PreserveAttributes="mv:*">
   <p:cSld>
     <p:spTree>
       <p:nvGrpSpPr>
@@ -24071,7 +24058,7 @@
     </p:spTree>
     <p:extLst>
       <p:ext uri="{BB962C8B-B14F-4D97-AF65-F5344CB8AC3E}">
-        <p14:creationId xmlns:p14="http://schemas.microsoft.com/office/powerpoint/2010/main" val="1642846382"/>
+        <p14:creationId xmlns:p14="http://schemas.microsoft.com/office/powerpoint/2010/main" xmlns:p="http://schemas.openxmlformats.org/presentationml/2006/main" xmlns:r="http://schemas.openxmlformats.org/officeDocument/2006/relationships" xmlns:a="http://schemas.openxmlformats.org/drawingml/2006/main" xmlns="" val="1642846382"/>
       </p:ext>
     </p:extLst>
   </p:cSld>
@@ -24089,7 +24076,7 @@
 </file>
 
 <file path=ppt/slides/slide7.xml><?xml version="1.0" encoding="utf-8"?>
-<p:sld xmlns:a="http://schemas.openxmlformats.org/drawingml/2006/main" xmlns:r="http://schemas.openxmlformats.org/officeDocument/2006/relationships" xmlns:p="http://schemas.openxmlformats.org/presentationml/2006/main">
+<p:sld xmlns:a="http://schemas.openxmlformats.org/drawingml/2006/main" xmlns:r="http://schemas.openxmlformats.org/officeDocument/2006/relationships" xmlns:mc="http://schemas.openxmlformats.org/markup-compatibility/2006" xmlns:mv="urn:schemas-microsoft-com:mac:vml" xmlns:p="http://schemas.openxmlformats.org/presentationml/2006/main" mc:Ignorable="mv" mc:PreserveAttributes="mv:*">
   <p:cSld>
     <p:spTree>
       <p:nvGrpSpPr>
@@ -24190,7 +24177,7 @@
     </p:spTree>
     <p:extLst>
       <p:ext uri="{BB962C8B-B14F-4D97-AF65-F5344CB8AC3E}">
-        <p14:creationId xmlns:p14="http://schemas.microsoft.com/office/powerpoint/2010/main" val="1441032778"/>
+        <p14:creationId xmlns:p14="http://schemas.microsoft.com/office/powerpoint/2010/main" xmlns:p="http://schemas.openxmlformats.org/presentationml/2006/main" xmlns:r="http://schemas.openxmlformats.org/officeDocument/2006/relationships" xmlns:a="http://schemas.openxmlformats.org/drawingml/2006/main" xmlns="" val="1441032778"/>
       </p:ext>
     </p:extLst>
   </p:cSld>
@@ -24208,7 +24195,7 @@
 </file>
 
 <file path=ppt/slides/slide8.xml><?xml version="1.0" encoding="utf-8"?>
-<p:sld xmlns:a="http://schemas.openxmlformats.org/drawingml/2006/main" xmlns:r="http://schemas.openxmlformats.org/officeDocument/2006/relationships" xmlns:p="http://schemas.openxmlformats.org/presentationml/2006/main">
+<p:sld xmlns:a="http://schemas.openxmlformats.org/drawingml/2006/main" xmlns:r="http://schemas.openxmlformats.org/officeDocument/2006/relationships" xmlns:mc="http://schemas.openxmlformats.org/markup-compatibility/2006" xmlns:mv="urn:schemas-microsoft-com:mac:vml" xmlns:p="http://schemas.openxmlformats.org/presentationml/2006/main" mc:Ignorable="mv" mc:PreserveAttributes="mv:*">
   <p:cSld>
     <p:spTree>
       <p:nvGrpSpPr>
@@ -24325,7 +24312,7 @@
     </p:spTree>
     <p:extLst>
       <p:ext uri="{BB962C8B-B14F-4D97-AF65-F5344CB8AC3E}">
-        <p14:creationId xmlns:p14="http://schemas.microsoft.com/office/powerpoint/2010/main" val="711675961"/>
+        <p14:creationId xmlns:p14="http://schemas.microsoft.com/office/powerpoint/2010/main" xmlns:p="http://schemas.openxmlformats.org/presentationml/2006/main" xmlns:r="http://schemas.openxmlformats.org/officeDocument/2006/relationships" xmlns:a="http://schemas.openxmlformats.org/drawingml/2006/main" xmlns="" val="711675961"/>
       </p:ext>
     </p:extLst>
   </p:cSld>
@@ -24343,7 +24330,7 @@
 </file>
 
 <file path=ppt/slides/slide9.xml><?xml version="1.0" encoding="utf-8"?>
-<p:sld xmlns:a="http://schemas.openxmlformats.org/drawingml/2006/main" xmlns:r="http://schemas.openxmlformats.org/officeDocument/2006/relationships" xmlns:p="http://schemas.openxmlformats.org/presentationml/2006/main">
+<p:sld xmlns:a="http://schemas.openxmlformats.org/drawingml/2006/main" xmlns:r="http://schemas.openxmlformats.org/officeDocument/2006/relationships" xmlns:mc="http://schemas.openxmlformats.org/markup-compatibility/2006" xmlns:mv="urn:schemas-microsoft-com:mac:vml" xmlns:p="http://schemas.openxmlformats.org/presentationml/2006/main" mc:Ignorable="mv" mc:PreserveAttributes="mv:*">
   <p:cSld>
     <p:spTree>
       <p:nvGrpSpPr>
@@ -24460,7 +24447,7 @@
     </p:spTree>
     <p:extLst>
       <p:ext uri="{BB962C8B-B14F-4D97-AF65-F5344CB8AC3E}">
-        <p14:creationId xmlns:p14="http://schemas.microsoft.com/office/powerpoint/2010/main" val="1541192887"/>
+        <p14:creationId xmlns:p14="http://schemas.microsoft.com/office/powerpoint/2010/main" xmlns:p="http://schemas.openxmlformats.org/presentationml/2006/main" xmlns:r="http://schemas.openxmlformats.org/officeDocument/2006/relationships" xmlns:a="http://schemas.openxmlformats.org/drawingml/2006/main" xmlns="" val="1541192887"/>
       </p:ext>
     </p:extLst>
   </p:cSld>
@@ -24808,7 +24795,7 @@
   <a:extraClrSchemeLst/>
   <a:extLst>
     <a:ext uri="{05A4C25C-085E-4340-85A3-A5531E510DB2}">
-      <thm15:themeFamily xmlns:thm15="http://schemas.microsoft.com/office/thememl/2012/main" name="reinvent2015-template-light" id="{347E3041-9385-4346-9DC4-E740F718428B}" vid="{42D8A2EF-AA2C-2C4C-8867-3F36DEEE7EEC}"/>
+      <thm15:themeFamily xmlns:thm15="http://schemas.microsoft.com/office/thememl/2012/main" xmlns:a="http://schemas.openxmlformats.org/drawingml/2006/main" xmlns="" name="reinvent2015-template-light" id="{347E3041-9385-4346-9DC4-E740F718428B}" vid="{42D8A2EF-AA2C-2C4C-8867-3F36DEEE7EEC}"/>
     </a:ext>
   </a:extLst>
 </a:theme>

</xml_diff>

<commit_message>
Update About us & #'s slides
</commit_message>
<xml_diff>
--- a/slides/slides.pptx
+++ b/slides/slides.pptx
@@ -170,7 +170,7 @@
   </p:defaultTextStyle>
   <p:extLst>
     <p:ext uri="{EFAFB233-063F-42B5-8137-9DF3F51BA10A}">
-      <p15:sldGuideLst xmlns:p15="http://schemas.microsoft.com/office/powerpoint/2012/main" xmlns:p="http://schemas.openxmlformats.org/presentationml/2006/main" xmlns:r="http://schemas.openxmlformats.org/officeDocument/2006/relationships" xmlns:a="http://schemas.openxmlformats.org/drawingml/2006/main" xmlns="">
+      <p15:sldGuideLst xmlns="" xmlns:a="http://schemas.openxmlformats.org/drawingml/2006/main" xmlns:r="http://schemas.openxmlformats.org/officeDocument/2006/relationships" xmlns:p="http://schemas.openxmlformats.org/presentationml/2006/main" xmlns:p15="http://schemas.microsoft.com/office/powerpoint/2012/main" xmlns:mv="urn:schemas-microsoft-com:mac:vml" xmlns:mc="http://schemas.openxmlformats.org/markup-compatibility/2006">
         <p15:guide id="1" orient="horz" pos="644">
           <p15:clr>
             <a:srgbClr val="A4A3A4"/>
@@ -579,7 +579,7 @@
     </p:spTree>
     <p:extLst>
       <p:ext uri="{BB962C8B-B14F-4D97-AF65-F5344CB8AC3E}">
-        <p14:creationId xmlns:p14="http://schemas.microsoft.com/office/powerpoint/2010/main" xmlns:p="http://schemas.openxmlformats.org/presentationml/2006/main" xmlns:r="http://schemas.openxmlformats.org/officeDocument/2006/relationships" xmlns:a="http://schemas.openxmlformats.org/drawingml/2006/main" xmlns="" val="943536003"/>
+        <p14:creationId xmlns="" xmlns:a="http://schemas.openxmlformats.org/drawingml/2006/main" xmlns:r="http://schemas.openxmlformats.org/officeDocument/2006/relationships" xmlns:p="http://schemas.openxmlformats.org/presentationml/2006/main" xmlns:p14="http://schemas.microsoft.com/office/powerpoint/2010/main" xmlns:mv="urn:schemas-microsoft-com:mac:vml" xmlns:mc="http://schemas.openxmlformats.org/markup-compatibility/2006" val="943536003"/>
       </p:ext>
     </p:extLst>
   </p:cSld>
@@ -770,7 +770,7 @@
     </p:spTree>
     <p:extLst>
       <p:ext uri="{BB962C8B-B14F-4D97-AF65-F5344CB8AC3E}">
-        <p14:creationId xmlns:p14="http://schemas.microsoft.com/office/powerpoint/2010/main" xmlns:p="http://schemas.openxmlformats.org/presentationml/2006/main" xmlns:r="http://schemas.openxmlformats.org/officeDocument/2006/relationships" xmlns:a="http://schemas.openxmlformats.org/drawingml/2006/main" xmlns="" val="461632318"/>
+        <p14:creationId xmlns="" xmlns:a="http://schemas.openxmlformats.org/drawingml/2006/main" xmlns:r="http://schemas.openxmlformats.org/officeDocument/2006/relationships" xmlns:p="http://schemas.openxmlformats.org/presentationml/2006/main" xmlns:p14="http://schemas.microsoft.com/office/powerpoint/2010/main" xmlns:mv="urn:schemas-microsoft-com:mac:vml" xmlns:mc="http://schemas.openxmlformats.org/markup-compatibility/2006" val="461632318"/>
       </p:ext>
     </p:extLst>
   </p:cSld>
@@ -871,7 +871,7 @@
     </p:spTree>
     <p:extLst>
       <p:ext uri="{BB962C8B-B14F-4D97-AF65-F5344CB8AC3E}">
-        <p14:creationId xmlns:p14="http://schemas.microsoft.com/office/powerpoint/2010/main" xmlns:p="http://schemas.openxmlformats.org/presentationml/2006/main" xmlns:r="http://schemas.openxmlformats.org/officeDocument/2006/relationships" xmlns:a="http://schemas.openxmlformats.org/drawingml/2006/main" xmlns="" val="1838510240"/>
+        <p14:creationId xmlns="" xmlns:a="http://schemas.openxmlformats.org/drawingml/2006/main" xmlns:r="http://schemas.openxmlformats.org/officeDocument/2006/relationships" xmlns:p="http://schemas.openxmlformats.org/presentationml/2006/main" xmlns:p14="http://schemas.microsoft.com/office/powerpoint/2010/main" xmlns:mv="urn:schemas-microsoft-com:mac:vml" xmlns:mc="http://schemas.openxmlformats.org/markup-compatibility/2006" val="1838510240"/>
       </p:ext>
     </p:extLst>
   </p:cSld>
@@ -1059,7 +1059,7 @@
     </p:spTree>
     <p:extLst>
       <p:ext uri="{BB962C8B-B14F-4D97-AF65-F5344CB8AC3E}">
-        <p14:creationId xmlns:p14="http://schemas.microsoft.com/office/powerpoint/2010/main" xmlns:p="http://schemas.openxmlformats.org/presentationml/2006/main" xmlns:r="http://schemas.openxmlformats.org/officeDocument/2006/relationships" xmlns:a="http://schemas.openxmlformats.org/drawingml/2006/main" xmlns="" val="1023281219"/>
+        <p14:creationId xmlns="" xmlns:a="http://schemas.openxmlformats.org/drawingml/2006/main" xmlns:r="http://schemas.openxmlformats.org/officeDocument/2006/relationships" xmlns:p="http://schemas.openxmlformats.org/presentationml/2006/main" xmlns:p14="http://schemas.microsoft.com/office/powerpoint/2010/main" xmlns:mv="urn:schemas-microsoft-com:mac:vml" xmlns:mc="http://schemas.openxmlformats.org/markup-compatibility/2006" val="1023281219"/>
       </p:ext>
     </p:extLst>
   </p:cSld>
@@ -1201,7 +1201,7 @@
     </p:spTree>
     <p:extLst>
       <p:ext uri="{BB962C8B-B14F-4D97-AF65-F5344CB8AC3E}">
-        <p14:creationId xmlns:p14="http://schemas.microsoft.com/office/powerpoint/2010/main" xmlns:p="http://schemas.openxmlformats.org/presentationml/2006/main" xmlns:r="http://schemas.openxmlformats.org/officeDocument/2006/relationships" xmlns:a="http://schemas.openxmlformats.org/drawingml/2006/main" xmlns="" val="1120424473"/>
+        <p14:creationId xmlns="" xmlns:a="http://schemas.openxmlformats.org/drawingml/2006/main" xmlns:r="http://schemas.openxmlformats.org/officeDocument/2006/relationships" xmlns:p="http://schemas.openxmlformats.org/presentationml/2006/main" xmlns:p14="http://schemas.microsoft.com/office/powerpoint/2010/main" xmlns:mv="urn:schemas-microsoft-com:mac:vml" xmlns:mc="http://schemas.openxmlformats.org/markup-compatibility/2006" val="1120424473"/>
       </p:ext>
     </p:extLst>
   </p:cSld>
@@ -1290,7 +1290,7 @@
     </p:spTree>
     <p:extLst>
       <p:ext uri="{BB962C8B-B14F-4D97-AF65-F5344CB8AC3E}">
-        <p14:creationId xmlns:p14="http://schemas.microsoft.com/office/powerpoint/2010/main" xmlns:p="http://schemas.openxmlformats.org/presentationml/2006/main" xmlns:r="http://schemas.openxmlformats.org/officeDocument/2006/relationships" xmlns:a="http://schemas.openxmlformats.org/drawingml/2006/main" xmlns="" val="1407957544"/>
+        <p14:creationId xmlns="" xmlns:a="http://schemas.openxmlformats.org/drawingml/2006/main" xmlns:r="http://schemas.openxmlformats.org/officeDocument/2006/relationships" xmlns:p="http://schemas.openxmlformats.org/presentationml/2006/main" xmlns:p14="http://schemas.microsoft.com/office/powerpoint/2010/main" xmlns:mv="urn:schemas-microsoft-com:mac:vml" xmlns:mc="http://schemas.openxmlformats.org/markup-compatibility/2006" val="1407957544"/>
       </p:ext>
     </p:extLst>
   </p:cSld>
@@ -1399,7 +1399,7 @@
     </p:spTree>
     <p:extLst>
       <p:ext uri="{BB962C8B-B14F-4D97-AF65-F5344CB8AC3E}">
-        <p14:creationId xmlns:p14="http://schemas.microsoft.com/office/powerpoint/2010/main" xmlns:p="http://schemas.openxmlformats.org/presentationml/2006/main" xmlns:r="http://schemas.openxmlformats.org/officeDocument/2006/relationships" xmlns:a="http://schemas.openxmlformats.org/drawingml/2006/main" xmlns="" val="728320368"/>
+        <p14:creationId xmlns="" xmlns:a="http://schemas.openxmlformats.org/drawingml/2006/main" xmlns:r="http://schemas.openxmlformats.org/officeDocument/2006/relationships" xmlns:p="http://schemas.openxmlformats.org/presentationml/2006/main" xmlns:p14="http://schemas.microsoft.com/office/powerpoint/2010/main" xmlns:mv="urn:schemas-microsoft-com:mac:vml" xmlns:mc="http://schemas.openxmlformats.org/markup-compatibility/2006" val="728320368"/>
       </p:ext>
     </p:extLst>
   </p:cSld>
@@ -1492,7 +1492,7 @@
     </p:spTree>
     <p:extLst>
       <p:ext uri="{BB962C8B-B14F-4D97-AF65-F5344CB8AC3E}">
-        <p14:creationId xmlns:p14="http://schemas.microsoft.com/office/powerpoint/2010/main" xmlns:p="http://schemas.openxmlformats.org/presentationml/2006/main" xmlns:r="http://schemas.openxmlformats.org/officeDocument/2006/relationships" xmlns:a="http://schemas.openxmlformats.org/drawingml/2006/main" xmlns="" val="122903841"/>
+        <p14:creationId xmlns="" xmlns:a="http://schemas.openxmlformats.org/drawingml/2006/main" xmlns:r="http://schemas.openxmlformats.org/officeDocument/2006/relationships" xmlns:p="http://schemas.openxmlformats.org/presentationml/2006/main" xmlns:p14="http://schemas.microsoft.com/office/powerpoint/2010/main" xmlns:mv="urn:schemas-microsoft-com:mac:vml" xmlns:mc="http://schemas.openxmlformats.org/markup-compatibility/2006" val="122903841"/>
       </p:ext>
     </p:extLst>
   </p:cSld>
@@ -1774,7 +1774,7 @@
     </p:spTree>
     <p:extLst>
       <p:ext uri="{BB962C8B-B14F-4D97-AF65-F5344CB8AC3E}">
-        <p14:creationId xmlns:p14="http://schemas.microsoft.com/office/powerpoint/2010/main" xmlns:p="http://schemas.openxmlformats.org/presentationml/2006/main" xmlns:r="http://schemas.openxmlformats.org/officeDocument/2006/relationships" xmlns:a="http://schemas.openxmlformats.org/drawingml/2006/main" xmlns="" val="522038541"/>
+        <p14:creationId xmlns="" xmlns:a="http://schemas.openxmlformats.org/drawingml/2006/main" xmlns:r="http://schemas.openxmlformats.org/officeDocument/2006/relationships" xmlns:p="http://schemas.openxmlformats.org/presentationml/2006/main" xmlns:p14="http://schemas.microsoft.com/office/powerpoint/2010/main" xmlns:mv="urn:schemas-microsoft-com:mac:vml" xmlns:mc="http://schemas.openxmlformats.org/markup-compatibility/2006" val="522038541"/>
       </p:ext>
     </p:extLst>
   </p:cSld>
@@ -1891,7 +1891,7 @@
     </p:spTree>
     <p:extLst>
       <p:ext uri="{BB962C8B-B14F-4D97-AF65-F5344CB8AC3E}">
-        <p14:creationId xmlns:p14="http://schemas.microsoft.com/office/powerpoint/2010/main" xmlns:p="http://schemas.openxmlformats.org/presentationml/2006/main" xmlns:r="http://schemas.openxmlformats.org/officeDocument/2006/relationships" xmlns:a="http://schemas.openxmlformats.org/drawingml/2006/main" xmlns="" val="527839127"/>
+        <p14:creationId xmlns="" xmlns:a="http://schemas.openxmlformats.org/drawingml/2006/main" xmlns:r="http://schemas.openxmlformats.org/officeDocument/2006/relationships" xmlns:p="http://schemas.openxmlformats.org/presentationml/2006/main" xmlns:p14="http://schemas.microsoft.com/office/powerpoint/2010/main" xmlns:mv="urn:schemas-microsoft-com:mac:vml" xmlns:mc="http://schemas.openxmlformats.org/markup-compatibility/2006" val="527839127"/>
       </p:ext>
     </p:extLst>
   </p:cSld>
@@ -2035,7 +2035,7 @@
     </p:spTree>
     <p:extLst>
       <p:ext uri="{BB962C8B-B14F-4D97-AF65-F5344CB8AC3E}">
-        <p14:creationId xmlns:p14="http://schemas.microsoft.com/office/powerpoint/2010/main" xmlns:p="http://schemas.openxmlformats.org/presentationml/2006/main" xmlns:r="http://schemas.openxmlformats.org/officeDocument/2006/relationships" xmlns:a="http://schemas.openxmlformats.org/drawingml/2006/main" xmlns="" val="978342375"/>
+        <p14:creationId xmlns="" xmlns:a="http://schemas.openxmlformats.org/drawingml/2006/main" xmlns:r="http://schemas.openxmlformats.org/officeDocument/2006/relationships" xmlns:p="http://schemas.openxmlformats.org/presentationml/2006/main" xmlns:p14="http://schemas.microsoft.com/office/powerpoint/2010/main" xmlns:mv="urn:schemas-microsoft-com:mac:vml" xmlns:mc="http://schemas.openxmlformats.org/markup-compatibility/2006" val="978342375"/>
       </p:ext>
     </p:extLst>
   </p:cSld>
@@ -2128,7 +2128,7 @@
     </p:spTree>
     <p:extLst>
       <p:ext uri="{BB962C8B-B14F-4D97-AF65-F5344CB8AC3E}">
-        <p14:creationId xmlns:p14="http://schemas.microsoft.com/office/powerpoint/2010/main" xmlns:p="http://schemas.openxmlformats.org/presentationml/2006/main" xmlns:r="http://schemas.openxmlformats.org/officeDocument/2006/relationships" xmlns:a="http://schemas.openxmlformats.org/drawingml/2006/main" xmlns="" val="2082005316"/>
+        <p14:creationId xmlns="" xmlns:a="http://schemas.openxmlformats.org/drawingml/2006/main" xmlns:r="http://schemas.openxmlformats.org/officeDocument/2006/relationships" xmlns:p="http://schemas.openxmlformats.org/presentationml/2006/main" xmlns:p14="http://schemas.microsoft.com/office/powerpoint/2010/main" xmlns:mv="urn:schemas-microsoft-com:mac:vml" xmlns:mc="http://schemas.openxmlformats.org/markup-compatibility/2006" val="2082005316"/>
       </p:ext>
     </p:extLst>
   </p:cSld>
@@ -2276,7 +2276,7 @@
     </p:spTree>
     <p:extLst>
       <p:ext uri="{BB962C8B-B14F-4D97-AF65-F5344CB8AC3E}">
-        <p14:creationId xmlns:p14="http://schemas.microsoft.com/office/powerpoint/2010/main" xmlns:p="http://schemas.openxmlformats.org/presentationml/2006/main" xmlns:r="http://schemas.openxmlformats.org/officeDocument/2006/relationships" xmlns:a="http://schemas.openxmlformats.org/drawingml/2006/main" xmlns="" val="1689963030"/>
+        <p14:creationId xmlns="" xmlns:a="http://schemas.openxmlformats.org/drawingml/2006/main" xmlns:r="http://schemas.openxmlformats.org/officeDocument/2006/relationships" xmlns:p="http://schemas.openxmlformats.org/presentationml/2006/main" xmlns:p14="http://schemas.microsoft.com/office/powerpoint/2010/main" xmlns:mv="urn:schemas-microsoft-com:mac:vml" xmlns:mc="http://schemas.openxmlformats.org/markup-compatibility/2006" val="1689963030"/>
       </p:ext>
     </p:extLst>
   </p:cSld>
@@ -2378,7 +2378,7 @@
     </p:spTree>
     <p:extLst>
       <p:ext uri="{BB962C8B-B14F-4D97-AF65-F5344CB8AC3E}">
-        <p14:creationId xmlns:p14="http://schemas.microsoft.com/office/powerpoint/2010/main" xmlns:p="http://schemas.openxmlformats.org/presentationml/2006/main" xmlns:r="http://schemas.openxmlformats.org/officeDocument/2006/relationships" xmlns:a="http://schemas.openxmlformats.org/drawingml/2006/main" xmlns="" val="527881731"/>
+        <p14:creationId xmlns="" xmlns:a="http://schemas.openxmlformats.org/drawingml/2006/main" xmlns:r="http://schemas.openxmlformats.org/officeDocument/2006/relationships" xmlns:p="http://schemas.openxmlformats.org/presentationml/2006/main" xmlns:p14="http://schemas.microsoft.com/office/powerpoint/2010/main" xmlns:mv="urn:schemas-microsoft-com:mac:vml" xmlns:mc="http://schemas.openxmlformats.org/markup-compatibility/2006" val="527881731"/>
       </p:ext>
     </p:extLst>
   </p:cSld>
@@ -2479,7 +2479,7 @@
     </p:spTree>
     <p:extLst>
       <p:ext uri="{BB962C8B-B14F-4D97-AF65-F5344CB8AC3E}">
-        <p14:creationId xmlns:p14="http://schemas.microsoft.com/office/powerpoint/2010/main" xmlns:p="http://schemas.openxmlformats.org/presentationml/2006/main" xmlns:r="http://schemas.openxmlformats.org/officeDocument/2006/relationships" xmlns:a="http://schemas.openxmlformats.org/drawingml/2006/main" xmlns="" val="1480234258"/>
+        <p14:creationId xmlns="" xmlns:a="http://schemas.openxmlformats.org/drawingml/2006/main" xmlns:r="http://schemas.openxmlformats.org/officeDocument/2006/relationships" xmlns:p="http://schemas.openxmlformats.org/presentationml/2006/main" xmlns:p14="http://schemas.microsoft.com/office/powerpoint/2010/main" xmlns:mv="urn:schemas-microsoft-com:mac:vml" xmlns:mc="http://schemas.openxmlformats.org/markup-compatibility/2006" val="1480234258"/>
       </p:ext>
     </p:extLst>
   </p:cSld>
@@ -2576,7 +2576,7 @@
     </p:spTree>
     <p:extLst>
       <p:ext uri="{BB962C8B-B14F-4D97-AF65-F5344CB8AC3E}">
-        <p14:creationId xmlns:p14="http://schemas.microsoft.com/office/powerpoint/2010/main" xmlns:p="http://schemas.openxmlformats.org/presentationml/2006/main" xmlns:r="http://schemas.openxmlformats.org/officeDocument/2006/relationships" xmlns:a="http://schemas.openxmlformats.org/drawingml/2006/main" xmlns="" val="788776861"/>
+        <p14:creationId xmlns="" xmlns:a="http://schemas.openxmlformats.org/drawingml/2006/main" xmlns:r="http://schemas.openxmlformats.org/officeDocument/2006/relationships" xmlns:p="http://schemas.openxmlformats.org/presentationml/2006/main" xmlns:p14="http://schemas.microsoft.com/office/powerpoint/2010/main" xmlns:mv="urn:schemas-microsoft-com:mac:vml" xmlns:mc="http://schemas.openxmlformats.org/markup-compatibility/2006" val="788776861"/>
       </p:ext>
     </p:extLst>
   </p:cSld>
@@ -2678,7 +2678,7 @@
     </p:spTree>
     <p:extLst>
       <p:ext uri="{BB962C8B-B14F-4D97-AF65-F5344CB8AC3E}">
-        <p14:creationId xmlns:p14="http://schemas.microsoft.com/office/powerpoint/2010/main" xmlns:p="http://schemas.openxmlformats.org/presentationml/2006/main" xmlns:r="http://schemas.openxmlformats.org/officeDocument/2006/relationships" xmlns:a="http://schemas.openxmlformats.org/drawingml/2006/main" xmlns="" val="881273466"/>
+        <p14:creationId xmlns="" xmlns:a="http://schemas.openxmlformats.org/drawingml/2006/main" xmlns:r="http://schemas.openxmlformats.org/officeDocument/2006/relationships" xmlns:p="http://schemas.openxmlformats.org/presentationml/2006/main" xmlns:p14="http://schemas.microsoft.com/office/powerpoint/2010/main" xmlns:mv="urn:schemas-microsoft-com:mac:vml" xmlns:mc="http://schemas.openxmlformats.org/markup-compatibility/2006" val="881273466"/>
       </p:ext>
     </p:extLst>
   </p:cSld>
@@ -2795,7 +2795,7 @@
     </p:spTree>
     <p:extLst>
       <p:ext uri="{BB962C8B-B14F-4D97-AF65-F5344CB8AC3E}">
-        <p14:creationId xmlns:p14="http://schemas.microsoft.com/office/powerpoint/2010/main" xmlns:p="http://schemas.openxmlformats.org/presentationml/2006/main" xmlns:r="http://schemas.openxmlformats.org/officeDocument/2006/relationships" xmlns:a="http://schemas.openxmlformats.org/drawingml/2006/main" xmlns="" val="368429703"/>
+        <p14:creationId xmlns="" xmlns:a="http://schemas.openxmlformats.org/drawingml/2006/main" xmlns:r="http://schemas.openxmlformats.org/officeDocument/2006/relationships" xmlns:p="http://schemas.openxmlformats.org/presentationml/2006/main" xmlns:p14="http://schemas.microsoft.com/office/powerpoint/2010/main" xmlns:mv="urn:schemas-microsoft-com:mac:vml" xmlns:mc="http://schemas.openxmlformats.org/markup-compatibility/2006" val="368429703"/>
       </p:ext>
     </p:extLst>
   </p:cSld>
@@ -2888,7 +2888,7 @@
     </p:spTree>
     <p:extLst>
       <p:ext uri="{BB962C8B-B14F-4D97-AF65-F5344CB8AC3E}">
-        <p14:creationId xmlns:p14="http://schemas.microsoft.com/office/powerpoint/2010/main" xmlns:p="http://schemas.openxmlformats.org/presentationml/2006/main" xmlns:r="http://schemas.openxmlformats.org/officeDocument/2006/relationships" xmlns:a="http://schemas.openxmlformats.org/drawingml/2006/main" xmlns="" val="1058275855"/>
+        <p14:creationId xmlns="" xmlns:a="http://schemas.openxmlformats.org/drawingml/2006/main" xmlns:r="http://schemas.openxmlformats.org/officeDocument/2006/relationships" xmlns:p="http://schemas.openxmlformats.org/presentationml/2006/main" xmlns:p14="http://schemas.microsoft.com/office/powerpoint/2010/main" xmlns:mv="urn:schemas-microsoft-com:mac:vml" xmlns:mc="http://schemas.openxmlformats.org/markup-compatibility/2006" val="1058275855"/>
       </p:ext>
     </p:extLst>
   </p:cSld>
@@ -3021,7 +3021,7 @@
     </p:spTree>
     <p:extLst>
       <p:ext uri="{BB962C8B-B14F-4D97-AF65-F5344CB8AC3E}">
-        <p14:creationId xmlns:p14="http://schemas.microsoft.com/office/powerpoint/2010/main" xmlns:p="http://schemas.openxmlformats.org/presentationml/2006/main" xmlns:r="http://schemas.openxmlformats.org/officeDocument/2006/relationships" xmlns:a="http://schemas.openxmlformats.org/drawingml/2006/main" xmlns="" val="284401046"/>
+        <p14:creationId xmlns="" xmlns:a="http://schemas.openxmlformats.org/drawingml/2006/main" xmlns:r="http://schemas.openxmlformats.org/officeDocument/2006/relationships" xmlns:p="http://schemas.openxmlformats.org/presentationml/2006/main" xmlns:p14="http://schemas.microsoft.com/office/powerpoint/2010/main" xmlns:mv="urn:schemas-microsoft-com:mac:vml" xmlns:mc="http://schemas.openxmlformats.org/markup-compatibility/2006" val="284401046"/>
       </p:ext>
     </p:extLst>
   </p:cSld>
@@ -3130,7 +3130,7 @@
     </p:spTree>
     <p:extLst>
       <p:ext uri="{BB962C8B-B14F-4D97-AF65-F5344CB8AC3E}">
-        <p14:creationId xmlns:p14="http://schemas.microsoft.com/office/powerpoint/2010/main" xmlns:p="http://schemas.openxmlformats.org/presentationml/2006/main" xmlns:r="http://schemas.openxmlformats.org/officeDocument/2006/relationships" xmlns:a="http://schemas.openxmlformats.org/drawingml/2006/main" xmlns="" val="2107302263"/>
+        <p14:creationId xmlns="" xmlns:a="http://schemas.openxmlformats.org/drawingml/2006/main" xmlns:r="http://schemas.openxmlformats.org/officeDocument/2006/relationships" xmlns:p="http://schemas.openxmlformats.org/presentationml/2006/main" xmlns:p14="http://schemas.microsoft.com/office/powerpoint/2010/main" xmlns:mv="urn:schemas-microsoft-com:mac:vml" xmlns:mc="http://schemas.openxmlformats.org/markup-compatibility/2006" val="2107302263"/>
       </p:ext>
     </p:extLst>
   </p:cSld>
@@ -3272,7 +3272,7 @@
     </p:spTree>
     <p:extLst>
       <p:ext uri="{BB962C8B-B14F-4D97-AF65-F5344CB8AC3E}">
-        <p14:creationId xmlns:p14="http://schemas.microsoft.com/office/powerpoint/2010/main" xmlns:p="http://schemas.openxmlformats.org/presentationml/2006/main" xmlns:r="http://schemas.openxmlformats.org/officeDocument/2006/relationships" xmlns:a="http://schemas.openxmlformats.org/drawingml/2006/main" xmlns="" val="1980234669"/>
+        <p14:creationId xmlns="" xmlns:a="http://schemas.openxmlformats.org/drawingml/2006/main" xmlns:r="http://schemas.openxmlformats.org/officeDocument/2006/relationships" xmlns:p="http://schemas.openxmlformats.org/presentationml/2006/main" xmlns:p14="http://schemas.microsoft.com/office/powerpoint/2010/main" xmlns:mv="urn:schemas-microsoft-com:mac:vml" xmlns:mc="http://schemas.openxmlformats.org/markup-compatibility/2006" val="1980234669"/>
       </p:ext>
     </p:extLst>
   </p:cSld>
@@ -3382,7 +3382,7 @@
     </p:spTree>
     <p:extLst>
       <p:ext uri="{BB962C8B-B14F-4D97-AF65-F5344CB8AC3E}">
-        <p14:creationId xmlns:p14="http://schemas.microsoft.com/office/powerpoint/2010/main" xmlns:p="http://schemas.openxmlformats.org/presentationml/2006/main" xmlns:r="http://schemas.openxmlformats.org/officeDocument/2006/relationships" xmlns:a="http://schemas.openxmlformats.org/drawingml/2006/main" xmlns="" val="482006622"/>
+        <p14:creationId xmlns="" xmlns:a="http://schemas.openxmlformats.org/drawingml/2006/main" xmlns:r="http://schemas.openxmlformats.org/officeDocument/2006/relationships" xmlns:p="http://schemas.openxmlformats.org/presentationml/2006/main" xmlns:p14="http://schemas.microsoft.com/office/powerpoint/2010/main" xmlns:mv="urn:schemas-microsoft-com:mac:vml" xmlns:mc="http://schemas.openxmlformats.org/markup-compatibility/2006" val="482006622"/>
       </p:ext>
     </p:extLst>
   </p:cSld>
@@ -3506,7 +3506,7 @@
     </p:spTree>
     <p:extLst>
       <p:ext uri="{BB962C8B-B14F-4D97-AF65-F5344CB8AC3E}">
-        <p14:creationId xmlns:p14="http://schemas.microsoft.com/office/powerpoint/2010/main" xmlns:p="http://schemas.openxmlformats.org/presentationml/2006/main" xmlns:r="http://schemas.openxmlformats.org/officeDocument/2006/relationships" xmlns:a="http://schemas.openxmlformats.org/drawingml/2006/main" xmlns="" val="1764799602"/>
+        <p14:creationId xmlns="" xmlns:a="http://schemas.openxmlformats.org/drawingml/2006/main" xmlns:r="http://schemas.openxmlformats.org/officeDocument/2006/relationships" xmlns:p="http://schemas.openxmlformats.org/presentationml/2006/main" xmlns:p14="http://schemas.microsoft.com/office/powerpoint/2010/main" xmlns:mv="urn:schemas-microsoft-com:mac:vml" xmlns:mc="http://schemas.openxmlformats.org/markup-compatibility/2006" val="1764799602"/>
       </p:ext>
     </p:extLst>
   </p:cSld>
@@ -3607,7 +3607,7 @@
     </p:spTree>
     <p:extLst>
       <p:ext uri="{BB962C8B-B14F-4D97-AF65-F5344CB8AC3E}">
-        <p14:creationId xmlns:p14="http://schemas.microsoft.com/office/powerpoint/2010/main" xmlns:p="http://schemas.openxmlformats.org/presentationml/2006/main" xmlns:r="http://schemas.openxmlformats.org/officeDocument/2006/relationships" xmlns:a="http://schemas.openxmlformats.org/drawingml/2006/main" xmlns="" val="1449030827"/>
+        <p14:creationId xmlns="" xmlns:a="http://schemas.openxmlformats.org/drawingml/2006/main" xmlns:r="http://schemas.openxmlformats.org/officeDocument/2006/relationships" xmlns:p="http://schemas.openxmlformats.org/presentationml/2006/main" xmlns:p14="http://schemas.microsoft.com/office/powerpoint/2010/main" xmlns:mv="urn:schemas-microsoft-com:mac:vml" xmlns:mc="http://schemas.openxmlformats.org/markup-compatibility/2006" val="1449030827"/>
       </p:ext>
     </p:extLst>
   </p:cSld>
@@ -3724,7 +3724,7 @@
     </p:spTree>
     <p:extLst>
       <p:ext uri="{BB962C8B-B14F-4D97-AF65-F5344CB8AC3E}">
-        <p14:creationId xmlns:p14="http://schemas.microsoft.com/office/powerpoint/2010/main" xmlns:p="http://schemas.openxmlformats.org/presentationml/2006/main" xmlns:r="http://schemas.openxmlformats.org/officeDocument/2006/relationships" xmlns:a="http://schemas.openxmlformats.org/drawingml/2006/main" xmlns="" val="757552106"/>
+        <p14:creationId xmlns="" xmlns:a="http://schemas.openxmlformats.org/drawingml/2006/main" xmlns:r="http://schemas.openxmlformats.org/officeDocument/2006/relationships" xmlns:p="http://schemas.openxmlformats.org/presentationml/2006/main" xmlns:p14="http://schemas.microsoft.com/office/powerpoint/2010/main" xmlns:mv="urn:schemas-microsoft-com:mac:vml" xmlns:mc="http://schemas.openxmlformats.org/markup-compatibility/2006" val="757552106"/>
       </p:ext>
     </p:extLst>
   </p:cSld>
@@ -3833,7 +3833,7 @@
     </p:spTree>
     <p:extLst>
       <p:ext uri="{BB962C8B-B14F-4D97-AF65-F5344CB8AC3E}">
-        <p14:creationId xmlns:p14="http://schemas.microsoft.com/office/powerpoint/2010/main" xmlns:p="http://schemas.openxmlformats.org/presentationml/2006/main" xmlns:r="http://schemas.openxmlformats.org/officeDocument/2006/relationships" xmlns:a="http://schemas.openxmlformats.org/drawingml/2006/main" xmlns="" val="505885279"/>
+        <p14:creationId xmlns="" xmlns:a="http://schemas.openxmlformats.org/drawingml/2006/main" xmlns:r="http://schemas.openxmlformats.org/officeDocument/2006/relationships" xmlns:p="http://schemas.openxmlformats.org/presentationml/2006/main" xmlns:p14="http://schemas.microsoft.com/office/powerpoint/2010/main" xmlns:mv="urn:schemas-microsoft-com:mac:vml" xmlns:mc="http://schemas.openxmlformats.org/markup-compatibility/2006" val="505885279"/>
       </p:ext>
     </p:extLst>
   </p:cSld>
@@ -3966,7 +3966,7 @@
     </p:spTree>
     <p:extLst>
       <p:ext uri="{BB962C8B-B14F-4D97-AF65-F5344CB8AC3E}">
-        <p14:creationId xmlns:p14="http://schemas.microsoft.com/office/powerpoint/2010/main" xmlns:p="http://schemas.openxmlformats.org/presentationml/2006/main" xmlns:r="http://schemas.openxmlformats.org/officeDocument/2006/relationships" xmlns:a="http://schemas.openxmlformats.org/drawingml/2006/main" xmlns="" val="1124783118"/>
+        <p14:creationId xmlns="" xmlns:a="http://schemas.openxmlformats.org/drawingml/2006/main" xmlns:r="http://schemas.openxmlformats.org/officeDocument/2006/relationships" xmlns:p="http://schemas.openxmlformats.org/presentationml/2006/main" xmlns:p14="http://schemas.microsoft.com/office/powerpoint/2010/main" xmlns:mv="urn:schemas-microsoft-com:mac:vml" xmlns:mc="http://schemas.openxmlformats.org/markup-compatibility/2006" val="1124783118"/>
       </p:ext>
     </p:extLst>
   </p:cSld>
@@ -4059,7 +4059,7 @@
     </p:spTree>
     <p:extLst>
       <p:ext uri="{BB962C8B-B14F-4D97-AF65-F5344CB8AC3E}">
-        <p14:creationId xmlns:p14="http://schemas.microsoft.com/office/powerpoint/2010/main" xmlns:p="http://schemas.openxmlformats.org/presentationml/2006/main" xmlns:r="http://schemas.openxmlformats.org/officeDocument/2006/relationships" xmlns:a="http://schemas.openxmlformats.org/drawingml/2006/main" xmlns="" val="163846026"/>
+        <p14:creationId xmlns="" xmlns:a="http://schemas.openxmlformats.org/drawingml/2006/main" xmlns:r="http://schemas.openxmlformats.org/officeDocument/2006/relationships" xmlns:p="http://schemas.openxmlformats.org/presentationml/2006/main" xmlns:p14="http://schemas.microsoft.com/office/powerpoint/2010/main" xmlns:mv="urn:schemas-microsoft-com:mac:vml" xmlns:mc="http://schemas.openxmlformats.org/markup-compatibility/2006" val="163846026"/>
       </p:ext>
     </p:extLst>
   </p:cSld>
@@ -4177,7 +4177,7 @@
     </p:spTree>
     <p:extLst>
       <p:ext uri="{BB962C8B-B14F-4D97-AF65-F5344CB8AC3E}">
-        <p14:creationId xmlns:p14="http://schemas.microsoft.com/office/powerpoint/2010/main" xmlns:p="http://schemas.openxmlformats.org/presentationml/2006/main" xmlns:r="http://schemas.openxmlformats.org/officeDocument/2006/relationships" xmlns:a="http://schemas.openxmlformats.org/drawingml/2006/main" xmlns="" val="2080801414"/>
+        <p14:creationId xmlns="" xmlns:a="http://schemas.openxmlformats.org/drawingml/2006/main" xmlns:r="http://schemas.openxmlformats.org/officeDocument/2006/relationships" xmlns:p="http://schemas.openxmlformats.org/presentationml/2006/main" xmlns:p14="http://schemas.microsoft.com/office/powerpoint/2010/main" xmlns:mv="urn:schemas-microsoft-com:mac:vml" xmlns:mc="http://schemas.openxmlformats.org/markup-compatibility/2006" val="2080801414"/>
       </p:ext>
     </p:extLst>
   </p:cSld>
@@ -4298,7 +4298,7 @@
     </p:spTree>
     <p:extLst>
       <p:ext uri="{BB962C8B-B14F-4D97-AF65-F5344CB8AC3E}">
-        <p14:creationId xmlns:p14="http://schemas.microsoft.com/office/powerpoint/2010/main" xmlns:p="http://schemas.openxmlformats.org/presentationml/2006/main" xmlns:r="http://schemas.openxmlformats.org/officeDocument/2006/relationships" xmlns:a="http://schemas.openxmlformats.org/drawingml/2006/main" xmlns="" val="1199116108"/>
+        <p14:creationId xmlns="" xmlns:a="http://schemas.openxmlformats.org/drawingml/2006/main" xmlns:r="http://schemas.openxmlformats.org/officeDocument/2006/relationships" xmlns:p="http://schemas.openxmlformats.org/presentationml/2006/main" xmlns:p14="http://schemas.microsoft.com/office/powerpoint/2010/main" xmlns:mv="urn:schemas-microsoft-com:mac:vml" xmlns:mc="http://schemas.openxmlformats.org/markup-compatibility/2006" val="1199116108"/>
       </p:ext>
     </p:extLst>
   </p:cSld>
@@ -4463,7 +4463,7 @@
     </p:spTree>
     <p:extLst>
       <p:ext uri="{BB962C8B-B14F-4D97-AF65-F5344CB8AC3E}">
-        <p14:creationId xmlns:p14="http://schemas.microsoft.com/office/powerpoint/2010/main" xmlns:p="http://schemas.openxmlformats.org/presentationml/2006/main" xmlns:r="http://schemas.openxmlformats.org/officeDocument/2006/relationships" xmlns:a="http://schemas.openxmlformats.org/drawingml/2006/main" xmlns="" val="985019265"/>
+        <p14:creationId xmlns="" xmlns:a="http://schemas.openxmlformats.org/drawingml/2006/main" xmlns:r="http://schemas.openxmlformats.org/officeDocument/2006/relationships" xmlns:p="http://schemas.openxmlformats.org/presentationml/2006/main" xmlns:p14="http://schemas.microsoft.com/office/powerpoint/2010/main" xmlns:mv="urn:schemas-microsoft-com:mac:vml" xmlns:mc="http://schemas.openxmlformats.org/markup-compatibility/2006" val="985019265"/>
       </p:ext>
     </p:extLst>
   </p:cSld>
@@ -4574,7 +4574,7 @@
     </p:spTree>
     <p:extLst>
       <p:ext uri="{BB962C8B-B14F-4D97-AF65-F5344CB8AC3E}">
-        <p14:creationId xmlns:p14="http://schemas.microsoft.com/office/powerpoint/2010/main" xmlns:p="http://schemas.openxmlformats.org/presentationml/2006/main" xmlns:r="http://schemas.openxmlformats.org/officeDocument/2006/relationships" xmlns:a="http://schemas.openxmlformats.org/drawingml/2006/main" xmlns="" val="1651491368"/>
+        <p14:creationId xmlns="" xmlns:a="http://schemas.openxmlformats.org/drawingml/2006/main" xmlns:r="http://schemas.openxmlformats.org/officeDocument/2006/relationships" xmlns:p="http://schemas.openxmlformats.org/presentationml/2006/main" xmlns:p14="http://schemas.microsoft.com/office/powerpoint/2010/main" xmlns:mv="urn:schemas-microsoft-com:mac:vml" xmlns:mc="http://schemas.openxmlformats.org/markup-compatibility/2006" val="1651491368"/>
       </p:ext>
     </p:extLst>
   </p:cSld>
@@ -4687,7 +4687,7 @@
     </p:spTree>
     <p:extLst>
       <p:ext uri="{BB962C8B-B14F-4D97-AF65-F5344CB8AC3E}">
-        <p14:creationId xmlns:p14="http://schemas.microsoft.com/office/powerpoint/2010/main" xmlns:p="http://schemas.openxmlformats.org/presentationml/2006/main" xmlns:r="http://schemas.openxmlformats.org/officeDocument/2006/relationships" xmlns:a="http://schemas.openxmlformats.org/drawingml/2006/main" xmlns="" val="1264428276"/>
+        <p14:creationId xmlns="" xmlns:a="http://schemas.openxmlformats.org/drawingml/2006/main" xmlns:r="http://schemas.openxmlformats.org/officeDocument/2006/relationships" xmlns:p="http://schemas.openxmlformats.org/presentationml/2006/main" xmlns:p14="http://schemas.microsoft.com/office/powerpoint/2010/main" xmlns:mv="urn:schemas-microsoft-com:mac:vml" xmlns:mc="http://schemas.openxmlformats.org/markup-compatibility/2006" val="1264428276"/>
       </p:ext>
     </p:extLst>
   </p:cSld>
@@ -4809,7 +4809,7 @@
     </p:spTree>
     <p:extLst>
       <p:ext uri="{BB962C8B-B14F-4D97-AF65-F5344CB8AC3E}">
-        <p14:creationId xmlns:p14="http://schemas.microsoft.com/office/powerpoint/2010/main" xmlns:p="http://schemas.openxmlformats.org/presentationml/2006/main" xmlns:r="http://schemas.openxmlformats.org/officeDocument/2006/relationships" xmlns:a="http://schemas.openxmlformats.org/drawingml/2006/main" xmlns="" val="1887372709"/>
+        <p14:creationId xmlns="" xmlns:a="http://schemas.openxmlformats.org/drawingml/2006/main" xmlns:r="http://schemas.openxmlformats.org/officeDocument/2006/relationships" xmlns:p="http://schemas.openxmlformats.org/presentationml/2006/main" xmlns:p14="http://schemas.microsoft.com/office/powerpoint/2010/main" xmlns:mv="urn:schemas-microsoft-com:mac:vml" xmlns:mc="http://schemas.openxmlformats.org/markup-compatibility/2006" val="1887372709"/>
       </p:ext>
     </p:extLst>
   </p:cSld>
@@ -4949,7 +4949,7 @@
     </p:spTree>
     <p:extLst>
       <p:ext uri="{BB962C8B-B14F-4D97-AF65-F5344CB8AC3E}">
-        <p14:creationId xmlns:p14="http://schemas.microsoft.com/office/powerpoint/2010/main" xmlns:p="http://schemas.openxmlformats.org/presentationml/2006/main" xmlns:r="http://schemas.openxmlformats.org/officeDocument/2006/relationships" xmlns:a="http://schemas.openxmlformats.org/drawingml/2006/main" xmlns="" val="52196230"/>
+        <p14:creationId xmlns="" xmlns:a="http://schemas.openxmlformats.org/drawingml/2006/main" xmlns:r="http://schemas.openxmlformats.org/officeDocument/2006/relationships" xmlns:p="http://schemas.openxmlformats.org/presentationml/2006/main" xmlns:p14="http://schemas.microsoft.com/office/powerpoint/2010/main" xmlns:mv="urn:schemas-microsoft-com:mac:vml" xmlns:mc="http://schemas.openxmlformats.org/markup-compatibility/2006" val="52196230"/>
       </p:ext>
     </p:extLst>
   </p:cSld>
@@ -5041,7 +5041,7 @@
     </p:spTree>
     <p:extLst>
       <p:ext uri="{BB962C8B-B14F-4D97-AF65-F5344CB8AC3E}">
-        <p14:creationId xmlns:p14="http://schemas.microsoft.com/office/powerpoint/2010/main" xmlns:p="http://schemas.openxmlformats.org/presentationml/2006/main" xmlns:r="http://schemas.openxmlformats.org/officeDocument/2006/relationships" xmlns:a="http://schemas.openxmlformats.org/drawingml/2006/main" xmlns="" val="2096419307"/>
+        <p14:creationId xmlns="" xmlns:a="http://schemas.openxmlformats.org/drawingml/2006/main" xmlns:r="http://schemas.openxmlformats.org/officeDocument/2006/relationships" xmlns:p="http://schemas.openxmlformats.org/presentationml/2006/main" xmlns:p14="http://schemas.microsoft.com/office/powerpoint/2010/main" xmlns:mv="urn:schemas-microsoft-com:mac:vml" xmlns:mc="http://schemas.openxmlformats.org/markup-compatibility/2006" val="2096419307"/>
       </p:ext>
     </p:extLst>
   </p:cSld>
@@ -5126,7 +5126,7 @@
     </p:spTree>
     <p:extLst>
       <p:ext uri="{BB962C8B-B14F-4D97-AF65-F5344CB8AC3E}">
-        <p14:creationId xmlns:p14="http://schemas.microsoft.com/office/powerpoint/2010/main" xmlns:p="http://schemas.openxmlformats.org/presentationml/2006/main" xmlns:r="http://schemas.openxmlformats.org/officeDocument/2006/relationships" xmlns:a="http://schemas.openxmlformats.org/drawingml/2006/main" xmlns="" val="1418377824"/>
+        <p14:creationId xmlns="" xmlns:a="http://schemas.openxmlformats.org/drawingml/2006/main" xmlns:r="http://schemas.openxmlformats.org/officeDocument/2006/relationships" xmlns:p="http://schemas.openxmlformats.org/presentationml/2006/main" xmlns:p14="http://schemas.microsoft.com/office/powerpoint/2010/main" xmlns:mv="urn:schemas-microsoft-com:mac:vml" xmlns:mc="http://schemas.openxmlformats.org/markup-compatibility/2006" val="1418377824"/>
       </p:ext>
     </p:extLst>
   </p:cSld>
@@ -5245,7 +5245,7 @@
     </p:spTree>
     <p:extLst>
       <p:ext uri="{BB962C8B-B14F-4D97-AF65-F5344CB8AC3E}">
-        <p14:creationId xmlns:p14="http://schemas.microsoft.com/office/powerpoint/2010/main" xmlns:p="http://schemas.openxmlformats.org/presentationml/2006/main" xmlns:r="http://schemas.openxmlformats.org/officeDocument/2006/relationships" xmlns:a="http://schemas.openxmlformats.org/drawingml/2006/main" xmlns="" val="2086426095"/>
+        <p14:creationId xmlns="" xmlns:a="http://schemas.openxmlformats.org/drawingml/2006/main" xmlns:r="http://schemas.openxmlformats.org/officeDocument/2006/relationships" xmlns:p="http://schemas.openxmlformats.org/presentationml/2006/main" xmlns:p14="http://schemas.microsoft.com/office/powerpoint/2010/main" xmlns:mv="urn:schemas-microsoft-com:mac:vml" xmlns:mc="http://schemas.openxmlformats.org/markup-compatibility/2006" val="2086426095"/>
       </p:ext>
     </p:extLst>
   </p:cSld>
@@ -5409,7 +5409,7 @@
     </p:spTree>
     <p:extLst>
       <p:ext uri="{BB962C8B-B14F-4D97-AF65-F5344CB8AC3E}">
-        <p14:creationId xmlns:p14="http://schemas.microsoft.com/office/powerpoint/2010/main" xmlns:p="http://schemas.openxmlformats.org/presentationml/2006/main" xmlns:r="http://schemas.openxmlformats.org/officeDocument/2006/relationships" xmlns:a="http://schemas.openxmlformats.org/drawingml/2006/main" xmlns="" val="801220236"/>
+        <p14:creationId xmlns="" xmlns:a="http://schemas.openxmlformats.org/drawingml/2006/main" xmlns:r="http://schemas.openxmlformats.org/officeDocument/2006/relationships" xmlns:p="http://schemas.openxmlformats.org/presentationml/2006/main" xmlns:p14="http://schemas.microsoft.com/office/powerpoint/2010/main" xmlns:mv="urn:schemas-microsoft-com:mac:vml" xmlns:mc="http://schemas.openxmlformats.org/markup-compatibility/2006" val="801220236"/>
       </p:ext>
     </p:extLst>
   </p:cSld>
@@ -5571,7 +5571,7 @@
     </p:spTree>
     <p:extLst>
       <p:ext uri="{BB962C8B-B14F-4D97-AF65-F5344CB8AC3E}">
-        <p14:creationId xmlns:p14="http://schemas.microsoft.com/office/powerpoint/2010/main" xmlns:p="http://schemas.openxmlformats.org/presentationml/2006/main" xmlns:r="http://schemas.openxmlformats.org/officeDocument/2006/relationships" xmlns:a="http://schemas.openxmlformats.org/drawingml/2006/main" xmlns="" val="1448925256"/>
+        <p14:creationId xmlns="" xmlns:a="http://schemas.openxmlformats.org/drawingml/2006/main" xmlns:r="http://schemas.openxmlformats.org/officeDocument/2006/relationships" xmlns:p="http://schemas.openxmlformats.org/presentationml/2006/main" xmlns:p14="http://schemas.microsoft.com/office/powerpoint/2010/main" xmlns:mv="urn:schemas-microsoft-com:mac:vml" xmlns:mc="http://schemas.openxmlformats.org/markup-compatibility/2006" val="1448925256"/>
       </p:ext>
     </p:extLst>
   </p:cSld>
@@ -5736,7 +5736,7 @@
     </p:spTree>
     <p:extLst>
       <p:ext uri="{BB962C8B-B14F-4D97-AF65-F5344CB8AC3E}">
-        <p14:creationId xmlns:p14="http://schemas.microsoft.com/office/powerpoint/2010/main" xmlns:p="http://schemas.openxmlformats.org/presentationml/2006/main" xmlns:r="http://schemas.openxmlformats.org/officeDocument/2006/relationships" xmlns:a="http://schemas.openxmlformats.org/drawingml/2006/main" xmlns="" val="2031048549"/>
+        <p14:creationId xmlns="" xmlns:a="http://schemas.openxmlformats.org/drawingml/2006/main" xmlns:r="http://schemas.openxmlformats.org/officeDocument/2006/relationships" xmlns:p="http://schemas.openxmlformats.org/presentationml/2006/main" xmlns:p14="http://schemas.microsoft.com/office/powerpoint/2010/main" xmlns:mv="urn:schemas-microsoft-com:mac:vml" xmlns:mc="http://schemas.openxmlformats.org/markup-compatibility/2006" val="2031048549"/>
       </p:ext>
     </p:extLst>
   </p:cSld>
@@ -6000,7 +6000,7 @@
           <a:blip r:embed="rId3">
             <a:extLst>
               <a:ext uri="{28A0092B-C50C-407E-A947-70E740481C1C}">
-                <a14:useLocalDpi xmlns:a14="http://schemas.microsoft.com/office/drawing/2010/main" xmlns:p="http://schemas.openxmlformats.org/presentationml/2006/main" xmlns:r="http://schemas.openxmlformats.org/officeDocument/2006/relationships" xmlns:a="http://schemas.openxmlformats.org/drawingml/2006/main" xmlns="" val="0"/>
+                <a14:useLocalDpi xmlns="" xmlns:a="http://schemas.openxmlformats.org/drawingml/2006/main" xmlns:r="http://schemas.openxmlformats.org/officeDocument/2006/relationships" xmlns:p="http://schemas.openxmlformats.org/presentationml/2006/main" xmlns:a14="http://schemas.microsoft.com/office/drawing/2010/main" xmlns:mv="urn:schemas-microsoft-com:mac:vml" xmlns:mc="http://schemas.openxmlformats.org/markup-compatibility/2006" val="0"/>
               </a:ext>
             </a:extLst>
           </a:blip>
@@ -6021,7 +6021,7 @@
     </p:spTree>
     <p:extLst>
       <p:ext uri="{BB962C8B-B14F-4D97-AF65-F5344CB8AC3E}">
-        <p14:creationId xmlns:p14="http://schemas.microsoft.com/office/powerpoint/2010/main" xmlns:p="http://schemas.openxmlformats.org/presentationml/2006/main" xmlns:r="http://schemas.openxmlformats.org/officeDocument/2006/relationships" xmlns:a="http://schemas.openxmlformats.org/drawingml/2006/main" xmlns="" val="2005314365"/>
+        <p14:creationId xmlns="" xmlns:a="http://schemas.openxmlformats.org/drawingml/2006/main" xmlns:r="http://schemas.openxmlformats.org/officeDocument/2006/relationships" xmlns:p="http://schemas.openxmlformats.org/presentationml/2006/main" xmlns:p14="http://schemas.microsoft.com/office/powerpoint/2010/main" xmlns:mv="urn:schemas-microsoft-com:mac:vml" xmlns:mc="http://schemas.openxmlformats.org/markup-compatibility/2006" val="2005314365"/>
       </p:ext>
     </p:extLst>
   </p:cSld>
@@ -6733,7 +6733,7 @@
     </p:spTree>
     <p:extLst>
       <p:ext uri="{BB962C8B-B14F-4D97-AF65-F5344CB8AC3E}">
-        <p14:creationId xmlns:p14="http://schemas.microsoft.com/office/powerpoint/2010/main" xmlns:p="http://schemas.openxmlformats.org/presentationml/2006/main" xmlns:r="http://schemas.openxmlformats.org/officeDocument/2006/relationships" xmlns:a="http://schemas.openxmlformats.org/drawingml/2006/main" xmlns="" val="3273093039"/>
+        <p14:creationId xmlns="" xmlns:a="http://schemas.openxmlformats.org/drawingml/2006/main" xmlns:r="http://schemas.openxmlformats.org/officeDocument/2006/relationships" xmlns:p="http://schemas.openxmlformats.org/presentationml/2006/main" xmlns:p14="http://schemas.microsoft.com/office/powerpoint/2010/main" xmlns:mv="urn:schemas-microsoft-com:mac:vml" xmlns:mc="http://schemas.openxmlformats.org/markup-compatibility/2006" val="3273093039"/>
       </p:ext>
     </p:extLst>
   </p:cSld>
@@ -6791,7 +6791,7 @@
     </p:spTree>
     <p:extLst>
       <p:ext uri="{BB962C8B-B14F-4D97-AF65-F5344CB8AC3E}">
-        <p14:creationId xmlns:p14="http://schemas.microsoft.com/office/powerpoint/2010/main" xmlns:p="http://schemas.openxmlformats.org/presentationml/2006/main" xmlns:r="http://schemas.openxmlformats.org/officeDocument/2006/relationships" xmlns:a="http://schemas.openxmlformats.org/drawingml/2006/main" xmlns="" val="467069072"/>
+        <p14:creationId xmlns="" xmlns:a="http://schemas.openxmlformats.org/drawingml/2006/main" xmlns:r="http://schemas.openxmlformats.org/officeDocument/2006/relationships" xmlns:p="http://schemas.openxmlformats.org/presentationml/2006/main" xmlns:p14="http://schemas.microsoft.com/office/powerpoint/2010/main" xmlns:mv="urn:schemas-microsoft-com:mac:vml" xmlns:mc="http://schemas.openxmlformats.org/markup-compatibility/2006" val="467069072"/>
       </p:ext>
     </p:extLst>
   </p:cSld>
@@ -6855,7 +6855,7 @@
     </p:spTree>
     <p:extLst>
       <p:ext uri="{BB962C8B-B14F-4D97-AF65-F5344CB8AC3E}">
-        <p14:creationId xmlns:p14="http://schemas.microsoft.com/office/powerpoint/2010/main" xmlns:p="http://schemas.openxmlformats.org/presentationml/2006/main" xmlns:r="http://schemas.openxmlformats.org/officeDocument/2006/relationships" xmlns:a="http://schemas.openxmlformats.org/drawingml/2006/main" xmlns="" val="4006882603"/>
+        <p14:creationId xmlns="" xmlns:a="http://schemas.openxmlformats.org/drawingml/2006/main" xmlns:r="http://schemas.openxmlformats.org/officeDocument/2006/relationships" xmlns:p="http://schemas.openxmlformats.org/presentationml/2006/main" xmlns:p14="http://schemas.microsoft.com/office/powerpoint/2010/main" xmlns:mv="urn:schemas-microsoft-com:mac:vml" xmlns:mc="http://schemas.openxmlformats.org/markup-compatibility/2006" val="4006882603"/>
       </p:ext>
     </p:extLst>
   </p:cSld>
@@ -6885,7 +6885,7 @@
     </p:spTree>
     <p:extLst>
       <p:ext uri="{BB962C8B-B14F-4D97-AF65-F5344CB8AC3E}">
-        <p14:creationId xmlns:p14="http://schemas.microsoft.com/office/powerpoint/2010/main" xmlns:p="http://schemas.openxmlformats.org/presentationml/2006/main" xmlns:r="http://schemas.openxmlformats.org/officeDocument/2006/relationships" xmlns:a="http://schemas.openxmlformats.org/drawingml/2006/main" xmlns="" val="654024207"/>
+        <p14:creationId xmlns="" xmlns:a="http://schemas.openxmlformats.org/drawingml/2006/main" xmlns:r="http://schemas.openxmlformats.org/officeDocument/2006/relationships" xmlns:p="http://schemas.openxmlformats.org/presentationml/2006/main" xmlns:p14="http://schemas.microsoft.com/office/powerpoint/2010/main" xmlns:mv="urn:schemas-microsoft-com:mac:vml" xmlns:mc="http://schemas.openxmlformats.org/markup-compatibility/2006" val="654024207"/>
       </p:ext>
     </p:extLst>
   </p:cSld>
@@ -7005,7 +7005,7 @@
     </p:spTree>
     <p:extLst>
       <p:ext uri="{BB962C8B-B14F-4D97-AF65-F5344CB8AC3E}">
-        <p14:creationId xmlns:p14="http://schemas.microsoft.com/office/powerpoint/2010/main" xmlns:p="http://schemas.openxmlformats.org/presentationml/2006/main" xmlns:r="http://schemas.openxmlformats.org/officeDocument/2006/relationships" xmlns:a="http://schemas.openxmlformats.org/drawingml/2006/main" xmlns="" val="2124837561"/>
+        <p14:creationId xmlns="" xmlns:a="http://schemas.openxmlformats.org/drawingml/2006/main" xmlns:r="http://schemas.openxmlformats.org/officeDocument/2006/relationships" xmlns:p="http://schemas.openxmlformats.org/presentationml/2006/main" xmlns:p14="http://schemas.microsoft.com/office/powerpoint/2010/main" xmlns:mv="urn:schemas-microsoft-com:mac:vml" xmlns:mc="http://schemas.openxmlformats.org/markup-compatibility/2006" val="2124837561"/>
       </p:ext>
     </p:extLst>
   </p:cSld>
@@ -7105,7 +7105,7 @@
     </p:spTree>
     <p:extLst>
       <p:ext uri="{BB962C8B-B14F-4D97-AF65-F5344CB8AC3E}">
-        <p14:creationId xmlns:p14="http://schemas.microsoft.com/office/powerpoint/2010/main" xmlns:p="http://schemas.openxmlformats.org/presentationml/2006/main" xmlns:r="http://schemas.openxmlformats.org/officeDocument/2006/relationships" xmlns:a="http://schemas.openxmlformats.org/drawingml/2006/main" xmlns="" val="65627032"/>
+        <p14:creationId xmlns="" xmlns:a="http://schemas.openxmlformats.org/drawingml/2006/main" xmlns:r="http://schemas.openxmlformats.org/officeDocument/2006/relationships" xmlns:p="http://schemas.openxmlformats.org/presentationml/2006/main" xmlns:p14="http://schemas.microsoft.com/office/powerpoint/2010/main" xmlns:mv="urn:schemas-microsoft-com:mac:vml" xmlns:mc="http://schemas.openxmlformats.org/markup-compatibility/2006" val="65627032"/>
       </p:ext>
     </p:extLst>
   </p:cSld>
@@ -7272,7 +7272,7 @@
     </p:spTree>
     <p:extLst>
       <p:ext uri="{BB962C8B-B14F-4D97-AF65-F5344CB8AC3E}">
-        <p14:creationId xmlns:p14="http://schemas.microsoft.com/office/powerpoint/2010/main" xmlns:p="http://schemas.openxmlformats.org/presentationml/2006/main" xmlns:r="http://schemas.openxmlformats.org/officeDocument/2006/relationships" xmlns:a="http://schemas.openxmlformats.org/drawingml/2006/main" xmlns="" val="3750702607"/>
+        <p14:creationId xmlns="" xmlns:a="http://schemas.openxmlformats.org/drawingml/2006/main" xmlns:r="http://schemas.openxmlformats.org/officeDocument/2006/relationships" xmlns:p="http://schemas.openxmlformats.org/presentationml/2006/main" xmlns:p14="http://schemas.microsoft.com/office/powerpoint/2010/main" xmlns:mv="urn:schemas-microsoft-com:mac:vml" xmlns:mc="http://schemas.openxmlformats.org/markup-compatibility/2006" val="3750702607"/>
       </p:ext>
     </p:extLst>
   </p:cSld>
@@ -7442,7 +7442,7 @@
     </p:spTree>
     <p:extLst>
       <p:ext uri="{BB962C8B-B14F-4D97-AF65-F5344CB8AC3E}">
-        <p14:creationId xmlns:p14="http://schemas.microsoft.com/office/powerpoint/2010/main" xmlns:p="http://schemas.openxmlformats.org/presentationml/2006/main" xmlns:r="http://schemas.openxmlformats.org/officeDocument/2006/relationships" xmlns:a="http://schemas.openxmlformats.org/drawingml/2006/main" xmlns="" val="2008725742"/>
+        <p14:creationId xmlns="" xmlns:a="http://schemas.openxmlformats.org/drawingml/2006/main" xmlns:r="http://schemas.openxmlformats.org/officeDocument/2006/relationships" xmlns:p="http://schemas.openxmlformats.org/presentationml/2006/main" xmlns:p14="http://schemas.microsoft.com/office/powerpoint/2010/main" xmlns:mv="urn:schemas-microsoft-com:mac:vml" xmlns:mc="http://schemas.openxmlformats.org/markup-compatibility/2006" val="2008725742"/>
       </p:ext>
     </p:extLst>
   </p:cSld>
@@ -7601,7 +7601,7 @@
     </p:spTree>
     <p:extLst>
       <p:ext uri="{BB962C8B-B14F-4D97-AF65-F5344CB8AC3E}">
-        <p14:creationId xmlns:p14="http://schemas.microsoft.com/office/powerpoint/2010/main" xmlns:p="http://schemas.openxmlformats.org/presentationml/2006/main" xmlns:r="http://schemas.openxmlformats.org/officeDocument/2006/relationships" xmlns:a="http://schemas.openxmlformats.org/drawingml/2006/main" xmlns="" val="3508459060"/>
+        <p14:creationId xmlns="" xmlns:a="http://schemas.openxmlformats.org/drawingml/2006/main" xmlns:r="http://schemas.openxmlformats.org/officeDocument/2006/relationships" xmlns:p="http://schemas.openxmlformats.org/presentationml/2006/main" xmlns:p14="http://schemas.microsoft.com/office/powerpoint/2010/main" xmlns:mv="urn:schemas-microsoft-com:mac:vml" xmlns:mc="http://schemas.openxmlformats.org/markup-compatibility/2006" val="3508459060"/>
       </p:ext>
     </p:extLst>
   </p:cSld>
@@ -7801,7 +7801,7 @@
     </p:spTree>
     <p:extLst>
       <p:ext uri="{BB962C8B-B14F-4D97-AF65-F5344CB8AC3E}">
-        <p14:creationId xmlns:p14="http://schemas.microsoft.com/office/powerpoint/2010/main" xmlns:p="http://schemas.openxmlformats.org/presentationml/2006/main" xmlns:r="http://schemas.openxmlformats.org/officeDocument/2006/relationships" xmlns:a="http://schemas.openxmlformats.org/drawingml/2006/main" xmlns="" val="2636968817"/>
+        <p14:creationId xmlns="" xmlns:a="http://schemas.openxmlformats.org/drawingml/2006/main" xmlns:r="http://schemas.openxmlformats.org/officeDocument/2006/relationships" xmlns:p="http://schemas.openxmlformats.org/presentationml/2006/main" xmlns:p14="http://schemas.microsoft.com/office/powerpoint/2010/main" xmlns:mv="urn:schemas-microsoft-com:mac:vml" xmlns:mc="http://schemas.openxmlformats.org/markup-compatibility/2006" val="2636968817"/>
       </p:ext>
     </p:extLst>
   </p:cSld>
@@ -7869,7 +7869,7 @@
     </p:spTree>
     <p:extLst>
       <p:ext uri="{BB962C8B-B14F-4D97-AF65-F5344CB8AC3E}">
-        <p14:creationId xmlns:p14="http://schemas.microsoft.com/office/powerpoint/2010/main" xmlns:p="http://schemas.openxmlformats.org/presentationml/2006/main" xmlns:r="http://schemas.openxmlformats.org/officeDocument/2006/relationships" xmlns:a="http://schemas.openxmlformats.org/drawingml/2006/main" xmlns="" val="2124837561"/>
+        <p14:creationId xmlns="" xmlns:a="http://schemas.openxmlformats.org/drawingml/2006/main" xmlns:r="http://schemas.openxmlformats.org/officeDocument/2006/relationships" xmlns:p="http://schemas.openxmlformats.org/presentationml/2006/main" xmlns:p14="http://schemas.microsoft.com/office/powerpoint/2010/main" xmlns:mv="urn:schemas-microsoft-com:mac:vml" xmlns:mc="http://schemas.openxmlformats.org/markup-compatibility/2006" val="2124837561"/>
       </p:ext>
     </p:extLst>
   </p:cSld>
@@ -8154,7 +8154,7 @@
     </p:spTree>
     <p:extLst>
       <p:ext uri="{BB962C8B-B14F-4D97-AF65-F5344CB8AC3E}">
-        <p14:creationId xmlns:p14="http://schemas.microsoft.com/office/powerpoint/2010/main" xmlns:p="http://schemas.openxmlformats.org/presentationml/2006/main" xmlns:r="http://schemas.openxmlformats.org/officeDocument/2006/relationships" xmlns:a="http://schemas.openxmlformats.org/drawingml/2006/main" xmlns="" val="3833519293"/>
+        <p14:creationId xmlns="" xmlns:a="http://schemas.openxmlformats.org/drawingml/2006/main" xmlns:r="http://schemas.openxmlformats.org/officeDocument/2006/relationships" xmlns:p="http://schemas.openxmlformats.org/presentationml/2006/main" xmlns:p14="http://schemas.microsoft.com/office/powerpoint/2010/main" xmlns:mv="urn:schemas-microsoft-com:mac:vml" xmlns:mc="http://schemas.openxmlformats.org/markup-compatibility/2006" val="3833519293"/>
       </p:ext>
     </p:extLst>
   </p:cSld>
@@ -8526,7 +8526,7 @@
     </p:spTree>
     <p:extLst>
       <p:ext uri="{BB962C8B-B14F-4D97-AF65-F5344CB8AC3E}">
-        <p14:creationId xmlns:p14="http://schemas.microsoft.com/office/powerpoint/2010/main" xmlns:p="http://schemas.openxmlformats.org/presentationml/2006/main" xmlns:r="http://schemas.openxmlformats.org/officeDocument/2006/relationships" xmlns:a="http://schemas.openxmlformats.org/drawingml/2006/main" xmlns="" val="2901287801"/>
+        <p14:creationId xmlns="" xmlns:a="http://schemas.openxmlformats.org/drawingml/2006/main" xmlns:r="http://schemas.openxmlformats.org/officeDocument/2006/relationships" xmlns:p="http://schemas.openxmlformats.org/presentationml/2006/main" xmlns:p14="http://schemas.microsoft.com/office/powerpoint/2010/main" xmlns:mv="urn:schemas-microsoft-com:mac:vml" xmlns:mc="http://schemas.openxmlformats.org/markup-compatibility/2006" val="2901287801"/>
       </p:ext>
     </p:extLst>
   </p:cSld>
@@ -8824,7 +8824,7 @@
     </p:spTree>
     <p:extLst>
       <p:ext uri="{BB962C8B-B14F-4D97-AF65-F5344CB8AC3E}">
-        <p14:creationId xmlns:p14="http://schemas.microsoft.com/office/powerpoint/2010/main" xmlns:p="http://schemas.openxmlformats.org/presentationml/2006/main" xmlns:r="http://schemas.openxmlformats.org/officeDocument/2006/relationships" xmlns:a="http://schemas.openxmlformats.org/drawingml/2006/main" xmlns="" val="826396584"/>
+        <p14:creationId xmlns="" xmlns:a="http://schemas.openxmlformats.org/drawingml/2006/main" xmlns:r="http://schemas.openxmlformats.org/officeDocument/2006/relationships" xmlns:p="http://schemas.openxmlformats.org/presentationml/2006/main" xmlns:p14="http://schemas.microsoft.com/office/powerpoint/2010/main" xmlns:mv="urn:schemas-microsoft-com:mac:vml" xmlns:mc="http://schemas.openxmlformats.org/markup-compatibility/2006" val="826396584"/>
       </p:ext>
     </p:extLst>
   </p:cSld>
@@ -9330,7 +9330,7 @@
     </p:spTree>
     <p:extLst>
       <p:ext uri="{BB962C8B-B14F-4D97-AF65-F5344CB8AC3E}">
-        <p14:creationId xmlns:p14="http://schemas.microsoft.com/office/powerpoint/2010/main" xmlns:p="http://schemas.openxmlformats.org/presentationml/2006/main" xmlns:r="http://schemas.openxmlformats.org/officeDocument/2006/relationships" xmlns:a="http://schemas.openxmlformats.org/drawingml/2006/main" xmlns="" val="2302505678"/>
+        <p14:creationId xmlns="" xmlns:a="http://schemas.openxmlformats.org/drawingml/2006/main" xmlns:r="http://schemas.openxmlformats.org/officeDocument/2006/relationships" xmlns:p="http://schemas.openxmlformats.org/presentationml/2006/main" xmlns:p14="http://schemas.microsoft.com/office/powerpoint/2010/main" xmlns:mv="urn:schemas-microsoft-com:mac:vml" xmlns:mc="http://schemas.openxmlformats.org/markup-compatibility/2006" val="2302505678"/>
       </p:ext>
     </p:extLst>
   </p:cSld>
@@ -9467,7 +9467,7 @@
     </p:spTree>
     <p:extLst>
       <p:ext uri="{BB962C8B-B14F-4D97-AF65-F5344CB8AC3E}">
-        <p14:creationId xmlns:p14="http://schemas.microsoft.com/office/powerpoint/2010/main" xmlns:p="http://schemas.openxmlformats.org/presentationml/2006/main" xmlns:r="http://schemas.openxmlformats.org/officeDocument/2006/relationships" xmlns:a="http://schemas.openxmlformats.org/drawingml/2006/main" xmlns="" val="14311777"/>
+        <p14:creationId xmlns="" xmlns:a="http://schemas.openxmlformats.org/drawingml/2006/main" xmlns:r="http://schemas.openxmlformats.org/officeDocument/2006/relationships" xmlns:p="http://schemas.openxmlformats.org/presentationml/2006/main" xmlns:p14="http://schemas.microsoft.com/office/powerpoint/2010/main" xmlns:mv="urn:schemas-microsoft-com:mac:vml" xmlns:mc="http://schemas.openxmlformats.org/markup-compatibility/2006" val="14311777"/>
       </p:ext>
     </p:extLst>
   </p:cSld>
@@ -9779,15 +9779,7 @@
           <a:p>
             <a:r>
               <a:rPr lang="en-US" dirty="0" smtClean="0"/>
-              <a:t>Eric </a:t>
-            </a:r>
-            <a:r>
-              <a:rPr lang="en-US" dirty="0" smtClean="0"/>
-              <a:t>Holmes &amp; Michael Barrett, </a:t>
-            </a:r>
-            <a:r>
-              <a:rPr lang="en-US" dirty="0" smtClean="0"/>
-              <a:t>Remind</a:t>
+              <a:t>Eric Holmes &amp; Michael Barrett, Remind</a:t>
             </a:r>
             <a:endParaRPr lang="en-US" dirty="0"/>
           </a:p>
@@ -9873,7 +9865,7 @@
     </p:spTree>
     <p:extLst>
       <p:ext uri="{BB962C8B-B14F-4D97-AF65-F5344CB8AC3E}">
-        <p14:creationId xmlns:p14="http://schemas.microsoft.com/office/powerpoint/2010/main" xmlns:p="http://schemas.openxmlformats.org/presentationml/2006/main" xmlns:r="http://schemas.openxmlformats.org/officeDocument/2006/relationships" xmlns:a="http://schemas.openxmlformats.org/drawingml/2006/main" xmlns="" val="215277738"/>
+        <p14:creationId xmlns="" xmlns:a="http://schemas.openxmlformats.org/drawingml/2006/main" xmlns:r="http://schemas.openxmlformats.org/officeDocument/2006/relationships" xmlns:p="http://schemas.openxmlformats.org/presentationml/2006/main" xmlns:p14="http://schemas.microsoft.com/office/powerpoint/2010/main" xmlns:mv="urn:schemas-microsoft-com:mac:vml" xmlns:mc="http://schemas.openxmlformats.org/markup-compatibility/2006" val="215277738"/>
       </p:ext>
     </p:extLst>
   </p:cSld>
@@ -9937,7 +9929,7 @@
     </p:spTree>
     <p:extLst>
       <p:ext uri="{BB962C8B-B14F-4D97-AF65-F5344CB8AC3E}">
-        <p14:creationId xmlns:p14="http://schemas.microsoft.com/office/powerpoint/2010/main" xmlns:p="http://schemas.openxmlformats.org/presentationml/2006/main" xmlns:r="http://schemas.openxmlformats.org/officeDocument/2006/relationships" xmlns:a="http://schemas.openxmlformats.org/drawingml/2006/main" xmlns="" val="2005060300"/>
+        <p14:creationId xmlns="" xmlns:a="http://schemas.openxmlformats.org/drawingml/2006/main" xmlns:r="http://schemas.openxmlformats.org/officeDocument/2006/relationships" xmlns:p="http://schemas.openxmlformats.org/presentationml/2006/main" xmlns:p14="http://schemas.microsoft.com/office/powerpoint/2010/main" xmlns:mv="urn:schemas-microsoft-com:mac:vml" xmlns:mc="http://schemas.openxmlformats.org/markup-compatibility/2006" val="2005060300"/>
       </p:ext>
     </p:extLst>
   </p:cSld>
@@ -10088,7 +10080,7 @@
     </p:spTree>
     <p:extLst>
       <p:ext uri="{BB962C8B-B14F-4D97-AF65-F5344CB8AC3E}">
-        <p14:creationId xmlns:p14="http://schemas.microsoft.com/office/powerpoint/2010/main" xmlns:p="http://schemas.openxmlformats.org/presentationml/2006/main" xmlns:r="http://schemas.openxmlformats.org/officeDocument/2006/relationships" xmlns:a="http://schemas.openxmlformats.org/drawingml/2006/main" xmlns="" val="904526595"/>
+        <p14:creationId xmlns="" xmlns:a="http://schemas.openxmlformats.org/drawingml/2006/main" xmlns:r="http://schemas.openxmlformats.org/officeDocument/2006/relationships" xmlns:p="http://schemas.openxmlformats.org/presentationml/2006/main" xmlns:p14="http://schemas.microsoft.com/office/powerpoint/2010/main" xmlns:mv="urn:schemas-microsoft-com:mac:vml" xmlns:mc="http://schemas.openxmlformats.org/markup-compatibility/2006" val="904526595"/>
       </p:ext>
     </p:extLst>
   </p:cSld>
@@ -10233,7 +10225,7 @@
           <a:blip r:embed="rId3">
             <a:extLst>
               <a:ext uri="{28A0092B-C50C-407E-A947-70E740481C1C}">
-                <a14:useLocalDpi xmlns:a14="http://schemas.microsoft.com/office/drawing/2010/main" xmlns:p="http://schemas.openxmlformats.org/presentationml/2006/main" xmlns:r="http://schemas.openxmlformats.org/officeDocument/2006/relationships" xmlns:a="http://schemas.openxmlformats.org/drawingml/2006/main" xmlns="" val="0"/>
+                <a14:useLocalDpi xmlns="" xmlns:a="http://schemas.openxmlformats.org/drawingml/2006/main" xmlns:r="http://schemas.openxmlformats.org/officeDocument/2006/relationships" xmlns:p="http://schemas.openxmlformats.org/presentationml/2006/main" xmlns:a14="http://schemas.microsoft.com/office/drawing/2010/main" xmlns:mv="urn:schemas-microsoft-com:mac:vml" xmlns:mc="http://schemas.openxmlformats.org/markup-compatibility/2006" val="0"/>
               </a:ext>
             </a:extLst>
           </a:blip>
@@ -10263,7 +10255,7 @@
           <a:blip r:embed="rId4">
             <a:extLst>
               <a:ext uri="{28A0092B-C50C-407E-A947-70E740481C1C}">
-                <a14:useLocalDpi xmlns:a14="http://schemas.microsoft.com/office/drawing/2010/main" xmlns:p="http://schemas.openxmlformats.org/presentationml/2006/main" xmlns:r="http://schemas.openxmlformats.org/officeDocument/2006/relationships" xmlns:a="http://schemas.openxmlformats.org/drawingml/2006/main" xmlns="" val="0"/>
+                <a14:useLocalDpi xmlns="" xmlns:a="http://schemas.openxmlformats.org/drawingml/2006/main" xmlns:r="http://schemas.openxmlformats.org/officeDocument/2006/relationships" xmlns:p="http://schemas.openxmlformats.org/presentationml/2006/main" xmlns:a14="http://schemas.microsoft.com/office/drawing/2010/main" xmlns:mv="urn:schemas-microsoft-com:mac:vml" xmlns:mc="http://schemas.openxmlformats.org/markup-compatibility/2006" val="0"/>
               </a:ext>
             </a:extLst>
           </a:blip>
@@ -10293,7 +10285,7 @@
           <a:blip r:embed="rId5">
             <a:extLst>
               <a:ext uri="{28A0092B-C50C-407E-A947-70E740481C1C}">
-                <a14:useLocalDpi xmlns:a14="http://schemas.microsoft.com/office/drawing/2010/main" xmlns:p="http://schemas.openxmlformats.org/presentationml/2006/main" xmlns:r="http://schemas.openxmlformats.org/officeDocument/2006/relationships" xmlns:a="http://schemas.openxmlformats.org/drawingml/2006/main" xmlns="" val="0"/>
+                <a14:useLocalDpi xmlns="" xmlns:a="http://schemas.openxmlformats.org/drawingml/2006/main" xmlns:r="http://schemas.openxmlformats.org/officeDocument/2006/relationships" xmlns:p="http://schemas.openxmlformats.org/presentationml/2006/main" xmlns:a14="http://schemas.microsoft.com/office/drawing/2010/main" xmlns:mv="urn:schemas-microsoft-com:mac:vml" xmlns:mc="http://schemas.openxmlformats.org/markup-compatibility/2006" val="0"/>
               </a:ext>
             </a:extLst>
           </a:blip>
@@ -10314,7 +10306,7 @@
     </p:spTree>
     <p:extLst>
       <p:ext uri="{BB962C8B-B14F-4D97-AF65-F5344CB8AC3E}">
-        <p14:creationId xmlns:p14="http://schemas.microsoft.com/office/powerpoint/2010/main" xmlns:p="http://schemas.openxmlformats.org/presentationml/2006/main" xmlns:r="http://schemas.openxmlformats.org/officeDocument/2006/relationships" xmlns:a="http://schemas.openxmlformats.org/drawingml/2006/main" xmlns="" val="603589582"/>
+        <p14:creationId xmlns="" xmlns:a="http://schemas.openxmlformats.org/drawingml/2006/main" xmlns:r="http://schemas.openxmlformats.org/officeDocument/2006/relationships" xmlns:p="http://schemas.openxmlformats.org/presentationml/2006/main" xmlns:p14="http://schemas.microsoft.com/office/powerpoint/2010/main" xmlns:mv="urn:schemas-microsoft-com:mac:vml" xmlns:mc="http://schemas.openxmlformats.org/markup-compatibility/2006" val="603589582"/>
       </p:ext>
     </p:extLst>
   </p:cSld>
@@ -10383,7 +10375,7 @@
           <a:blip r:embed="rId3">
             <a:extLst>
               <a:ext uri="{28A0092B-C50C-407E-A947-70E740481C1C}">
-                <a14:useLocalDpi xmlns:a14="http://schemas.microsoft.com/office/drawing/2010/main" xmlns:p="http://schemas.openxmlformats.org/presentationml/2006/main" xmlns:r="http://schemas.openxmlformats.org/officeDocument/2006/relationships" xmlns:a="http://schemas.openxmlformats.org/drawingml/2006/main" xmlns="" val="0"/>
+                <a14:useLocalDpi xmlns="" xmlns:a="http://schemas.openxmlformats.org/drawingml/2006/main" xmlns:r="http://schemas.openxmlformats.org/officeDocument/2006/relationships" xmlns:p="http://schemas.openxmlformats.org/presentationml/2006/main" xmlns:a14="http://schemas.microsoft.com/office/drawing/2010/main" xmlns:mv="urn:schemas-microsoft-com:mac:vml" xmlns:mc="http://schemas.openxmlformats.org/markup-compatibility/2006" val="0"/>
               </a:ext>
             </a:extLst>
           </a:blip>
@@ -10413,7 +10405,7 @@
           <a:blip r:embed="rId4">
             <a:extLst>
               <a:ext uri="{28A0092B-C50C-407E-A947-70E740481C1C}">
-                <a14:useLocalDpi xmlns:a14="http://schemas.microsoft.com/office/drawing/2010/main" xmlns:p="http://schemas.openxmlformats.org/presentationml/2006/main" xmlns:r="http://schemas.openxmlformats.org/officeDocument/2006/relationships" xmlns:a="http://schemas.openxmlformats.org/drawingml/2006/main" xmlns="" val="0"/>
+                <a14:useLocalDpi xmlns="" xmlns:a="http://schemas.openxmlformats.org/drawingml/2006/main" xmlns:r="http://schemas.openxmlformats.org/officeDocument/2006/relationships" xmlns:p="http://schemas.openxmlformats.org/presentationml/2006/main" xmlns:a14="http://schemas.microsoft.com/office/drawing/2010/main" xmlns:mv="urn:schemas-microsoft-com:mac:vml" xmlns:mc="http://schemas.openxmlformats.org/markup-compatibility/2006" val="0"/>
               </a:ext>
             </a:extLst>
           </a:blip>
@@ -10512,7 +10504,7 @@
           <a:blip r:embed="rId4">
             <a:extLst>
               <a:ext uri="{28A0092B-C50C-407E-A947-70E740481C1C}">
-                <a14:useLocalDpi xmlns:a14="http://schemas.microsoft.com/office/drawing/2010/main" xmlns:p="http://schemas.openxmlformats.org/presentationml/2006/main" xmlns:r="http://schemas.openxmlformats.org/officeDocument/2006/relationships" xmlns:a="http://schemas.openxmlformats.org/drawingml/2006/main" xmlns="" val="0"/>
+                <a14:useLocalDpi xmlns="" xmlns:a="http://schemas.openxmlformats.org/drawingml/2006/main" xmlns:r="http://schemas.openxmlformats.org/officeDocument/2006/relationships" xmlns:p="http://schemas.openxmlformats.org/presentationml/2006/main" xmlns:a14="http://schemas.microsoft.com/office/drawing/2010/main" xmlns:mv="urn:schemas-microsoft-com:mac:vml" xmlns:mc="http://schemas.openxmlformats.org/markup-compatibility/2006" val="0"/>
               </a:ext>
             </a:extLst>
           </a:blip>
@@ -10593,7 +10585,7 @@
     </p:spTree>
     <p:extLst>
       <p:ext uri="{BB962C8B-B14F-4D97-AF65-F5344CB8AC3E}">
-        <p14:creationId xmlns:p14="http://schemas.microsoft.com/office/powerpoint/2010/main" xmlns:p="http://schemas.openxmlformats.org/presentationml/2006/main" xmlns:r="http://schemas.openxmlformats.org/officeDocument/2006/relationships" xmlns:a="http://schemas.openxmlformats.org/drawingml/2006/main" xmlns="" val="1011663949"/>
+        <p14:creationId xmlns="" xmlns:a="http://schemas.openxmlformats.org/drawingml/2006/main" xmlns:r="http://schemas.openxmlformats.org/officeDocument/2006/relationships" xmlns:p="http://schemas.openxmlformats.org/presentationml/2006/main" xmlns:p14="http://schemas.microsoft.com/office/powerpoint/2010/main" xmlns:mv="urn:schemas-microsoft-com:mac:vml" xmlns:mc="http://schemas.openxmlformats.org/markup-compatibility/2006" val="1011663949"/>
       </p:ext>
     </p:extLst>
   </p:cSld>
@@ -10662,7 +10654,7 @@
           <a:blip r:embed="rId3">
             <a:extLst>
               <a:ext uri="{28A0092B-C50C-407E-A947-70E740481C1C}">
-                <a14:useLocalDpi xmlns:a14="http://schemas.microsoft.com/office/drawing/2010/main" xmlns:p="http://schemas.openxmlformats.org/presentationml/2006/main" xmlns:r="http://schemas.openxmlformats.org/officeDocument/2006/relationships" xmlns:a="http://schemas.openxmlformats.org/drawingml/2006/main" xmlns="" val="0"/>
+                <a14:useLocalDpi xmlns="" xmlns:a="http://schemas.openxmlformats.org/drawingml/2006/main" xmlns:r="http://schemas.openxmlformats.org/officeDocument/2006/relationships" xmlns:p="http://schemas.openxmlformats.org/presentationml/2006/main" xmlns:a14="http://schemas.microsoft.com/office/drawing/2010/main" xmlns:mv="urn:schemas-microsoft-com:mac:vml" xmlns:mc="http://schemas.openxmlformats.org/markup-compatibility/2006" val="0"/>
               </a:ext>
             </a:extLst>
           </a:blip>
@@ -10692,7 +10684,7 @@
           <a:blip r:embed="rId4">
             <a:extLst>
               <a:ext uri="{28A0092B-C50C-407E-A947-70E740481C1C}">
-                <a14:useLocalDpi xmlns:a14="http://schemas.microsoft.com/office/drawing/2010/main" xmlns:p="http://schemas.openxmlformats.org/presentationml/2006/main" xmlns:r="http://schemas.openxmlformats.org/officeDocument/2006/relationships" xmlns:a="http://schemas.openxmlformats.org/drawingml/2006/main" xmlns="" val="0"/>
+                <a14:useLocalDpi xmlns="" xmlns:a="http://schemas.openxmlformats.org/drawingml/2006/main" xmlns:r="http://schemas.openxmlformats.org/officeDocument/2006/relationships" xmlns:p="http://schemas.openxmlformats.org/presentationml/2006/main" xmlns:a14="http://schemas.microsoft.com/office/drawing/2010/main" xmlns:mv="urn:schemas-microsoft-com:mac:vml" xmlns:mc="http://schemas.openxmlformats.org/markup-compatibility/2006" val="0"/>
               </a:ext>
             </a:extLst>
           </a:blip>
@@ -10722,7 +10714,7 @@
           <a:blip r:embed="rId5">
             <a:extLst>
               <a:ext uri="{28A0092B-C50C-407E-A947-70E740481C1C}">
-                <a14:useLocalDpi xmlns:a14="http://schemas.microsoft.com/office/drawing/2010/main" xmlns:p="http://schemas.openxmlformats.org/presentationml/2006/main" xmlns:r="http://schemas.openxmlformats.org/officeDocument/2006/relationships" xmlns:a="http://schemas.openxmlformats.org/drawingml/2006/main" xmlns="" val="0"/>
+                <a14:useLocalDpi xmlns="" xmlns:a="http://schemas.openxmlformats.org/drawingml/2006/main" xmlns:r="http://schemas.openxmlformats.org/officeDocument/2006/relationships" xmlns:p="http://schemas.openxmlformats.org/presentationml/2006/main" xmlns:a14="http://schemas.microsoft.com/office/drawing/2010/main" xmlns:mv="urn:schemas-microsoft-com:mac:vml" xmlns:mc="http://schemas.openxmlformats.org/markup-compatibility/2006" val="0"/>
               </a:ext>
             </a:extLst>
           </a:blip>
@@ -10974,7 +10966,7 @@
     </p:spTree>
     <p:extLst>
       <p:ext uri="{BB962C8B-B14F-4D97-AF65-F5344CB8AC3E}">
-        <p14:creationId xmlns:p14="http://schemas.microsoft.com/office/powerpoint/2010/main" xmlns:p="http://schemas.openxmlformats.org/presentationml/2006/main" xmlns:r="http://schemas.openxmlformats.org/officeDocument/2006/relationships" xmlns:a="http://schemas.openxmlformats.org/drawingml/2006/main" xmlns="" val="1221938147"/>
+        <p14:creationId xmlns="" xmlns:a="http://schemas.openxmlformats.org/drawingml/2006/main" xmlns:r="http://schemas.openxmlformats.org/officeDocument/2006/relationships" xmlns:p="http://schemas.openxmlformats.org/presentationml/2006/main" xmlns:p14="http://schemas.microsoft.com/office/powerpoint/2010/main" xmlns:mv="urn:schemas-microsoft-com:mac:vml" xmlns:mc="http://schemas.openxmlformats.org/markup-compatibility/2006" val="1221938147"/>
       </p:ext>
     </p:extLst>
   </p:cSld>
@@ -11138,7 +11130,7 @@
     </p:spTree>
     <p:extLst>
       <p:ext uri="{BB962C8B-B14F-4D97-AF65-F5344CB8AC3E}">
-        <p14:creationId xmlns:p14="http://schemas.microsoft.com/office/powerpoint/2010/main" xmlns:p="http://schemas.openxmlformats.org/presentationml/2006/main" xmlns:r="http://schemas.openxmlformats.org/officeDocument/2006/relationships" xmlns:a="http://schemas.openxmlformats.org/drawingml/2006/main" xmlns="" val="2135493620"/>
+        <p14:creationId xmlns="" xmlns:a="http://schemas.openxmlformats.org/drawingml/2006/main" xmlns:r="http://schemas.openxmlformats.org/officeDocument/2006/relationships" xmlns:p="http://schemas.openxmlformats.org/presentationml/2006/main" xmlns:p14="http://schemas.microsoft.com/office/powerpoint/2010/main" xmlns:mv="urn:schemas-microsoft-com:mac:vml" xmlns:mc="http://schemas.openxmlformats.org/markup-compatibility/2006" val="2135493620"/>
       </p:ext>
     </p:extLst>
   </p:cSld>
@@ -11276,7 +11268,7 @@
           <a:blip r:embed="rId3">
             <a:extLst>
               <a:ext uri="{28A0092B-C50C-407E-A947-70E740481C1C}">
-                <a14:useLocalDpi xmlns:a14="http://schemas.microsoft.com/office/drawing/2010/main" xmlns:p="http://schemas.openxmlformats.org/presentationml/2006/main" xmlns:r="http://schemas.openxmlformats.org/officeDocument/2006/relationships" xmlns:a="http://schemas.openxmlformats.org/drawingml/2006/main" xmlns="" val="0"/>
+                <a14:useLocalDpi xmlns="" xmlns:a="http://schemas.openxmlformats.org/drawingml/2006/main" xmlns:r="http://schemas.openxmlformats.org/officeDocument/2006/relationships" xmlns:p="http://schemas.openxmlformats.org/presentationml/2006/main" xmlns:a14="http://schemas.microsoft.com/office/drawing/2010/main" xmlns:mv="urn:schemas-microsoft-com:mac:vml" xmlns:mc="http://schemas.openxmlformats.org/markup-compatibility/2006" val="0"/>
               </a:ext>
             </a:extLst>
           </a:blip>
@@ -11336,7 +11328,7 @@
           <a:blip r:embed="rId4">
             <a:extLst>
               <a:ext uri="{28A0092B-C50C-407E-A947-70E740481C1C}">
-                <a14:useLocalDpi xmlns:a14="http://schemas.microsoft.com/office/drawing/2010/main" xmlns:p="http://schemas.openxmlformats.org/presentationml/2006/main" xmlns:r="http://schemas.openxmlformats.org/officeDocument/2006/relationships" xmlns:a="http://schemas.openxmlformats.org/drawingml/2006/main" xmlns="" val="0"/>
+                <a14:useLocalDpi xmlns="" xmlns:a="http://schemas.openxmlformats.org/drawingml/2006/main" xmlns:r="http://schemas.openxmlformats.org/officeDocument/2006/relationships" xmlns:p="http://schemas.openxmlformats.org/presentationml/2006/main" xmlns:a14="http://schemas.microsoft.com/office/drawing/2010/main" xmlns:mv="urn:schemas-microsoft-com:mac:vml" xmlns:mc="http://schemas.openxmlformats.org/markup-compatibility/2006" val="0"/>
               </a:ext>
             </a:extLst>
           </a:blip>
@@ -11466,7 +11458,7 @@
           <a:blip r:embed="rId5">
             <a:extLst>
               <a:ext uri="{28A0092B-C50C-407E-A947-70E740481C1C}">
-                <a14:useLocalDpi xmlns:a14="http://schemas.microsoft.com/office/drawing/2010/main" xmlns:p="http://schemas.openxmlformats.org/presentationml/2006/main" xmlns:r="http://schemas.openxmlformats.org/officeDocument/2006/relationships" xmlns:a="http://schemas.openxmlformats.org/drawingml/2006/main" xmlns="" val="0"/>
+                <a14:useLocalDpi xmlns="" xmlns:a="http://schemas.openxmlformats.org/drawingml/2006/main" xmlns:r="http://schemas.openxmlformats.org/officeDocument/2006/relationships" xmlns:p="http://schemas.openxmlformats.org/presentationml/2006/main" xmlns:a14="http://schemas.microsoft.com/office/drawing/2010/main" xmlns:mv="urn:schemas-microsoft-com:mac:vml" xmlns:mc="http://schemas.openxmlformats.org/markup-compatibility/2006" val="0"/>
               </a:ext>
             </a:extLst>
           </a:blip>
@@ -11487,7 +11479,7 @@
     </p:spTree>
     <p:extLst>
       <p:ext uri="{BB962C8B-B14F-4D97-AF65-F5344CB8AC3E}">
-        <p14:creationId xmlns:p14="http://schemas.microsoft.com/office/powerpoint/2010/main" xmlns:p="http://schemas.openxmlformats.org/presentationml/2006/main" xmlns:r="http://schemas.openxmlformats.org/officeDocument/2006/relationships" xmlns:a="http://schemas.openxmlformats.org/drawingml/2006/main" xmlns="" val="721009559"/>
+        <p14:creationId xmlns="" xmlns:a="http://schemas.openxmlformats.org/drawingml/2006/main" xmlns:r="http://schemas.openxmlformats.org/officeDocument/2006/relationships" xmlns:p="http://schemas.openxmlformats.org/presentationml/2006/main" xmlns:p14="http://schemas.microsoft.com/office/powerpoint/2010/main" xmlns:mv="urn:schemas-microsoft-com:mac:vml" xmlns:mc="http://schemas.openxmlformats.org/markup-compatibility/2006" val="721009559"/>
       </p:ext>
     </p:extLst>
   </p:cSld>
@@ -11609,7 +11601,7 @@
     </p:spTree>
     <p:extLst>
       <p:ext uri="{BB962C8B-B14F-4D97-AF65-F5344CB8AC3E}">
-        <p14:creationId xmlns:p14="http://schemas.microsoft.com/office/powerpoint/2010/main" xmlns:p="http://schemas.openxmlformats.org/presentationml/2006/main" xmlns:r="http://schemas.openxmlformats.org/officeDocument/2006/relationships" xmlns:a="http://schemas.openxmlformats.org/drawingml/2006/main" xmlns="" val="1013969935"/>
+        <p14:creationId xmlns="" xmlns:a="http://schemas.openxmlformats.org/drawingml/2006/main" xmlns:r="http://schemas.openxmlformats.org/officeDocument/2006/relationships" xmlns:p="http://schemas.openxmlformats.org/presentationml/2006/main" xmlns:p14="http://schemas.microsoft.com/office/powerpoint/2010/main" xmlns:mv="urn:schemas-microsoft-com:mac:vml" xmlns:mc="http://schemas.openxmlformats.org/markup-compatibility/2006" val="1013969935"/>
       </p:ext>
     </p:extLst>
   </p:cSld>
@@ -11726,7 +11718,7 @@
     </p:spTree>
     <p:extLst>
       <p:ext uri="{BB962C8B-B14F-4D97-AF65-F5344CB8AC3E}">
-        <p14:creationId xmlns:p14="http://schemas.microsoft.com/office/powerpoint/2010/main" xmlns:p="http://schemas.openxmlformats.org/presentationml/2006/main" xmlns:r="http://schemas.openxmlformats.org/officeDocument/2006/relationships" xmlns:a="http://schemas.openxmlformats.org/drawingml/2006/main" xmlns="" val="557709769"/>
+        <p14:creationId xmlns="" xmlns:a="http://schemas.openxmlformats.org/drawingml/2006/main" xmlns:r="http://schemas.openxmlformats.org/officeDocument/2006/relationships" xmlns:p="http://schemas.openxmlformats.org/presentationml/2006/main" xmlns:p14="http://schemas.microsoft.com/office/powerpoint/2010/main" xmlns:mv="urn:schemas-microsoft-com:mac:vml" xmlns:mc="http://schemas.openxmlformats.org/markup-compatibility/2006" val="557709769"/>
       </p:ext>
     </p:extLst>
   </p:cSld>
@@ -11955,7 +11947,7 @@
     </p:spTree>
     <p:extLst>
       <p:ext uri="{BB962C8B-B14F-4D97-AF65-F5344CB8AC3E}">
-        <p14:creationId xmlns:p14="http://schemas.microsoft.com/office/powerpoint/2010/main" xmlns:p="http://schemas.openxmlformats.org/presentationml/2006/main" xmlns:r="http://schemas.openxmlformats.org/officeDocument/2006/relationships" xmlns:a="http://schemas.openxmlformats.org/drawingml/2006/main" xmlns="" val="178948511"/>
+        <p14:creationId xmlns="" xmlns:a="http://schemas.openxmlformats.org/drawingml/2006/main" xmlns:r="http://schemas.openxmlformats.org/officeDocument/2006/relationships" xmlns:p="http://schemas.openxmlformats.org/presentationml/2006/main" xmlns:p14="http://schemas.microsoft.com/office/powerpoint/2010/main" xmlns:mv="urn:schemas-microsoft-com:mac:vml" xmlns:mc="http://schemas.openxmlformats.org/markup-compatibility/2006" val="178948511"/>
       </p:ext>
     </p:extLst>
   </p:cSld>
@@ -12063,7 +12055,7 @@
     </p:spTree>
     <p:extLst>
       <p:ext uri="{BB962C8B-B14F-4D97-AF65-F5344CB8AC3E}">
-        <p14:creationId xmlns:p14="http://schemas.microsoft.com/office/powerpoint/2010/main" xmlns:p="http://schemas.openxmlformats.org/presentationml/2006/main" xmlns:r="http://schemas.openxmlformats.org/officeDocument/2006/relationships" xmlns:a="http://schemas.openxmlformats.org/drawingml/2006/main" xmlns="" val="67347756"/>
+        <p14:creationId xmlns="" xmlns:a="http://schemas.openxmlformats.org/drawingml/2006/main" xmlns:r="http://schemas.openxmlformats.org/officeDocument/2006/relationships" xmlns:p="http://schemas.openxmlformats.org/presentationml/2006/main" xmlns:p14="http://schemas.microsoft.com/office/powerpoint/2010/main" xmlns:mv="urn:schemas-microsoft-com:mac:vml" xmlns:mc="http://schemas.openxmlformats.org/markup-compatibility/2006" val="67347756"/>
       </p:ext>
     </p:extLst>
   </p:cSld>
@@ -12197,7 +12189,7 @@
           <a:blip r:embed="rId3">
             <a:extLst>
               <a:ext uri="{28A0092B-C50C-407E-A947-70E740481C1C}">
-                <a14:useLocalDpi xmlns:a14="http://schemas.microsoft.com/office/drawing/2010/main" xmlns:p="http://schemas.openxmlformats.org/presentationml/2006/main" xmlns:r="http://schemas.openxmlformats.org/officeDocument/2006/relationships" xmlns:a="http://schemas.openxmlformats.org/drawingml/2006/main" xmlns="" val="0"/>
+                <a14:useLocalDpi xmlns="" xmlns:a="http://schemas.openxmlformats.org/drawingml/2006/main" xmlns:r="http://schemas.openxmlformats.org/officeDocument/2006/relationships" xmlns:p="http://schemas.openxmlformats.org/presentationml/2006/main" xmlns:a14="http://schemas.microsoft.com/office/drawing/2010/main" xmlns:mv="urn:schemas-microsoft-com:mac:vml" xmlns:mc="http://schemas.openxmlformats.org/markup-compatibility/2006" val="0"/>
               </a:ext>
             </a:extLst>
           </a:blip>
@@ -12257,7 +12249,7 @@
           <a:blip r:embed="rId3">
             <a:extLst>
               <a:ext uri="{28A0092B-C50C-407E-A947-70E740481C1C}">
-                <a14:useLocalDpi xmlns:a14="http://schemas.microsoft.com/office/drawing/2010/main" xmlns:p="http://schemas.openxmlformats.org/presentationml/2006/main" xmlns:r="http://schemas.openxmlformats.org/officeDocument/2006/relationships" xmlns:a="http://schemas.openxmlformats.org/drawingml/2006/main" xmlns="" val="0"/>
+                <a14:useLocalDpi xmlns="" xmlns:a="http://schemas.openxmlformats.org/drawingml/2006/main" xmlns:r="http://schemas.openxmlformats.org/officeDocument/2006/relationships" xmlns:p="http://schemas.openxmlformats.org/presentationml/2006/main" xmlns:a14="http://schemas.microsoft.com/office/drawing/2010/main" xmlns:mv="urn:schemas-microsoft-com:mac:vml" xmlns:mc="http://schemas.openxmlformats.org/markup-compatibility/2006" val="0"/>
               </a:ext>
             </a:extLst>
           </a:blip>
@@ -12367,7 +12359,7 @@
           <a:blip r:embed="rId4">
             <a:extLst>
               <a:ext uri="{28A0092B-C50C-407E-A947-70E740481C1C}">
-                <a14:useLocalDpi xmlns:a14="http://schemas.microsoft.com/office/drawing/2010/main" xmlns:p="http://schemas.openxmlformats.org/presentationml/2006/main" xmlns:r="http://schemas.openxmlformats.org/officeDocument/2006/relationships" xmlns:a="http://schemas.openxmlformats.org/drawingml/2006/main" xmlns="" val="0"/>
+                <a14:useLocalDpi xmlns="" xmlns:a="http://schemas.openxmlformats.org/drawingml/2006/main" xmlns:r="http://schemas.openxmlformats.org/officeDocument/2006/relationships" xmlns:p="http://schemas.openxmlformats.org/presentationml/2006/main" xmlns:a14="http://schemas.microsoft.com/office/drawing/2010/main" xmlns:mv="urn:schemas-microsoft-com:mac:vml" xmlns:mc="http://schemas.openxmlformats.org/markup-compatibility/2006" val="0"/>
               </a:ext>
             </a:extLst>
           </a:blip>
@@ -12388,7 +12380,7 @@
     </p:spTree>
     <p:extLst>
       <p:ext uri="{BB962C8B-B14F-4D97-AF65-F5344CB8AC3E}">
-        <p14:creationId xmlns:p14="http://schemas.microsoft.com/office/powerpoint/2010/main" xmlns:p="http://schemas.openxmlformats.org/presentationml/2006/main" xmlns:r="http://schemas.openxmlformats.org/officeDocument/2006/relationships" xmlns:a="http://schemas.openxmlformats.org/drawingml/2006/main" xmlns="" val="1705604458"/>
+        <p14:creationId xmlns="" xmlns:a="http://schemas.openxmlformats.org/drawingml/2006/main" xmlns:r="http://schemas.openxmlformats.org/officeDocument/2006/relationships" xmlns:p="http://schemas.openxmlformats.org/presentationml/2006/main" xmlns:p14="http://schemas.microsoft.com/office/powerpoint/2010/main" xmlns:mv="urn:schemas-microsoft-com:mac:vml" xmlns:mc="http://schemas.openxmlformats.org/markup-compatibility/2006" val="1705604458"/>
       </p:ext>
     </p:extLst>
   </p:cSld>
@@ -12495,7 +12487,7 @@
     </p:spTree>
     <p:extLst>
       <p:ext uri="{BB962C8B-B14F-4D97-AF65-F5344CB8AC3E}">
-        <p14:creationId xmlns:p14="http://schemas.microsoft.com/office/powerpoint/2010/main" xmlns:p="http://schemas.openxmlformats.org/presentationml/2006/main" xmlns:r="http://schemas.openxmlformats.org/officeDocument/2006/relationships" xmlns:a="http://schemas.openxmlformats.org/drawingml/2006/main" xmlns="" val="2045736504"/>
+        <p14:creationId xmlns="" xmlns:a="http://schemas.openxmlformats.org/drawingml/2006/main" xmlns:r="http://schemas.openxmlformats.org/officeDocument/2006/relationships" xmlns:p="http://schemas.openxmlformats.org/presentationml/2006/main" xmlns:p14="http://schemas.microsoft.com/office/powerpoint/2010/main" xmlns:mv="urn:schemas-microsoft-com:mac:vml" xmlns:mc="http://schemas.openxmlformats.org/markup-compatibility/2006" val="2045736504"/>
       </p:ext>
     </p:extLst>
   </p:cSld>
@@ -12541,7 +12533,7 @@
           <a:blip r:embed="rId3">
             <a:extLst>
               <a:ext uri="{28A0092B-C50C-407E-A947-70E740481C1C}">
-                <a14:useLocalDpi xmlns:a14="http://schemas.microsoft.com/office/drawing/2010/main" xmlns:p="http://schemas.openxmlformats.org/presentationml/2006/main" xmlns:r="http://schemas.openxmlformats.org/officeDocument/2006/relationships" xmlns:a="http://schemas.openxmlformats.org/drawingml/2006/main" xmlns="" val="0"/>
+                <a14:useLocalDpi xmlns="" xmlns:a="http://schemas.openxmlformats.org/drawingml/2006/main" xmlns:r="http://schemas.openxmlformats.org/officeDocument/2006/relationships" xmlns:p="http://schemas.openxmlformats.org/presentationml/2006/main" xmlns:a14="http://schemas.microsoft.com/office/drawing/2010/main" xmlns:mv="urn:schemas-microsoft-com:mac:vml" xmlns:mc="http://schemas.openxmlformats.org/markup-compatibility/2006" val="0"/>
               </a:ext>
             </a:extLst>
           </a:blip>
@@ -12571,7 +12563,7 @@
           <a:blip r:embed="rId4">
             <a:extLst>
               <a:ext uri="{28A0092B-C50C-407E-A947-70E740481C1C}">
-                <a14:useLocalDpi xmlns:a14="http://schemas.microsoft.com/office/drawing/2010/main" xmlns:p="http://schemas.openxmlformats.org/presentationml/2006/main" xmlns:r="http://schemas.openxmlformats.org/officeDocument/2006/relationships" xmlns:a="http://schemas.openxmlformats.org/drawingml/2006/main" xmlns="" val="0"/>
+                <a14:useLocalDpi xmlns="" xmlns:a="http://schemas.openxmlformats.org/drawingml/2006/main" xmlns:r="http://schemas.openxmlformats.org/officeDocument/2006/relationships" xmlns:p="http://schemas.openxmlformats.org/presentationml/2006/main" xmlns:a14="http://schemas.microsoft.com/office/drawing/2010/main" xmlns:mv="urn:schemas-microsoft-com:mac:vml" xmlns:mc="http://schemas.openxmlformats.org/markup-compatibility/2006" val="0"/>
               </a:ext>
             </a:extLst>
           </a:blip>
@@ -12631,7 +12623,7 @@
           <a:blip r:embed="rId5">
             <a:extLst>
               <a:ext uri="{28A0092B-C50C-407E-A947-70E740481C1C}">
-                <a14:useLocalDpi xmlns:a14="http://schemas.microsoft.com/office/drawing/2010/main" xmlns:p="http://schemas.openxmlformats.org/presentationml/2006/main" xmlns:r="http://schemas.openxmlformats.org/officeDocument/2006/relationships" xmlns:a="http://schemas.openxmlformats.org/drawingml/2006/main" xmlns="" val="0"/>
+                <a14:useLocalDpi xmlns="" xmlns:a="http://schemas.openxmlformats.org/drawingml/2006/main" xmlns:r="http://schemas.openxmlformats.org/officeDocument/2006/relationships" xmlns:p="http://schemas.openxmlformats.org/presentationml/2006/main" xmlns:a14="http://schemas.microsoft.com/office/drawing/2010/main" xmlns:mv="urn:schemas-microsoft-com:mac:vml" xmlns:mc="http://schemas.openxmlformats.org/markup-compatibility/2006" val="0"/>
               </a:ext>
             </a:extLst>
           </a:blip>
@@ -12652,7 +12644,7 @@
     </p:spTree>
     <p:extLst>
       <p:ext uri="{BB962C8B-B14F-4D97-AF65-F5344CB8AC3E}">
-        <p14:creationId xmlns:p14="http://schemas.microsoft.com/office/powerpoint/2010/main" xmlns:p="http://schemas.openxmlformats.org/presentationml/2006/main" xmlns:r="http://schemas.openxmlformats.org/officeDocument/2006/relationships" xmlns:a="http://schemas.openxmlformats.org/drawingml/2006/main" xmlns="" val="231676306"/>
+        <p14:creationId xmlns="" xmlns:a="http://schemas.openxmlformats.org/drawingml/2006/main" xmlns:r="http://schemas.openxmlformats.org/officeDocument/2006/relationships" xmlns:p="http://schemas.openxmlformats.org/presentationml/2006/main" xmlns:p14="http://schemas.microsoft.com/office/powerpoint/2010/main" xmlns:mv="urn:schemas-microsoft-com:mac:vml" xmlns:mc="http://schemas.openxmlformats.org/markup-compatibility/2006" val="231676306"/>
       </p:ext>
     </p:extLst>
   </p:cSld>
@@ -12903,7 +12895,7 @@
     </p:spTree>
     <p:extLst>
       <p:ext uri="{BB962C8B-B14F-4D97-AF65-F5344CB8AC3E}">
-        <p14:creationId xmlns:p14="http://schemas.microsoft.com/office/powerpoint/2010/main" xmlns:p="http://schemas.openxmlformats.org/presentationml/2006/main" xmlns:r="http://schemas.openxmlformats.org/officeDocument/2006/relationships" xmlns:a="http://schemas.openxmlformats.org/drawingml/2006/main" xmlns="" val="701688603"/>
+        <p14:creationId xmlns="" xmlns:a="http://schemas.openxmlformats.org/drawingml/2006/main" xmlns:r="http://schemas.openxmlformats.org/officeDocument/2006/relationships" xmlns:p="http://schemas.openxmlformats.org/presentationml/2006/main" xmlns:p14="http://schemas.microsoft.com/office/powerpoint/2010/main" xmlns:mv="urn:schemas-microsoft-com:mac:vml" xmlns:mc="http://schemas.openxmlformats.org/markup-compatibility/2006" val="701688603"/>
       </p:ext>
     </p:extLst>
   </p:cSld>
@@ -13106,7 +13098,7 @@
     </p:spTree>
     <p:extLst>
       <p:ext uri="{BB962C8B-B14F-4D97-AF65-F5344CB8AC3E}">
-        <p14:creationId xmlns:p14="http://schemas.microsoft.com/office/powerpoint/2010/main" xmlns:p="http://schemas.openxmlformats.org/presentationml/2006/main" xmlns:r="http://schemas.openxmlformats.org/officeDocument/2006/relationships" xmlns:a="http://schemas.openxmlformats.org/drawingml/2006/main" xmlns="" val="2114367108"/>
+        <p14:creationId xmlns="" xmlns:a="http://schemas.openxmlformats.org/drawingml/2006/main" xmlns:r="http://schemas.openxmlformats.org/officeDocument/2006/relationships" xmlns:p="http://schemas.openxmlformats.org/presentationml/2006/main" xmlns:p14="http://schemas.microsoft.com/office/powerpoint/2010/main" xmlns:mv="urn:schemas-microsoft-com:mac:vml" xmlns:mc="http://schemas.openxmlformats.org/markup-compatibility/2006" val="2114367108"/>
       </p:ext>
     </p:extLst>
   </p:cSld>
@@ -13206,7 +13198,7 @@
           <a:blip r:embed="rId3">
             <a:extLst>
               <a:ext uri="{28A0092B-C50C-407E-A947-70E740481C1C}">
-                <a14:useLocalDpi xmlns:a14="http://schemas.microsoft.com/office/drawing/2010/main" xmlns:p="http://schemas.openxmlformats.org/presentationml/2006/main" xmlns:r="http://schemas.openxmlformats.org/officeDocument/2006/relationships" xmlns:a="http://schemas.openxmlformats.org/drawingml/2006/main" xmlns="" val="0"/>
+                <a14:useLocalDpi xmlns="" xmlns:a="http://schemas.openxmlformats.org/drawingml/2006/main" xmlns:r="http://schemas.openxmlformats.org/officeDocument/2006/relationships" xmlns:p="http://schemas.openxmlformats.org/presentationml/2006/main" xmlns:a14="http://schemas.microsoft.com/office/drawing/2010/main" xmlns:mv="urn:schemas-microsoft-com:mac:vml" xmlns:mc="http://schemas.openxmlformats.org/markup-compatibility/2006" val="0"/>
               </a:ext>
             </a:extLst>
           </a:blip>
@@ -13236,7 +13228,7 @@
           <a:blip r:embed="rId4">
             <a:extLst>
               <a:ext uri="{28A0092B-C50C-407E-A947-70E740481C1C}">
-                <a14:useLocalDpi xmlns:a14="http://schemas.microsoft.com/office/drawing/2010/main" xmlns:p="http://schemas.openxmlformats.org/presentationml/2006/main" xmlns:r="http://schemas.openxmlformats.org/officeDocument/2006/relationships" xmlns:a="http://schemas.openxmlformats.org/drawingml/2006/main" xmlns="" val="0"/>
+                <a14:useLocalDpi xmlns="" xmlns:a="http://schemas.openxmlformats.org/drawingml/2006/main" xmlns:r="http://schemas.openxmlformats.org/officeDocument/2006/relationships" xmlns:p="http://schemas.openxmlformats.org/presentationml/2006/main" xmlns:a14="http://schemas.microsoft.com/office/drawing/2010/main" xmlns:mv="urn:schemas-microsoft-com:mac:vml" xmlns:mc="http://schemas.openxmlformats.org/markup-compatibility/2006" val="0"/>
               </a:ext>
             </a:extLst>
           </a:blip>
@@ -13359,7 +13351,7 @@
     </p:spTree>
     <p:extLst>
       <p:ext uri="{BB962C8B-B14F-4D97-AF65-F5344CB8AC3E}">
-        <p14:creationId xmlns:p14="http://schemas.microsoft.com/office/powerpoint/2010/main" xmlns:p="http://schemas.openxmlformats.org/presentationml/2006/main" xmlns:r="http://schemas.openxmlformats.org/officeDocument/2006/relationships" xmlns:a="http://schemas.openxmlformats.org/drawingml/2006/main" xmlns="" val="2069377225"/>
+        <p14:creationId xmlns="" xmlns:a="http://schemas.openxmlformats.org/drawingml/2006/main" xmlns:r="http://schemas.openxmlformats.org/officeDocument/2006/relationships" xmlns:p="http://schemas.openxmlformats.org/presentationml/2006/main" xmlns:p14="http://schemas.microsoft.com/office/powerpoint/2010/main" xmlns:mv="urn:schemas-microsoft-com:mac:vml" xmlns:mc="http://schemas.openxmlformats.org/markup-compatibility/2006" val="2069377225"/>
       </p:ext>
     </p:extLst>
   </p:cSld>
@@ -13620,7 +13612,7 @@
           <a:blip r:embed="rId3">
             <a:extLst>
               <a:ext uri="{28A0092B-C50C-407E-A947-70E740481C1C}">
-                <a14:useLocalDpi xmlns:a14="http://schemas.microsoft.com/office/drawing/2010/main" xmlns:p="http://schemas.openxmlformats.org/presentationml/2006/main" xmlns:r="http://schemas.openxmlformats.org/officeDocument/2006/relationships" xmlns:a="http://schemas.openxmlformats.org/drawingml/2006/main" xmlns="" val="0"/>
+                <a14:useLocalDpi xmlns="" xmlns:a="http://schemas.openxmlformats.org/drawingml/2006/main" xmlns:r="http://schemas.openxmlformats.org/officeDocument/2006/relationships" xmlns:p="http://schemas.openxmlformats.org/presentationml/2006/main" xmlns:a14="http://schemas.microsoft.com/office/drawing/2010/main" xmlns:mv="urn:schemas-microsoft-com:mac:vml" xmlns:mc="http://schemas.openxmlformats.org/markup-compatibility/2006" val="0"/>
               </a:ext>
             </a:extLst>
           </a:blip>
@@ -13641,7 +13633,7 @@
     </p:spTree>
     <p:extLst>
       <p:ext uri="{BB962C8B-B14F-4D97-AF65-F5344CB8AC3E}">
-        <p14:creationId xmlns:p14="http://schemas.microsoft.com/office/powerpoint/2010/main" xmlns:p="http://schemas.openxmlformats.org/presentationml/2006/main" xmlns:r="http://schemas.openxmlformats.org/officeDocument/2006/relationships" xmlns:a="http://schemas.openxmlformats.org/drawingml/2006/main" xmlns="" val="746424979"/>
+        <p14:creationId xmlns="" xmlns:a="http://schemas.openxmlformats.org/drawingml/2006/main" xmlns:r="http://schemas.openxmlformats.org/officeDocument/2006/relationships" xmlns:p="http://schemas.openxmlformats.org/presentationml/2006/main" xmlns:p14="http://schemas.microsoft.com/office/powerpoint/2010/main" xmlns:mv="urn:schemas-microsoft-com:mac:vml" xmlns:mc="http://schemas.openxmlformats.org/markup-compatibility/2006" val="746424979"/>
       </p:ext>
     </p:extLst>
   </p:cSld>
@@ -13710,7 +13702,7 @@
           <a:blip r:embed="rId3">
             <a:extLst>
               <a:ext uri="{28A0092B-C50C-407E-A947-70E740481C1C}">
-                <a14:useLocalDpi xmlns:a14="http://schemas.microsoft.com/office/drawing/2010/main" xmlns:p="http://schemas.openxmlformats.org/presentationml/2006/main" xmlns:r="http://schemas.openxmlformats.org/officeDocument/2006/relationships" xmlns:a="http://schemas.openxmlformats.org/drawingml/2006/main" xmlns="" val="0"/>
+                <a14:useLocalDpi xmlns="" xmlns:a="http://schemas.openxmlformats.org/drawingml/2006/main" xmlns:r="http://schemas.openxmlformats.org/officeDocument/2006/relationships" xmlns:p="http://schemas.openxmlformats.org/presentationml/2006/main" xmlns:a14="http://schemas.microsoft.com/office/drawing/2010/main" xmlns:mv="urn:schemas-microsoft-com:mac:vml" xmlns:mc="http://schemas.openxmlformats.org/markup-compatibility/2006" val="0"/>
               </a:ext>
             </a:extLst>
           </a:blip>
@@ -13898,7 +13890,7 @@
           <a:blip r:embed="rId4">
             <a:extLst>
               <a:ext uri="{28A0092B-C50C-407E-A947-70E740481C1C}">
-                <a14:useLocalDpi xmlns:a14="http://schemas.microsoft.com/office/drawing/2010/main" xmlns:p="http://schemas.openxmlformats.org/presentationml/2006/main" xmlns:r="http://schemas.openxmlformats.org/officeDocument/2006/relationships" xmlns:a="http://schemas.openxmlformats.org/drawingml/2006/main" xmlns="" val="0"/>
+                <a14:useLocalDpi xmlns="" xmlns:a="http://schemas.openxmlformats.org/drawingml/2006/main" xmlns:r="http://schemas.openxmlformats.org/officeDocument/2006/relationships" xmlns:p="http://schemas.openxmlformats.org/presentationml/2006/main" xmlns:a14="http://schemas.microsoft.com/office/drawing/2010/main" xmlns:mv="urn:schemas-microsoft-com:mac:vml" xmlns:mc="http://schemas.openxmlformats.org/markup-compatibility/2006" val="0"/>
               </a:ext>
             </a:extLst>
           </a:blip>
@@ -13928,7 +13920,7 @@
           <a:blip r:embed="rId5">
             <a:extLst>
               <a:ext uri="{28A0092B-C50C-407E-A947-70E740481C1C}">
-                <a14:useLocalDpi xmlns:a14="http://schemas.microsoft.com/office/drawing/2010/main" xmlns:p="http://schemas.openxmlformats.org/presentationml/2006/main" xmlns:r="http://schemas.openxmlformats.org/officeDocument/2006/relationships" xmlns:a="http://schemas.openxmlformats.org/drawingml/2006/main" xmlns="" val="0"/>
+                <a14:useLocalDpi xmlns="" xmlns:a="http://schemas.openxmlformats.org/drawingml/2006/main" xmlns:r="http://schemas.openxmlformats.org/officeDocument/2006/relationships" xmlns:p="http://schemas.openxmlformats.org/presentationml/2006/main" xmlns:a14="http://schemas.microsoft.com/office/drawing/2010/main" xmlns:mv="urn:schemas-microsoft-com:mac:vml" xmlns:mc="http://schemas.openxmlformats.org/markup-compatibility/2006" val="0"/>
               </a:ext>
             </a:extLst>
           </a:blip>
@@ -14009,7 +14001,7 @@
     </p:spTree>
     <p:extLst>
       <p:ext uri="{BB962C8B-B14F-4D97-AF65-F5344CB8AC3E}">
-        <p14:creationId xmlns:p14="http://schemas.microsoft.com/office/powerpoint/2010/main" xmlns:p="http://schemas.openxmlformats.org/presentationml/2006/main" xmlns:r="http://schemas.openxmlformats.org/officeDocument/2006/relationships" xmlns:a="http://schemas.openxmlformats.org/drawingml/2006/main" xmlns="" val="1429079060"/>
+        <p14:creationId xmlns="" xmlns:a="http://schemas.openxmlformats.org/drawingml/2006/main" xmlns:r="http://schemas.openxmlformats.org/officeDocument/2006/relationships" xmlns:p="http://schemas.openxmlformats.org/presentationml/2006/main" xmlns:p14="http://schemas.microsoft.com/office/powerpoint/2010/main" xmlns:mv="urn:schemas-microsoft-com:mac:vml" xmlns:mc="http://schemas.openxmlformats.org/markup-compatibility/2006" val="1429079060"/>
       </p:ext>
     </p:extLst>
   </p:cSld>
@@ -14385,7 +14377,7 @@
     </p:spTree>
     <p:extLst>
       <p:ext uri="{BB962C8B-B14F-4D97-AF65-F5344CB8AC3E}">
-        <p14:creationId xmlns:p14="http://schemas.microsoft.com/office/powerpoint/2010/main" xmlns:p="http://schemas.openxmlformats.org/presentationml/2006/main" xmlns:r="http://schemas.openxmlformats.org/officeDocument/2006/relationships" xmlns:a="http://schemas.openxmlformats.org/drawingml/2006/main" xmlns="" val="1697602590"/>
+        <p14:creationId xmlns="" xmlns:a="http://schemas.openxmlformats.org/drawingml/2006/main" xmlns:r="http://schemas.openxmlformats.org/officeDocument/2006/relationships" xmlns:p="http://schemas.openxmlformats.org/presentationml/2006/main" xmlns:p14="http://schemas.microsoft.com/office/powerpoint/2010/main" xmlns:mv="urn:schemas-microsoft-com:mac:vml" xmlns:mc="http://schemas.openxmlformats.org/markup-compatibility/2006" val="1697602590"/>
       </p:ext>
     </p:extLst>
   </p:cSld>
@@ -14764,7 +14756,7 @@
     </p:spTree>
     <p:extLst>
       <p:ext uri="{BB962C8B-B14F-4D97-AF65-F5344CB8AC3E}">
-        <p14:creationId xmlns:p14="http://schemas.microsoft.com/office/powerpoint/2010/main" xmlns:p="http://schemas.openxmlformats.org/presentationml/2006/main" xmlns:r="http://schemas.openxmlformats.org/officeDocument/2006/relationships" xmlns:a="http://schemas.openxmlformats.org/drawingml/2006/main" xmlns="" val="247700720"/>
+        <p14:creationId xmlns="" xmlns:a="http://schemas.openxmlformats.org/drawingml/2006/main" xmlns:r="http://schemas.openxmlformats.org/officeDocument/2006/relationships" xmlns:p="http://schemas.openxmlformats.org/presentationml/2006/main" xmlns:p14="http://schemas.microsoft.com/office/powerpoint/2010/main" xmlns:mv="urn:schemas-microsoft-com:mac:vml" xmlns:mc="http://schemas.openxmlformats.org/markup-compatibility/2006" val="247700720"/>
       </p:ext>
     </p:extLst>
   </p:cSld>
@@ -14815,15 +14807,7 @@
           <a:p>
             <a:r>
               <a:rPr lang="en-US" dirty="0" smtClean="0"/>
-              <a:t>About</a:t>
-            </a:r>
-            <a:r>
-              <a:rPr lang="en-US" dirty="0" smtClean="0"/>
-              <a:t> </a:t>
-            </a:r>
-            <a:r>
-              <a:rPr lang="en-US" dirty="0" smtClean="0"/>
-              <a:t>Us</a:t>
+              <a:t>About Us</a:t>
             </a:r>
             <a:endParaRPr lang="en-US" dirty="0"/>
           </a:p>
@@ -14850,11 +14834,7 @@
             </a:pPr>
             <a:r>
               <a:rPr lang="en-US" dirty="0" smtClean="0"/>
-              <a:t>Eric </a:t>
-            </a:r>
-            <a:r>
-              <a:rPr lang="en-US" dirty="0" smtClean="0"/>
-              <a:t>Holmes &amp; Michael Barrett</a:t>
+              <a:t>Eric Holmes &amp; Michael Barrett</a:t>
             </a:r>
           </a:p>
           <a:p>
@@ -14864,17 +14844,8 @@
             </a:pPr>
             <a:r>
               <a:rPr lang="en-US" dirty="0" smtClean="0"/>
-              <a:t>Infrastructure </a:t>
-            </a:r>
-            <a:r>
-              <a:rPr lang="en-US" dirty="0" smtClean="0"/>
-              <a:t>Engineers </a:t>
-            </a:r>
-            <a:r>
-              <a:rPr lang="en-US" dirty="0" smtClean="0"/>
-              <a:t>at Remind</a:t>
-            </a:r>
-            <a:endParaRPr lang="en-US" dirty="0" smtClean="0"/>
+              <a:t>Infrastructure Engineers at Remind</a:t>
+            </a:r>
           </a:p>
           <a:p>
             <a:pPr marL="342900" indent="-342900">
@@ -14893,25 +14864,34 @@
             </a:pPr>
             <a:r>
               <a:rPr lang="en-US" dirty="0" smtClean="0"/>
-              <a:t>You </a:t>
+              <a:t>You can find our open source stuff </a:t>
             </a:r>
             <a:r>
               <a:rPr lang="en-US" dirty="0" smtClean="0"/>
-              <a:t>can find</a:t>
+              <a:t>at</a:t>
             </a:r>
             <a:r>
               <a:rPr lang="en-US" dirty="0" smtClean="0"/>
-              <a:t> our open </a:t>
-            </a:r>
-            <a:r>
-              <a:rPr lang="en-US" dirty="0" smtClean="0"/>
-              <a:t>source stuff at </a:t>
-            </a:r>
+              <a:t>:</a:t>
+            </a:r>
+            <a:endParaRPr lang="en-US" dirty="0" smtClean="0"/>
+          </a:p>
+          <a:p>
+            <a:pPr marL="1085850" lvl="1" indent="-342900">
+              <a:buFont typeface="Arial" charset="0"/>
+              <a:buChar char="•"/>
+            </a:pPr>
             <a:r>
               <a:rPr lang="en-US" dirty="0" smtClean="0">
                 <a:hlinkClick r:id="rId3"/>
               </a:rPr>
-              <a:t>https://github.com/</a:t>
+              <a:t>https</a:t>
+            </a:r>
+            <a:r>
+              <a:rPr lang="en-US" dirty="0" smtClean="0">
+                <a:hlinkClick r:id="rId3"/>
+              </a:rPr>
+              <a:t>://github.com/</a:t>
             </a:r>
             <a:r>
               <a:rPr lang="en-US" dirty="0" smtClean="0">
@@ -14921,13 +14901,25 @@
             </a:r>
             <a:r>
               <a:rPr lang="en-US" dirty="0" smtClean="0"/>
-              <a:t> &amp; </a:t>
-            </a:r>
+              <a:t> </a:t>
+            </a:r>
+          </a:p>
+          <a:p>
+            <a:pPr marL="1085850" lvl="1" indent="-342900">
+              <a:buFont typeface="Arial" charset="0"/>
+              <a:buChar char="•"/>
+            </a:pPr>
             <a:r>
               <a:rPr lang="en-US" dirty="0" smtClean="0">
                 <a:hlinkClick r:id="rId4"/>
               </a:rPr>
-              <a:t>https://github.com/phobologic</a:t>
+              <a:t>https</a:t>
+            </a:r>
+            <a:r>
+              <a:rPr lang="en-US" dirty="0" smtClean="0">
+                <a:hlinkClick r:id="rId4"/>
+              </a:rPr>
+              <a:t>://github.com/phobologic</a:t>
             </a:r>
             <a:endParaRPr lang="en-US" dirty="0" smtClean="0"/>
           </a:p>
@@ -14947,10 +14939,58 @@
           </a:p>
         </p:txBody>
       </p:sp>
+      <p:pic>
+        <p:nvPicPr>
+          <p:cNvPr id="4" name="Picture 3" descr="ejholmes.jpeg"/>
+          <p:cNvPicPr>
+            <a:picLocks noChangeAspect="1"/>
+          </p:cNvPicPr>
+          <p:nvPr/>
+        </p:nvPicPr>
+        <p:blipFill>
+          <a:blip r:embed="rId5"/>
+          <a:stretch>
+            <a:fillRect/>
+          </a:stretch>
+        </p:blipFill>
+        <p:spPr>
+          <a:xfrm>
+            <a:off x="6468806" y="181075"/>
+            <a:ext cx="2290097" cy="2290097"/>
+          </a:xfrm>
+          <a:prstGeom prst="rect">
+            <a:avLst/>
+          </a:prstGeom>
+        </p:spPr>
+      </p:pic>
+      <p:pic>
+        <p:nvPicPr>
+          <p:cNvPr id="5" name="Picture 4" descr="mike &amp; archer.jpeg"/>
+          <p:cNvPicPr>
+            <a:picLocks noChangeAspect="1"/>
+          </p:cNvPicPr>
+          <p:nvPr/>
+        </p:nvPicPr>
+        <p:blipFill>
+          <a:blip r:embed="rId6"/>
+          <a:stretch>
+            <a:fillRect/>
+          </a:stretch>
+        </p:blipFill>
+        <p:spPr>
+          <a:xfrm>
+            <a:off x="6469853" y="2631218"/>
+            <a:ext cx="2285175" cy="2285175"/>
+          </a:xfrm>
+          <a:prstGeom prst="rect">
+            <a:avLst/>
+          </a:prstGeom>
+        </p:spPr>
+      </p:pic>
     </p:spTree>
     <p:extLst>
       <p:ext uri="{BB962C8B-B14F-4D97-AF65-F5344CB8AC3E}">
-        <p14:creationId xmlns:p14="http://schemas.microsoft.com/office/powerpoint/2010/main" xmlns:p="http://schemas.openxmlformats.org/presentationml/2006/main" xmlns:r="http://schemas.openxmlformats.org/officeDocument/2006/relationships" xmlns:a="http://schemas.openxmlformats.org/drawingml/2006/main" xmlns="" val="681947218"/>
+        <p14:creationId xmlns="" xmlns:a="http://schemas.openxmlformats.org/drawingml/2006/main" xmlns:r="http://schemas.openxmlformats.org/officeDocument/2006/relationships" xmlns:p="http://schemas.openxmlformats.org/presentationml/2006/main" xmlns:p14="http://schemas.microsoft.com/office/powerpoint/2010/main" xmlns:mv="urn:schemas-microsoft-com:mac:vml" xmlns:mc="http://schemas.openxmlformats.org/markup-compatibility/2006" val="681947218"/>
       </p:ext>
     </p:extLst>
   </p:cSld>
@@ -15467,7 +15507,7 @@
     </p:spTree>
     <p:extLst>
       <p:ext uri="{BB962C8B-B14F-4D97-AF65-F5344CB8AC3E}">
-        <p14:creationId xmlns:p14="http://schemas.microsoft.com/office/powerpoint/2010/main" xmlns:p="http://schemas.openxmlformats.org/presentationml/2006/main" xmlns:r="http://schemas.openxmlformats.org/officeDocument/2006/relationships" xmlns:a="http://schemas.openxmlformats.org/drawingml/2006/main" xmlns="" val="916509501"/>
+        <p14:creationId xmlns="" xmlns:a="http://schemas.openxmlformats.org/drawingml/2006/main" xmlns:r="http://schemas.openxmlformats.org/officeDocument/2006/relationships" xmlns:p="http://schemas.openxmlformats.org/presentationml/2006/main" xmlns:p14="http://schemas.microsoft.com/office/powerpoint/2010/main" xmlns:mv="urn:schemas-microsoft-com:mac:vml" xmlns:mc="http://schemas.openxmlformats.org/markup-compatibility/2006" val="916509501"/>
       </p:ext>
     </p:extLst>
   </p:cSld>
@@ -15822,7 +15862,7 @@
     </p:spTree>
     <p:extLst>
       <p:ext uri="{BB962C8B-B14F-4D97-AF65-F5344CB8AC3E}">
-        <p14:creationId xmlns:p14="http://schemas.microsoft.com/office/powerpoint/2010/main" xmlns:p="http://schemas.openxmlformats.org/presentationml/2006/main" xmlns:r="http://schemas.openxmlformats.org/officeDocument/2006/relationships" xmlns:a="http://schemas.openxmlformats.org/drawingml/2006/main" xmlns="" val="1698253457"/>
+        <p14:creationId xmlns="" xmlns:a="http://schemas.openxmlformats.org/drawingml/2006/main" xmlns:r="http://schemas.openxmlformats.org/officeDocument/2006/relationships" xmlns:p="http://schemas.openxmlformats.org/presentationml/2006/main" xmlns:p14="http://schemas.microsoft.com/office/powerpoint/2010/main" xmlns:mv="urn:schemas-microsoft-com:mac:vml" xmlns:mc="http://schemas.openxmlformats.org/markup-compatibility/2006" val="1698253457"/>
       </p:ext>
     </p:extLst>
   </p:cSld>
@@ -16239,7 +16279,7 @@
     </p:spTree>
     <p:extLst>
       <p:ext uri="{BB962C8B-B14F-4D97-AF65-F5344CB8AC3E}">
-        <p14:creationId xmlns:p14="http://schemas.microsoft.com/office/powerpoint/2010/main" xmlns:p="http://schemas.openxmlformats.org/presentationml/2006/main" xmlns:r="http://schemas.openxmlformats.org/officeDocument/2006/relationships" xmlns:a="http://schemas.openxmlformats.org/drawingml/2006/main" xmlns="" val="1139894538"/>
+        <p14:creationId xmlns="" xmlns:a="http://schemas.openxmlformats.org/drawingml/2006/main" xmlns:r="http://schemas.openxmlformats.org/officeDocument/2006/relationships" xmlns:p="http://schemas.openxmlformats.org/presentationml/2006/main" xmlns:p14="http://schemas.microsoft.com/office/powerpoint/2010/main" xmlns:mv="urn:schemas-microsoft-com:mac:vml" xmlns:mc="http://schemas.openxmlformats.org/markup-compatibility/2006" val="1139894538"/>
       </p:ext>
     </p:extLst>
   </p:cSld>
@@ -16545,7 +16585,7 @@
     </p:spTree>
     <p:extLst>
       <p:ext uri="{BB962C8B-B14F-4D97-AF65-F5344CB8AC3E}">
-        <p14:creationId xmlns:p14="http://schemas.microsoft.com/office/powerpoint/2010/main" xmlns:p="http://schemas.openxmlformats.org/presentationml/2006/main" xmlns:r="http://schemas.openxmlformats.org/officeDocument/2006/relationships" xmlns:a="http://schemas.openxmlformats.org/drawingml/2006/main" xmlns="" val="1007558359"/>
+        <p14:creationId xmlns="" xmlns:a="http://schemas.openxmlformats.org/drawingml/2006/main" xmlns:r="http://schemas.openxmlformats.org/officeDocument/2006/relationships" xmlns:p="http://schemas.openxmlformats.org/presentationml/2006/main" xmlns:p14="http://schemas.microsoft.com/office/powerpoint/2010/main" xmlns:mv="urn:schemas-microsoft-com:mac:vml" xmlns:mc="http://schemas.openxmlformats.org/markup-compatibility/2006" val="1007558359"/>
       </p:ext>
     </p:extLst>
   </p:cSld>
@@ -16605,7 +16645,7 @@
     </p:spTree>
     <p:extLst>
       <p:ext uri="{BB962C8B-B14F-4D97-AF65-F5344CB8AC3E}">
-        <p14:creationId xmlns:p14="http://schemas.microsoft.com/office/powerpoint/2010/main" xmlns:p="http://schemas.openxmlformats.org/presentationml/2006/main" xmlns:r="http://schemas.openxmlformats.org/officeDocument/2006/relationships" xmlns:a="http://schemas.openxmlformats.org/drawingml/2006/main" xmlns="" val="1047632536"/>
+        <p14:creationId xmlns="" xmlns:a="http://schemas.openxmlformats.org/drawingml/2006/main" xmlns:r="http://schemas.openxmlformats.org/officeDocument/2006/relationships" xmlns:p="http://schemas.openxmlformats.org/presentationml/2006/main" xmlns:p14="http://schemas.microsoft.com/office/powerpoint/2010/main" xmlns:mv="urn:schemas-microsoft-com:mac:vml" xmlns:mc="http://schemas.openxmlformats.org/markup-compatibility/2006" val="1047632536"/>
       </p:ext>
     </p:extLst>
   </p:cSld>
@@ -16665,7 +16705,7 @@
     </p:spTree>
     <p:extLst>
       <p:ext uri="{BB962C8B-B14F-4D97-AF65-F5344CB8AC3E}">
-        <p14:creationId xmlns:p14="http://schemas.microsoft.com/office/powerpoint/2010/main" xmlns:p="http://schemas.openxmlformats.org/presentationml/2006/main" xmlns:r="http://schemas.openxmlformats.org/officeDocument/2006/relationships" xmlns:a="http://schemas.openxmlformats.org/drawingml/2006/main" xmlns="" val="1065250353"/>
+        <p14:creationId xmlns="" xmlns:a="http://schemas.openxmlformats.org/drawingml/2006/main" xmlns:r="http://schemas.openxmlformats.org/officeDocument/2006/relationships" xmlns:p="http://schemas.openxmlformats.org/presentationml/2006/main" xmlns:p14="http://schemas.microsoft.com/office/powerpoint/2010/main" xmlns:mv="urn:schemas-microsoft-com:mac:vml" xmlns:mc="http://schemas.openxmlformats.org/markup-compatibility/2006" val="1065250353"/>
       </p:ext>
     </p:extLst>
   </p:cSld>
@@ -16790,7 +16830,7 @@
     </p:spTree>
     <p:extLst>
       <p:ext uri="{BB962C8B-B14F-4D97-AF65-F5344CB8AC3E}">
-        <p14:creationId xmlns:p14="http://schemas.microsoft.com/office/powerpoint/2010/main" xmlns:p="http://schemas.openxmlformats.org/presentationml/2006/main" xmlns:r="http://schemas.openxmlformats.org/officeDocument/2006/relationships" xmlns:a="http://schemas.openxmlformats.org/drawingml/2006/main" xmlns="" val="1188070149"/>
+        <p14:creationId xmlns="" xmlns:a="http://schemas.openxmlformats.org/drawingml/2006/main" xmlns:r="http://schemas.openxmlformats.org/officeDocument/2006/relationships" xmlns:p="http://schemas.openxmlformats.org/presentationml/2006/main" xmlns:p14="http://schemas.microsoft.com/office/powerpoint/2010/main" xmlns:mv="urn:schemas-microsoft-com:mac:vml" xmlns:mc="http://schemas.openxmlformats.org/markup-compatibility/2006" val="1188070149"/>
       </p:ext>
     </p:extLst>
   </p:cSld>
@@ -16859,7 +16899,7 @@
           <a:blip r:embed="rId3">
             <a:extLst>
               <a:ext uri="{28A0092B-C50C-407E-A947-70E740481C1C}">
-                <a14:useLocalDpi xmlns:a14="http://schemas.microsoft.com/office/drawing/2010/main" xmlns:p="http://schemas.openxmlformats.org/presentationml/2006/main" xmlns:r="http://schemas.openxmlformats.org/officeDocument/2006/relationships" xmlns:a="http://schemas.openxmlformats.org/drawingml/2006/main" xmlns="" val="0"/>
+                <a14:useLocalDpi xmlns="" xmlns:a="http://schemas.openxmlformats.org/drawingml/2006/main" xmlns:r="http://schemas.openxmlformats.org/officeDocument/2006/relationships" xmlns:p="http://schemas.openxmlformats.org/presentationml/2006/main" xmlns:a14="http://schemas.microsoft.com/office/drawing/2010/main" xmlns:mv="urn:schemas-microsoft-com:mac:vml" xmlns:mc="http://schemas.openxmlformats.org/markup-compatibility/2006" val="0"/>
               </a:ext>
             </a:extLst>
           </a:blip>
@@ -16928,7 +16968,7 @@
           <a:blip r:embed="rId4">
             <a:extLst>
               <a:ext uri="{28A0092B-C50C-407E-A947-70E740481C1C}">
-                <a14:useLocalDpi xmlns:a14="http://schemas.microsoft.com/office/drawing/2010/main" xmlns:p="http://schemas.openxmlformats.org/presentationml/2006/main" xmlns:r="http://schemas.openxmlformats.org/officeDocument/2006/relationships" xmlns:a="http://schemas.openxmlformats.org/drawingml/2006/main" xmlns="" val="0"/>
+                <a14:useLocalDpi xmlns="" xmlns:a="http://schemas.openxmlformats.org/drawingml/2006/main" xmlns:r="http://schemas.openxmlformats.org/officeDocument/2006/relationships" xmlns:p="http://schemas.openxmlformats.org/presentationml/2006/main" xmlns:a14="http://schemas.microsoft.com/office/drawing/2010/main" xmlns:mv="urn:schemas-microsoft-com:mac:vml" xmlns:mc="http://schemas.openxmlformats.org/markup-compatibility/2006" val="0"/>
               </a:ext>
             </a:extLst>
           </a:blip>
@@ -17018,7 +17058,7 @@
     </p:spTree>
     <p:extLst>
       <p:ext uri="{BB962C8B-B14F-4D97-AF65-F5344CB8AC3E}">
-        <p14:creationId xmlns:p14="http://schemas.microsoft.com/office/powerpoint/2010/main" xmlns:p="http://schemas.openxmlformats.org/presentationml/2006/main" xmlns:r="http://schemas.openxmlformats.org/officeDocument/2006/relationships" xmlns:a="http://schemas.openxmlformats.org/drawingml/2006/main" xmlns="" val="420560106"/>
+        <p14:creationId xmlns="" xmlns:a="http://schemas.openxmlformats.org/drawingml/2006/main" xmlns:r="http://schemas.openxmlformats.org/officeDocument/2006/relationships" xmlns:p="http://schemas.openxmlformats.org/presentationml/2006/main" xmlns:p14="http://schemas.microsoft.com/office/powerpoint/2010/main" xmlns:mv="urn:schemas-microsoft-com:mac:vml" xmlns:mc="http://schemas.openxmlformats.org/markup-compatibility/2006" val="420560106"/>
       </p:ext>
     </p:extLst>
   </p:cSld>
@@ -17087,7 +17127,7 @@
           <a:blip r:embed="rId3">
             <a:extLst>
               <a:ext uri="{28A0092B-C50C-407E-A947-70E740481C1C}">
-                <a14:useLocalDpi xmlns:a14="http://schemas.microsoft.com/office/drawing/2010/main" xmlns:p="http://schemas.openxmlformats.org/presentationml/2006/main" xmlns:r="http://schemas.openxmlformats.org/officeDocument/2006/relationships" xmlns:a="http://schemas.openxmlformats.org/drawingml/2006/main" xmlns="" val="0"/>
+                <a14:useLocalDpi xmlns="" xmlns:a="http://schemas.openxmlformats.org/drawingml/2006/main" xmlns:r="http://schemas.openxmlformats.org/officeDocument/2006/relationships" xmlns:p="http://schemas.openxmlformats.org/presentationml/2006/main" xmlns:a14="http://schemas.microsoft.com/office/drawing/2010/main" xmlns:mv="urn:schemas-microsoft-com:mac:vml" xmlns:mc="http://schemas.openxmlformats.org/markup-compatibility/2006" val="0"/>
               </a:ext>
             </a:extLst>
           </a:blip>
@@ -17288,7 +17328,7 @@
     </p:spTree>
     <p:extLst>
       <p:ext uri="{BB962C8B-B14F-4D97-AF65-F5344CB8AC3E}">
-        <p14:creationId xmlns:p14="http://schemas.microsoft.com/office/powerpoint/2010/main" xmlns:p="http://schemas.openxmlformats.org/presentationml/2006/main" xmlns:r="http://schemas.openxmlformats.org/officeDocument/2006/relationships" xmlns:a="http://schemas.openxmlformats.org/drawingml/2006/main" xmlns="" val="1585635513"/>
+        <p14:creationId xmlns="" xmlns:a="http://schemas.openxmlformats.org/drawingml/2006/main" xmlns:r="http://schemas.openxmlformats.org/officeDocument/2006/relationships" xmlns:p="http://schemas.openxmlformats.org/presentationml/2006/main" xmlns:p14="http://schemas.microsoft.com/office/powerpoint/2010/main" xmlns:mv="urn:schemas-microsoft-com:mac:vml" xmlns:mc="http://schemas.openxmlformats.org/markup-compatibility/2006" val="1585635513"/>
       </p:ext>
     </p:extLst>
   </p:cSld>
@@ -17400,7 +17440,7 @@
           <a:blip r:embed="rId3">
             <a:extLst>
               <a:ext uri="{28A0092B-C50C-407E-A947-70E740481C1C}">
-                <a14:useLocalDpi xmlns:a14="http://schemas.microsoft.com/office/drawing/2010/main" xmlns:p="http://schemas.openxmlformats.org/presentationml/2006/main" xmlns:r="http://schemas.openxmlformats.org/officeDocument/2006/relationships" xmlns:a="http://schemas.openxmlformats.org/drawingml/2006/main" xmlns="" val="0"/>
+                <a14:useLocalDpi xmlns="" xmlns:a="http://schemas.openxmlformats.org/drawingml/2006/main" xmlns:r="http://schemas.openxmlformats.org/officeDocument/2006/relationships" xmlns:p="http://schemas.openxmlformats.org/presentationml/2006/main" xmlns:a14="http://schemas.microsoft.com/office/drawing/2010/main" xmlns:mv="urn:schemas-microsoft-com:mac:vml" xmlns:mc="http://schemas.openxmlformats.org/markup-compatibility/2006" val="0"/>
               </a:ext>
             </a:extLst>
           </a:blip>
@@ -17430,7 +17470,7 @@
           <a:blip r:embed="rId4">
             <a:extLst>
               <a:ext uri="{28A0092B-C50C-407E-A947-70E740481C1C}">
-                <a14:useLocalDpi xmlns:a14="http://schemas.microsoft.com/office/drawing/2010/main" xmlns:p="http://schemas.openxmlformats.org/presentationml/2006/main" xmlns:r="http://schemas.openxmlformats.org/officeDocument/2006/relationships" xmlns:a="http://schemas.openxmlformats.org/drawingml/2006/main" xmlns="" val="0"/>
+                <a14:useLocalDpi xmlns="" xmlns:a="http://schemas.openxmlformats.org/drawingml/2006/main" xmlns:r="http://schemas.openxmlformats.org/officeDocument/2006/relationships" xmlns:p="http://schemas.openxmlformats.org/presentationml/2006/main" xmlns:a14="http://schemas.microsoft.com/office/drawing/2010/main" xmlns:mv="urn:schemas-microsoft-com:mac:vml" xmlns:mc="http://schemas.openxmlformats.org/markup-compatibility/2006" val="0"/>
               </a:ext>
             </a:extLst>
           </a:blip>
@@ -17511,7 +17551,7 @@
     </p:spTree>
     <p:extLst>
       <p:ext uri="{BB962C8B-B14F-4D97-AF65-F5344CB8AC3E}">
-        <p14:creationId xmlns:p14="http://schemas.microsoft.com/office/powerpoint/2010/main" xmlns:p="http://schemas.openxmlformats.org/presentationml/2006/main" xmlns:r="http://schemas.openxmlformats.org/officeDocument/2006/relationships" xmlns:a="http://schemas.openxmlformats.org/drawingml/2006/main" xmlns="" val="190712800"/>
+        <p14:creationId xmlns="" xmlns:a="http://schemas.openxmlformats.org/drawingml/2006/main" xmlns:r="http://schemas.openxmlformats.org/officeDocument/2006/relationships" xmlns:p="http://schemas.openxmlformats.org/presentationml/2006/main" xmlns:p14="http://schemas.microsoft.com/office/powerpoint/2010/main" xmlns:mv="urn:schemas-microsoft-com:mac:vml" xmlns:mc="http://schemas.openxmlformats.org/markup-compatibility/2006" val="190712800"/>
       </p:ext>
     </p:extLst>
   </p:cSld>
@@ -17601,6 +17641,7 @@
               <a:rPr lang="en-US" dirty="0" smtClean="0"/>
               <a:t>Chat/Announcements/Files</a:t>
             </a:r>
+            <a:endParaRPr lang="en-US" dirty="0" smtClean="0"/>
           </a:p>
           <a:p>
             <a:pPr marL="342900" indent="-342900">
@@ -17609,8 +17650,17 @@
             </a:pPr>
             <a:r>
               <a:rPr lang="en-US" dirty="0" smtClean="0"/>
-              <a:t>~25(?) million users</a:t>
-            </a:r>
+              <a:t>Over 30</a:t>
+            </a:r>
+            <a:r>
+              <a:rPr lang="en-US" dirty="0" smtClean="0"/>
+              <a:t> </a:t>
+            </a:r>
+            <a:r>
+              <a:rPr lang="en-US" dirty="0" smtClean="0"/>
+              <a:t>million users</a:t>
+            </a:r>
+            <a:endParaRPr lang="en-US" dirty="0" smtClean="0"/>
           </a:p>
           <a:p>
             <a:pPr marL="342900" indent="-342900">
@@ -17619,8 +17669,9 @@
             </a:pPr>
             <a:r>
               <a:rPr lang="en-US" dirty="0" smtClean="0"/>
-              <a:t>~350(?) users added every day</a:t>
-            </a:r>
+              <a:t>Used actively in ~50% of U.S. public schools</a:t>
+            </a:r>
+            <a:endParaRPr lang="en-US" dirty="0" smtClean="0"/>
           </a:p>
           <a:p>
             <a:pPr marL="342900" indent="-342900">
@@ -17629,9 +17680,8 @@
             </a:pPr>
             <a:r>
               <a:rPr lang="en-US" dirty="0" smtClean="0"/>
-              <a:t>~5(?) million messages per day</a:t>
-            </a:r>
-            <a:endParaRPr lang="en-US" dirty="0"/>
+              <a:t>Over 2 billion messages delivered</a:t>
+            </a:r>
           </a:p>
           <a:p>
             <a:pPr marL="342900" indent="-342900">
@@ -17640,7 +17690,11 @@
             </a:pPr>
             <a:r>
               <a:rPr lang="en-US" dirty="0" smtClean="0"/>
-              <a:t>~60 employees. ~30 engineers.</a:t>
+              <a:t>~50 </a:t>
+            </a:r>
+            <a:r>
+              <a:rPr lang="en-US" dirty="0" smtClean="0"/>
+              <a:t>employees. ~30 engineers.</a:t>
             </a:r>
           </a:p>
         </p:txBody>
@@ -17657,7 +17711,7 @@
           <a:blip r:embed="rId3">
             <a:extLst>
               <a:ext uri="{28A0092B-C50C-407E-A947-70E740481C1C}">
-                <a14:useLocalDpi xmlns:a14="http://schemas.microsoft.com/office/drawing/2010/main" xmlns:p="http://schemas.openxmlformats.org/presentationml/2006/main" xmlns:r="http://schemas.openxmlformats.org/officeDocument/2006/relationships" xmlns:a="http://schemas.openxmlformats.org/drawingml/2006/main" xmlns="" val="0"/>
+                <a14:useLocalDpi xmlns="" xmlns:a="http://schemas.openxmlformats.org/drawingml/2006/main" xmlns:r="http://schemas.openxmlformats.org/officeDocument/2006/relationships" xmlns:p="http://schemas.openxmlformats.org/presentationml/2006/main" xmlns:a14="http://schemas.microsoft.com/office/drawing/2010/main" xmlns:mv="urn:schemas-microsoft-com:mac:vml" xmlns:mc="http://schemas.openxmlformats.org/markup-compatibility/2006" val="0"/>
               </a:ext>
             </a:extLst>
           </a:blip>
@@ -17678,7 +17732,7 @@
     </p:spTree>
     <p:extLst>
       <p:ext uri="{BB962C8B-B14F-4D97-AF65-F5344CB8AC3E}">
-        <p14:creationId xmlns:p14="http://schemas.microsoft.com/office/powerpoint/2010/main" xmlns:p="http://schemas.openxmlformats.org/presentationml/2006/main" xmlns:r="http://schemas.openxmlformats.org/officeDocument/2006/relationships" xmlns:a="http://schemas.openxmlformats.org/drawingml/2006/main" xmlns="" val="589906508"/>
+        <p14:creationId xmlns="" xmlns:a="http://schemas.openxmlformats.org/drawingml/2006/main" xmlns:r="http://schemas.openxmlformats.org/officeDocument/2006/relationships" xmlns:p="http://schemas.openxmlformats.org/presentationml/2006/main" xmlns:p14="http://schemas.microsoft.com/office/powerpoint/2010/main" xmlns:mv="urn:schemas-microsoft-com:mac:vml" xmlns:mc="http://schemas.openxmlformats.org/markup-compatibility/2006" val="589906508"/>
       </p:ext>
     </p:extLst>
   </p:cSld>
@@ -17829,7 +17883,7 @@
     </p:spTree>
     <p:extLst>
       <p:ext uri="{BB962C8B-B14F-4D97-AF65-F5344CB8AC3E}">
-        <p14:creationId xmlns:p14="http://schemas.microsoft.com/office/powerpoint/2010/main" xmlns:p="http://schemas.openxmlformats.org/presentationml/2006/main" xmlns:r="http://schemas.openxmlformats.org/officeDocument/2006/relationships" xmlns:a="http://schemas.openxmlformats.org/drawingml/2006/main" xmlns="" val="1962145869"/>
+        <p14:creationId xmlns="" xmlns:a="http://schemas.openxmlformats.org/drawingml/2006/main" xmlns:r="http://schemas.openxmlformats.org/officeDocument/2006/relationships" xmlns:p="http://schemas.openxmlformats.org/presentationml/2006/main" xmlns:p14="http://schemas.microsoft.com/office/powerpoint/2010/main" xmlns:mv="urn:schemas-microsoft-com:mac:vml" xmlns:mc="http://schemas.openxmlformats.org/markup-compatibility/2006" val="1962145869"/>
       </p:ext>
     </p:extLst>
   </p:cSld>
@@ -17950,7 +18004,7 @@
     </p:spTree>
     <p:extLst>
       <p:ext uri="{BB962C8B-B14F-4D97-AF65-F5344CB8AC3E}">
-        <p14:creationId xmlns:p14="http://schemas.microsoft.com/office/powerpoint/2010/main" xmlns:p="http://schemas.openxmlformats.org/presentationml/2006/main" xmlns:r="http://schemas.openxmlformats.org/officeDocument/2006/relationships" xmlns:a="http://schemas.openxmlformats.org/drawingml/2006/main" xmlns="" val="407593370"/>
+        <p14:creationId xmlns="" xmlns:a="http://schemas.openxmlformats.org/drawingml/2006/main" xmlns:r="http://schemas.openxmlformats.org/officeDocument/2006/relationships" xmlns:p="http://schemas.openxmlformats.org/presentationml/2006/main" xmlns:p14="http://schemas.microsoft.com/office/powerpoint/2010/main" xmlns:mv="urn:schemas-microsoft-com:mac:vml" xmlns:mc="http://schemas.openxmlformats.org/markup-compatibility/2006" val="407593370"/>
       </p:ext>
     </p:extLst>
   </p:cSld>
@@ -18006,7 +18060,7 @@
     </p:spTree>
     <p:extLst>
       <p:ext uri="{BB962C8B-B14F-4D97-AF65-F5344CB8AC3E}">
-        <p14:creationId xmlns:p14="http://schemas.microsoft.com/office/powerpoint/2010/main" xmlns:p="http://schemas.openxmlformats.org/presentationml/2006/main" xmlns:r="http://schemas.openxmlformats.org/officeDocument/2006/relationships" xmlns:a="http://schemas.openxmlformats.org/drawingml/2006/main" xmlns="" val="1954272061"/>
+        <p14:creationId xmlns="" xmlns:a="http://schemas.openxmlformats.org/drawingml/2006/main" xmlns:r="http://schemas.openxmlformats.org/officeDocument/2006/relationships" xmlns:p="http://schemas.openxmlformats.org/presentationml/2006/main" xmlns:p14="http://schemas.microsoft.com/office/powerpoint/2010/main" xmlns:mv="urn:schemas-microsoft-com:mac:vml" xmlns:mc="http://schemas.openxmlformats.org/markup-compatibility/2006" val="1954272061"/>
       </p:ext>
     </p:extLst>
   </p:cSld>
@@ -18043,7 +18097,7 @@
     </p:spTree>
     <p:extLst>
       <p:ext uri="{BB962C8B-B14F-4D97-AF65-F5344CB8AC3E}">
-        <p14:creationId xmlns:p14="http://schemas.microsoft.com/office/powerpoint/2010/main" xmlns:p="http://schemas.openxmlformats.org/presentationml/2006/main" xmlns:r="http://schemas.openxmlformats.org/officeDocument/2006/relationships" xmlns:a="http://schemas.openxmlformats.org/drawingml/2006/main" xmlns="" val="1835632009"/>
+        <p14:creationId xmlns="" xmlns:a="http://schemas.openxmlformats.org/drawingml/2006/main" xmlns:r="http://schemas.openxmlformats.org/officeDocument/2006/relationships" xmlns:p="http://schemas.openxmlformats.org/presentationml/2006/main" xmlns:p14="http://schemas.microsoft.com/office/powerpoint/2010/main" xmlns:mv="urn:schemas-microsoft-com:mac:vml" xmlns:mc="http://schemas.openxmlformats.org/markup-compatibility/2006" val="1835632009"/>
       </p:ext>
     </p:extLst>
   </p:cSld>
@@ -18428,7 +18482,7 @@
     </p:spTree>
     <p:extLst>
       <p:ext uri="{BB962C8B-B14F-4D97-AF65-F5344CB8AC3E}">
-        <p14:creationId xmlns:p14="http://schemas.microsoft.com/office/powerpoint/2010/main" xmlns:p="http://schemas.openxmlformats.org/presentationml/2006/main" xmlns:r="http://schemas.openxmlformats.org/officeDocument/2006/relationships" xmlns:a="http://schemas.openxmlformats.org/drawingml/2006/main" xmlns="" val="4193510302"/>
+        <p14:creationId xmlns="" xmlns:a="http://schemas.openxmlformats.org/drawingml/2006/main" xmlns:r="http://schemas.openxmlformats.org/officeDocument/2006/relationships" xmlns:p="http://schemas.openxmlformats.org/presentationml/2006/main" xmlns:p14="http://schemas.microsoft.com/office/powerpoint/2010/main" xmlns:mv="urn:schemas-microsoft-com:mac:vml" xmlns:mc="http://schemas.openxmlformats.org/markup-compatibility/2006" val="4193510302"/>
       </p:ext>
     </p:extLst>
   </p:cSld>
@@ -18914,7 +18968,7 @@
           <a:blip r:embed="rId3">
             <a:extLst>
               <a:ext uri="{28A0092B-C50C-407E-A947-70E740481C1C}">
-                <a14:useLocalDpi xmlns:a14="http://schemas.microsoft.com/office/drawing/2010/main" xmlns:p="http://schemas.openxmlformats.org/presentationml/2006/main" xmlns:r="http://schemas.openxmlformats.org/officeDocument/2006/relationships" xmlns:a="http://schemas.openxmlformats.org/drawingml/2006/main" xmlns="" val="0"/>
+                <a14:useLocalDpi xmlns="" xmlns:a="http://schemas.openxmlformats.org/drawingml/2006/main" xmlns:r="http://schemas.openxmlformats.org/officeDocument/2006/relationships" xmlns:p="http://schemas.openxmlformats.org/presentationml/2006/main" xmlns:a14="http://schemas.microsoft.com/office/drawing/2010/main" xmlns:mv="urn:schemas-microsoft-com:mac:vml" xmlns:mc="http://schemas.openxmlformats.org/markup-compatibility/2006" val="0"/>
               </a:ext>
             </a:extLst>
           </a:blip>
@@ -18979,7 +19033,7 @@
     </p:spTree>
     <p:extLst>
       <p:ext uri="{BB962C8B-B14F-4D97-AF65-F5344CB8AC3E}">
-        <p14:creationId xmlns:p14="http://schemas.microsoft.com/office/powerpoint/2010/main" xmlns:p="http://schemas.openxmlformats.org/presentationml/2006/main" xmlns:r="http://schemas.openxmlformats.org/officeDocument/2006/relationships" xmlns:a="http://schemas.openxmlformats.org/drawingml/2006/main" xmlns="" val="4184592893"/>
+        <p14:creationId xmlns="" xmlns:a="http://schemas.openxmlformats.org/drawingml/2006/main" xmlns:r="http://schemas.openxmlformats.org/officeDocument/2006/relationships" xmlns:p="http://schemas.openxmlformats.org/presentationml/2006/main" xmlns:p14="http://schemas.microsoft.com/office/powerpoint/2010/main" xmlns:mv="urn:schemas-microsoft-com:mac:vml" xmlns:mc="http://schemas.openxmlformats.org/markup-compatibility/2006" val="4184592893"/>
       </p:ext>
     </p:extLst>
   </p:cSld>
@@ -19307,7 +19361,7 @@
           <a:blip r:embed="rId3">
             <a:extLst>
               <a:ext uri="{28A0092B-C50C-407E-A947-70E740481C1C}">
-                <a14:useLocalDpi xmlns:a14="http://schemas.microsoft.com/office/drawing/2010/main" xmlns:p="http://schemas.openxmlformats.org/presentationml/2006/main" xmlns:r="http://schemas.openxmlformats.org/officeDocument/2006/relationships" xmlns:a="http://schemas.openxmlformats.org/drawingml/2006/main" xmlns="" val="0"/>
+                <a14:useLocalDpi xmlns="" xmlns:a="http://schemas.openxmlformats.org/drawingml/2006/main" xmlns:r="http://schemas.openxmlformats.org/officeDocument/2006/relationships" xmlns:p="http://schemas.openxmlformats.org/presentationml/2006/main" xmlns:a14="http://schemas.microsoft.com/office/drawing/2010/main" xmlns:mv="urn:schemas-microsoft-com:mac:vml" xmlns:mc="http://schemas.openxmlformats.org/markup-compatibility/2006" val="0"/>
               </a:ext>
             </a:extLst>
           </a:blip>
@@ -19372,7 +19426,7 @@
     </p:spTree>
     <p:extLst>
       <p:ext uri="{BB962C8B-B14F-4D97-AF65-F5344CB8AC3E}">
-        <p14:creationId xmlns:p14="http://schemas.microsoft.com/office/powerpoint/2010/main" xmlns:p="http://schemas.openxmlformats.org/presentationml/2006/main" xmlns:r="http://schemas.openxmlformats.org/officeDocument/2006/relationships" xmlns:a="http://schemas.openxmlformats.org/drawingml/2006/main" xmlns="" val="4042946778"/>
+        <p14:creationId xmlns="" xmlns:a="http://schemas.openxmlformats.org/drawingml/2006/main" xmlns:r="http://schemas.openxmlformats.org/officeDocument/2006/relationships" xmlns:p="http://schemas.openxmlformats.org/presentationml/2006/main" xmlns:p14="http://schemas.microsoft.com/office/powerpoint/2010/main" xmlns:mv="urn:schemas-microsoft-com:mac:vml" xmlns:mc="http://schemas.openxmlformats.org/markup-compatibility/2006" val="4042946778"/>
       </p:ext>
     </p:extLst>
   </p:cSld>
@@ -19455,7 +19509,7 @@
             <a:blip r:embed="rId2">
               <a:extLst>
                 <a:ext uri="{28A0092B-C50C-407E-A947-70E740481C1C}">
-                  <a14:useLocalDpi xmlns:a14="http://schemas.microsoft.com/office/drawing/2010/main" xmlns:p="http://schemas.openxmlformats.org/presentationml/2006/main" xmlns:r="http://schemas.openxmlformats.org/officeDocument/2006/relationships" xmlns:a="http://schemas.openxmlformats.org/drawingml/2006/main" xmlns="" val="0"/>
+                  <a14:useLocalDpi xmlns="" xmlns:a="http://schemas.openxmlformats.org/drawingml/2006/main" xmlns:r="http://schemas.openxmlformats.org/officeDocument/2006/relationships" xmlns:p="http://schemas.openxmlformats.org/presentationml/2006/main" xmlns:a14="http://schemas.microsoft.com/office/drawing/2010/main" xmlns:mv="urn:schemas-microsoft-com:mac:vml" xmlns:mc="http://schemas.openxmlformats.org/markup-compatibility/2006" val="0"/>
                 </a:ext>
               </a:extLst>
             </a:blip>
@@ -19485,7 +19539,7 @@
             <a:blip r:embed="rId3">
               <a:extLst>
                 <a:ext uri="{28A0092B-C50C-407E-A947-70E740481C1C}">
-                  <a14:useLocalDpi xmlns:a14="http://schemas.microsoft.com/office/drawing/2010/main" xmlns:p="http://schemas.openxmlformats.org/presentationml/2006/main" xmlns:r="http://schemas.openxmlformats.org/officeDocument/2006/relationships" xmlns:a="http://schemas.openxmlformats.org/drawingml/2006/main" xmlns="" val="0"/>
+                  <a14:useLocalDpi xmlns="" xmlns:a="http://schemas.openxmlformats.org/drawingml/2006/main" xmlns:r="http://schemas.openxmlformats.org/officeDocument/2006/relationships" xmlns:p="http://schemas.openxmlformats.org/presentationml/2006/main" xmlns:a14="http://schemas.microsoft.com/office/drawing/2010/main" xmlns:mv="urn:schemas-microsoft-com:mac:vml" xmlns:mc="http://schemas.openxmlformats.org/markup-compatibility/2006" val="0"/>
                 </a:ext>
               </a:extLst>
             </a:blip>
@@ -19530,7 +19584,7 @@
             <a:blip r:embed="rId4">
               <a:extLst>
                 <a:ext uri="{28A0092B-C50C-407E-A947-70E740481C1C}">
-                  <a14:useLocalDpi xmlns:a14="http://schemas.microsoft.com/office/drawing/2010/main" xmlns:p="http://schemas.openxmlformats.org/presentationml/2006/main" xmlns:r="http://schemas.openxmlformats.org/officeDocument/2006/relationships" xmlns:a="http://schemas.openxmlformats.org/drawingml/2006/main" xmlns="" val="0"/>
+                  <a14:useLocalDpi xmlns="" xmlns:a="http://schemas.openxmlformats.org/drawingml/2006/main" xmlns:r="http://schemas.openxmlformats.org/officeDocument/2006/relationships" xmlns:p="http://schemas.openxmlformats.org/presentationml/2006/main" xmlns:a14="http://schemas.microsoft.com/office/drawing/2010/main" xmlns:mv="urn:schemas-microsoft-com:mac:vml" xmlns:mc="http://schemas.openxmlformats.org/markup-compatibility/2006" val="0"/>
                 </a:ext>
               </a:extLst>
             </a:blip>
@@ -19560,7 +19614,7 @@
             <a:blip r:embed="rId5">
               <a:extLst>
                 <a:ext uri="{28A0092B-C50C-407E-A947-70E740481C1C}">
-                  <a14:useLocalDpi xmlns:a14="http://schemas.microsoft.com/office/drawing/2010/main" xmlns:p="http://schemas.openxmlformats.org/presentationml/2006/main" xmlns:r="http://schemas.openxmlformats.org/officeDocument/2006/relationships" xmlns:a="http://schemas.openxmlformats.org/drawingml/2006/main" xmlns="" val="0"/>
+                  <a14:useLocalDpi xmlns="" xmlns:a="http://schemas.openxmlformats.org/drawingml/2006/main" xmlns:r="http://schemas.openxmlformats.org/officeDocument/2006/relationships" xmlns:p="http://schemas.openxmlformats.org/presentationml/2006/main" xmlns:a14="http://schemas.microsoft.com/office/drawing/2010/main" xmlns:mv="urn:schemas-microsoft-com:mac:vml" xmlns:mc="http://schemas.openxmlformats.org/markup-compatibility/2006" val="0"/>
                 </a:ext>
               </a:extLst>
             </a:blip>
@@ -19590,7 +19644,7 @@
             <a:blip r:embed="rId6">
               <a:extLst>
                 <a:ext uri="{28A0092B-C50C-407E-A947-70E740481C1C}">
-                  <a14:useLocalDpi xmlns:a14="http://schemas.microsoft.com/office/drawing/2010/main" xmlns:p="http://schemas.openxmlformats.org/presentationml/2006/main" xmlns:r="http://schemas.openxmlformats.org/officeDocument/2006/relationships" xmlns:a="http://schemas.openxmlformats.org/drawingml/2006/main" xmlns="" val="0"/>
+                  <a14:useLocalDpi xmlns="" xmlns:a="http://schemas.openxmlformats.org/drawingml/2006/main" xmlns:r="http://schemas.openxmlformats.org/officeDocument/2006/relationships" xmlns:p="http://schemas.openxmlformats.org/presentationml/2006/main" xmlns:a14="http://schemas.microsoft.com/office/drawing/2010/main" xmlns:mv="urn:schemas-microsoft-com:mac:vml" xmlns:mc="http://schemas.openxmlformats.org/markup-compatibility/2006" val="0"/>
                 </a:ext>
               </a:extLst>
             </a:blip>
@@ -19635,7 +19689,7 @@
             <a:blip r:embed="rId7">
               <a:extLst>
                 <a:ext uri="{28A0092B-C50C-407E-A947-70E740481C1C}">
-                  <a14:useLocalDpi xmlns:a14="http://schemas.microsoft.com/office/drawing/2010/main" xmlns:p="http://schemas.openxmlformats.org/presentationml/2006/main" xmlns:r="http://schemas.openxmlformats.org/officeDocument/2006/relationships" xmlns:a="http://schemas.openxmlformats.org/drawingml/2006/main" xmlns="" val="0"/>
+                  <a14:useLocalDpi xmlns="" xmlns:a="http://schemas.openxmlformats.org/drawingml/2006/main" xmlns:r="http://schemas.openxmlformats.org/officeDocument/2006/relationships" xmlns:p="http://schemas.openxmlformats.org/presentationml/2006/main" xmlns:a14="http://schemas.microsoft.com/office/drawing/2010/main" xmlns:mv="urn:schemas-microsoft-com:mac:vml" xmlns:mc="http://schemas.openxmlformats.org/markup-compatibility/2006" val="0"/>
                 </a:ext>
               </a:extLst>
             </a:blip>
@@ -19665,7 +19719,7 @@
             <a:blip r:embed="rId8">
               <a:extLst>
                 <a:ext uri="{28A0092B-C50C-407E-A947-70E740481C1C}">
-                  <a14:useLocalDpi xmlns:a14="http://schemas.microsoft.com/office/drawing/2010/main" xmlns:p="http://schemas.openxmlformats.org/presentationml/2006/main" xmlns:r="http://schemas.openxmlformats.org/officeDocument/2006/relationships" xmlns:a="http://schemas.openxmlformats.org/drawingml/2006/main" xmlns="" val="0"/>
+                  <a14:useLocalDpi xmlns="" xmlns:a="http://schemas.openxmlformats.org/drawingml/2006/main" xmlns:r="http://schemas.openxmlformats.org/officeDocument/2006/relationships" xmlns:p="http://schemas.openxmlformats.org/presentationml/2006/main" xmlns:a14="http://schemas.microsoft.com/office/drawing/2010/main" xmlns:mv="urn:schemas-microsoft-com:mac:vml" xmlns:mc="http://schemas.openxmlformats.org/markup-compatibility/2006" val="0"/>
                 </a:ext>
               </a:extLst>
             </a:blip>
@@ -19710,7 +19764,7 @@
             <a:blip r:embed="rId9">
               <a:extLst>
                 <a:ext uri="{28A0092B-C50C-407E-A947-70E740481C1C}">
-                  <a14:useLocalDpi xmlns:a14="http://schemas.microsoft.com/office/drawing/2010/main" xmlns:p="http://schemas.openxmlformats.org/presentationml/2006/main" xmlns:r="http://schemas.openxmlformats.org/officeDocument/2006/relationships" xmlns:a="http://schemas.openxmlformats.org/drawingml/2006/main" xmlns="" val="0"/>
+                  <a14:useLocalDpi xmlns="" xmlns:a="http://schemas.openxmlformats.org/drawingml/2006/main" xmlns:r="http://schemas.openxmlformats.org/officeDocument/2006/relationships" xmlns:p="http://schemas.openxmlformats.org/presentationml/2006/main" xmlns:a14="http://schemas.microsoft.com/office/drawing/2010/main" xmlns:mv="urn:schemas-microsoft-com:mac:vml" xmlns:mc="http://schemas.openxmlformats.org/markup-compatibility/2006" val="0"/>
                 </a:ext>
               </a:extLst>
             </a:blip>
@@ -19740,7 +19794,7 @@
             <a:blip r:embed="rId10">
               <a:extLst>
                 <a:ext uri="{28A0092B-C50C-407E-A947-70E740481C1C}">
-                  <a14:useLocalDpi xmlns:a14="http://schemas.microsoft.com/office/drawing/2010/main" xmlns:p="http://schemas.openxmlformats.org/presentationml/2006/main" xmlns:r="http://schemas.openxmlformats.org/officeDocument/2006/relationships" xmlns:a="http://schemas.openxmlformats.org/drawingml/2006/main" xmlns="" val="0"/>
+                  <a14:useLocalDpi xmlns="" xmlns:a="http://schemas.openxmlformats.org/drawingml/2006/main" xmlns:r="http://schemas.openxmlformats.org/officeDocument/2006/relationships" xmlns:p="http://schemas.openxmlformats.org/presentationml/2006/main" xmlns:a14="http://schemas.microsoft.com/office/drawing/2010/main" xmlns:mv="urn:schemas-microsoft-com:mac:vml" xmlns:mc="http://schemas.openxmlformats.org/markup-compatibility/2006" val="0"/>
                 </a:ext>
               </a:extLst>
             </a:blip>
@@ -19954,7 +20008,7 @@
           <a:blip r:embed="rId2">
             <a:extLst>
               <a:ext uri="{28A0092B-C50C-407E-A947-70E740481C1C}">
-                <a14:useLocalDpi xmlns:a14="http://schemas.microsoft.com/office/drawing/2010/main" xmlns:p="http://schemas.openxmlformats.org/presentationml/2006/main" xmlns:r="http://schemas.openxmlformats.org/officeDocument/2006/relationships" xmlns:a="http://schemas.openxmlformats.org/drawingml/2006/main" xmlns="" val="0"/>
+                <a14:useLocalDpi xmlns="" xmlns:a="http://schemas.openxmlformats.org/drawingml/2006/main" xmlns:r="http://schemas.openxmlformats.org/officeDocument/2006/relationships" xmlns:p="http://schemas.openxmlformats.org/presentationml/2006/main" xmlns:a14="http://schemas.microsoft.com/office/drawing/2010/main" xmlns:mv="urn:schemas-microsoft-com:mac:vml" xmlns:mc="http://schemas.openxmlformats.org/markup-compatibility/2006" val="0"/>
               </a:ext>
             </a:extLst>
           </a:blip>
@@ -19984,7 +20038,7 @@
           <a:blip r:embed="rId3">
             <a:extLst>
               <a:ext uri="{28A0092B-C50C-407E-A947-70E740481C1C}">
-                <a14:useLocalDpi xmlns:a14="http://schemas.microsoft.com/office/drawing/2010/main" xmlns:p="http://schemas.openxmlformats.org/presentationml/2006/main" xmlns:r="http://schemas.openxmlformats.org/officeDocument/2006/relationships" xmlns:a="http://schemas.openxmlformats.org/drawingml/2006/main" xmlns="" val="0"/>
+                <a14:useLocalDpi xmlns="" xmlns:a="http://schemas.openxmlformats.org/drawingml/2006/main" xmlns:r="http://schemas.openxmlformats.org/officeDocument/2006/relationships" xmlns:p="http://schemas.openxmlformats.org/presentationml/2006/main" xmlns:a14="http://schemas.microsoft.com/office/drawing/2010/main" xmlns:mv="urn:schemas-microsoft-com:mac:vml" xmlns:mc="http://schemas.openxmlformats.org/markup-compatibility/2006" val="0"/>
               </a:ext>
             </a:extLst>
           </a:blip>
@@ -20014,7 +20068,7 @@
           <a:blip r:embed="rId4">
             <a:extLst>
               <a:ext uri="{28A0092B-C50C-407E-A947-70E740481C1C}">
-                <a14:useLocalDpi xmlns:a14="http://schemas.microsoft.com/office/drawing/2010/main" xmlns:p="http://schemas.openxmlformats.org/presentationml/2006/main" xmlns:r="http://schemas.openxmlformats.org/officeDocument/2006/relationships" xmlns:a="http://schemas.openxmlformats.org/drawingml/2006/main" xmlns="" val="0"/>
+                <a14:useLocalDpi xmlns="" xmlns:a="http://schemas.openxmlformats.org/drawingml/2006/main" xmlns:r="http://schemas.openxmlformats.org/officeDocument/2006/relationships" xmlns:p="http://schemas.openxmlformats.org/presentationml/2006/main" xmlns:a14="http://schemas.microsoft.com/office/drawing/2010/main" xmlns:mv="urn:schemas-microsoft-com:mac:vml" xmlns:mc="http://schemas.openxmlformats.org/markup-compatibility/2006" val="0"/>
               </a:ext>
             </a:extLst>
           </a:blip>
@@ -20044,7 +20098,7 @@
           <a:blip r:embed="rId5">
             <a:extLst>
               <a:ext uri="{28A0092B-C50C-407E-A947-70E740481C1C}">
-                <a14:useLocalDpi xmlns:a14="http://schemas.microsoft.com/office/drawing/2010/main" xmlns:p="http://schemas.openxmlformats.org/presentationml/2006/main" xmlns:r="http://schemas.openxmlformats.org/officeDocument/2006/relationships" xmlns:a="http://schemas.openxmlformats.org/drawingml/2006/main" xmlns="" val="0"/>
+                <a14:useLocalDpi xmlns="" xmlns:a="http://schemas.openxmlformats.org/drawingml/2006/main" xmlns:r="http://schemas.openxmlformats.org/officeDocument/2006/relationships" xmlns:p="http://schemas.openxmlformats.org/presentationml/2006/main" xmlns:a14="http://schemas.microsoft.com/office/drawing/2010/main" xmlns:mv="urn:schemas-microsoft-com:mac:vml" xmlns:mc="http://schemas.openxmlformats.org/markup-compatibility/2006" val="0"/>
               </a:ext>
             </a:extLst>
           </a:blip>
@@ -20074,7 +20128,7 @@
           <a:blip r:embed="rId6">
             <a:extLst>
               <a:ext uri="{28A0092B-C50C-407E-A947-70E740481C1C}">
-                <a14:useLocalDpi xmlns:a14="http://schemas.microsoft.com/office/drawing/2010/main" xmlns:p="http://schemas.openxmlformats.org/presentationml/2006/main" xmlns:r="http://schemas.openxmlformats.org/officeDocument/2006/relationships" xmlns:a="http://schemas.openxmlformats.org/drawingml/2006/main" xmlns="" val="0"/>
+                <a14:useLocalDpi xmlns="" xmlns:a="http://schemas.openxmlformats.org/drawingml/2006/main" xmlns:r="http://schemas.openxmlformats.org/officeDocument/2006/relationships" xmlns:p="http://schemas.openxmlformats.org/presentationml/2006/main" xmlns:a14="http://schemas.microsoft.com/office/drawing/2010/main" xmlns:mv="urn:schemas-microsoft-com:mac:vml" xmlns:mc="http://schemas.openxmlformats.org/markup-compatibility/2006" val="0"/>
               </a:ext>
             </a:extLst>
           </a:blip>
@@ -20104,7 +20158,7 @@
           <a:blip r:embed="rId7">
             <a:extLst>
               <a:ext uri="{28A0092B-C50C-407E-A947-70E740481C1C}">
-                <a14:useLocalDpi xmlns:a14="http://schemas.microsoft.com/office/drawing/2010/main" xmlns:p="http://schemas.openxmlformats.org/presentationml/2006/main" xmlns:r="http://schemas.openxmlformats.org/officeDocument/2006/relationships" xmlns:a="http://schemas.openxmlformats.org/drawingml/2006/main" xmlns="" val="0"/>
+                <a14:useLocalDpi xmlns="" xmlns:a="http://schemas.openxmlformats.org/drawingml/2006/main" xmlns:r="http://schemas.openxmlformats.org/officeDocument/2006/relationships" xmlns:p="http://schemas.openxmlformats.org/presentationml/2006/main" xmlns:a14="http://schemas.microsoft.com/office/drawing/2010/main" xmlns:mv="urn:schemas-microsoft-com:mac:vml" xmlns:mc="http://schemas.openxmlformats.org/markup-compatibility/2006" val="0"/>
               </a:ext>
             </a:extLst>
           </a:blip>
@@ -20134,7 +20188,7 @@
           <a:blip r:embed="rId8">
             <a:extLst>
               <a:ext uri="{28A0092B-C50C-407E-A947-70E740481C1C}">
-                <a14:useLocalDpi xmlns:a14="http://schemas.microsoft.com/office/drawing/2010/main" xmlns:p="http://schemas.openxmlformats.org/presentationml/2006/main" xmlns:r="http://schemas.openxmlformats.org/officeDocument/2006/relationships" xmlns:a="http://schemas.openxmlformats.org/drawingml/2006/main" xmlns="" val="0"/>
+                <a14:useLocalDpi xmlns="" xmlns:a="http://schemas.openxmlformats.org/drawingml/2006/main" xmlns:r="http://schemas.openxmlformats.org/officeDocument/2006/relationships" xmlns:p="http://schemas.openxmlformats.org/presentationml/2006/main" xmlns:a14="http://schemas.microsoft.com/office/drawing/2010/main" xmlns:mv="urn:schemas-microsoft-com:mac:vml" xmlns:mc="http://schemas.openxmlformats.org/markup-compatibility/2006" val="0"/>
               </a:ext>
             </a:extLst>
           </a:blip>
@@ -20164,7 +20218,7 @@
           <a:blip r:embed="rId9">
             <a:extLst>
               <a:ext uri="{28A0092B-C50C-407E-A947-70E740481C1C}">
-                <a14:useLocalDpi xmlns:a14="http://schemas.microsoft.com/office/drawing/2010/main" xmlns:p="http://schemas.openxmlformats.org/presentationml/2006/main" xmlns:r="http://schemas.openxmlformats.org/officeDocument/2006/relationships" xmlns:a="http://schemas.openxmlformats.org/drawingml/2006/main" xmlns="" val="0"/>
+                <a14:useLocalDpi xmlns="" xmlns:a="http://schemas.openxmlformats.org/drawingml/2006/main" xmlns:r="http://schemas.openxmlformats.org/officeDocument/2006/relationships" xmlns:p="http://schemas.openxmlformats.org/presentationml/2006/main" xmlns:a14="http://schemas.microsoft.com/office/drawing/2010/main" xmlns:mv="urn:schemas-microsoft-com:mac:vml" xmlns:mc="http://schemas.openxmlformats.org/markup-compatibility/2006" val="0"/>
               </a:ext>
             </a:extLst>
           </a:blip>
@@ -20194,7 +20248,7 @@
           <a:blip r:embed="rId10">
             <a:extLst>
               <a:ext uri="{28A0092B-C50C-407E-A947-70E740481C1C}">
-                <a14:useLocalDpi xmlns:a14="http://schemas.microsoft.com/office/drawing/2010/main" xmlns:p="http://schemas.openxmlformats.org/presentationml/2006/main" xmlns:r="http://schemas.openxmlformats.org/officeDocument/2006/relationships" xmlns:a="http://schemas.openxmlformats.org/drawingml/2006/main" xmlns="" val="0"/>
+                <a14:useLocalDpi xmlns="" xmlns:a="http://schemas.openxmlformats.org/drawingml/2006/main" xmlns:r="http://schemas.openxmlformats.org/officeDocument/2006/relationships" xmlns:p="http://schemas.openxmlformats.org/presentationml/2006/main" xmlns:a14="http://schemas.microsoft.com/office/drawing/2010/main" xmlns:mv="urn:schemas-microsoft-com:mac:vml" xmlns:mc="http://schemas.openxmlformats.org/markup-compatibility/2006" val="0"/>
               </a:ext>
             </a:extLst>
           </a:blip>
@@ -21835,7 +21889,7 @@
     </p:spTree>
     <p:extLst>
       <p:ext uri="{BB962C8B-B14F-4D97-AF65-F5344CB8AC3E}">
-        <p14:creationId xmlns:p14="http://schemas.microsoft.com/office/powerpoint/2010/main" xmlns:p="http://schemas.openxmlformats.org/presentationml/2006/main" xmlns:r="http://schemas.openxmlformats.org/officeDocument/2006/relationships" xmlns:a="http://schemas.openxmlformats.org/drawingml/2006/main" xmlns="" val="1030899907"/>
+        <p14:creationId xmlns="" xmlns:a="http://schemas.openxmlformats.org/drawingml/2006/main" xmlns:r="http://schemas.openxmlformats.org/officeDocument/2006/relationships" xmlns:p="http://schemas.openxmlformats.org/presentationml/2006/main" xmlns:p14="http://schemas.microsoft.com/office/powerpoint/2010/main" xmlns:mv="urn:schemas-microsoft-com:mac:vml" xmlns:mc="http://schemas.openxmlformats.org/markup-compatibility/2006" val="1030899907"/>
       </p:ext>
     </p:extLst>
   </p:cSld>
@@ -22087,7 +22141,7 @@
           <a:blip r:embed="rId2">
             <a:extLst>
               <a:ext uri="{28A0092B-C50C-407E-A947-70E740481C1C}">
-                <a14:useLocalDpi xmlns:a14="http://schemas.microsoft.com/office/drawing/2010/main" xmlns:p="http://schemas.openxmlformats.org/presentationml/2006/main" xmlns:r="http://schemas.openxmlformats.org/officeDocument/2006/relationships" xmlns:a="http://schemas.openxmlformats.org/drawingml/2006/main" xmlns="" val="0"/>
+                <a14:useLocalDpi xmlns="" xmlns:a="http://schemas.openxmlformats.org/drawingml/2006/main" xmlns:r="http://schemas.openxmlformats.org/officeDocument/2006/relationships" xmlns:p="http://schemas.openxmlformats.org/presentationml/2006/main" xmlns:a14="http://schemas.microsoft.com/office/drawing/2010/main" xmlns:mv="urn:schemas-microsoft-com:mac:vml" xmlns:mc="http://schemas.openxmlformats.org/markup-compatibility/2006" val="0"/>
               </a:ext>
             </a:extLst>
           </a:blip>
@@ -22117,7 +22171,7 @@
           <a:blip r:embed="rId2">
             <a:extLst>
               <a:ext uri="{28A0092B-C50C-407E-A947-70E740481C1C}">
-                <a14:useLocalDpi xmlns:a14="http://schemas.microsoft.com/office/drawing/2010/main" xmlns:p="http://schemas.openxmlformats.org/presentationml/2006/main" xmlns:r="http://schemas.openxmlformats.org/officeDocument/2006/relationships" xmlns:a="http://schemas.openxmlformats.org/drawingml/2006/main" xmlns="" val="0"/>
+                <a14:useLocalDpi xmlns="" xmlns:a="http://schemas.openxmlformats.org/drawingml/2006/main" xmlns:r="http://schemas.openxmlformats.org/officeDocument/2006/relationships" xmlns:p="http://schemas.openxmlformats.org/presentationml/2006/main" xmlns:a14="http://schemas.microsoft.com/office/drawing/2010/main" xmlns:mv="urn:schemas-microsoft-com:mac:vml" xmlns:mc="http://schemas.openxmlformats.org/markup-compatibility/2006" val="0"/>
               </a:ext>
             </a:extLst>
           </a:blip>
@@ -22520,7 +22574,7 @@
     </p:spTree>
     <p:extLst>
       <p:ext uri="{BB962C8B-B14F-4D97-AF65-F5344CB8AC3E}">
-        <p14:creationId xmlns:p14="http://schemas.microsoft.com/office/powerpoint/2010/main" xmlns:p="http://schemas.openxmlformats.org/presentationml/2006/main" xmlns:r="http://schemas.openxmlformats.org/officeDocument/2006/relationships" xmlns:a="http://schemas.openxmlformats.org/drawingml/2006/main" xmlns="" val="2088642547"/>
+        <p14:creationId xmlns="" xmlns:a="http://schemas.openxmlformats.org/drawingml/2006/main" xmlns:r="http://schemas.openxmlformats.org/officeDocument/2006/relationships" xmlns:p="http://schemas.openxmlformats.org/presentationml/2006/main" xmlns:p14="http://schemas.microsoft.com/office/powerpoint/2010/main" xmlns:mv="urn:schemas-microsoft-com:mac:vml" xmlns:mc="http://schemas.openxmlformats.org/markup-compatibility/2006" val="2088642547"/>
       </p:ext>
     </p:extLst>
   </p:cSld>
@@ -22637,7 +22691,7 @@
     </p:spTree>
     <p:extLst>
       <p:ext uri="{BB962C8B-B14F-4D97-AF65-F5344CB8AC3E}">
-        <p14:creationId xmlns:p14="http://schemas.microsoft.com/office/powerpoint/2010/main" xmlns:p="http://schemas.openxmlformats.org/presentationml/2006/main" xmlns:r="http://schemas.openxmlformats.org/officeDocument/2006/relationships" xmlns:a="http://schemas.openxmlformats.org/drawingml/2006/main" xmlns="" val="1060988173"/>
+        <p14:creationId xmlns="" xmlns:a="http://schemas.openxmlformats.org/drawingml/2006/main" xmlns:r="http://schemas.openxmlformats.org/officeDocument/2006/relationships" xmlns:p="http://schemas.openxmlformats.org/presentationml/2006/main" xmlns:p14="http://schemas.microsoft.com/office/powerpoint/2010/main" xmlns:mv="urn:schemas-microsoft-com:mac:vml" xmlns:mc="http://schemas.openxmlformats.org/markup-compatibility/2006" val="1060988173"/>
       </p:ext>
     </p:extLst>
   </p:cSld>
@@ -22705,7 +22759,7 @@
     </p:spTree>
     <p:extLst>
       <p:ext uri="{BB962C8B-B14F-4D97-AF65-F5344CB8AC3E}">
-        <p14:creationId xmlns:p14="http://schemas.microsoft.com/office/powerpoint/2010/main" xmlns:p="http://schemas.openxmlformats.org/presentationml/2006/main" xmlns:r="http://schemas.openxmlformats.org/officeDocument/2006/relationships" xmlns:a="http://schemas.openxmlformats.org/drawingml/2006/main" xmlns="" val="730746052"/>
+        <p14:creationId xmlns="" xmlns:a="http://schemas.openxmlformats.org/drawingml/2006/main" xmlns:r="http://schemas.openxmlformats.org/officeDocument/2006/relationships" xmlns:p="http://schemas.openxmlformats.org/presentationml/2006/main" xmlns:p14="http://schemas.microsoft.com/office/powerpoint/2010/main" xmlns:mv="urn:schemas-microsoft-com:mac:vml" xmlns:mc="http://schemas.openxmlformats.org/markup-compatibility/2006" val="730746052"/>
       </p:ext>
     </p:extLst>
   </p:cSld>
@@ -22761,7 +22815,7 @@
     </p:spTree>
     <p:extLst>
       <p:ext uri="{BB962C8B-B14F-4D97-AF65-F5344CB8AC3E}">
-        <p14:creationId xmlns:p14="http://schemas.microsoft.com/office/powerpoint/2010/main" xmlns:p="http://schemas.openxmlformats.org/presentationml/2006/main" xmlns:r="http://schemas.openxmlformats.org/officeDocument/2006/relationships" xmlns:a="http://schemas.openxmlformats.org/drawingml/2006/main" xmlns="" val="2403161794"/>
+        <p14:creationId xmlns="" xmlns:a="http://schemas.openxmlformats.org/drawingml/2006/main" xmlns:r="http://schemas.openxmlformats.org/officeDocument/2006/relationships" xmlns:p="http://schemas.openxmlformats.org/presentationml/2006/main" xmlns:p14="http://schemas.microsoft.com/office/powerpoint/2010/main" xmlns:mv="urn:schemas-microsoft-com:mac:vml" xmlns:mc="http://schemas.openxmlformats.org/markup-compatibility/2006" val="2403161794"/>
       </p:ext>
     </p:extLst>
   </p:cSld>
@@ -22814,7 +22868,7 @@
     </p:spTree>
     <p:extLst>
       <p:ext uri="{BB962C8B-B14F-4D97-AF65-F5344CB8AC3E}">
-        <p14:creationId xmlns:p14="http://schemas.microsoft.com/office/powerpoint/2010/main" xmlns:p="http://schemas.openxmlformats.org/presentationml/2006/main" xmlns:r="http://schemas.openxmlformats.org/officeDocument/2006/relationships" xmlns:a="http://schemas.openxmlformats.org/drawingml/2006/main" xmlns="" val="1522136710"/>
+        <p14:creationId xmlns="" xmlns:a="http://schemas.openxmlformats.org/drawingml/2006/main" xmlns:r="http://schemas.openxmlformats.org/officeDocument/2006/relationships" xmlns:p="http://schemas.openxmlformats.org/presentationml/2006/main" xmlns:p14="http://schemas.microsoft.com/office/powerpoint/2010/main" xmlns:mv="urn:schemas-microsoft-com:mac:vml" xmlns:mc="http://schemas.openxmlformats.org/markup-compatibility/2006" val="1522136710"/>
       </p:ext>
     </p:extLst>
   </p:cSld>
@@ -22893,7 +22947,7 @@
     </p:spTree>
     <p:extLst>
       <p:ext uri="{BB962C8B-B14F-4D97-AF65-F5344CB8AC3E}">
-        <p14:creationId xmlns:p14="http://schemas.microsoft.com/office/powerpoint/2010/main" xmlns:p="http://schemas.openxmlformats.org/presentationml/2006/main" xmlns:r="http://schemas.openxmlformats.org/officeDocument/2006/relationships" xmlns:a="http://schemas.openxmlformats.org/drawingml/2006/main" xmlns="" val="2399798731"/>
+        <p14:creationId xmlns="" xmlns:a="http://schemas.openxmlformats.org/drawingml/2006/main" xmlns:r="http://schemas.openxmlformats.org/officeDocument/2006/relationships" xmlns:p="http://schemas.openxmlformats.org/presentationml/2006/main" xmlns:p14="http://schemas.microsoft.com/office/powerpoint/2010/main" xmlns:mv="urn:schemas-microsoft-com:mac:vml" xmlns:mc="http://schemas.openxmlformats.org/markup-compatibility/2006" val="2399798731"/>
       </p:ext>
     </p:extLst>
   </p:cSld>
@@ -22968,7 +23022,7 @@
     </p:spTree>
     <p:extLst>
       <p:ext uri="{BB962C8B-B14F-4D97-AF65-F5344CB8AC3E}">
-        <p14:creationId xmlns:p14="http://schemas.microsoft.com/office/powerpoint/2010/main" xmlns:p="http://schemas.openxmlformats.org/presentationml/2006/main" xmlns:r="http://schemas.openxmlformats.org/officeDocument/2006/relationships" xmlns:a="http://schemas.openxmlformats.org/drawingml/2006/main" xmlns="" val="2607461392"/>
+        <p14:creationId xmlns="" xmlns:a="http://schemas.openxmlformats.org/drawingml/2006/main" xmlns:r="http://schemas.openxmlformats.org/officeDocument/2006/relationships" xmlns:p="http://schemas.openxmlformats.org/presentationml/2006/main" xmlns:p14="http://schemas.microsoft.com/office/powerpoint/2010/main" xmlns:mv="urn:schemas-microsoft-com:mac:vml" xmlns:mc="http://schemas.openxmlformats.org/markup-compatibility/2006" val="2607461392"/>
       </p:ext>
     </p:extLst>
   </p:cSld>
@@ -23021,7 +23075,7 @@
     </p:spTree>
     <p:extLst>
       <p:ext uri="{BB962C8B-B14F-4D97-AF65-F5344CB8AC3E}">
-        <p14:creationId xmlns:p14="http://schemas.microsoft.com/office/powerpoint/2010/main" xmlns:p="http://schemas.openxmlformats.org/presentationml/2006/main" xmlns:r="http://schemas.openxmlformats.org/officeDocument/2006/relationships" xmlns:a="http://schemas.openxmlformats.org/drawingml/2006/main" xmlns="" val="1916182223"/>
+        <p14:creationId xmlns="" xmlns:a="http://schemas.openxmlformats.org/drawingml/2006/main" xmlns:r="http://schemas.openxmlformats.org/officeDocument/2006/relationships" xmlns:p="http://schemas.openxmlformats.org/presentationml/2006/main" xmlns:p14="http://schemas.microsoft.com/office/powerpoint/2010/main" xmlns:mv="urn:schemas-microsoft-com:mac:vml" xmlns:mc="http://schemas.openxmlformats.org/markup-compatibility/2006" val="1916182223"/>
       </p:ext>
     </p:extLst>
   </p:cSld>
@@ -23119,7 +23173,7 @@
     </p:spTree>
     <p:extLst>
       <p:ext uri="{BB962C8B-B14F-4D97-AF65-F5344CB8AC3E}">
-        <p14:creationId xmlns:p14="http://schemas.microsoft.com/office/powerpoint/2010/main" xmlns:p="http://schemas.openxmlformats.org/presentationml/2006/main" xmlns:r="http://schemas.openxmlformats.org/officeDocument/2006/relationships" xmlns:a="http://schemas.openxmlformats.org/drawingml/2006/main" xmlns="" val="8609580"/>
+        <p14:creationId xmlns="" xmlns:a="http://schemas.openxmlformats.org/drawingml/2006/main" xmlns:r="http://schemas.openxmlformats.org/officeDocument/2006/relationships" xmlns:p="http://schemas.openxmlformats.org/presentationml/2006/main" xmlns:p14="http://schemas.microsoft.com/office/powerpoint/2010/main" xmlns:mv="urn:schemas-microsoft-com:mac:vml" xmlns:mc="http://schemas.openxmlformats.org/markup-compatibility/2006" val="8609580"/>
       </p:ext>
     </p:extLst>
   </p:cSld>
@@ -23255,7 +23309,7 @@
     </p:spTree>
     <p:extLst>
       <p:ext uri="{BB962C8B-B14F-4D97-AF65-F5344CB8AC3E}">
-        <p14:creationId xmlns:p14="http://schemas.microsoft.com/office/powerpoint/2010/main" xmlns:p="http://schemas.openxmlformats.org/presentationml/2006/main" xmlns:r="http://schemas.openxmlformats.org/officeDocument/2006/relationships" xmlns:a="http://schemas.openxmlformats.org/drawingml/2006/main" xmlns="" val="1795932434"/>
+        <p14:creationId xmlns="" xmlns:a="http://schemas.openxmlformats.org/drawingml/2006/main" xmlns:r="http://schemas.openxmlformats.org/officeDocument/2006/relationships" xmlns:p="http://schemas.openxmlformats.org/presentationml/2006/main" xmlns:p14="http://schemas.microsoft.com/office/powerpoint/2010/main" xmlns:mv="urn:schemas-microsoft-com:mac:vml" xmlns:mc="http://schemas.openxmlformats.org/markup-compatibility/2006" val="1795932434"/>
       </p:ext>
     </p:extLst>
   </p:cSld>
@@ -23372,7 +23426,7 @@
     </p:spTree>
     <p:extLst>
       <p:ext uri="{BB962C8B-B14F-4D97-AF65-F5344CB8AC3E}">
-        <p14:creationId xmlns:p14="http://schemas.microsoft.com/office/powerpoint/2010/main" xmlns:p="http://schemas.openxmlformats.org/presentationml/2006/main" xmlns:r="http://schemas.openxmlformats.org/officeDocument/2006/relationships" xmlns:a="http://schemas.openxmlformats.org/drawingml/2006/main" xmlns="" val="4033552047"/>
+        <p14:creationId xmlns="" xmlns:a="http://schemas.openxmlformats.org/drawingml/2006/main" xmlns:r="http://schemas.openxmlformats.org/officeDocument/2006/relationships" xmlns:p="http://schemas.openxmlformats.org/presentationml/2006/main" xmlns:p14="http://schemas.microsoft.com/office/powerpoint/2010/main" xmlns:mv="urn:schemas-microsoft-com:mac:vml" xmlns:mc="http://schemas.openxmlformats.org/markup-compatibility/2006" val="4033552047"/>
       </p:ext>
     </p:extLst>
   </p:cSld>
@@ -23556,7 +23610,7 @@
     </p:spTree>
     <p:extLst>
       <p:ext uri="{BB962C8B-B14F-4D97-AF65-F5344CB8AC3E}">
-        <p14:creationId xmlns:p14="http://schemas.microsoft.com/office/powerpoint/2010/main" xmlns:p="http://schemas.openxmlformats.org/presentationml/2006/main" xmlns:r="http://schemas.openxmlformats.org/officeDocument/2006/relationships" xmlns:a="http://schemas.openxmlformats.org/drawingml/2006/main" xmlns="" val="220248659"/>
+        <p14:creationId xmlns="" xmlns:a="http://schemas.openxmlformats.org/drawingml/2006/main" xmlns:r="http://schemas.openxmlformats.org/officeDocument/2006/relationships" xmlns:p="http://schemas.openxmlformats.org/presentationml/2006/main" xmlns:p14="http://schemas.microsoft.com/office/powerpoint/2010/main" xmlns:mv="urn:schemas-microsoft-com:mac:vml" xmlns:mc="http://schemas.openxmlformats.org/markup-compatibility/2006" val="220248659"/>
       </p:ext>
     </p:extLst>
   </p:cSld>
@@ -23802,7 +23856,7 @@
     </p:spTree>
     <p:extLst>
       <p:ext uri="{BB962C8B-B14F-4D97-AF65-F5344CB8AC3E}">
-        <p14:creationId xmlns:p14="http://schemas.microsoft.com/office/powerpoint/2010/main" xmlns:p="http://schemas.openxmlformats.org/presentationml/2006/main" xmlns:r="http://schemas.openxmlformats.org/officeDocument/2006/relationships" xmlns:a="http://schemas.openxmlformats.org/drawingml/2006/main" xmlns="" val="3284264482"/>
+        <p14:creationId xmlns="" xmlns:a="http://schemas.openxmlformats.org/drawingml/2006/main" xmlns:r="http://schemas.openxmlformats.org/officeDocument/2006/relationships" xmlns:p="http://schemas.openxmlformats.org/presentationml/2006/main" xmlns:p14="http://schemas.microsoft.com/office/powerpoint/2010/main" xmlns:mv="urn:schemas-microsoft-com:mac:vml" xmlns:mc="http://schemas.openxmlformats.org/markup-compatibility/2006" val="3284264482"/>
       </p:ext>
     </p:extLst>
   </p:cSld>
@@ -23909,7 +23963,7 @@
     </p:spTree>
     <p:extLst>
       <p:ext uri="{BB962C8B-B14F-4D97-AF65-F5344CB8AC3E}">
-        <p14:creationId xmlns:p14="http://schemas.microsoft.com/office/powerpoint/2010/main" xmlns:p="http://schemas.openxmlformats.org/presentationml/2006/main" xmlns:r="http://schemas.openxmlformats.org/officeDocument/2006/relationships" xmlns:a="http://schemas.openxmlformats.org/drawingml/2006/main" xmlns="" val="1108981616"/>
+        <p14:creationId xmlns="" xmlns:a="http://schemas.openxmlformats.org/drawingml/2006/main" xmlns:r="http://schemas.openxmlformats.org/officeDocument/2006/relationships" xmlns:p="http://schemas.openxmlformats.org/presentationml/2006/main" xmlns:p14="http://schemas.microsoft.com/office/powerpoint/2010/main" xmlns:mv="urn:schemas-microsoft-com:mac:vml" xmlns:mc="http://schemas.openxmlformats.org/markup-compatibility/2006" val="1108981616"/>
       </p:ext>
     </p:extLst>
   </p:cSld>
@@ -23965,7 +24019,7 @@
     </p:spTree>
     <p:extLst>
       <p:ext uri="{BB962C8B-B14F-4D97-AF65-F5344CB8AC3E}">
-        <p14:creationId xmlns:p14="http://schemas.microsoft.com/office/powerpoint/2010/main" xmlns:p="http://schemas.openxmlformats.org/presentationml/2006/main" xmlns:r="http://schemas.openxmlformats.org/officeDocument/2006/relationships" xmlns:a="http://schemas.openxmlformats.org/drawingml/2006/main" xmlns="" val="1682920946"/>
+        <p14:creationId xmlns="" xmlns:a="http://schemas.openxmlformats.org/drawingml/2006/main" xmlns:r="http://schemas.openxmlformats.org/officeDocument/2006/relationships" xmlns:p="http://schemas.openxmlformats.org/presentationml/2006/main" xmlns:p14="http://schemas.microsoft.com/office/powerpoint/2010/main" xmlns:mv="urn:schemas-microsoft-com:mac:vml" xmlns:mc="http://schemas.openxmlformats.org/markup-compatibility/2006" val="1682920946"/>
       </p:ext>
     </p:extLst>
   </p:cSld>
@@ -24002,7 +24056,7 @@
     </p:spTree>
     <p:extLst>
       <p:ext uri="{BB962C8B-B14F-4D97-AF65-F5344CB8AC3E}">
-        <p14:creationId xmlns:p14="http://schemas.microsoft.com/office/powerpoint/2010/main" xmlns:p="http://schemas.openxmlformats.org/presentationml/2006/main" xmlns:r="http://schemas.openxmlformats.org/officeDocument/2006/relationships" xmlns:a="http://schemas.openxmlformats.org/drawingml/2006/main" xmlns="" val="3718186732"/>
+        <p14:creationId xmlns="" xmlns:a="http://schemas.openxmlformats.org/drawingml/2006/main" xmlns:r="http://schemas.openxmlformats.org/officeDocument/2006/relationships" xmlns:p="http://schemas.openxmlformats.org/presentationml/2006/main" xmlns:p14="http://schemas.microsoft.com/office/powerpoint/2010/main" xmlns:mv="urn:schemas-microsoft-com:mac:vml" xmlns:mc="http://schemas.openxmlformats.org/markup-compatibility/2006" val="3718186732"/>
       </p:ext>
     </p:extLst>
   </p:cSld>
@@ -24058,7 +24112,7 @@
     </p:spTree>
     <p:extLst>
       <p:ext uri="{BB962C8B-B14F-4D97-AF65-F5344CB8AC3E}">
-        <p14:creationId xmlns:p14="http://schemas.microsoft.com/office/powerpoint/2010/main" xmlns:p="http://schemas.openxmlformats.org/presentationml/2006/main" xmlns:r="http://schemas.openxmlformats.org/officeDocument/2006/relationships" xmlns:a="http://schemas.openxmlformats.org/drawingml/2006/main" xmlns="" val="1642846382"/>
+        <p14:creationId xmlns="" xmlns:a="http://schemas.openxmlformats.org/drawingml/2006/main" xmlns:r="http://schemas.openxmlformats.org/officeDocument/2006/relationships" xmlns:p="http://schemas.openxmlformats.org/presentationml/2006/main" xmlns:p14="http://schemas.microsoft.com/office/powerpoint/2010/main" xmlns:mv="urn:schemas-microsoft-com:mac:vml" xmlns:mc="http://schemas.openxmlformats.org/markup-compatibility/2006" val="1642846382"/>
       </p:ext>
     </p:extLst>
   </p:cSld>
@@ -24177,7 +24231,7 @@
     </p:spTree>
     <p:extLst>
       <p:ext uri="{BB962C8B-B14F-4D97-AF65-F5344CB8AC3E}">
-        <p14:creationId xmlns:p14="http://schemas.microsoft.com/office/powerpoint/2010/main" xmlns:p="http://schemas.openxmlformats.org/presentationml/2006/main" xmlns:r="http://schemas.openxmlformats.org/officeDocument/2006/relationships" xmlns:a="http://schemas.openxmlformats.org/drawingml/2006/main" xmlns="" val="1441032778"/>
+        <p14:creationId xmlns="" xmlns:a="http://schemas.openxmlformats.org/drawingml/2006/main" xmlns:r="http://schemas.openxmlformats.org/officeDocument/2006/relationships" xmlns:p="http://schemas.openxmlformats.org/presentationml/2006/main" xmlns:p14="http://schemas.microsoft.com/office/powerpoint/2010/main" xmlns:mv="urn:schemas-microsoft-com:mac:vml" xmlns:mc="http://schemas.openxmlformats.org/markup-compatibility/2006" val="1441032778"/>
       </p:ext>
     </p:extLst>
   </p:cSld>
@@ -24312,7 +24366,7 @@
     </p:spTree>
     <p:extLst>
       <p:ext uri="{BB962C8B-B14F-4D97-AF65-F5344CB8AC3E}">
-        <p14:creationId xmlns:p14="http://schemas.microsoft.com/office/powerpoint/2010/main" xmlns:p="http://schemas.openxmlformats.org/presentationml/2006/main" xmlns:r="http://schemas.openxmlformats.org/officeDocument/2006/relationships" xmlns:a="http://schemas.openxmlformats.org/drawingml/2006/main" xmlns="" val="711675961"/>
+        <p14:creationId xmlns="" xmlns:a="http://schemas.openxmlformats.org/drawingml/2006/main" xmlns:r="http://schemas.openxmlformats.org/officeDocument/2006/relationships" xmlns:p="http://schemas.openxmlformats.org/presentationml/2006/main" xmlns:p14="http://schemas.microsoft.com/office/powerpoint/2010/main" xmlns:mv="urn:schemas-microsoft-com:mac:vml" xmlns:mc="http://schemas.openxmlformats.org/markup-compatibility/2006" val="711675961"/>
       </p:ext>
     </p:extLst>
   </p:cSld>
@@ -24447,7 +24501,7 @@
     </p:spTree>
     <p:extLst>
       <p:ext uri="{BB962C8B-B14F-4D97-AF65-F5344CB8AC3E}">
-        <p14:creationId xmlns:p14="http://schemas.microsoft.com/office/powerpoint/2010/main" xmlns:p="http://schemas.openxmlformats.org/presentationml/2006/main" xmlns:r="http://schemas.openxmlformats.org/officeDocument/2006/relationships" xmlns:a="http://schemas.openxmlformats.org/drawingml/2006/main" xmlns="" val="1541192887"/>
+        <p14:creationId xmlns="" xmlns:a="http://schemas.openxmlformats.org/drawingml/2006/main" xmlns:r="http://schemas.openxmlformats.org/officeDocument/2006/relationships" xmlns:p="http://schemas.openxmlformats.org/presentationml/2006/main" xmlns:p14="http://schemas.microsoft.com/office/powerpoint/2010/main" xmlns:mv="urn:schemas-microsoft-com:mac:vml" xmlns:mc="http://schemas.openxmlformats.org/markup-compatibility/2006" val="1541192887"/>
       </p:ext>
     </p:extLst>
   </p:cSld>
@@ -24795,7 +24849,7 @@
   <a:extraClrSchemeLst/>
   <a:extLst>
     <a:ext uri="{05A4C25C-085E-4340-85A3-A5531E510DB2}">
-      <thm15:themeFamily xmlns:thm15="http://schemas.microsoft.com/office/thememl/2012/main" xmlns:a="http://schemas.openxmlformats.org/drawingml/2006/main" xmlns="" name="reinvent2015-template-light" id="{347E3041-9385-4346-9DC4-E740F718428B}" vid="{42D8A2EF-AA2C-2C4C-8867-3F36DEEE7EEC}"/>
+      <thm15:themeFamily xmlns="" xmlns:a="http://schemas.openxmlformats.org/drawingml/2006/main" xmlns:thm15="http://schemas.microsoft.com/office/thememl/2012/main" name="reinvent2015-template-light" id="{347E3041-9385-4346-9DC4-E740F718428B}" vid="{42D8A2EF-AA2C-2C4C-8867-3F36DEEE7EEC}"/>
     </a:ext>
   </a:extLst>
 </a:theme>

</xml_diff>

<commit_message>
Update notes about us
</commit_message>
<xml_diff>
--- a/slides/slides.pptx
+++ b/slides/slides.pptx
@@ -1,6 +1,6 @@
 
 <file path=ppt/presentation.xml><?xml version="1.0" encoding="utf-8"?>
-<p:presentation xmlns:a="http://schemas.openxmlformats.org/drawingml/2006/main" xmlns:r="http://schemas.openxmlformats.org/officeDocument/2006/relationships" xmlns:p="http://schemas.openxmlformats.org/presentationml/2006/main" saveSubsetFonts="1" autoCompressPictures="0">
+<p:presentation xmlns:a="http://schemas.openxmlformats.org/drawingml/2006/main" xmlns:r="http://schemas.openxmlformats.org/officeDocument/2006/relationships" xmlns:mc="http://schemas.openxmlformats.org/markup-compatibility/2006" xmlns:mv="urn:schemas-microsoft-com:mac:vml" xmlns:p="http://schemas.openxmlformats.org/presentationml/2006/main" mc:Ignorable="mv" mc:PreserveAttributes="mv:*" saveSubsetFonts="1" autoCompressPictures="0">
   <p:sldMasterIdLst>
     <p:sldMasterId id="2147483674" r:id="rId4"/>
   </p:sldMasterIdLst>
@@ -170,7 +170,7 @@
   </p:defaultTextStyle>
   <p:extLst>
     <p:ext uri="{EFAFB233-063F-42B5-8137-9DF3F51BA10A}">
-      <p15:sldGuideLst xmlns:p15="http://schemas.microsoft.com/office/powerpoint/2012/main">
+      <p15:sldGuideLst xmlns:p15="http://schemas.microsoft.com/office/powerpoint/2012/main" xmlns:p="http://schemas.openxmlformats.org/presentationml/2006/main" xmlns:r="http://schemas.openxmlformats.org/officeDocument/2006/relationships" xmlns:a="http://schemas.openxmlformats.org/drawingml/2006/main" xmlns="">
         <p15:guide id="1" orient="horz" pos="644">
           <p15:clr>
             <a:srgbClr val="A4A3A4"/>
@@ -313,14 +313,14 @@
 </file>
 
 <file path=ppt/commentAuthors.xml><?xml version="1.0" encoding="utf-8"?>
-<p:cmAuthorLst xmlns:a="http://schemas.openxmlformats.org/drawingml/2006/main" xmlns:r="http://schemas.openxmlformats.org/officeDocument/2006/relationships" xmlns:p="http://schemas.openxmlformats.org/presentationml/2006/main">
+<p:cmAuthorLst xmlns:a="http://schemas.openxmlformats.org/drawingml/2006/main" xmlns:r="http://schemas.openxmlformats.org/officeDocument/2006/relationships" xmlns:mc="http://schemas.openxmlformats.org/markup-compatibility/2006" xmlns:mv="urn:schemas-microsoft-com:mac:vml" xmlns:p="http://schemas.openxmlformats.org/presentationml/2006/main" mc:Ignorable="mv" mc:PreserveAttributes="mv:*">
   <p:cmAuthor id="0" name="Catalano, Alec" initials="" lastIdx="23" clrIdx="0"/>
   <p:cmAuthor id="1" name="Alec Catalano" initials="" lastIdx="1" clrIdx="1"/>
 </p:cmAuthorLst>
 </file>
 
 <file path=ppt/notesMasters/notesMaster1.xml><?xml version="1.0" encoding="utf-8"?>
-<p:notesMaster xmlns:a="http://schemas.openxmlformats.org/drawingml/2006/main" xmlns:r="http://schemas.openxmlformats.org/officeDocument/2006/relationships" xmlns:p="http://schemas.openxmlformats.org/presentationml/2006/main">
+<p:notesMaster xmlns:a="http://schemas.openxmlformats.org/drawingml/2006/main" xmlns:r="http://schemas.openxmlformats.org/officeDocument/2006/relationships" xmlns:mc="http://schemas.openxmlformats.org/markup-compatibility/2006" xmlns:mv="urn:schemas-microsoft-com:mac:vml" xmlns:p="http://schemas.openxmlformats.org/presentationml/2006/main" mc:Ignorable="mv" mc:PreserveAttributes="mv:*">
   <p:cSld>
     <p:bg>
       <p:bgRef idx="1001">
@@ -579,7 +579,7 @@
     </p:spTree>
     <p:extLst>
       <p:ext uri="{BB962C8B-B14F-4D97-AF65-F5344CB8AC3E}">
-        <p14:creationId xmlns:p14="http://schemas.microsoft.com/office/powerpoint/2010/main" val="943536003"/>
+        <p14:creationId xmlns:p14="http://schemas.microsoft.com/office/powerpoint/2010/main" xmlns:p="http://schemas.openxmlformats.org/presentationml/2006/main" xmlns:r="http://schemas.openxmlformats.org/officeDocument/2006/relationships" xmlns:a="http://schemas.openxmlformats.org/drawingml/2006/main" xmlns="" val="943536003"/>
       </p:ext>
     </p:extLst>
   </p:cSld>
@@ -680,7 +680,7 @@
 </file>
 
 <file path=ppt/notesSlides/notesSlide1.xml><?xml version="1.0" encoding="utf-8"?>
-<p:notes xmlns:a="http://schemas.openxmlformats.org/drawingml/2006/main" xmlns:r="http://schemas.openxmlformats.org/officeDocument/2006/relationships" xmlns:p="http://schemas.openxmlformats.org/presentationml/2006/main">
+<p:notes xmlns:a="http://schemas.openxmlformats.org/drawingml/2006/main" xmlns:r="http://schemas.openxmlformats.org/officeDocument/2006/relationships" xmlns:mc="http://schemas.openxmlformats.org/markup-compatibility/2006" xmlns:mv="urn:schemas-microsoft-com:mac:vml" xmlns:p="http://schemas.openxmlformats.org/presentationml/2006/main" mc:Ignorable="mv" mc:PreserveAttributes="mv:*">
   <p:cSld>
     <p:spTree>
       <p:nvGrpSpPr>
@@ -770,7 +770,7 @@
     </p:spTree>
     <p:extLst>
       <p:ext uri="{BB962C8B-B14F-4D97-AF65-F5344CB8AC3E}">
-        <p14:creationId xmlns:p14="http://schemas.microsoft.com/office/powerpoint/2010/main" val="461632318"/>
+        <p14:creationId xmlns:p14="http://schemas.microsoft.com/office/powerpoint/2010/main" xmlns:p="http://schemas.openxmlformats.org/presentationml/2006/main" xmlns:r="http://schemas.openxmlformats.org/officeDocument/2006/relationships" xmlns:a="http://schemas.openxmlformats.org/drawingml/2006/main" xmlns="" val="461632318"/>
       </p:ext>
     </p:extLst>
   </p:cSld>
@@ -781,7 +781,7 @@
 </file>
 
 <file path=ppt/notesSlides/notesSlide10.xml><?xml version="1.0" encoding="utf-8"?>
-<p:notes xmlns:a="http://schemas.openxmlformats.org/drawingml/2006/main" xmlns:r="http://schemas.openxmlformats.org/officeDocument/2006/relationships" xmlns:p="http://schemas.openxmlformats.org/presentationml/2006/main">
+<p:notes xmlns:a="http://schemas.openxmlformats.org/drawingml/2006/main" xmlns:r="http://schemas.openxmlformats.org/officeDocument/2006/relationships" xmlns:mc="http://schemas.openxmlformats.org/markup-compatibility/2006" xmlns:mv="urn:schemas-microsoft-com:mac:vml" xmlns:p="http://schemas.openxmlformats.org/presentationml/2006/main" mc:Ignorable="mv" mc:PreserveAttributes="mv:*">
   <p:cSld>
     <p:spTree>
       <p:nvGrpSpPr>
@@ -871,7 +871,7 @@
     </p:spTree>
     <p:extLst>
       <p:ext uri="{BB962C8B-B14F-4D97-AF65-F5344CB8AC3E}">
-        <p14:creationId xmlns:p14="http://schemas.microsoft.com/office/powerpoint/2010/main" val="1838510240"/>
+        <p14:creationId xmlns:p14="http://schemas.microsoft.com/office/powerpoint/2010/main" xmlns:p="http://schemas.openxmlformats.org/presentationml/2006/main" xmlns:r="http://schemas.openxmlformats.org/officeDocument/2006/relationships" xmlns:a="http://schemas.openxmlformats.org/drawingml/2006/main" xmlns="" val="1838510240"/>
       </p:ext>
     </p:extLst>
   </p:cSld>
@@ -882,7 +882,7 @@
 </file>
 
 <file path=ppt/notesSlides/notesSlide11.xml><?xml version="1.0" encoding="utf-8"?>
-<p:notes xmlns:a="http://schemas.openxmlformats.org/drawingml/2006/main" xmlns:r="http://schemas.openxmlformats.org/officeDocument/2006/relationships" xmlns:p="http://schemas.openxmlformats.org/presentationml/2006/main">
+<p:notes xmlns:a="http://schemas.openxmlformats.org/drawingml/2006/main" xmlns:r="http://schemas.openxmlformats.org/officeDocument/2006/relationships" xmlns:mc="http://schemas.openxmlformats.org/markup-compatibility/2006" xmlns:mv="urn:schemas-microsoft-com:mac:vml" xmlns:p="http://schemas.openxmlformats.org/presentationml/2006/main" mc:Ignorable="mv" mc:PreserveAttributes="mv:*">
   <p:cSld>
     <p:spTree>
       <p:nvGrpSpPr>
@@ -1059,7 +1059,7 @@
     </p:spTree>
     <p:extLst>
       <p:ext uri="{BB962C8B-B14F-4D97-AF65-F5344CB8AC3E}">
-        <p14:creationId xmlns:p14="http://schemas.microsoft.com/office/powerpoint/2010/main" val="1023281219"/>
+        <p14:creationId xmlns:p14="http://schemas.microsoft.com/office/powerpoint/2010/main" xmlns:p="http://schemas.openxmlformats.org/presentationml/2006/main" xmlns:r="http://schemas.openxmlformats.org/officeDocument/2006/relationships" xmlns:a="http://schemas.openxmlformats.org/drawingml/2006/main" xmlns="" val="1023281219"/>
       </p:ext>
     </p:extLst>
   </p:cSld>
@@ -1070,7 +1070,7 @@
 </file>
 
 <file path=ppt/notesSlides/notesSlide12.xml><?xml version="1.0" encoding="utf-8"?>
-<p:notes xmlns:a="http://schemas.openxmlformats.org/drawingml/2006/main" xmlns:r="http://schemas.openxmlformats.org/officeDocument/2006/relationships" xmlns:p="http://schemas.openxmlformats.org/presentationml/2006/main">
+<p:notes xmlns:a="http://schemas.openxmlformats.org/drawingml/2006/main" xmlns:r="http://schemas.openxmlformats.org/officeDocument/2006/relationships" xmlns:mc="http://schemas.openxmlformats.org/markup-compatibility/2006" xmlns:mv="urn:schemas-microsoft-com:mac:vml" xmlns:p="http://schemas.openxmlformats.org/presentationml/2006/main" mc:Ignorable="mv" mc:PreserveAttributes="mv:*">
   <p:cSld>
     <p:spTree>
       <p:nvGrpSpPr>
@@ -1201,7 +1201,7 @@
     </p:spTree>
     <p:extLst>
       <p:ext uri="{BB962C8B-B14F-4D97-AF65-F5344CB8AC3E}">
-        <p14:creationId xmlns:p14="http://schemas.microsoft.com/office/powerpoint/2010/main" val="1120424473"/>
+        <p14:creationId xmlns:p14="http://schemas.microsoft.com/office/powerpoint/2010/main" xmlns:p="http://schemas.openxmlformats.org/presentationml/2006/main" xmlns:r="http://schemas.openxmlformats.org/officeDocument/2006/relationships" xmlns:a="http://schemas.openxmlformats.org/drawingml/2006/main" xmlns="" val="1120424473"/>
       </p:ext>
     </p:extLst>
   </p:cSld>
@@ -1212,7 +1212,7 @@
 </file>
 
 <file path=ppt/notesSlides/notesSlide13.xml><?xml version="1.0" encoding="utf-8"?>
-<p:notes xmlns:a="http://schemas.openxmlformats.org/drawingml/2006/main" xmlns:r="http://schemas.openxmlformats.org/officeDocument/2006/relationships" xmlns:p="http://schemas.openxmlformats.org/presentationml/2006/main">
+<p:notes xmlns:a="http://schemas.openxmlformats.org/drawingml/2006/main" xmlns:r="http://schemas.openxmlformats.org/officeDocument/2006/relationships" xmlns:mc="http://schemas.openxmlformats.org/markup-compatibility/2006" xmlns:mv="urn:schemas-microsoft-com:mac:vml" xmlns:p="http://schemas.openxmlformats.org/presentationml/2006/main" mc:Ignorable="mv" mc:PreserveAttributes="mv:*">
   <p:cSld>
     <p:spTree>
       <p:nvGrpSpPr>
@@ -1290,7 +1290,7 @@
     </p:spTree>
     <p:extLst>
       <p:ext uri="{BB962C8B-B14F-4D97-AF65-F5344CB8AC3E}">
-        <p14:creationId xmlns:p14="http://schemas.microsoft.com/office/powerpoint/2010/main" val="1407957544"/>
+        <p14:creationId xmlns:p14="http://schemas.microsoft.com/office/powerpoint/2010/main" xmlns:p="http://schemas.openxmlformats.org/presentationml/2006/main" xmlns:r="http://schemas.openxmlformats.org/officeDocument/2006/relationships" xmlns:a="http://schemas.openxmlformats.org/drawingml/2006/main" xmlns="" val="1407957544"/>
       </p:ext>
     </p:extLst>
   </p:cSld>
@@ -1301,7 +1301,7 @@
 </file>
 
 <file path=ppt/notesSlides/notesSlide14.xml><?xml version="1.0" encoding="utf-8"?>
-<p:notes xmlns:a="http://schemas.openxmlformats.org/drawingml/2006/main" xmlns:r="http://schemas.openxmlformats.org/officeDocument/2006/relationships" xmlns:p="http://schemas.openxmlformats.org/presentationml/2006/main">
+<p:notes xmlns:a="http://schemas.openxmlformats.org/drawingml/2006/main" xmlns:r="http://schemas.openxmlformats.org/officeDocument/2006/relationships" xmlns:mc="http://schemas.openxmlformats.org/markup-compatibility/2006" xmlns:mv="urn:schemas-microsoft-com:mac:vml" xmlns:p="http://schemas.openxmlformats.org/presentationml/2006/main" mc:Ignorable="mv" mc:PreserveAttributes="mv:*">
   <p:cSld>
     <p:spTree>
       <p:nvGrpSpPr>
@@ -1399,7 +1399,7 @@
     </p:spTree>
     <p:extLst>
       <p:ext uri="{BB962C8B-B14F-4D97-AF65-F5344CB8AC3E}">
-        <p14:creationId xmlns:p14="http://schemas.microsoft.com/office/powerpoint/2010/main" val="728320368"/>
+        <p14:creationId xmlns:p14="http://schemas.microsoft.com/office/powerpoint/2010/main" xmlns:p="http://schemas.openxmlformats.org/presentationml/2006/main" xmlns:r="http://schemas.openxmlformats.org/officeDocument/2006/relationships" xmlns:a="http://schemas.openxmlformats.org/drawingml/2006/main" xmlns="" val="728320368"/>
       </p:ext>
     </p:extLst>
   </p:cSld>
@@ -1410,7 +1410,7 @@
 </file>
 
 <file path=ppt/notesSlides/notesSlide15.xml><?xml version="1.0" encoding="utf-8"?>
-<p:notes xmlns:a="http://schemas.openxmlformats.org/drawingml/2006/main" xmlns:r="http://schemas.openxmlformats.org/officeDocument/2006/relationships" xmlns:p="http://schemas.openxmlformats.org/presentationml/2006/main">
+<p:notes xmlns:a="http://schemas.openxmlformats.org/drawingml/2006/main" xmlns:r="http://schemas.openxmlformats.org/officeDocument/2006/relationships" xmlns:mc="http://schemas.openxmlformats.org/markup-compatibility/2006" xmlns:mv="urn:schemas-microsoft-com:mac:vml" xmlns:p="http://schemas.openxmlformats.org/presentationml/2006/main" mc:Ignorable="mv" mc:PreserveAttributes="mv:*">
   <p:cSld>
     <p:spTree>
       <p:nvGrpSpPr>
@@ -1492,7 +1492,7 @@
     </p:spTree>
     <p:extLst>
       <p:ext uri="{BB962C8B-B14F-4D97-AF65-F5344CB8AC3E}">
-        <p14:creationId xmlns:p14="http://schemas.microsoft.com/office/powerpoint/2010/main" val="122903841"/>
+        <p14:creationId xmlns:p14="http://schemas.microsoft.com/office/powerpoint/2010/main" xmlns:p="http://schemas.openxmlformats.org/presentationml/2006/main" xmlns:r="http://schemas.openxmlformats.org/officeDocument/2006/relationships" xmlns:a="http://schemas.openxmlformats.org/drawingml/2006/main" xmlns="" val="122903841"/>
       </p:ext>
     </p:extLst>
   </p:cSld>
@@ -1503,7 +1503,7 @@
 </file>
 
 <file path=ppt/notesSlides/notesSlide16.xml><?xml version="1.0" encoding="utf-8"?>
-<p:notes xmlns:a="http://schemas.openxmlformats.org/drawingml/2006/main" xmlns:r="http://schemas.openxmlformats.org/officeDocument/2006/relationships" xmlns:p="http://schemas.openxmlformats.org/presentationml/2006/main">
+<p:notes xmlns:a="http://schemas.openxmlformats.org/drawingml/2006/main" xmlns:r="http://schemas.openxmlformats.org/officeDocument/2006/relationships" xmlns:mc="http://schemas.openxmlformats.org/markup-compatibility/2006" xmlns:mv="urn:schemas-microsoft-com:mac:vml" xmlns:p="http://schemas.openxmlformats.org/presentationml/2006/main" mc:Ignorable="mv" mc:PreserveAttributes="mv:*">
   <p:cSld>
     <p:spTree>
       <p:nvGrpSpPr>
@@ -1774,7 +1774,7 @@
     </p:spTree>
     <p:extLst>
       <p:ext uri="{BB962C8B-B14F-4D97-AF65-F5344CB8AC3E}">
-        <p14:creationId xmlns:p14="http://schemas.microsoft.com/office/powerpoint/2010/main" val="522038541"/>
+        <p14:creationId xmlns:p14="http://schemas.microsoft.com/office/powerpoint/2010/main" xmlns:p="http://schemas.openxmlformats.org/presentationml/2006/main" xmlns:r="http://schemas.openxmlformats.org/officeDocument/2006/relationships" xmlns:a="http://schemas.openxmlformats.org/drawingml/2006/main" xmlns="" val="522038541"/>
       </p:ext>
     </p:extLst>
   </p:cSld>
@@ -1785,7 +1785,7 @@
 </file>
 
 <file path=ppt/notesSlides/notesSlide17.xml><?xml version="1.0" encoding="utf-8"?>
-<p:notes xmlns:a="http://schemas.openxmlformats.org/drawingml/2006/main" xmlns:r="http://schemas.openxmlformats.org/officeDocument/2006/relationships" xmlns:p="http://schemas.openxmlformats.org/presentationml/2006/main">
+<p:notes xmlns:a="http://schemas.openxmlformats.org/drawingml/2006/main" xmlns:r="http://schemas.openxmlformats.org/officeDocument/2006/relationships" xmlns:mc="http://schemas.openxmlformats.org/markup-compatibility/2006" xmlns:mv="urn:schemas-microsoft-com:mac:vml" xmlns:p="http://schemas.openxmlformats.org/presentationml/2006/main" mc:Ignorable="mv" mc:PreserveAttributes="mv:*">
   <p:cSld>
     <p:spTree>
       <p:nvGrpSpPr>
@@ -1891,7 +1891,7 @@
     </p:spTree>
     <p:extLst>
       <p:ext uri="{BB962C8B-B14F-4D97-AF65-F5344CB8AC3E}">
-        <p14:creationId xmlns:p14="http://schemas.microsoft.com/office/powerpoint/2010/main" val="527839127"/>
+        <p14:creationId xmlns:p14="http://schemas.microsoft.com/office/powerpoint/2010/main" xmlns:p="http://schemas.openxmlformats.org/presentationml/2006/main" xmlns:r="http://schemas.openxmlformats.org/officeDocument/2006/relationships" xmlns:a="http://schemas.openxmlformats.org/drawingml/2006/main" xmlns="" val="527839127"/>
       </p:ext>
     </p:extLst>
   </p:cSld>
@@ -1902,7 +1902,7 @@
 </file>
 
 <file path=ppt/notesSlides/notesSlide18.xml><?xml version="1.0" encoding="utf-8"?>
-<p:notes xmlns:a="http://schemas.openxmlformats.org/drawingml/2006/main" xmlns:r="http://schemas.openxmlformats.org/officeDocument/2006/relationships" xmlns:p="http://schemas.openxmlformats.org/presentationml/2006/main">
+<p:notes xmlns:a="http://schemas.openxmlformats.org/drawingml/2006/main" xmlns:r="http://schemas.openxmlformats.org/officeDocument/2006/relationships" xmlns:mc="http://schemas.openxmlformats.org/markup-compatibility/2006" xmlns:mv="urn:schemas-microsoft-com:mac:vml" xmlns:p="http://schemas.openxmlformats.org/presentationml/2006/main" mc:Ignorable="mv" mc:PreserveAttributes="mv:*">
   <p:cSld>
     <p:spTree>
       <p:nvGrpSpPr>
@@ -1964,19 +1964,7 @@
             </a:pPr>
             <a:r>
               <a:rPr lang="en-US" baseline="0" dirty="0" smtClean="0"/>
-              <a:t>Clusters are a logical grouping of EC2 instances. EC2 instances </a:t>
-            </a:r>
-            <a:r>
-              <a:rPr lang="en-US" baseline="0" dirty="0" smtClean="0"/>
-              <a:t>run an agent </a:t>
-            </a:r>
-            <a:r>
-              <a:rPr lang="en-US" baseline="0" dirty="0" smtClean="0"/>
-              <a:t>that will register the instance with a cluster and begin accepting tasks </a:t>
-            </a:r>
-            <a:r>
-              <a:rPr lang="en-US" baseline="0" dirty="0" smtClean="0"/>
-              <a:t>to run with </a:t>
+              <a:t>Clusters are a logical grouping of EC2 instances. EC2 instances run an agent that will register the instance with a cluster and begin accepting tasks to run with </a:t>
             </a:r>
             <a:r>
               <a:rPr lang="en-US" baseline="0" dirty="0" err="1" smtClean="0"/>
@@ -2047,7 +2035,7 @@
     </p:spTree>
     <p:extLst>
       <p:ext uri="{BB962C8B-B14F-4D97-AF65-F5344CB8AC3E}">
-        <p14:creationId xmlns:p14="http://schemas.microsoft.com/office/powerpoint/2010/main" val="978342375"/>
+        <p14:creationId xmlns:p14="http://schemas.microsoft.com/office/powerpoint/2010/main" xmlns:p="http://schemas.openxmlformats.org/presentationml/2006/main" xmlns:r="http://schemas.openxmlformats.org/officeDocument/2006/relationships" xmlns:a="http://schemas.openxmlformats.org/drawingml/2006/main" xmlns="" val="978342375"/>
       </p:ext>
     </p:extLst>
   </p:cSld>
@@ -2058,7 +2046,7 @@
 </file>
 
 <file path=ppt/notesSlides/notesSlide19.xml><?xml version="1.0" encoding="utf-8"?>
-<p:notes xmlns:a="http://schemas.openxmlformats.org/drawingml/2006/main" xmlns:r="http://schemas.openxmlformats.org/officeDocument/2006/relationships" xmlns:p="http://schemas.openxmlformats.org/presentationml/2006/main">
+<p:notes xmlns:a="http://schemas.openxmlformats.org/drawingml/2006/main" xmlns:r="http://schemas.openxmlformats.org/officeDocument/2006/relationships" xmlns:mc="http://schemas.openxmlformats.org/markup-compatibility/2006" xmlns:mv="urn:schemas-microsoft-com:mac:vml" xmlns:p="http://schemas.openxmlformats.org/presentationml/2006/main" mc:Ignorable="mv" mc:PreserveAttributes="mv:*">
   <p:cSld>
     <p:spTree>
       <p:nvGrpSpPr>
@@ -2140,7 +2128,7 @@
     </p:spTree>
     <p:extLst>
       <p:ext uri="{BB962C8B-B14F-4D97-AF65-F5344CB8AC3E}">
-        <p14:creationId xmlns:p14="http://schemas.microsoft.com/office/powerpoint/2010/main" val="2082005316"/>
+        <p14:creationId xmlns:p14="http://schemas.microsoft.com/office/powerpoint/2010/main" xmlns:p="http://schemas.openxmlformats.org/presentationml/2006/main" xmlns:r="http://schemas.openxmlformats.org/officeDocument/2006/relationships" xmlns:a="http://schemas.openxmlformats.org/drawingml/2006/main" xmlns="" val="2082005316"/>
       </p:ext>
     </p:extLst>
   </p:cSld>
@@ -2151,7 +2139,7 @@
 </file>
 
 <file path=ppt/notesSlides/notesSlide2.xml><?xml version="1.0" encoding="utf-8"?>
-<p:notes xmlns:a="http://schemas.openxmlformats.org/drawingml/2006/main" xmlns:r="http://schemas.openxmlformats.org/officeDocument/2006/relationships" xmlns:p="http://schemas.openxmlformats.org/presentationml/2006/main">
+<p:notes xmlns:a="http://schemas.openxmlformats.org/drawingml/2006/main" xmlns:r="http://schemas.openxmlformats.org/officeDocument/2006/relationships" xmlns:mc="http://schemas.openxmlformats.org/markup-compatibility/2006" xmlns:mv="urn:schemas-microsoft-com:mac:vml" xmlns:p="http://schemas.openxmlformats.org/presentationml/2006/main" mc:Ignorable="mv" mc:PreserveAttributes="mv:*">
   <p:cSld>
     <p:spTree>
       <p:nvGrpSpPr>
@@ -2288,7 +2276,7 @@
     </p:spTree>
     <p:extLst>
       <p:ext uri="{BB962C8B-B14F-4D97-AF65-F5344CB8AC3E}">
-        <p14:creationId xmlns:p14="http://schemas.microsoft.com/office/powerpoint/2010/main" val="1689963030"/>
+        <p14:creationId xmlns:p14="http://schemas.microsoft.com/office/powerpoint/2010/main" xmlns:p="http://schemas.openxmlformats.org/presentationml/2006/main" xmlns:r="http://schemas.openxmlformats.org/officeDocument/2006/relationships" xmlns:a="http://schemas.openxmlformats.org/drawingml/2006/main" xmlns="" val="1689963030"/>
       </p:ext>
     </p:extLst>
   </p:cSld>
@@ -2299,7 +2287,7 @@
 </file>
 
 <file path=ppt/notesSlides/notesSlide20.xml><?xml version="1.0" encoding="utf-8"?>
-<p:notes xmlns:a="http://schemas.openxmlformats.org/drawingml/2006/main" xmlns:r="http://schemas.openxmlformats.org/officeDocument/2006/relationships" xmlns:p="http://schemas.openxmlformats.org/presentationml/2006/main">
+<p:notes xmlns:a="http://schemas.openxmlformats.org/drawingml/2006/main" xmlns:r="http://schemas.openxmlformats.org/officeDocument/2006/relationships" xmlns:mc="http://schemas.openxmlformats.org/markup-compatibility/2006" xmlns:mv="urn:schemas-microsoft-com:mac:vml" xmlns:p="http://schemas.openxmlformats.org/presentationml/2006/main" mc:Ignorable="mv" mc:PreserveAttributes="mv:*">
   <p:cSld>
     <p:spTree>
       <p:nvGrpSpPr>
@@ -2390,7 +2378,7 @@
     </p:spTree>
     <p:extLst>
       <p:ext uri="{BB962C8B-B14F-4D97-AF65-F5344CB8AC3E}">
-        <p14:creationId xmlns:p14="http://schemas.microsoft.com/office/powerpoint/2010/main" val="527881731"/>
+        <p14:creationId xmlns:p14="http://schemas.microsoft.com/office/powerpoint/2010/main" xmlns:p="http://schemas.openxmlformats.org/presentationml/2006/main" xmlns:r="http://schemas.openxmlformats.org/officeDocument/2006/relationships" xmlns:a="http://schemas.openxmlformats.org/drawingml/2006/main" xmlns="" val="527881731"/>
       </p:ext>
     </p:extLst>
   </p:cSld>
@@ -2401,7 +2389,7 @@
 </file>
 
 <file path=ppt/notesSlides/notesSlide21.xml><?xml version="1.0" encoding="utf-8"?>
-<p:notes xmlns:a="http://schemas.openxmlformats.org/drawingml/2006/main" xmlns:r="http://schemas.openxmlformats.org/officeDocument/2006/relationships" xmlns:p="http://schemas.openxmlformats.org/presentationml/2006/main">
+<p:notes xmlns:a="http://schemas.openxmlformats.org/drawingml/2006/main" xmlns:r="http://schemas.openxmlformats.org/officeDocument/2006/relationships" xmlns:mc="http://schemas.openxmlformats.org/markup-compatibility/2006" xmlns:mv="urn:schemas-microsoft-com:mac:vml" xmlns:p="http://schemas.openxmlformats.org/presentationml/2006/main" mc:Ignorable="mv" mc:PreserveAttributes="mv:*">
   <p:cSld>
     <p:spTree>
       <p:nvGrpSpPr>
@@ -2491,7 +2479,7 @@
     </p:spTree>
     <p:extLst>
       <p:ext uri="{BB962C8B-B14F-4D97-AF65-F5344CB8AC3E}">
-        <p14:creationId xmlns:p14="http://schemas.microsoft.com/office/powerpoint/2010/main" val="1480234258"/>
+        <p14:creationId xmlns:p14="http://schemas.microsoft.com/office/powerpoint/2010/main" xmlns:p="http://schemas.openxmlformats.org/presentationml/2006/main" xmlns:r="http://schemas.openxmlformats.org/officeDocument/2006/relationships" xmlns:a="http://schemas.openxmlformats.org/drawingml/2006/main" xmlns="" val="1480234258"/>
       </p:ext>
     </p:extLst>
   </p:cSld>
@@ -2502,7 +2490,7 @@
 </file>
 
 <file path=ppt/notesSlides/notesSlide22.xml><?xml version="1.0" encoding="utf-8"?>
-<p:notes xmlns:a="http://schemas.openxmlformats.org/drawingml/2006/main" xmlns:r="http://schemas.openxmlformats.org/officeDocument/2006/relationships" xmlns:p="http://schemas.openxmlformats.org/presentationml/2006/main">
+<p:notes xmlns:a="http://schemas.openxmlformats.org/drawingml/2006/main" xmlns:r="http://schemas.openxmlformats.org/officeDocument/2006/relationships" xmlns:mc="http://schemas.openxmlformats.org/markup-compatibility/2006" xmlns:mv="urn:schemas-microsoft-com:mac:vml" xmlns:p="http://schemas.openxmlformats.org/presentationml/2006/main" mc:Ignorable="mv" mc:PreserveAttributes="mv:*">
   <p:cSld>
     <p:spTree>
       <p:nvGrpSpPr>
@@ -2588,7 +2576,7 @@
     </p:spTree>
     <p:extLst>
       <p:ext uri="{BB962C8B-B14F-4D97-AF65-F5344CB8AC3E}">
-        <p14:creationId xmlns:p14="http://schemas.microsoft.com/office/powerpoint/2010/main" val="788776861"/>
+        <p14:creationId xmlns:p14="http://schemas.microsoft.com/office/powerpoint/2010/main" xmlns:p="http://schemas.openxmlformats.org/presentationml/2006/main" xmlns:r="http://schemas.openxmlformats.org/officeDocument/2006/relationships" xmlns:a="http://schemas.openxmlformats.org/drawingml/2006/main" xmlns="" val="788776861"/>
       </p:ext>
     </p:extLst>
   </p:cSld>
@@ -2599,7 +2587,7 @@
 </file>
 
 <file path=ppt/notesSlides/notesSlide23.xml><?xml version="1.0" encoding="utf-8"?>
-<p:notes xmlns:a="http://schemas.openxmlformats.org/drawingml/2006/main" xmlns:r="http://schemas.openxmlformats.org/officeDocument/2006/relationships" xmlns:p="http://schemas.openxmlformats.org/presentationml/2006/main">
+<p:notes xmlns:a="http://schemas.openxmlformats.org/drawingml/2006/main" xmlns:r="http://schemas.openxmlformats.org/officeDocument/2006/relationships" xmlns:mc="http://schemas.openxmlformats.org/markup-compatibility/2006" xmlns:mv="urn:schemas-microsoft-com:mac:vml" xmlns:p="http://schemas.openxmlformats.org/presentationml/2006/main" mc:Ignorable="mv" mc:PreserveAttributes="mv:*">
   <p:cSld>
     <p:spTree>
       <p:nvGrpSpPr>
@@ -2690,7 +2678,7 @@
     </p:spTree>
     <p:extLst>
       <p:ext uri="{BB962C8B-B14F-4D97-AF65-F5344CB8AC3E}">
-        <p14:creationId xmlns:p14="http://schemas.microsoft.com/office/powerpoint/2010/main" val="881273466"/>
+        <p14:creationId xmlns:p14="http://schemas.microsoft.com/office/powerpoint/2010/main" xmlns:p="http://schemas.openxmlformats.org/presentationml/2006/main" xmlns:r="http://schemas.openxmlformats.org/officeDocument/2006/relationships" xmlns:a="http://schemas.openxmlformats.org/drawingml/2006/main" xmlns="" val="881273466"/>
       </p:ext>
     </p:extLst>
   </p:cSld>
@@ -2701,7 +2689,7 @@
 </file>
 
 <file path=ppt/notesSlides/notesSlide24.xml><?xml version="1.0" encoding="utf-8"?>
-<p:notes xmlns:a="http://schemas.openxmlformats.org/drawingml/2006/main" xmlns:r="http://schemas.openxmlformats.org/officeDocument/2006/relationships" xmlns:p="http://schemas.openxmlformats.org/presentationml/2006/main">
+<p:notes xmlns:a="http://schemas.openxmlformats.org/drawingml/2006/main" xmlns:r="http://schemas.openxmlformats.org/officeDocument/2006/relationships" xmlns:mc="http://schemas.openxmlformats.org/markup-compatibility/2006" xmlns:mv="urn:schemas-microsoft-com:mac:vml" xmlns:p="http://schemas.openxmlformats.org/presentationml/2006/main" mc:Ignorable="mv" mc:PreserveAttributes="mv:*">
   <p:cSld>
     <p:spTree>
       <p:nvGrpSpPr>
@@ -2807,7 +2795,7 @@
     </p:spTree>
     <p:extLst>
       <p:ext uri="{BB962C8B-B14F-4D97-AF65-F5344CB8AC3E}">
-        <p14:creationId xmlns:p14="http://schemas.microsoft.com/office/powerpoint/2010/main" val="368429703"/>
+        <p14:creationId xmlns:p14="http://schemas.microsoft.com/office/powerpoint/2010/main" xmlns:p="http://schemas.openxmlformats.org/presentationml/2006/main" xmlns:r="http://schemas.openxmlformats.org/officeDocument/2006/relationships" xmlns:a="http://schemas.openxmlformats.org/drawingml/2006/main" xmlns="" val="368429703"/>
       </p:ext>
     </p:extLst>
   </p:cSld>
@@ -2818,7 +2806,7 @@
 </file>
 
 <file path=ppt/notesSlides/notesSlide25.xml><?xml version="1.0" encoding="utf-8"?>
-<p:notes xmlns:a="http://schemas.openxmlformats.org/drawingml/2006/main" xmlns:r="http://schemas.openxmlformats.org/officeDocument/2006/relationships" xmlns:p="http://schemas.openxmlformats.org/presentationml/2006/main">
+<p:notes xmlns:a="http://schemas.openxmlformats.org/drawingml/2006/main" xmlns:r="http://schemas.openxmlformats.org/officeDocument/2006/relationships" xmlns:mc="http://schemas.openxmlformats.org/markup-compatibility/2006" xmlns:mv="urn:schemas-microsoft-com:mac:vml" xmlns:p="http://schemas.openxmlformats.org/presentationml/2006/main" mc:Ignorable="mv" mc:PreserveAttributes="mv:*">
   <p:cSld>
     <p:spTree>
       <p:nvGrpSpPr>
@@ -2900,7 +2888,7 @@
     </p:spTree>
     <p:extLst>
       <p:ext uri="{BB962C8B-B14F-4D97-AF65-F5344CB8AC3E}">
-        <p14:creationId xmlns:p14="http://schemas.microsoft.com/office/powerpoint/2010/main" val="1058275855"/>
+        <p14:creationId xmlns:p14="http://schemas.microsoft.com/office/powerpoint/2010/main" xmlns:p="http://schemas.openxmlformats.org/presentationml/2006/main" xmlns:r="http://schemas.openxmlformats.org/officeDocument/2006/relationships" xmlns:a="http://schemas.openxmlformats.org/drawingml/2006/main" xmlns="" val="1058275855"/>
       </p:ext>
     </p:extLst>
   </p:cSld>
@@ -2911,7 +2899,7 @@
 </file>
 
 <file path=ppt/notesSlides/notesSlide26.xml><?xml version="1.0" encoding="utf-8"?>
-<p:notes xmlns:a="http://schemas.openxmlformats.org/drawingml/2006/main" xmlns:r="http://schemas.openxmlformats.org/officeDocument/2006/relationships" xmlns:p="http://schemas.openxmlformats.org/presentationml/2006/main">
+<p:notes xmlns:a="http://schemas.openxmlformats.org/drawingml/2006/main" xmlns:r="http://schemas.openxmlformats.org/officeDocument/2006/relationships" xmlns:mc="http://schemas.openxmlformats.org/markup-compatibility/2006" xmlns:mv="urn:schemas-microsoft-com:mac:vml" xmlns:p="http://schemas.openxmlformats.org/presentationml/2006/main" mc:Ignorable="mv" mc:PreserveAttributes="mv:*">
   <p:cSld>
     <p:spTree>
       <p:nvGrpSpPr>
@@ -3033,7 +3021,7 @@
     </p:spTree>
     <p:extLst>
       <p:ext uri="{BB962C8B-B14F-4D97-AF65-F5344CB8AC3E}">
-        <p14:creationId xmlns:p14="http://schemas.microsoft.com/office/powerpoint/2010/main" val="284401046"/>
+        <p14:creationId xmlns:p14="http://schemas.microsoft.com/office/powerpoint/2010/main" xmlns:p="http://schemas.openxmlformats.org/presentationml/2006/main" xmlns:r="http://schemas.openxmlformats.org/officeDocument/2006/relationships" xmlns:a="http://schemas.openxmlformats.org/drawingml/2006/main" xmlns="" val="284401046"/>
       </p:ext>
     </p:extLst>
   </p:cSld>
@@ -3044,7 +3032,7 @@
 </file>
 
 <file path=ppt/notesSlides/notesSlide27.xml><?xml version="1.0" encoding="utf-8"?>
-<p:notes xmlns:a="http://schemas.openxmlformats.org/drawingml/2006/main" xmlns:r="http://schemas.openxmlformats.org/officeDocument/2006/relationships" xmlns:p="http://schemas.openxmlformats.org/presentationml/2006/main">
+<p:notes xmlns:a="http://schemas.openxmlformats.org/drawingml/2006/main" xmlns:r="http://schemas.openxmlformats.org/officeDocument/2006/relationships" xmlns:mc="http://schemas.openxmlformats.org/markup-compatibility/2006" xmlns:mv="urn:schemas-microsoft-com:mac:vml" xmlns:p="http://schemas.openxmlformats.org/presentationml/2006/main" mc:Ignorable="mv" mc:PreserveAttributes="mv:*">
   <p:cSld>
     <p:spTree>
       <p:nvGrpSpPr>
@@ -3109,15 +3097,7 @@
             </a:r>
             <a:r>
               <a:rPr lang="en-US" baseline="0" dirty="0" smtClean="0"/>
-              <a:t> commit that they want to run. This gets combined with the current configuration for the app and turned into a </a:t>
-            </a:r>
-            <a:r>
-              <a:rPr lang="en-US" baseline="0" dirty="0" smtClean="0"/>
-              <a:t>release within Empire. </a:t>
-            </a:r>
-            <a:r>
-              <a:rPr lang="en-US" baseline="0" dirty="0" smtClean="0"/>
-              <a:t>The release is then sent to ECS to run.</a:t>
+              <a:t> commit that they want to run. This gets combined with the current configuration for the app and turned into a release within Empire. The release is then sent to ECS to run.</a:t>
             </a:r>
             <a:endParaRPr lang="en-US" dirty="0"/>
           </a:p>
@@ -3150,7 +3130,7 @@
     </p:spTree>
     <p:extLst>
       <p:ext uri="{BB962C8B-B14F-4D97-AF65-F5344CB8AC3E}">
-        <p14:creationId xmlns:p14="http://schemas.microsoft.com/office/powerpoint/2010/main" val="2107302263"/>
+        <p14:creationId xmlns:p14="http://schemas.microsoft.com/office/powerpoint/2010/main" xmlns:p="http://schemas.openxmlformats.org/presentationml/2006/main" xmlns:r="http://schemas.openxmlformats.org/officeDocument/2006/relationships" xmlns:a="http://schemas.openxmlformats.org/drawingml/2006/main" xmlns="" val="2107302263"/>
       </p:ext>
     </p:extLst>
   </p:cSld>
@@ -3161,7 +3141,7 @@
 </file>
 
 <file path=ppt/notesSlides/notesSlide28.xml><?xml version="1.0" encoding="utf-8"?>
-<p:notes xmlns:a="http://schemas.openxmlformats.org/drawingml/2006/main" xmlns:r="http://schemas.openxmlformats.org/officeDocument/2006/relationships" xmlns:p="http://schemas.openxmlformats.org/presentationml/2006/main">
+<p:notes xmlns:a="http://schemas.openxmlformats.org/drawingml/2006/main" xmlns:r="http://schemas.openxmlformats.org/officeDocument/2006/relationships" xmlns:mc="http://schemas.openxmlformats.org/markup-compatibility/2006" xmlns:mv="urn:schemas-microsoft-com:mac:vml" xmlns:p="http://schemas.openxmlformats.org/presentationml/2006/main" mc:Ignorable="mv" mc:PreserveAttributes="mv:*">
   <p:cSld>
     <p:spTree>
       <p:nvGrpSpPr>
@@ -3292,7 +3272,7 @@
     </p:spTree>
     <p:extLst>
       <p:ext uri="{BB962C8B-B14F-4D97-AF65-F5344CB8AC3E}">
-        <p14:creationId xmlns:p14="http://schemas.microsoft.com/office/powerpoint/2010/main" val="1980234669"/>
+        <p14:creationId xmlns:p14="http://schemas.microsoft.com/office/powerpoint/2010/main" xmlns:p="http://schemas.openxmlformats.org/presentationml/2006/main" xmlns:r="http://schemas.openxmlformats.org/officeDocument/2006/relationships" xmlns:a="http://schemas.openxmlformats.org/drawingml/2006/main" xmlns="" val="1980234669"/>
       </p:ext>
     </p:extLst>
   </p:cSld>
@@ -3303,7 +3283,7 @@
 </file>
 
 <file path=ppt/notesSlides/notesSlide29.xml><?xml version="1.0" encoding="utf-8"?>
-<p:notes xmlns:a="http://schemas.openxmlformats.org/drawingml/2006/main" xmlns:r="http://schemas.openxmlformats.org/officeDocument/2006/relationships" xmlns:p="http://schemas.openxmlformats.org/presentationml/2006/main">
+<p:notes xmlns:a="http://schemas.openxmlformats.org/drawingml/2006/main" xmlns:r="http://schemas.openxmlformats.org/officeDocument/2006/relationships" xmlns:mc="http://schemas.openxmlformats.org/markup-compatibility/2006" xmlns:mv="urn:schemas-microsoft-com:mac:vml" xmlns:p="http://schemas.openxmlformats.org/presentationml/2006/main" mc:Ignorable="mv" mc:PreserveAttributes="mv:*">
   <p:cSld>
     <p:spTree>
       <p:nvGrpSpPr>
@@ -3369,19 +3349,7 @@
           <a:p>
             <a:r>
               <a:rPr lang="en-US" baseline="0" dirty="0" smtClean="0"/>
-              <a:t>By default, all applications that expose a web process are considered internal, meaning that they are only accessible within the VPC. Empire </a:t>
-            </a:r>
-            <a:r>
-              <a:rPr lang="en-US" baseline="0" dirty="0" smtClean="0"/>
-              <a:t>also supports </a:t>
-            </a:r>
-            <a:r>
-              <a:rPr lang="en-US" baseline="0" dirty="0" smtClean="0"/>
-              <a:t>making an </a:t>
-            </a:r>
-            <a:r>
-              <a:rPr lang="en-US" baseline="0" dirty="0" smtClean="0"/>
-              <a:t>application external to allow for internet facing traffic.</a:t>
+              <a:t>By default, all applications that expose a web process are considered internal, meaning that they are only accessible within the VPC. Empire also supports making an application external to allow for internet facing traffic.</a:t>
             </a:r>
             <a:endParaRPr lang="en-US" dirty="0"/>
           </a:p>
@@ -3414,7 +3382,7 @@
     </p:spTree>
     <p:extLst>
       <p:ext uri="{BB962C8B-B14F-4D97-AF65-F5344CB8AC3E}">
-        <p14:creationId xmlns:p14="http://schemas.microsoft.com/office/powerpoint/2010/main" val="482006622"/>
+        <p14:creationId xmlns:p14="http://schemas.microsoft.com/office/powerpoint/2010/main" xmlns:p="http://schemas.openxmlformats.org/presentationml/2006/main" xmlns:r="http://schemas.openxmlformats.org/officeDocument/2006/relationships" xmlns:a="http://schemas.openxmlformats.org/drawingml/2006/main" xmlns="" val="482006622"/>
       </p:ext>
     </p:extLst>
   </p:cSld>
@@ -3425,7 +3393,7 @@
 </file>
 
 <file path=ppt/notesSlides/notesSlide3.xml><?xml version="1.0" encoding="utf-8"?>
-<p:notes xmlns:a="http://schemas.openxmlformats.org/drawingml/2006/main" xmlns:r="http://schemas.openxmlformats.org/officeDocument/2006/relationships" xmlns:p="http://schemas.openxmlformats.org/presentationml/2006/main">
+<p:notes xmlns:a="http://schemas.openxmlformats.org/drawingml/2006/main" xmlns:r="http://schemas.openxmlformats.org/officeDocument/2006/relationships" xmlns:mc="http://schemas.openxmlformats.org/markup-compatibility/2006" xmlns:mv="urn:schemas-microsoft-com:mac:vml" xmlns:p="http://schemas.openxmlformats.org/presentationml/2006/main" mc:Ignorable="mv" mc:PreserveAttributes="mv:*">
   <p:cSld>
     <p:spTree>
       <p:nvGrpSpPr>
@@ -3479,10 +3447,10 @@
                 <a:ea typeface="+mn-ea"/>
                 <a:cs typeface="+mn-cs"/>
               </a:rPr>
-              <a:t>But first, a little bit about myself. My name is Eric Holmes and I’m an infrastructure engineer at Remind. I like building things for other developers. I work mostly with Go these days but my background is primarily in Ruby. I open source a lot of crazy ideas, and you can find them all on my </a:t>
-            </a:r>
-            <a:r>
-              <a:rPr lang="en-US" sz="1200" b="0" i="0" u="none" strike="noStrike" kern="1200" dirty="0" err="1" smtClean="0">
+              <a:t>But first, I’m Mike Barrett, and this</a:t>
+            </a:r>
+            <a:r>
+              <a:rPr lang="en-US" sz="1200" b="0" i="0" u="none" strike="noStrike" kern="1200" baseline="0" dirty="0" smtClean="0">
                 <a:solidFill>
                   <a:schemeClr val="tx1"/>
                 </a:solidFill>
@@ -3491,22 +3459,16 @@
                 <a:ea typeface="+mn-ea"/>
                 <a:cs typeface="+mn-cs"/>
               </a:rPr>
-              <a:t>GitHub</a:t>
-            </a:r>
-            <a:r>
-              <a:rPr lang="en-US" sz="1200" b="0" i="0" u="none" strike="noStrike" kern="1200" dirty="0" smtClean="0">
-                <a:solidFill>
-                  <a:schemeClr val="tx1"/>
-                </a:solidFill>
-                <a:effectLst/>
-                <a:latin typeface="Arial"/>
-                <a:ea typeface="+mn-ea"/>
-                <a:cs typeface="+mn-cs"/>
-              </a:rPr>
-              <a:t>.</a:t>
-            </a:r>
-            <a:endParaRPr lang="en-US" b="0" dirty="0" smtClean="0">
+              <a:t> is Eric Holmes.  We’re infrastructure engineers at Remind.  I’m going to give you a little history, then Eric’s going to go ahead and get into the design &amp; architecture of Empire, the platform we built and open sourced.</a:t>
+            </a:r>
+            <a:endParaRPr lang="en-US" sz="1200" b="0" i="0" u="none" strike="noStrike" kern="1200" dirty="0" smtClean="0">
+              <a:solidFill>
+                <a:schemeClr val="tx1"/>
+              </a:solidFill>
               <a:effectLst/>
+              <a:latin typeface="Arial"/>
+              <a:ea typeface="+mn-ea"/>
+              <a:cs typeface="+mn-cs"/>
             </a:endParaRPr>
           </a:p>
         </p:txBody>
@@ -3538,7 +3500,7 @@
     </p:spTree>
     <p:extLst>
       <p:ext uri="{BB962C8B-B14F-4D97-AF65-F5344CB8AC3E}">
-        <p14:creationId xmlns:p14="http://schemas.microsoft.com/office/powerpoint/2010/main" val="1764799602"/>
+        <p14:creationId xmlns:p14="http://schemas.microsoft.com/office/powerpoint/2010/main" xmlns:p="http://schemas.openxmlformats.org/presentationml/2006/main" xmlns:r="http://schemas.openxmlformats.org/officeDocument/2006/relationships" xmlns:a="http://schemas.openxmlformats.org/drawingml/2006/main" xmlns="" val="1764799602"/>
       </p:ext>
     </p:extLst>
   </p:cSld>
@@ -3549,7 +3511,7 @@
 </file>
 
 <file path=ppt/notesSlides/notesSlide30.xml><?xml version="1.0" encoding="utf-8"?>
-<p:notes xmlns:a="http://schemas.openxmlformats.org/drawingml/2006/main" xmlns:r="http://schemas.openxmlformats.org/officeDocument/2006/relationships" xmlns:p="http://schemas.openxmlformats.org/presentationml/2006/main">
+<p:notes xmlns:a="http://schemas.openxmlformats.org/drawingml/2006/main" xmlns:r="http://schemas.openxmlformats.org/officeDocument/2006/relationships" xmlns:mc="http://schemas.openxmlformats.org/markup-compatibility/2006" xmlns:mv="urn:schemas-microsoft-com:mac:vml" xmlns:p="http://schemas.openxmlformats.org/presentationml/2006/main" mc:Ignorable="mv" mc:PreserveAttributes="mv:*">
   <p:cSld>
     <p:spTree>
       <p:nvGrpSpPr>
@@ -3639,7 +3601,7 @@
     </p:spTree>
     <p:extLst>
       <p:ext uri="{BB962C8B-B14F-4D97-AF65-F5344CB8AC3E}">
-        <p14:creationId xmlns:p14="http://schemas.microsoft.com/office/powerpoint/2010/main" val="1449030827"/>
+        <p14:creationId xmlns:p14="http://schemas.microsoft.com/office/powerpoint/2010/main" xmlns:p="http://schemas.openxmlformats.org/presentationml/2006/main" xmlns:r="http://schemas.openxmlformats.org/officeDocument/2006/relationships" xmlns:a="http://schemas.openxmlformats.org/drawingml/2006/main" xmlns="" val="1449030827"/>
       </p:ext>
     </p:extLst>
   </p:cSld>
@@ -3650,7 +3612,7 @@
 </file>
 
 <file path=ppt/notesSlides/notesSlide31.xml><?xml version="1.0" encoding="utf-8"?>
-<p:notes xmlns:a="http://schemas.openxmlformats.org/drawingml/2006/main" xmlns:r="http://schemas.openxmlformats.org/officeDocument/2006/relationships" xmlns:p="http://schemas.openxmlformats.org/presentationml/2006/main">
+<p:notes xmlns:a="http://schemas.openxmlformats.org/drawingml/2006/main" xmlns:r="http://schemas.openxmlformats.org/officeDocument/2006/relationships" xmlns:mc="http://schemas.openxmlformats.org/markup-compatibility/2006" xmlns:mv="urn:schemas-microsoft-com:mac:vml" xmlns:p="http://schemas.openxmlformats.org/presentationml/2006/main" mc:Ignorable="mv" mc:PreserveAttributes="mv:*">
   <p:cSld>
     <p:spTree>
       <p:nvGrpSpPr>
@@ -3756,7 +3718,7 @@
     </p:spTree>
     <p:extLst>
       <p:ext uri="{BB962C8B-B14F-4D97-AF65-F5344CB8AC3E}">
-        <p14:creationId xmlns:p14="http://schemas.microsoft.com/office/powerpoint/2010/main" val="757552106"/>
+        <p14:creationId xmlns:p14="http://schemas.microsoft.com/office/powerpoint/2010/main" xmlns:p="http://schemas.openxmlformats.org/presentationml/2006/main" xmlns:r="http://schemas.openxmlformats.org/officeDocument/2006/relationships" xmlns:a="http://schemas.openxmlformats.org/drawingml/2006/main" xmlns="" val="757552106"/>
       </p:ext>
     </p:extLst>
   </p:cSld>
@@ -3767,7 +3729,7 @@
 </file>
 
 <file path=ppt/notesSlides/notesSlide32.xml><?xml version="1.0" encoding="utf-8"?>
-<p:notes xmlns:a="http://schemas.openxmlformats.org/drawingml/2006/main" xmlns:r="http://schemas.openxmlformats.org/officeDocument/2006/relationships" xmlns:p="http://schemas.openxmlformats.org/presentationml/2006/main">
+<p:notes xmlns:a="http://schemas.openxmlformats.org/drawingml/2006/main" xmlns:r="http://schemas.openxmlformats.org/officeDocument/2006/relationships" xmlns:mc="http://schemas.openxmlformats.org/markup-compatibility/2006" xmlns:mv="urn:schemas-microsoft-com:mac:vml" xmlns:p="http://schemas.openxmlformats.org/presentationml/2006/main" mc:Ignorable="mv" mc:PreserveAttributes="mv:*">
   <p:cSld>
     <p:spTree>
       <p:nvGrpSpPr>
@@ -3865,7 +3827,7 @@
     </p:spTree>
     <p:extLst>
       <p:ext uri="{BB962C8B-B14F-4D97-AF65-F5344CB8AC3E}">
-        <p14:creationId xmlns:p14="http://schemas.microsoft.com/office/powerpoint/2010/main" val="505885279"/>
+        <p14:creationId xmlns:p14="http://schemas.microsoft.com/office/powerpoint/2010/main" xmlns:p="http://schemas.openxmlformats.org/presentationml/2006/main" xmlns:r="http://schemas.openxmlformats.org/officeDocument/2006/relationships" xmlns:a="http://schemas.openxmlformats.org/drawingml/2006/main" xmlns="" val="505885279"/>
       </p:ext>
     </p:extLst>
   </p:cSld>
@@ -3876,7 +3838,7 @@
 </file>
 
 <file path=ppt/notesSlides/notesSlide33.xml><?xml version="1.0" encoding="utf-8"?>
-<p:notes xmlns:a="http://schemas.openxmlformats.org/drawingml/2006/main" xmlns:r="http://schemas.openxmlformats.org/officeDocument/2006/relationships" xmlns:p="http://schemas.openxmlformats.org/presentationml/2006/main">
+<p:notes xmlns:a="http://schemas.openxmlformats.org/drawingml/2006/main" xmlns:r="http://schemas.openxmlformats.org/officeDocument/2006/relationships" xmlns:mc="http://schemas.openxmlformats.org/markup-compatibility/2006" xmlns:mv="urn:schemas-microsoft-com:mac:vml" xmlns:p="http://schemas.openxmlformats.org/presentationml/2006/main" mc:Ignorable="mv" mc:PreserveAttributes="mv:*">
   <p:cSld>
     <p:spTree>
       <p:nvGrpSpPr>
@@ -3998,7 +3960,7 @@
     </p:spTree>
     <p:extLst>
       <p:ext uri="{BB962C8B-B14F-4D97-AF65-F5344CB8AC3E}">
-        <p14:creationId xmlns:p14="http://schemas.microsoft.com/office/powerpoint/2010/main" val="1124783118"/>
+        <p14:creationId xmlns:p14="http://schemas.microsoft.com/office/powerpoint/2010/main" xmlns:p="http://schemas.openxmlformats.org/presentationml/2006/main" xmlns:r="http://schemas.openxmlformats.org/officeDocument/2006/relationships" xmlns:a="http://schemas.openxmlformats.org/drawingml/2006/main" xmlns="" val="1124783118"/>
       </p:ext>
     </p:extLst>
   </p:cSld>
@@ -4009,7 +3971,7 @@
 </file>
 
 <file path=ppt/notesSlides/notesSlide34.xml><?xml version="1.0" encoding="utf-8"?>
-<p:notes xmlns:a="http://schemas.openxmlformats.org/drawingml/2006/main" xmlns:r="http://schemas.openxmlformats.org/officeDocument/2006/relationships" xmlns:p="http://schemas.openxmlformats.org/presentationml/2006/main">
+<p:notes xmlns:a="http://schemas.openxmlformats.org/drawingml/2006/main" xmlns:r="http://schemas.openxmlformats.org/officeDocument/2006/relationships" xmlns:mc="http://schemas.openxmlformats.org/markup-compatibility/2006" xmlns:mv="urn:schemas-microsoft-com:mac:vml" xmlns:p="http://schemas.openxmlformats.org/presentationml/2006/main" mc:Ignorable="mv" mc:PreserveAttributes="mv:*">
   <p:cSld>
     <p:spTree>
       <p:nvGrpSpPr>
@@ -4091,7 +4053,7 @@
     </p:spTree>
     <p:extLst>
       <p:ext uri="{BB962C8B-B14F-4D97-AF65-F5344CB8AC3E}">
-        <p14:creationId xmlns:p14="http://schemas.microsoft.com/office/powerpoint/2010/main" val="163846026"/>
+        <p14:creationId xmlns:p14="http://schemas.microsoft.com/office/powerpoint/2010/main" xmlns:p="http://schemas.openxmlformats.org/presentationml/2006/main" xmlns:r="http://schemas.openxmlformats.org/officeDocument/2006/relationships" xmlns:a="http://schemas.openxmlformats.org/drawingml/2006/main" xmlns="" val="163846026"/>
       </p:ext>
     </p:extLst>
   </p:cSld>
@@ -4102,7 +4064,7 @@
 </file>
 
 <file path=ppt/notesSlides/notesSlide35.xml><?xml version="1.0" encoding="utf-8"?>
-<p:notes xmlns:a="http://schemas.openxmlformats.org/drawingml/2006/main" xmlns:r="http://schemas.openxmlformats.org/officeDocument/2006/relationships" xmlns:p="http://schemas.openxmlformats.org/presentationml/2006/main">
+<p:notes xmlns:a="http://schemas.openxmlformats.org/drawingml/2006/main" xmlns:r="http://schemas.openxmlformats.org/officeDocument/2006/relationships" xmlns:mc="http://schemas.openxmlformats.org/markup-compatibility/2006" xmlns:mv="urn:schemas-microsoft-com:mac:vml" xmlns:p="http://schemas.openxmlformats.org/presentationml/2006/main" mc:Ignorable="mv" mc:PreserveAttributes="mv:*">
   <p:cSld>
     <p:spTree>
       <p:nvGrpSpPr>
@@ -4209,7 +4171,7 @@
     </p:spTree>
     <p:extLst>
       <p:ext uri="{BB962C8B-B14F-4D97-AF65-F5344CB8AC3E}">
-        <p14:creationId xmlns:p14="http://schemas.microsoft.com/office/powerpoint/2010/main" val="2080801414"/>
+        <p14:creationId xmlns:p14="http://schemas.microsoft.com/office/powerpoint/2010/main" xmlns:p="http://schemas.openxmlformats.org/presentationml/2006/main" xmlns:r="http://schemas.openxmlformats.org/officeDocument/2006/relationships" xmlns:a="http://schemas.openxmlformats.org/drawingml/2006/main" xmlns="" val="2080801414"/>
       </p:ext>
     </p:extLst>
   </p:cSld>
@@ -4220,7 +4182,7 @@
 </file>
 
 <file path=ppt/notesSlides/notesSlide36.xml><?xml version="1.0" encoding="utf-8"?>
-<p:notes xmlns:a="http://schemas.openxmlformats.org/drawingml/2006/main" xmlns:r="http://schemas.openxmlformats.org/officeDocument/2006/relationships" xmlns:p="http://schemas.openxmlformats.org/presentationml/2006/main">
+<p:notes xmlns:a="http://schemas.openxmlformats.org/drawingml/2006/main" xmlns:r="http://schemas.openxmlformats.org/officeDocument/2006/relationships" xmlns:mc="http://schemas.openxmlformats.org/markup-compatibility/2006" xmlns:mv="urn:schemas-microsoft-com:mac:vml" xmlns:p="http://schemas.openxmlformats.org/presentationml/2006/main" mc:Ignorable="mv" mc:PreserveAttributes="mv:*">
   <p:cSld>
     <p:spTree>
       <p:nvGrpSpPr>
@@ -4283,11 +4245,7 @@
             </a:r>
             <a:r>
               <a:rPr lang="en-US" baseline="0" dirty="0" smtClean="0"/>
-              <a:t> </a:t>
-            </a:r>
-            <a:r>
-              <a:rPr lang="en-US" baseline="0" dirty="0" smtClean="0"/>
-              <a:t>our ECS cluster, we keep a pool of EC2 hosts that run our base AMI. This AMI includes </a:t>
+              <a:t> our ECS cluster, we keep a pool of EC2 hosts that run our base AMI. This AMI includes </a:t>
             </a:r>
             <a:r>
               <a:rPr lang="en-US" baseline="0" dirty="0" err="1" smtClean="0"/>
@@ -4348,7 +4306,7 @@
     </p:spTree>
     <p:extLst>
       <p:ext uri="{BB962C8B-B14F-4D97-AF65-F5344CB8AC3E}">
-        <p14:creationId xmlns:p14="http://schemas.microsoft.com/office/powerpoint/2010/main" val="1199116108"/>
+        <p14:creationId xmlns:p14="http://schemas.microsoft.com/office/powerpoint/2010/main" xmlns:p="http://schemas.openxmlformats.org/presentationml/2006/main" xmlns:r="http://schemas.openxmlformats.org/officeDocument/2006/relationships" xmlns:a="http://schemas.openxmlformats.org/drawingml/2006/main" xmlns="" val="1199116108"/>
       </p:ext>
     </p:extLst>
   </p:cSld>
@@ -4359,7 +4317,7 @@
 </file>
 
 <file path=ppt/notesSlides/notesSlide37.xml><?xml version="1.0" encoding="utf-8"?>
-<p:notes xmlns:a="http://schemas.openxmlformats.org/drawingml/2006/main" xmlns:r="http://schemas.openxmlformats.org/officeDocument/2006/relationships" xmlns:p="http://schemas.openxmlformats.org/presentationml/2006/main">
+<p:notes xmlns:a="http://schemas.openxmlformats.org/drawingml/2006/main" xmlns:r="http://schemas.openxmlformats.org/officeDocument/2006/relationships" xmlns:mc="http://schemas.openxmlformats.org/markup-compatibility/2006" xmlns:mv="urn:schemas-microsoft-com:mac:vml" xmlns:p="http://schemas.openxmlformats.org/presentationml/2006/main" mc:Ignorable="mv" mc:PreserveAttributes="mv:*">
   <p:cSld>
     <p:spTree>
       <p:nvGrpSpPr>
@@ -4413,11 +4371,7 @@
           <a:p>
             <a:r>
               <a:rPr lang="en-US" dirty="0" smtClean="0"/>
-              <a:t>Unfortunately</a:t>
-            </a:r>
-            <a:r>
-              <a:rPr lang="en-US" dirty="0" smtClean="0"/>
-              <a:t>, logging</a:t>
+              <a:t>Unfortunately, logging</a:t>
             </a:r>
             <a:r>
               <a:rPr lang="en-US" baseline="0" dirty="0" smtClean="0"/>
@@ -4461,15 +4415,7 @@
             </a:r>
             <a:r>
               <a:rPr lang="en-US" baseline="0" dirty="0" smtClean="0"/>
-              <a:t> </a:t>
-            </a:r>
-            <a:r>
-              <a:rPr lang="en-US" baseline="0" dirty="0" smtClean="0"/>
-              <a:t>on </a:t>
-            </a:r>
-            <a:r>
-              <a:rPr lang="en-US" baseline="0" dirty="0" smtClean="0"/>
-              <a:t>all the container instances. </a:t>
+              <a:t> on all the container instances. </a:t>
             </a:r>
             <a:r>
               <a:rPr lang="en-US" baseline="0" dirty="0" err="1" smtClean="0"/>
@@ -4534,7 +4480,7 @@
     </p:spTree>
     <p:extLst>
       <p:ext uri="{BB962C8B-B14F-4D97-AF65-F5344CB8AC3E}">
-        <p14:creationId xmlns:p14="http://schemas.microsoft.com/office/powerpoint/2010/main" val="985019265"/>
+        <p14:creationId xmlns:p14="http://schemas.microsoft.com/office/powerpoint/2010/main" xmlns:p="http://schemas.openxmlformats.org/presentationml/2006/main" xmlns:r="http://schemas.openxmlformats.org/officeDocument/2006/relationships" xmlns:a="http://schemas.openxmlformats.org/drawingml/2006/main" xmlns="" val="985019265"/>
       </p:ext>
     </p:extLst>
   </p:cSld>
@@ -4545,7 +4491,7 @@
 </file>
 
 <file path=ppt/notesSlides/notesSlide38.xml><?xml version="1.0" encoding="utf-8"?>
-<p:notes xmlns:a="http://schemas.openxmlformats.org/drawingml/2006/main" xmlns:r="http://schemas.openxmlformats.org/officeDocument/2006/relationships" xmlns:p="http://schemas.openxmlformats.org/presentationml/2006/main">
+<p:notes xmlns:a="http://schemas.openxmlformats.org/drawingml/2006/main" xmlns:r="http://schemas.openxmlformats.org/officeDocument/2006/relationships" xmlns:mc="http://schemas.openxmlformats.org/markup-compatibility/2006" xmlns:mv="urn:schemas-microsoft-com:mac:vml" xmlns:p="http://schemas.openxmlformats.org/presentationml/2006/main" mc:Ignorable="mv" mc:PreserveAttributes="mv:*">
   <p:cSld>
     <p:spTree>
       <p:nvGrpSpPr>
@@ -4645,7 +4591,7 @@
     </p:spTree>
     <p:extLst>
       <p:ext uri="{BB962C8B-B14F-4D97-AF65-F5344CB8AC3E}">
-        <p14:creationId xmlns:p14="http://schemas.microsoft.com/office/powerpoint/2010/main" val="1651491368"/>
+        <p14:creationId xmlns:p14="http://schemas.microsoft.com/office/powerpoint/2010/main" xmlns:p="http://schemas.openxmlformats.org/presentationml/2006/main" xmlns:r="http://schemas.openxmlformats.org/officeDocument/2006/relationships" xmlns:a="http://schemas.openxmlformats.org/drawingml/2006/main" xmlns="" val="1651491368"/>
       </p:ext>
     </p:extLst>
   </p:cSld>
@@ -4656,7 +4602,7 @@
 </file>
 
 <file path=ppt/notesSlides/notesSlide39.xml><?xml version="1.0" encoding="utf-8"?>
-<p:notes xmlns:a="http://schemas.openxmlformats.org/drawingml/2006/main" xmlns:r="http://schemas.openxmlformats.org/officeDocument/2006/relationships" xmlns:p="http://schemas.openxmlformats.org/presentationml/2006/main">
+<p:notes xmlns:a="http://schemas.openxmlformats.org/drawingml/2006/main" xmlns:r="http://schemas.openxmlformats.org/officeDocument/2006/relationships" xmlns:mc="http://schemas.openxmlformats.org/markup-compatibility/2006" xmlns:mv="urn:schemas-microsoft-com:mac:vml" xmlns:p="http://schemas.openxmlformats.org/presentationml/2006/main" mc:Ignorable="mv" mc:PreserveAttributes="mv:*">
   <p:cSld>
     <p:spTree>
       <p:nvGrpSpPr>
@@ -4758,7 +4704,7 @@
     </p:spTree>
     <p:extLst>
       <p:ext uri="{BB962C8B-B14F-4D97-AF65-F5344CB8AC3E}">
-        <p14:creationId xmlns:p14="http://schemas.microsoft.com/office/powerpoint/2010/main" val="1264428276"/>
+        <p14:creationId xmlns:p14="http://schemas.microsoft.com/office/powerpoint/2010/main" xmlns:p="http://schemas.openxmlformats.org/presentationml/2006/main" xmlns:r="http://schemas.openxmlformats.org/officeDocument/2006/relationships" xmlns:a="http://schemas.openxmlformats.org/drawingml/2006/main" xmlns="" val="1264428276"/>
       </p:ext>
     </p:extLst>
   </p:cSld>
@@ -4769,7 +4715,7 @@
 </file>
 
 <file path=ppt/notesSlides/notesSlide4.xml><?xml version="1.0" encoding="utf-8"?>
-<p:notes xmlns:a="http://schemas.openxmlformats.org/drawingml/2006/main" xmlns:r="http://schemas.openxmlformats.org/officeDocument/2006/relationships" xmlns:p="http://schemas.openxmlformats.org/presentationml/2006/main">
+<p:notes xmlns:a="http://schemas.openxmlformats.org/drawingml/2006/main" xmlns:r="http://schemas.openxmlformats.org/officeDocument/2006/relationships" xmlns:mc="http://schemas.openxmlformats.org/markup-compatibility/2006" xmlns:mv="urn:schemas-microsoft-com:mac:vml" xmlns:p="http://schemas.openxmlformats.org/presentationml/2006/main" mc:Ignorable="mv" mc:PreserveAttributes="mv:*">
   <p:cSld>
     <p:spTree>
       <p:nvGrpSpPr>
@@ -4822,55 +4768,7 @@
                 <a:ea typeface="+mn-ea"/>
                 <a:cs typeface="+mn-cs"/>
               </a:rPr>
-              <a:t>So, </a:t>
-            </a:r>
-            <a:r>
-              <a:rPr lang="en-US" sz="1200" b="0" i="0" u="none" strike="noStrike" kern="1200" dirty="0" smtClean="0">
-                <a:solidFill>
-                  <a:schemeClr val="tx1"/>
-                </a:solidFill>
-                <a:effectLst/>
-                <a:latin typeface="Arial"/>
-                <a:ea typeface="+mn-ea"/>
-                <a:cs typeface="+mn-cs"/>
-              </a:rPr>
-              <a:t>we </a:t>
-            </a:r>
-            <a:r>
-              <a:rPr lang="en-US" sz="1200" b="0" i="0" u="none" strike="noStrike" kern="1200" dirty="0" smtClean="0">
-                <a:solidFill>
-                  <a:schemeClr val="tx1"/>
-                </a:solidFill>
-                <a:effectLst/>
-                <a:latin typeface="Arial"/>
-                <a:ea typeface="+mn-ea"/>
-                <a:cs typeface="+mn-cs"/>
-              </a:rPr>
-              <a:t>work for this company called Remind. </a:t>
-            </a:r>
-            <a:r>
-              <a:rPr lang="en-US" sz="1200" b="0" i="0" u="none" strike="noStrike" kern="1200" dirty="0" smtClean="0">
-                <a:solidFill>
-                  <a:schemeClr val="tx1"/>
-                </a:solidFill>
-                <a:effectLst/>
-                <a:latin typeface="Arial"/>
-                <a:ea typeface="+mn-ea"/>
-                <a:cs typeface="+mn-cs"/>
-              </a:rPr>
-              <a:t>Remind is a product </a:t>
-            </a:r>
-            <a:r>
-              <a:rPr lang="en-US" sz="1200" b="0" i="0" u="none" strike="noStrike" kern="1200" dirty="0" smtClean="0">
-                <a:solidFill>
-                  <a:schemeClr val="tx1"/>
-                </a:solidFill>
-                <a:effectLst/>
-                <a:latin typeface="Arial"/>
-                <a:ea typeface="+mn-ea"/>
-                <a:cs typeface="+mn-cs"/>
-              </a:rPr>
-              <a:t>for teachers that makes it easier for them to communicate with their students and parents. We have 3 major features, which is real-time Chat, announcements and we support attaching files.</a:t>
+              <a:t>So, we work for this company called Remind. Remind is a product for teachers that makes it easier for them to communicate with their students and parents. We have 3 major features, which is real-time Chat, announcements and we support attaching files.</a:t>
             </a:r>
           </a:p>
           <a:p>
@@ -4895,43 +4793,7 @@
                 <a:ea typeface="+mn-ea"/>
                 <a:cs typeface="+mn-cs"/>
               </a:rPr>
-              <a:t>We have about </a:t>
-            </a:r>
-            <a:r>
-              <a:rPr lang="en-US" sz="1200" b="0" i="0" u="none" strike="noStrike" kern="1200" dirty="0" smtClean="0">
-                <a:solidFill>
-                  <a:schemeClr val="tx1"/>
-                </a:solidFill>
-                <a:effectLst/>
-                <a:latin typeface="Arial"/>
-                <a:ea typeface="+mn-ea"/>
-                <a:cs typeface="+mn-cs"/>
-              </a:rPr>
-              <a:t>30 </a:t>
-            </a:r>
-            <a:r>
-              <a:rPr lang="en-US" sz="1200" b="0" i="0" u="none" strike="noStrike" kern="1200" dirty="0" smtClean="0">
-                <a:solidFill>
-                  <a:schemeClr val="tx1"/>
-                </a:solidFill>
-                <a:effectLst/>
-                <a:latin typeface="Arial"/>
-                <a:ea typeface="+mn-ea"/>
-                <a:cs typeface="+mn-cs"/>
-              </a:rPr>
-              <a:t>million users right </a:t>
-            </a:r>
-            <a:r>
-              <a:rPr lang="en-US" sz="1200" b="0" i="0" u="none" strike="noStrike" kern="1200" dirty="0" smtClean="0">
-                <a:solidFill>
-                  <a:schemeClr val="tx1"/>
-                </a:solidFill>
-                <a:effectLst/>
-                <a:latin typeface="Arial"/>
-                <a:ea typeface="+mn-ea"/>
-                <a:cs typeface="+mn-cs"/>
-              </a:rPr>
-              <a:t>now</a:t>
+              <a:t>We have about 30 million users right now</a:t>
             </a:r>
             <a:r>
               <a:rPr lang="en-US" sz="1200" b="0" i="0" u="none" strike="noStrike" kern="1200" baseline="0" dirty="0" smtClean="0">
@@ -4976,7 +4838,7 @@
     </p:spTree>
     <p:extLst>
       <p:ext uri="{BB962C8B-B14F-4D97-AF65-F5344CB8AC3E}">
-        <p14:creationId xmlns:p14="http://schemas.microsoft.com/office/powerpoint/2010/main" val="1887372709"/>
+        <p14:creationId xmlns:p14="http://schemas.microsoft.com/office/powerpoint/2010/main" xmlns:p="http://schemas.openxmlformats.org/presentationml/2006/main" xmlns:r="http://schemas.openxmlformats.org/officeDocument/2006/relationships" xmlns:a="http://schemas.openxmlformats.org/drawingml/2006/main" xmlns="" val="1887372709"/>
       </p:ext>
     </p:extLst>
   </p:cSld>
@@ -4987,7 +4849,7 @@
 </file>
 
 <file path=ppt/notesSlides/notesSlide40.xml><?xml version="1.0" encoding="utf-8"?>
-<p:notes xmlns:a="http://schemas.openxmlformats.org/drawingml/2006/main" xmlns:r="http://schemas.openxmlformats.org/officeDocument/2006/relationships" xmlns:p="http://schemas.openxmlformats.org/presentationml/2006/main">
+<p:notes xmlns:a="http://schemas.openxmlformats.org/drawingml/2006/main" xmlns:r="http://schemas.openxmlformats.org/officeDocument/2006/relationships" xmlns:mc="http://schemas.openxmlformats.org/markup-compatibility/2006" xmlns:mv="urn:schemas-microsoft-com:mac:vml" xmlns:p="http://schemas.openxmlformats.org/presentationml/2006/main" mc:Ignorable="mv" mc:PreserveAttributes="mv:*">
   <p:cSld>
     <p:spTree>
       <p:nvGrpSpPr>
@@ -5116,7 +4978,7 @@
     </p:spTree>
     <p:extLst>
       <p:ext uri="{BB962C8B-B14F-4D97-AF65-F5344CB8AC3E}">
-        <p14:creationId xmlns:p14="http://schemas.microsoft.com/office/powerpoint/2010/main" val="52196230"/>
+        <p14:creationId xmlns:p14="http://schemas.microsoft.com/office/powerpoint/2010/main" xmlns:p="http://schemas.openxmlformats.org/presentationml/2006/main" xmlns:r="http://schemas.openxmlformats.org/officeDocument/2006/relationships" xmlns:a="http://schemas.openxmlformats.org/drawingml/2006/main" xmlns="" val="52196230"/>
       </p:ext>
     </p:extLst>
   </p:cSld>
@@ -5127,7 +4989,7 @@
 </file>
 
 <file path=ppt/notesSlides/notesSlide41.xml><?xml version="1.0" encoding="utf-8"?>
-<p:notes xmlns:a="http://schemas.openxmlformats.org/drawingml/2006/main" xmlns:r="http://schemas.openxmlformats.org/officeDocument/2006/relationships" xmlns:p="http://schemas.openxmlformats.org/presentationml/2006/main">
+<p:notes xmlns:a="http://schemas.openxmlformats.org/drawingml/2006/main" xmlns:r="http://schemas.openxmlformats.org/officeDocument/2006/relationships" xmlns:mc="http://schemas.openxmlformats.org/markup-compatibility/2006" xmlns:mv="urn:schemas-microsoft-com:mac:vml" xmlns:p="http://schemas.openxmlformats.org/presentationml/2006/main" mc:Ignorable="mv" mc:PreserveAttributes="mv:*">
   <p:cSld>
     <p:spTree>
       <p:nvGrpSpPr>
@@ -5180,11 +5042,7 @@
             </a:r>
             <a:r>
               <a:rPr lang="en-US" baseline="0" smtClean="0"/>
-              <a:t>with </a:t>
-            </a:r>
-            <a:r>
-              <a:rPr lang="en-US" baseline="0" smtClean="0"/>
-              <a:t>containerization, </a:t>
+              <a:t>with containerization, </a:t>
             </a:r>
             <a:r>
               <a:rPr lang="en-US" baseline="0" dirty="0" smtClean="0"/>
@@ -5220,7 +5078,7 @@
     </p:spTree>
     <p:extLst>
       <p:ext uri="{BB962C8B-B14F-4D97-AF65-F5344CB8AC3E}">
-        <p14:creationId xmlns:p14="http://schemas.microsoft.com/office/powerpoint/2010/main" val="2096419307"/>
+        <p14:creationId xmlns:p14="http://schemas.microsoft.com/office/powerpoint/2010/main" xmlns:p="http://schemas.openxmlformats.org/presentationml/2006/main" xmlns:r="http://schemas.openxmlformats.org/officeDocument/2006/relationships" xmlns:a="http://schemas.openxmlformats.org/drawingml/2006/main" xmlns="" val="2096419307"/>
       </p:ext>
     </p:extLst>
   </p:cSld>
@@ -5231,7 +5089,7 @@
 </file>
 
 <file path=ppt/notesSlides/notesSlide5.xml><?xml version="1.0" encoding="utf-8"?>
-<p:notes xmlns:a="http://schemas.openxmlformats.org/drawingml/2006/main" xmlns:r="http://schemas.openxmlformats.org/officeDocument/2006/relationships" xmlns:p="http://schemas.openxmlformats.org/presentationml/2006/main">
+<p:notes xmlns:a="http://schemas.openxmlformats.org/drawingml/2006/main" xmlns:r="http://schemas.openxmlformats.org/officeDocument/2006/relationships" xmlns:mc="http://schemas.openxmlformats.org/markup-compatibility/2006" xmlns:mv="urn:schemas-microsoft-com:mac:vml" xmlns:p="http://schemas.openxmlformats.org/presentationml/2006/main" mc:Ignorable="mv" mc:PreserveAttributes="mv:*">
   <p:cSld>
     <p:spTree>
       <p:nvGrpSpPr>
@@ -5305,7 +5163,7 @@
     </p:spTree>
     <p:extLst>
       <p:ext uri="{BB962C8B-B14F-4D97-AF65-F5344CB8AC3E}">
-        <p14:creationId xmlns:p14="http://schemas.microsoft.com/office/powerpoint/2010/main" val="1418377824"/>
+        <p14:creationId xmlns:p14="http://schemas.microsoft.com/office/powerpoint/2010/main" xmlns:p="http://schemas.openxmlformats.org/presentationml/2006/main" xmlns:r="http://schemas.openxmlformats.org/officeDocument/2006/relationships" xmlns:a="http://schemas.openxmlformats.org/drawingml/2006/main" xmlns="" val="1418377824"/>
       </p:ext>
     </p:extLst>
   </p:cSld>
@@ -5316,7 +5174,7 @@
 </file>
 
 <file path=ppt/notesSlides/notesSlide6.xml><?xml version="1.0" encoding="utf-8"?>
-<p:notes xmlns:a="http://schemas.openxmlformats.org/drawingml/2006/main" xmlns:r="http://schemas.openxmlformats.org/officeDocument/2006/relationships" xmlns:p="http://schemas.openxmlformats.org/presentationml/2006/main">
+<p:notes xmlns:a="http://schemas.openxmlformats.org/drawingml/2006/main" xmlns:r="http://schemas.openxmlformats.org/officeDocument/2006/relationships" xmlns:mc="http://schemas.openxmlformats.org/markup-compatibility/2006" xmlns:mv="urn:schemas-microsoft-com:mac:vml" xmlns:p="http://schemas.openxmlformats.org/presentationml/2006/main" mc:Ignorable="mv" mc:PreserveAttributes="mv:*">
   <p:cSld>
     <p:spTree>
       <p:nvGrpSpPr>
@@ -5424,7 +5282,7 @@
     </p:spTree>
     <p:extLst>
       <p:ext uri="{BB962C8B-B14F-4D97-AF65-F5344CB8AC3E}">
-        <p14:creationId xmlns:p14="http://schemas.microsoft.com/office/powerpoint/2010/main" val="2086426095"/>
+        <p14:creationId xmlns:p14="http://schemas.microsoft.com/office/powerpoint/2010/main" xmlns:p="http://schemas.openxmlformats.org/presentationml/2006/main" xmlns:r="http://schemas.openxmlformats.org/officeDocument/2006/relationships" xmlns:a="http://schemas.openxmlformats.org/drawingml/2006/main" xmlns="" val="2086426095"/>
       </p:ext>
     </p:extLst>
   </p:cSld>
@@ -5435,7 +5293,7 @@
 </file>
 
 <file path=ppt/notesSlides/notesSlide7.xml><?xml version="1.0" encoding="utf-8"?>
-<p:notes xmlns:a="http://schemas.openxmlformats.org/drawingml/2006/main" xmlns:r="http://schemas.openxmlformats.org/officeDocument/2006/relationships" xmlns:p="http://schemas.openxmlformats.org/presentationml/2006/main">
+<p:notes xmlns:a="http://schemas.openxmlformats.org/drawingml/2006/main" xmlns:r="http://schemas.openxmlformats.org/officeDocument/2006/relationships" xmlns:mc="http://schemas.openxmlformats.org/markup-compatibility/2006" xmlns:mv="urn:schemas-microsoft-com:mac:vml" xmlns:p="http://schemas.openxmlformats.org/presentationml/2006/main" mc:Ignorable="mv" mc:PreserveAttributes="mv:*">
   <p:cSld>
     <p:spTree>
       <p:nvGrpSpPr>
@@ -5539,13 +5397,8 @@
             </a:pPr>
             <a:r>
               <a:rPr lang="en-US" baseline="0" dirty="0" smtClean="0"/>
-              <a:t>Databases needed to be exposed to internet traffic instead of being able to lock down access to </a:t>
-            </a:r>
-            <a:r>
-              <a:rPr lang="en-US" baseline="0" dirty="0" smtClean="0"/>
-              <a:t>a specific app.</a:t>
-            </a:r>
-            <a:endParaRPr lang="en-US" baseline="0" dirty="0" smtClean="0"/>
+              <a:t>Databases needed to be exposed to internet traffic instead of being able to lock down access to a specific app.</a:t>
+            </a:r>
           </a:p>
           <a:p>
             <a:pPr marL="171450" indent="-171450">
@@ -5593,7 +5446,7 @@
     </p:spTree>
     <p:extLst>
       <p:ext uri="{BB962C8B-B14F-4D97-AF65-F5344CB8AC3E}">
-        <p14:creationId xmlns:p14="http://schemas.microsoft.com/office/powerpoint/2010/main" val="801220236"/>
+        <p14:creationId xmlns:p14="http://schemas.microsoft.com/office/powerpoint/2010/main" xmlns:p="http://schemas.openxmlformats.org/presentationml/2006/main" xmlns:r="http://schemas.openxmlformats.org/officeDocument/2006/relationships" xmlns:a="http://schemas.openxmlformats.org/drawingml/2006/main" xmlns="" val="801220236"/>
       </p:ext>
     </p:extLst>
   </p:cSld>
@@ -5604,7 +5457,7 @@
 </file>
 
 <file path=ppt/notesSlides/notesSlide8.xml><?xml version="1.0" encoding="utf-8"?>
-<p:notes xmlns:a="http://schemas.openxmlformats.org/drawingml/2006/main" xmlns:r="http://schemas.openxmlformats.org/officeDocument/2006/relationships" xmlns:p="http://schemas.openxmlformats.org/presentationml/2006/main">
+<p:notes xmlns:a="http://schemas.openxmlformats.org/drawingml/2006/main" xmlns:r="http://schemas.openxmlformats.org/officeDocument/2006/relationships" xmlns:mc="http://schemas.openxmlformats.org/markup-compatibility/2006" xmlns:mv="urn:schemas-microsoft-com:mac:vml" xmlns:p="http://schemas.openxmlformats.org/presentationml/2006/main" mc:Ignorable="mv" mc:PreserveAttributes="mv:*">
   <p:cSld>
     <p:spTree>
       <p:nvGrpSpPr>
@@ -5714,11 +5567,7 @@
             </a:pPr>
             <a:r>
               <a:rPr lang="en-US" baseline="0" dirty="0" smtClean="0"/>
-              <a:t>And if </a:t>
-            </a:r>
-            <a:r>
-              <a:rPr lang="en-US" baseline="0" dirty="0" smtClean="0"/>
-              <a:t>we could, we wanted to use </a:t>
+              <a:t>And if we could, we wanted to use </a:t>
             </a:r>
             <a:r>
               <a:rPr lang="en-US" baseline="0" dirty="0" err="1" smtClean="0"/>
@@ -5759,7 +5608,7 @@
     </p:spTree>
     <p:extLst>
       <p:ext uri="{BB962C8B-B14F-4D97-AF65-F5344CB8AC3E}">
-        <p14:creationId xmlns:p14="http://schemas.microsoft.com/office/powerpoint/2010/main" val="1448925256"/>
+        <p14:creationId xmlns:p14="http://schemas.microsoft.com/office/powerpoint/2010/main" xmlns:p="http://schemas.openxmlformats.org/presentationml/2006/main" xmlns:r="http://schemas.openxmlformats.org/officeDocument/2006/relationships" xmlns:a="http://schemas.openxmlformats.org/drawingml/2006/main" xmlns="" val="1448925256"/>
       </p:ext>
     </p:extLst>
   </p:cSld>
@@ -5770,7 +5619,7 @@
 </file>
 
 <file path=ppt/notesSlides/notesSlide9.xml><?xml version="1.0" encoding="utf-8"?>
-<p:notes xmlns:a="http://schemas.openxmlformats.org/drawingml/2006/main" xmlns:r="http://schemas.openxmlformats.org/officeDocument/2006/relationships" xmlns:p="http://schemas.openxmlformats.org/presentationml/2006/main">
+<p:notes xmlns:a="http://schemas.openxmlformats.org/drawingml/2006/main" xmlns:r="http://schemas.openxmlformats.org/officeDocument/2006/relationships" xmlns:mc="http://schemas.openxmlformats.org/markup-compatibility/2006" xmlns:mv="urn:schemas-microsoft-com:mac:vml" xmlns:p="http://schemas.openxmlformats.org/presentationml/2006/main" mc:Ignorable="mv" mc:PreserveAttributes="mv:*">
   <p:cSld>
     <p:spTree>
       <p:nvGrpSpPr>
@@ -5924,7 +5773,7 @@
     </p:spTree>
     <p:extLst>
       <p:ext uri="{BB962C8B-B14F-4D97-AF65-F5344CB8AC3E}">
-        <p14:creationId xmlns:p14="http://schemas.microsoft.com/office/powerpoint/2010/main" val="2031048549"/>
+        <p14:creationId xmlns:p14="http://schemas.microsoft.com/office/powerpoint/2010/main" xmlns:p="http://schemas.openxmlformats.org/presentationml/2006/main" xmlns:r="http://schemas.openxmlformats.org/officeDocument/2006/relationships" xmlns:a="http://schemas.openxmlformats.org/drawingml/2006/main" xmlns="" val="2031048549"/>
       </p:ext>
     </p:extLst>
   </p:cSld>
@@ -5935,7 +5784,7 @@
 </file>
 
 <file path=ppt/slideLayouts/slideLayout1.xml><?xml version="1.0" encoding="utf-8"?>
-<p:sldLayout xmlns:a="http://schemas.openxmlformats.org/drawingml/2006/main" xmlns:r="http://schemas.openxmlformats.org/officeDocument/2006/relationships" xmlns:p="http://schemas.openxmlformats.org/presentationml/2006/main" preserve="1" userDrawn="1">
+<p:sldLayout xmlns:a="http://schemas.openxmlformats.org/drawingml/2006/main" xmlns:r="http://schemas.openxmlformats.org/officeDocument/2006/relationships" xmlns:mc="http://schemas.openxmlformats.org/markup-compatibility/2006" xmlns:mv="urn:schemas-microsoft-com:mac:vml" xmlns:p="http://schemas.openxmlformats.org/presentationml/2006/main" mc:Ignorable="mv" mc:PreserveAttributes="mv:*" preserve="1" userDrawn="1">
   <p:cSld name="Title Slide">
     <p:bg>
       <p:bgPr>
@@ -6188,7 +6037,7 @@
           <a:blip r:embed="rId3">
             <a:extLst>
               <a:ext uri="{28A0092B-C50C-407E-A947-70E740481C1C}">
-                <a14:useLocalDpi xmlns:a14="http://schemas.microsoft.com/office/drawing/2010/main" val="0"/>
+                <a14:useLocalDpi xmlns:a14="http://schemas.microsoft.com/office/drawing/2010/main" xmlns:p="http://schemas.openxmlformats.org/presentationml/2006/main" xmlns:r="http://schemas.openxmlformats.org/officeDocument/2006/relationships" xmlns:a="http://schemas.openxmlformats.org/drawingml/2006/main" xmlns="" val="0"/>
               </a:ext>
             </a:extLst>
           </a:blip>
@@ -6209,7 +6058,7 @@
     </p:spTree>
     <p:extLst>
       <p:ext uri="{BB962C8B-B14F-4D97-AF65-F5344CB8AC3E}">
-        <p14:creationId xmlns:p14="http://schemas.microsoft.com/office/powerpoint/2010/main" val="2005314365"/>
+        <p14:creationId xmlns:p14="http://schemas.microsoft.com/office/powerpoint/2010/main" xmlns:p="http://schemas.openxmlformats.org/presentationml/2006/main" xmlns:r="http://schemas.openxmlformats.org/officeDocument/2006/relationships" xmlns:a="http://schemas.openxmlformats.org/drawingml/2006/main" xmlns="" val="2005314365"/>
       </p:ext>
     </p:extLst>
   </p:cSld>
@@ -6220,7 +6069,7 @@
 </file>
 
 <file path=ppt/slideLayouts/slideLayout10.xml><?xml version="1.0" encoding="utf-8"?>
-<p:sldLayout xmlns:a="http://schemas.openxmlformats.org/drawingml/2006/main" xmlns:r="http://schemas.openxmlformats.org/officeDocument/2006/relationships" xmlns:p="http://schemas.openxmlformats.org/presentationml/2006/main" preserve="1" userDrawn="1">
+<p:sldLayout xmlns:a="http://schemas.openxmlformats.org/drawingml/2006/main" xmlns:r="http://schemas.openxmlformats.org/officeDocument/2006/relationships" xmlns:mc="http://schemas.openxmlformats.org/markup-compatibility/2006" xmlns:mv="urn:schemas-microsoft-com:mac:vml" xmlns:p="http://schemas.openxmlformats.org/presentationml/2006/main" mc:Ignorable="mv" mc:PreserveAttributes="mv:*" preserve="1" userDrawn="1">
   <p:cSld name="Six Content - Graphics">
     <p:spTree>
       <p:nvGrpSpPr>
@@ -6921,7 +6770,7 @@
     </p:spTree>
     <p:extLst>
       <p:ext uri="{BB962C8B-B14F-4D97-AF65-F5344CB8AC3E}">
-        <p14:creationId xmlns:p14="http://schemas.microsoft.com/office/powerpoint/2010/main" val="3273093039"/>
+        <p14:creationId xmlns:p14="http://schemas.microsoft.com/office/powerpoint/2010/main" xmlns:p="http://schemas.openxmlformats.org/presentationml/2006/main" xmlns:r="http://schemas.openxmlformats.org/officeDocument/2006/relationships" xmlns:a="http://schemas.openxmlformats.org/drawingml/2006/main" xmlns="" val="3273093039"/>
       </p:ext>
     </p:extLst>
   </p:cSld>
@@ -6932,7 +6781,7 @@
 </file>
 
 <file path=ppt/slideLayouts/slideLayout11.xml><?xml version="1.0" encoding="utf-8"?>
-<p:sldLayout xmlns:a="http://schemas.openxmlformats.org/drawingml/2006/main" xmlns:r="http://schemas.openxmlformats.org/officeDocument/2006/relationships" xmlns:p="http://schemas.openxmlformats.org/presentationml/2006/main" type="titleOnly" preserve="1">
+<p:sldLayout xmlns:a="http://schemas.openxmlformats.org/drawingml/2006/main" xmlns:r="http://schemas.openxmlformats.org/officeDocument/2006/relationships" xmlns:mc="http://schemas.openxmlformats.org/markup-compatibility/2006" xmlns:mv="urn:schemas-microsoft-com:mac:vml" xmlns:p="http://schemas.openxmlformats.org/presentationml/2006/main" mc:Ignorable="mv" mc:PreserveAttributes="mv:*" type="titleOnly" preserve="1">
   <p:cSld name="Title Only">
     <p:spTree>
       <p:nvGrpSpPr>
@@ -6979,7 +6828,7 @@
     </p:spTree>
     <p:extLst>
       <p:ext uri="{BB962C8B-B14F-4D97-AF65-F5344CB8AC3E}">
-        <p14:creationId xmlns:p14="http://schemas.microsoft.com/office/powerpoint/2010/main" val="467069072"/>
+        <p14:creationId xmlns:p14="http://schemas.microsoft.com/office/powerpoint/2010/main" xmlns:p="http://schemas.openxmlformats.org/presentationml/2006/main" xmlns:r="http://schemas.openxmlformats.org/officeDocument/2006/relationships" xmlns:a="http://schemas.openxmlformats.org/drawingml/2006/main" xmlns="" val="467069072"/>
       </p:ext>
     </p:extLst>
   </p:cSld>
@@ -6990,7 +6839,7 @@
 </file>
 
 <file path=ppt/slideLayouts/slideLayout12.xml><?xml version="1.0" encoding="utf-8"?>
-<p:sldLayout xmlns:a="http://schemas.openxmlformats.org/drawingml/2006/main" xmlns:r="http://schemas.openxmlformats.org/officeDocument/2006/relationships" xmlns:p="http://schemas.openxmlformats.org/presentationml/2006/main" preserve="1">
+<p:sldLayout xmlns:a="http://schemas.openxmlformats.org/drawingml/2006/main" xmlns:r="http://schemas.openxmlformats.org/officeDocument/2006/relationships" xmlns:mc="http://schemas.openxmlformats.org/markup-compatibility/2006" xmlns:mv="urn:schemas-microsoft-com:mac:vml" xmlns:p="http://schemas.openxmlformats.org/presentationml/2006/main" mc:Ignorable="mv" mc:PreserveAttributes="mv:*" preserve="1">
   <p:cSld name="Section Header 2">
     <p:spTree>
       <p:nvGrpSpPr>
@@ -7043,7 +6892,7 @@
     </p:spTree>
     <p:extLst>
       <p:ext uri="{BB962C8B-B14F-4D97-AF65-F5344CB8AC3E}">
-        <p14:creationId xmlns:p14="http://schemas.microsoft.com/office/powerpoint/2010/main" val="4006882603"/>
+        <p14:creationId xmlns:p14="http://schemas.microsoft.com/office/powerpoint/2010/main" xmlns:p="http://schemas.openxmlformats.org/presentationml/2006/main" xmlns:r="http://schemas.openxmlformats.org/officeDocument/2006/relationships" xmlns:a="http://schemas.openxmlformats.org/drawingml/2006/main" xmlns="" val="4006882603"/>
       </p:ext>
     </p:extLst>
   </p:cSld>
@@ -7054,7 +6903,7 @@
 </file>
 
 <file path=ppt/slideLayouts/slideLayout13.xml><?xml version="1.0" encoding="utf-8"?>
-<p:sldLayout xmlns:a="http://schemas.openxmlformats.org/drawingml/2006/main" xmlns:r="http://schemas.openxmlformats.org/officeDocument/2006/relationships" xmlns:p="http://schemas.openxmlformats.org/presentationml/2006/main" type="blank" preserve="1">
+<p:sldLayout xmlns:a="http://schemas.openxmlformats.org/drawingml/2006/main" xmlns:r="http://schemas.openxmlformats.org/officeDocument/2006/relationships" xmlns:mc="http://schemas.openxmlformats.org/markup-compatibility/2006" xmlns:mv="urn:schemas-microsoft-com:mac:vml" xmlns:p="http://schemas.openxmlformats.org/presentationml/2006/main" mc:Ignorable="mv" mc:PreserveAttributes="mv:*" type="blank" preserve="1">
   <p:cSld name="Blank">
     <p:spTree>
       <p:nvGrpSpPr>
@@ -7073,7 +6922,7 @@
     </p:spTree>
     <p:extLst>
       <p:ext uri="{BB962C8B-B14F-4D97-AF65-F5344CB8AC3E}">
-        <p14:creationId xmlns:p14="http://schemas.microsoft.com/office/powerpoint/2010/main" val="654024207"/>
+        <p14:creationId xmlns:p14="http://schemas.microsoft.com/office/powerpoint/2010/main" xmlns:p="http://schemas.openxmlformats.org/presentationml/2006/main" xmlns:r="http://schemas.openxmlformats.org/officeDocument/2006/relationships" xmlns:a="http://schemas.openxmlformats.org/drawingml/2006/main" xmlns="" val="654024207"/>
       </p:ext>
     </p:extLst>
   </p:cSld>
@@ -7084,7 +6933,7 @@
 </file>
 
 <file path=ppt/slideLayouts/slideLayout14.xml><?xml version="1.0" encoding="utf-8"?>
-<p:sldLayout xmlns:a="http://schemas.openxmlformats.org/drawingml/2006/main" xmlns:r="http://schemas.openxmlformats.org/officeDocument/2006/relationships" xmlns:p="http://schemas.openxmlformats.org/presentationml/2006/main" preserve="1" userDrawn="1">
+<p:sldLayout xmlns:a="http://schemas.openxmlformats.org/drawingml/2006/main" xmlns:r="http://schemas.openxmlformats.org/officeDocument/2006/relationships" xmlns:mc="http://schemas.openxmlformats.org/markup-compatibility/2006" xmlns:mv="urn:schemas-microsoft-com:mac:vml" xmlns:p="http://schemas.openxmlformats.org/presentationml/2006/main" mc:Ignorable="mv" mc:PreserveAttributes="mv:*" preserve="1" userDrawn="1">
   <p:cSld name="Thank You">
     <p:bg>
       <p:bgPr>
@@ -7193,7 +7042,7 @@
     </p:spTree>
     <p:extLst>
       <p:ext uri="{BB962C8B-B14F-4D97-AF65-F5344CB8AC3E}">
-        <p14:creationId xmlns:p14="http://schemas.microsoft.com/office/powerpoint/2010/main" val="2124837561"/>
+        <p14:creationId xmlns:p14="http://schemas.microsoft.com/office/powerpoint/2010/main" xmlns:p="http://schemas.openxmlformats.org/presentationml/2006/main" xmlns:r="http://schemas.openxmlformats.org/officeDocument/2006/relationships" xmlns:a="http://schemas.openxmlformats.org/drawingml/2006/main" xmlns="" val="2124837561"/>
       </p:ext>
     </p:extLst>
   </p:cSld>
@@ -7211,7 +7060,7 @@
 </file>
 
 <file path=ppt/slideLayouts/slideLayout15.xml><?xml version="1.0" encoding="utf-8"?>
-<p:sldLayout xmlns:a="http://schemas.openxmlformats.org/drawingml/2006/main" xmlns:r="http://schemas.openxmlformats.org/officeDocument/2006/relationships" xmlns:p="http://schemas.openxmlformats.org/presentationml/2006/main" preserve="1" userDrawn="1">
+<p:sldLayout xmlns:a="http://schemas.openxmlformats.org/drawingml/2006/main" xmlns:r="http://schemas.openxmlformats.org/officeDocument/2006/relationships" xmlns:mc="http://schemas.openxmlformats.org/markup-compatibility/2006" xmlns:mv="urn:schemas-microsoft-com:mac:vml" xmlns:p="http://schemas.openxmlformats.org/presentationml/2006/main" mc:Ignorable="mv" mc:PreserveAttributes="mv:*" preserve="1" userDrawn="1">
   <p:cSld name="Eval Reminder">
     <p:spTree>
       <p:nvGrpSpPr>
@@ -7293,7 +7142,7 @@
     </p:spTree>
     <p:extLst>
       <p:ext uri="{BB962C8B-B14F-4D97-AF65-F5344CB8AC3E}">
-        <p14:creationId xmlns:p14="http://schemas.microsoft.com/office/powerpoint/2010/main" val="65627032"/>
+        <p14:creationId xmlns:p14="http://schemas.microsoft.com/office/powerpoint/2010/main" xmlns:p="http://schemas.openxmlformats.org/presentationml/2006/main" xmlns:r="http://schemas.openxmlformats.org/officeDocument/2006/relationships" xmlns:a="http://schemas.openxmlformats.org/drawingml/2006/main" xmlns="" val="65627032"/>
       </p:ext>
     </p:extLst>
   </p:cSld>
@@ -7304,7 +7153,7 @@
 </file>
 
 <file path=ppt/slideLayouts/slideLayout16.xml><?xml version="1.0" encoding="utf-8"?>
-<p:sldLayout xmlns:a="http://schemas.openxmlformats.org/drawingml/2006/main" xmlns:r="http://schemas.openxmlformats.org/officeDocument/2006/relationships" xmlns:p="http://schemas.openxmlformats.org/presentationml/2006/main" preserve="1" userDrawn="1">
+<p:sldLayout xmlns:a="http://schemas.openxmlformats.org/drawingml/2006/main" xmlns:r="http://schemas.openxmlformats.org/officeDocument/2006/relationships" xmlns:mc="http://schemas.openxmlformats.org/markup-compatibility/2006" xmlns:mv="urn:schemas-microsoft-com:mac:vml" xmlns:p="http://schemas.openxmlformats.org/presentationml/2006/main" mc:Ignorable="mv" mc:PreserveAttributes="mv:*" preserve="1" userDrawn="1">
   <p:cSld name="Related Sessions">
     <p:spTree>
       <p:nvGrpSpPr>
@@ -7460,7 +7309,7 @@
     </p:spTree>
     <p:extLst>
       <p:ext uri="{BB962C8B-B14F-4D97-AF65-F5344CB8AC3E}">
-        <p14:creationId xmlns:p14="http://schemas.microsoft.com/office/powerpoint/2010/main" val="3750702607"/>
+        <p14:creationId xmlns:p14="http://schemas.microsoft.com/office/powerpoint/2010/main" xmlns:p="http://schemas.openxmlformats.org/presentationml/2006/main" xmlns:r="http://schemas.openxmlformats.org/officeDocument/2006/relationships" xmlns:a="http://schemas.openxmlformats.org/drawingml/2006/main" xmlns="" val="3750702607"/>
       </p:ext>
     </p:extLst>
   </p:cSld>
@@ -7471,7 +7320,7 @@
 </file>
 
 <file path=ppt/slideLayouts/slideLayout2.xml><?xml version="1.0" encoding="utf-8"?>
-<p:sldLayout xmlns:a="http://schemas.openxmlformats.org/drawingml/2006/main" xmlns:r="http://schemas.openxmlformats.org/officeDocument/2006/relationships" xmlns:p="http://schemas.openxmlformats.org/presentationml/2006/main" preserve="1" userDrawn="1">
+<p:sldLayout xmlns:a="http://schemas.openxmlformats.org/drawingml/2006/main" xmlns:r="http://schemas.openxmlformats.org/officeDocument/2006/relationships" xmlns:mc="http://schemas.openxmlformats.org/markup-compatibility/2006" xmlns:mv="urn:schemas-microsoft-com:mac:vml" xmlns:p="http://schemas.openxmlformats.org/presentationml/2006/main" mc:Ignorable="mv" mc:PreserveAttributes="mv:*" preserve="1" userDrawn="1">
   <p:cSld name="Session Pre-reqs">
     <p:spTree>
       <p:nvGrpSpPr>
@@ -7630,7 +7479,7 @@
     </p:spTree>
     <p:extLst>
       <p:ext uri="{BB962C8B-B14F-4D97-AF65-F5344CB8AC3E}">
-        <p14:creationId xmlns:p14="http://schemas.microsoft.com/office/powerpoint/2010/main" val="2008725742"/>
+        <p14:creationId xmlns:p14="http://schemas.microsoft.com/office/powerpoint/2010/main" xmlns:p="http://schemas.openxmlformats.org/presentationml/2006/main" xmlns:r="http://schemas.openxmlformats.org/officeDocument/2006/relationships" xmlns:a="http://schemas.openxmlformats.org/drawingml/2006/main" xmlns="" val="2008725742"/>
       </p:ext>
     </p:extLst>
   </p:cSld>
@@ -7641,7 +7490,7 @@
 </file>
 
 <file path=ppt/slideLayouts/slideLayout3.xml><?xml version="1.0" encoding="utf-8"?>
-<p:sldLayout xmlns:a="http://schemas.openxmlformats.org/drawingml/2006/main" xmlns:r="http://schemas.openxmlformats.org/officeDocument/2006/relationships" xmlns:p="http://schemas.openxmlformats.org/presentationml/2006/main" type="obj" preserve="1">
+<p:sldLayout xmlns:a="http://schemas.openxmlformats.org/drawingml/2006/main" xmlns:r="http://schemas.openxmlformats.org/officeDocument/2006/relationships" xmlns:mc="http://schemas.openxmlformats.org/markup-compatibility/2006" xmlns:mv="urn:schemas-microsoft-com:mac:vml" xmlns:p="http://schemas.openxmlformats.org/presentationml/2006/main" mc:Ignorable="mv" mc:PreserveAttributes="mv:*" type="obj" preserve="1">
   <p:cSld name="Title and Content">
     <p:spTree>
       <p:nvGrpSpPr>
@@ -7789,7 +7638,7 @@
     </p:spTree>
     <p:extLst>
       <p:ext uri="{BB962C8B-B14F-4D97-AF65-F5344CB8AC3E}">
-        <p14:creationId xmlns:p14="http://schemas.microsoft.com/office/powerpoint/2010/main" val="3508459060"/>
+        <p14:creationId xmlns:p14="http://schemas.microsoft.com/office/powerpoint/2010/main" xmlns:p="http://schemas.openxmlformats.org/presentationml/2006/main" xmlns:r="http://schemas.openxmlformats.org/officeDocument/2006/relationships" xmlns:a="http://schemas.openxmlformats.org/drawingml/2006/main" xmlns="" val="3508459060"/>
       </p:ext>
     </p:extLst>
   </p:cSld>
@@ -7800,7 +7649,7 @@
 </file>
 
 <file path=ppt/slideLayouts/slideLayout4.xml><?xml version="1.0" encoding="utf-8"?>
-<p:sldLayout xmlns:a="http://schemas.openxmlformats.org/drawingml/2006/main" xmlns:r="http://schemas.openxmlformats.org/officeDocument/2006/relationships" xmlns:p="http://schemas.openxmlformats.org/presentationml/2006/main" preserve="1" userDrawn="1">
+<p:sldLayout xmlns:a="http://schemas.openxmlformats.org/drawingml/2006/main" xmlns:r="http://schemas.openxmlformats.org/officeDocument/2006/relationships" xmlns:mc="http://schemas.openxmlformats.org/markup-compatibility/2006" xmlns:mv="urn:schemas-microsoft-com:mac:vml" xmlns:p="http://schemas.openxmlformats.org/presentationml/2006/main" mc:Ignorable="mv" mc:PreserveAttributes="mv:*" preserve="1" userDrawn="1">
   <p:cSld name="Code Snippet">
     <p:spTree>
       <p:nvGrpSpPr>
@@ -7989,7 +7838,7 @@
     </p:spTree>
     <p:extLst>
       <p:ext uri="{BB962C8B-B14F-4D97-AF65-F5344CB8AC3E}">
-        <p14:creationId xmlns:p14="http://schemas.microsoft.com/office/powerpoint/2010/main" val="2636968817"/>
+        <p14:creationId xmlns:p14="http://schemas.microsoft.com/office/powerpoint/2010/main" xmlns:p="http://schemas.openxmlformats.org/presentationml/2006/main" xmlns:r="http://schemas.openxmlformats.org/officeDocument/2006/relationships" xmlns:a="http://schemas.openxmlformats.org/drawingml/2006/main" xmlns="" val="2636968817"/>
       </p:ext>
     </p:extLst>
   </p:cSld>
@@ -8000,7 +7849,7 @@
 </file>
 
 <file path=ppt/slideLayouts/slideLayout5.xml><?xml version="1.0" encoding="utf-8"?>
-<p:sldLayout xmlns:a="http://schemas.openxmlformats.org/drawingml/2006/main" xmlns:r="http://schemas.openxmlformats.org/officeDocument/2006/relationships" xmlns:p="http://schemas.openxmlformats.org/presentationml/2006/main" preserve="1">
+<p:sldLayout xmlns:a="http://schemas.openxmlformats.org/drawingml/2006/main" xmlns:r="http://schemas.openxmlformats.org/officeDocument/2006/relationships" xmlns:mc="http://schemas.openxmlformats.org/markup-compatibility/2006" xmlns:mv="urn:schemas-microsoft-com:mac:vml" xmlns:p="http://schemas.openxmlformats.org/presentationml/2006/main" mc:Ignorable="mv" mc:PreserveAttributes="mv:*" preserve="1">
   <p:cSld name="Section Header 1">
     <p:spTree>
       <p:nvGrpSpPr>
@@ -8057,7 +7906,7 @@
     </p:spTree>
     <p:extLst>
       <p:ext uri="{BB962C8B-B14F-4D97-AF65-F5344CB8AC3E}">
-        <p14:creationId xmlns:p14="http://schemas.microsoft.com/office/powerpoint/2010/main" val="2124837561"/>
+        <p14:creationId xmlns:p14="http://schemas.microsoft.com/office/powerpoint/2010/main" xmlns:p="http://schemas.openxmlformats.org/presentationml/2006/main" xmlns:r="http://schemas.openxmlformats.org/officeDocument/2006/relationships" xmlns:a="http://schemas.openxmlformats.org/drawingml/2006/main" xmlns="" val="2124837561"/>
       </p:ext>
     </p:extLst>
   </p:cSld>
@@ -8075,7 +7924,7 @@
 </file>
 
 <file path=ppt/slideLayouts/slideLayout6.xml><?xml version="1.0" encoding="utf-8"?>
-<p:sldLayout xmlns:a="http://schemas.openxmlformats.org/drawingml/2006/main" xmlns:r="http://schemas.openxmlformats.org/officeDocument/2006/relationships" xmlns:p="http://schemas.openxmlformats.org/presentationml/2006/main" type="twoObj" preserve="1">
+<p:sldLayout xmlns:a="http://schemas.openxmlformats.org/drawingml/2006/main" xmlns:r="http://schemas.openxmlformats.org/officeDocument/2006/relationships" xmlns:mc="http://schemas.openxmlformats.org/markup-compatibility/2006" xmlns:mv="urn:schemas-microsoft-com:mac:vml" xmlns:p="http://schemas.openxmlformats.org/presentationml/2006/main" mc:Ignorable="mv" mc:PreserveAttributes="mv:*" type="twoObj" preserve="1">
   <p:cSld name="Two Content">
     <p:spTree>
       <p:nvGrpSpPr>
@@ -8342,7 +8191,7 @@
     </p:spTree>
     <p:extLst>
       <p:ext uri="{BB962C8B-B14F-4D97-AF65-F5344CB8AC3E}">
-        <p14:creationId xmlns:p14="http://schemas.microsoft.com/office/powerpoint/2010/main" val="3833519293"/>
+        <p14:creationId xmlns:p14="http://schemas.microsoft.com/office/powerpoint/2010/main" xmlns:p="http://schemas.openxmlformats.org/presentationml/2006/main" xmlns:r="http://schemas.openxmlformats.org/officeDocument/2006/relationships" xmlns:a="http://schemas.openxmlformats.org/drawingml/2006/main" xmlns="" val="3833519293"/>
       </p:ext>
     </p:extLst>
   </p:cSld>
@@ -8353,7 +8202,7 @@
 </file>
 
 <file path=ppt/slideLayouts/slideLayout7.xml><?xml version="1.0" encoding="utf-8"?>
-<p:sldLayout xmlns:a="http://schemas.openxmlformats.org/drawingml/2006/main" xmlns:r="http://schemas.openxmlformats.org/officeDocument/2006/relationships" xmlns:p="http://schemas.openxmlformats.org/presentationml/2006/main" preserve="1" userDrawn="1">
+<p:sldLayout xmlns:a="http://schemas.openxmlformats.org/drawingml/2006/main" xmlns:r="http://schemas.openxmlformats.org/officeDocument/2006/relationships" xmlns:mc="http://schemas.openxmlformats.org/markup-compatibility/2006" xmlns:mv="urn:schemas-microsoft-com:mac:vml" xmlns:p="http://schemas.openxmlformats.org/presentationml/2006/main" mc:Ignorable="mv" mc:PreserveAttributes="mv:*" preserve="1" userDrawn="1">
   <p:cSld name="Comparison">
     <p:spTree>
       <p:nvGrpSpPr>
@@ -8714,7 +8563,7 @@
     </p:spTree>
     <p:extLst>
       <p:ext uri="{BB962C8B-B14F-4D97-AF65-F5344CB8AC3E}">
-        <p14:creationId xmlns:p14="http://schemas.microsoft.com/office/powerpoint/2010/main" val="2901287801"/>
+        <p14:creationId xmlns:p14="http://schemas.microsoft.com/office/powerpoint/2010/main" xmlns:p="http://schemas.openxmlformats.org/presentationml/2006/main" xmlns:r="http://schemas.openxmlformats.org/officeDocument/2006/relationships" xmlns:a="http://schemas.openxmlformats.org/drawingml/2006/main" xmlns="" val="2901287801"/>
       </p:ext>
     </p:extLst>
   </p:cSld>
@@ -8725,7 +8574,7 @@
 </file>
 
 <file path=ppt/slideLayouts/slideLayout8.xml><?xml version="1.0" encoding="utf-8"?>
-<p:sldLayout xmlns:a="http://schemas.openxmlformats.org/drawingml/2006/main" xmlns:r="http://schemas.openxmlformats.org/officeDocument/2006/relationships" xmlns:p="http://schemas.openxmlformats.org/presentationml/2006/main" preserve="1" userDrawn="1">
+<p:sldLayout xmlns:a="http://schemas.openxmlformats.org/drawingml/2006/main" xmlns:r="http://schemas.openxmlformats.org/officeDocument/2006/relationships" xmlns:mc="http://schemas.openxmlformats.org/markup-compatibility/2006" xmlns:mv="urn:schemas-microsoft-com:mac:vml" xmlns:p="http://schemas.openxmlformats.org/presentationml/2006/main" mc:Ignorable="mv" mc:PreserveAttributes="mv:*" preserve="1" userDrawn="1">
   <p:cSld name="Three Content">
     <p:spTree>
       <p:nvGrpSpPr>
@@ -9012,7 +8861,7 @@
     </p:spTree>
     <p:extLst>
       <p:ext uri="{BB962C8B-B14F-4D97-AF65-F5344CB8AC3E}">
-        <p14:creationId xmlns:p14="http://schemas.microsoft.com/office/powerpoint/2010/main" val="826396584"/>
+        <p14:creationId xmlns:p14="http://schemas.microsoft.com/office/powerpoint/2010/main" xmlns:p="http://schemas.openxmlformats.org/presentationml/2006/main" xmlns:r="http://schemas.openxmlformats.org/officeDocument/2006/relationships" xmlns:a="http://schemas.openxmlformats.org/drawingml/2006/main" xmlns="" val="826396584"/>
       </p:ext>
     </p:extLst>
   </p:cSld>
@@ -9023,7 +8872,7 @@
 </file>
 
 <file path=ppt/slideLayouts/slideLayout9.xml><?xml version="1.0" encoding="utf-8"?>
-<p:sldLayout xmlns:a="http://schemas.openxmlformats.org/drawingml/2006/main" xmlns:r="http://schemas.openxmlformats.org/officeDocument/2006/relationships" xmlns:p="http://schemas.openxmlformats.org/presentationml/2006/main" preserve="1" userDrawn="1">
+<p:sldLayout xmlns:a="http://schemas.openxmlformats.org/drawingml/2006/main" xmlns:r="http://schemas.openxmlformats.org/officeDocument/2006/relationships" xmlns:mc="http://schemas.openxmlformats.org/markup-compatibility/2006" xmlns:mv="urn:schemas-microsoft-com:mac:vml" xmlns:p="http://schemas.openxmlformats.org/presentationml/2006/main" mc:Ignorable="mv" mc:PreserveAttributes="mv:*" preserve="1" userDrawn="1">
   <p:cSld name="Four Content - Graphics">
     <p:spTree>
       <p:nvGrpSpPr>
@@ -9518,7 +9367,7 @@
     </p:spTree>
     <p:extLst>
       <p:ext uri="{BB962C8B-B14F-4D97-AF65-F5344CB8AC3E}">
-        <p14:creationId xmlns:p14="http://schemas.microsoft.com/office/powerpoint/2010/main" val="2302505678"/>
+        <p14:creationId xmlns:p14="http://schemas.microsoft.com/office/powerpoint/2010/main" xmlns:p="http://schemas.openxmlformats.org/presentationml/2006/main" xmlns:r="http://schemas.openxmlformats.org/officeDocument/2006/relationships" xmlns:a="http://schemas.openxmlformats.org/drawingml/2006/main" xmlns="" val="2302505678"/>
       </p:ext>
     </p:extLst>
   </p:cSld>
@@ -9529,7 +9378,7 @@
 </file>
 
 <file path=ppt/slideMasters/slideMaster1.xml><?xml version="1.0" encoding="utf-8"?>
-<p:sldMaster xmlns:a="http://schemas.openxmlformats.org/drawingml/2006/main" xmlns:r="http://schemas.openxmlformats.org/officeDocument/2006/relationships" xmlns:p="http://schemas.openxmlformats.org/presentationml/2006/main">
+<p:sldMaster xmlns:a="http://schemas.openxmlformats.org/drawingml/2006/main" xmlns:r="http://schemas.openxmlformats.org/officeDocument/2006/relationships" xmlns:mc="http://schemas.openxmlformats.org/markup-compatibility/2006" xmlns:mv="urn:schemas-microsoft-com:mac:vml" xmlns:p="http://schemas.openxmlformats.org/presentationml/2006/main" mc:Ignorable="mv" mc:PreserveAttributes="mv:*">
   <p:cSld>
     <p:bg>
       <p:bgPr>
@@ -9655,7 +9504,7 @@
     </p:spTree>
     <p:extLst>
       <p:ext uri="{BB962C8B-B14F-4D97-AF65-F5344CB8AC3E}">
-        <p14:creationId xmlns:p14="http://schemas.microsoft.com/office/powerpoint/2010/main" val="14311777"/>
+        <p14:creationId xmlns:p14="http://schemas.microsoft.com/office/powerpoint/2010/main" xmlns:p="http://schemas.openxmlformats.org/presentationml/2006/main" xmlns:r="http://schemas.openxmlformats.org/officeDocument/2006/relationships" xmlns:a="http://schemas.openxmlformats.org/drawingml/2006/main" xmlns="" val="14311777"/>
       </p:ext>
     </p:extLst>
   </p:cSld>
@@ -9932,7 +9781,7 @@
 </file>
 
 <file path=ppt/slides/slide1.xml><?xml version="1.0" encoding="utf-8"?>
-<p:sld xmlns:a="http://schemas.openxmlformats.org/drawingml/2006/main" xmlns:r="http://schemas.openxmlformats.org/officeDocument/2006/relationships" xmlns:p="http://schemas.openxmlformats.org/presentationml/2006/main">
+<p:sld xmlns:a="http://schemas.openxmlformats.org/drawingml/2006/main" xmlns:r="http://schemas.openxmlformats.org/officeDocument/2006/relationships" xmlns:mc="http://schemas.openxmlformats.org/markup-compatibility/2006" xmlns:mv="urn:schemas-microsoft-com:mac:vml" xmlns:p="http://schemas.openxmlformats.org/presentationml/2006/main" mc:Ignorable="mv" mc:PreserveAttributes="mv:*">
   <p:cSld>
     <p:spTree>
       <p:nvGrpSpPr>
@@ -10053,7 +9902,7 @@
     </p:spTree>
     <p:extLst>
       <p:ext uri="{BB962C8B-B14F-4D97-AF65-F5344CB8AC3E}">
-        <p14:creationId xmlns:p14="http://schemas.microsoft.com/office/powerpoint/2010/main" val="215277738"/>
+        <p14:creationId xmlns:p14="http://schemas.microsoft.com/office/powerpoint/2010/main" xmlns:p="http://schemas.openxmlformats.org/presentationml/2006/main" xmlns:r="http://schemas.openxmlformats.org/officeDocument/2006/relationships" xmlns:a="http://schemas.openxmlformats.org/drawingml/2006/main" xmlns="" val="215277738"/>
       </p:ext>
     </p:extLst>
   </p:cSld>
@@ -10071,7 +9920,7 @@
 </file>
 
 <file path=ppt/slides/slide10.xml><?xml version="1.0" encoding="utf-8"?>
-<p:sld xmlns:a="http://schemas.openxmlformats.org/drawingml/2006/main" xmlns:r="http://schemas.openxmlformats.org/officeDocument/2006/relationships" xmlns:p="http://schemas.openxmlformats.org/presentationml/2006/main">
+<p:sld xmlns:a="http://schemas.openxmlformats.org/drawingml/2006/main" xmlns:r="http://schemas.openxmlformats.org/officeDocument/2006/relationships" xmlns:mc="http://schemas.openxmlformats.org/markup-compatibility/2006" xmlns:mv="urn:schemas-microsoft-com:mac:vml" xmlns:p="http://schemas.openxmlformats.org/presentationml/2006/main" mc:Ignorable="mv" mc:PreserveAttributes="mv:*">
   <p:cSld>
     <p:spTree>
       <p:nvGrpSpPr>
@@ -10117,7 +9966,7 @@
     </p:spTree>
     <p:extLst>
       <p:ext uri="{BB962C8B-B14F-4D97-AF65-F5344CB8AC3E}">
-        <p14:creationId xmlns:p14="http://schemas.microsoft.com/office/powerpoint/2010/main" val="2005060300"/>
+        <p14:creationId xmlns:p14="http://schemas.microsoft.com/office/powerpoint/2010/main" xmlns:p="http://schemas.openxmlformats.org/presentationml/2006/main" xmlns:r="http://schemas.openxmlformats.org/officeDocument/2006/relationships" xmlns:a="http://schemas.openxmlformats.org/drawingml/2006/main" xmlns="" val="2005060300"/>
       </p:ext>
     </p:extLst>
   </p:cSld>
@@ -10135,7 +9984,7 @@
 </file>
 
 <file path=ppt/slides/slide11.xml><?xml version="1.0" encoding="utf-8"?>
-<p:sld xmlns:a="http://schemas.openxmlformats.org/drawingml/2006/main" xmlns:r="http://schemas.openxmlformats.org/officeDocument/2006/relationships" xmlns:p="http://schemas.openxmlformats.org/presentationml/2006/main">
+<p:sld xmlns:a="http://schemas.openxmlformats.org/drawingml/2006/main" xmlns:r="http://schemas.openxmlformats.org/officeDocument/2006/relationships" xmlns:mc="http://schemas.openxmlformats.org/markup-compatibility/2006" xmlns:mv="urn:schemas-microsoft-com:mac:vml" xmlns:p="http://schemas.openxmlformats.org/presentationml/2006/main" mc:Ignorable="mv" mc:PreserveAttributes="mv:*">
   <p:cSld>
     <p:spTree>
       <p:nvGrpSpPr>
@@ -10268,7 +10117,7 @@
     </p:spTree>
     <p:extLst>
       <p:ext uri="{BB962C8B-B14F-4D97-AF65-F5344CB8AC3E}">
-        <p14:creationId xmlns:p14="http://schemas.microsoft.com/office/powerpoint/2010/main" val="904526595"/>
+        <p14:creationId xmlns:p14="http://schemas.microsoft.com/office/powerpoint/2010/main" xmlns:p="http://schemas.openxmlformats.org/presentationml/2006/main" xmlns:r="http://schemas.openxmlformats.org/officeDocument/2006/relationships" xmlns:a="http://schemas.openxmlformats.org/drawingml/2006/main" xmlns="" val="904526595"/>
       </p:ext>
     </p:extLst>
   </p:cSld>
@@ -10286,7 +10135,7 @@
 </file>
 
 <file path=ppt/slides/slide12.xml><?xml version="1.0" encoding="utf-8"?>
-<p:sld xmlns:a="http://schemas.openxmlformats.org/drawingml/2006/main" xmlns:r="http://schemas.openxmlformats.org/officeDocument/2006/relationships" xmlns:p="http://schemas.openxmlformats.org/presentationml/2006/main">
+<p:sld xmlns:a="http://schemas.openxmlformats.org/drawingml/2006/main" xmlns:r="http://schemas.openxmlformats.org/officeDocument/2006/relationships" xmlns:mc="http://schemas.openxmlformats.org/markup-compatibility/2006" xmlns:mv="urn:schemas-microsoft-com:mac:vml" xmlns:p="http://schemas.openxmlformats.org/presentationml/2006/main" mc:Ignorable="mv" mc:PreserveAttributes="mv:*">
   <p:cSld>
     <p:spTree>
       <p:nvGrpSpPr>
@@ -10413,7 +10262,7 @@
           <a:blip r:embed="rId3">
             <a:extLst>
               <a:ext uri="{28A0092B-C50C-407E-A947-70E740481C1C}">
-                <a14:useLocalDpi xmlns:a14="http://schemas.microsoft.com/office/drawing/2010/main" val="0"/>
+                <a14:useLocalDpi xmlns:a14="http://schemas.microsoft.com/office/drawing/2010/main" xmlns:p="http://schemas.openxmlformats.org/presentationml/2006/main" xmlns:r="http://schemas.openxmlformats.org/officeDocument/2006/relationships" xmlns:a="http://schemas.openxmlformats.org/drawingml/2006/main" xmlns="" val="0"/>
               </a:ext>
             </a:extLst>
           </a:blip>
@@ -10443,7 +10292,7 @@
           <a:blip r:embed="rId4">
             <a:extLst>
               <a:ext uri="{28A0092B-C50C-407E-A947-70E740481C1C}">
-                <a14:useLocalDpi xmlns:a14="http://schemas.microsoft.com/office/drawing/2010/main" val="0"/>
+                <a14:useLocalDpi xmlns:a14="http://schemas.microsoft.com/office/drawing/2010/main" xmlns:p="http://schemas.openxmlformats.org/presentationml/2006/main" xmlns:r="http://schemas.openxmlformats.org/officeDocument/2006/relationships" xmlns:a="http://schemas.openxmlformats.org/drawingml/2006/main" xmlns="" val="0"/>
               </a:ext>
             </a:extLst>
           </a:blip>
@@ -10473,7 +10322,7 @@
           <a:blip r:embed="rId5">
             <a:extLst>
               <a:ext uri="{28A0092B-C50C-407E-A947-70E740481C1C}">
-                <a14:useLocalDpi xmlns:a14="http://schemas.microsoft.com/office/drawing/2010/main" val="0"/>
+                <a14:useLocalDpi xmlns:a14="http://schemas.microsoft.com/office/drawing/2010/main" xmlns:p="http://schemas.openxmlformats.org/presentationml/2006/main" xmlns:r="http://schemas.openxmlformats.org/officeDocument/2006/relationships" xmlns:a="http://schemas.openxmlformats.org/drawingml/2006/main" xmlns="" val="0"/>
               </a:ext>
             </a:extLst>
           </a:blip>
@@ -10494,7 +10343,7 @@
     </p:spTree>
     <p:extLst>
       <p:ext uri="{BB962C8B-B14F-4D97-AF65-F5344CB8AC3E}">
-        <p14:creationId xmlns:p14="http://schemas.microsoft.com/office/powerpoint/2010/main" val="603589582"/>
+        <p14:creationId xmlns:p14="http://schemas.microsoft.com/office/powerpoint/2010/main" xmlns:p="http://schemas.openxmlformats.org/presentationml/2006/main" xmlns:r="http://schemas.openxmlformats.org/officeDocument/2006/relationships" xmlns:a="http://schemas.openxmlformats.org/drawingml/2006/main" xmlns="" val="603589582"/>
       </p:ext>
     </p:extLst>
   </p:cSld>
@@ -10512,7 +10361,7 @@
 </file>
 
 <file path=ppt/slides/slide13.xml><?xml version="1.0" encoding="utf-8"?>
-<p:sld xmlns:a="http://schemas.openxmlformats.org/drawingml/2006/main" xmlns:r="http://schemas.openxmlformats.org/officeDocument/2006/relationships" xmlns:p="http://schemas.openxmlformats.org/presentationml/2006/main">
+<p:sld xmlns:a="http://schemas.openxmlformats.org/drawingml/2006/main" xmlns:r="http://schemas.openxmlformats.org/officeDocument/2006/relationships" xmlns:mc="http://schemas.openxmlformats.org/markup-compatibility/2006" xmlns:mv="urn:schemas-microsoft-com:mac:vml" xmlns:p="http://schemas.openxmlformats.org/presentationml/2006/main" mc:Ignorable="mv" mc:PreserveAttributes="mv:*">
   <p:cSld>
     <p:spTree>
       <p:nvGrpSpPr>
@@ -10563,7 +10412,7 @@
           <a:blip r:embed="rId3">
             <a:extLst>
               <a:ext uri="{28A0092B-C50C-407E-A947-70E740481C1C}">
-                <a14:useLocalDpi xmlns:a14="http://schemas.microsoft.com/office/drawing/2010/main" val="0"/>
+                <a14:useLocalDpi xmlns:a14="http://schemas.microsoft.com/office/drawing/2010/main" xmlns:p="http://schemas.openxmlformats.org/presentationml/2006/main" xmlns:r="http://schemas.openxmlformats.org/officeDocument/2006/relationships" xmlns:a="http://schemas.openxmlformats.org/drawingml/2006/main" xmlns="" val="0"/>
               </a:ext>
             </a:extLst>
           </a:blip>
@@ -10593,7 +10442,7 @@
           <a:blip r:embed="rId4">
             <a:extLst>
               <a:ext uri="{28A0092B-C50C-407E-A947-70E740481C1C}">
-                <a14:useLocalDpi xmlns:a14="http://schemas.microsoft.com/office/drawing/2010/main" val="0"/>
+                <a14:useLocalDpi xmlns:a14="http://schemas.microsoft.com/office/drawing/2010/main" xmlns:p="http://schemas.openxmlformats.org/presentationml/2006/main" xmlns:r="http://schemas.openxmlformats.org/officeDocument/2006/relationships" xmlns:a="http://schemas.openxmlformats.org/drawingml/2006/main" xmlns="" val="0"/>
               </a:ext>
             </a:extLst>
           </a:blip>
@@ -10692,7 +10541,7 @@
           <a:blip r:embed="rId4">
             <a:extLst>
               <a:ext uri="{28A0092B-C50C-407E-A947-70E740481C1C}">
-                <a14:useLocalDpi xmlns:a14="http://schemas.microsoft.com/office/drawing/2010/main" val="0"/>
+                <a14:useLocalDpi xmlns:a14="http://schemas.microsoft.com/office/drawing/2010/main" xmlns:p="http://schemas.openxmlformats.org/presentationml/2006/main" xmlns:r="http://schemas.openxmlformats.org/officeDocument/2006/relationships" xmlns:a="http://schemas.openxmlformats.org/drawingml/2006/main" xmlns="" val="0"/>
               </a:ext>
             </a:extLst>
           </a:blip>
@@ -10773,7 +10622,7 @@
     </p:spTree>
     <p:extLst>
       <p:ext uri="{BB962C8B-B14F-4D97-AF65-F5344CB8AC3E}">
-        <p14:creationId xmlns:p14="http://schemas.microsoft.com/office/powerpoint/2010/main" val="1011663949"/>
+        <p14:creationId xmlns:p14="http://schemas.microsoft.com/office/powerpoint/2010/main" xmlns:p="http://schemas.openxmlformats.org/presentationml/2006/main" xmlns:r="http://schemas.openxmlformats.org/officeDocument/2006/relationships" xmlns:a="http://schemas.openxmlformats.org/drawingml/2006/main" xmlns="" val="1011663949"/>
       </p:ext>
     </p:extLst>
   </p:cSld>
@@ -10791,7 +10640,7 @@
 </file>
 
 <file path=ppt/slides/slide14.xml><?xml version="1.0" encoding="utf-8"?>
-<p:sld xmlns:a="http://schemas.openxmlformats.org/drawingml/2006/main" xmlns:r="http://schemas.openxmlformats.org/officeDocument/2006/relationships" xmlns:p="http://schemas.openxmlformats.org/presentationml/2006/main">
+<p:sld xmlns:a="http://schemas.openxmlformats.org/drawingml/2006/main" xmlns:r="http://schemas.openxmlformats.org/officeDocument/2006/relationships" xmlns:mc="http://schemas.openxmlformats.org/markup-compatibility/2006" xmlns:mv="urn:schemas-microsoft-com:mac:vml" xmlns:p="http://schemas.openxmlformats.org/presentationml/2006/main" mc:Ignorable="mv" mc:PreserveAttributes="mv:*">
   <p:cSld>
     <p:spTree>
       <p:nvGrpSpPr>
@@ -10842,7 +10691,7 @@
           <a:blip r:embed="rId3">
             <a:extLst>
               <a:ext uri="{28A0092B-C50C-407E-A947-70E740481C1C}">
-                <a14:useLocalDpi xmlns:a14="http://schemas.microsoft.com/office/drawing/2010/main" val="0"/>
+                <a14:useLocalDpi xmlns:a14="http://schemas.microsoft.com/office/drawing/2010/main" xmlns:p="http://schemas.openxmlformats.org/presentationml/2006/main" xmlns:r="http://schemas.openxmlformats.org/officeDocument/2006/relationships" xmlns:a="http://schemas.openxmlformats.org/drawingml/2006/main" xmlns="" val="0"/>
               </a:ext>
             </a:extLst>
           </a:blip>
@@ -10872,7 +10721,7 @@
           <a:blip r:embed="rId4">
             <a:extLst>
               <a:ext uri="{28A0092B-C50C-407E-A947-70E740481C1C}">
-                <a14:useLocalDpi xmlns:a14="http://schemas.microsoft.com/office/drawing/2010/main" val="0"/>
+                <a14:useLocalDpi xmlns:a14="http://schemas.microsoft.com/office/drawing/2010/main" xmlns:p="http://schemas.openxmlformats.org/presentationml/2006/main" xmlns:r="http://schemas.openxmlformats.org/officeDocument/2006/relationships" xmlns:a="http://schemas.openxmlformats.org/drawingml/2006/main" xmlns="" val="0"/>
               </a:ext>
             </a:extLst>
           </a:blip>
@@ -10902,7 +10751,7 @@
           <a:blip r:embed="rId5">
             <a:extLst>
               <a:ext uri="{28A0092B-C50C-407E-A947-70E740481C1C}">
-                <a14:useLocalDpi xmlns:a14="http://schemas.microsoft.com/office/drawing/2010/main" val="0"/>
+                <a14:useLocalDpi xmlns:a14="http://schemas.microsoft.com/office/drawing/2010/main" xmlns:p="http://schemas.openxmlformats.org/presentationml/2006/main" xmlns:r="http://schemas.openxmlformats.org/officeDocument/2006/relationships" xmlns:a="http://schemas.openxmlformats.org/drawingml/2006/main" xmlns="" val="0"/>
               </a:ext>
             </a:extLst>
           </a:blip>
@@ -11154,7 +11003,7 @@
     </p:spTree>
     <p:extLst>
       <p:ext uri="{BB962C8B-B14F-4D97-AF65-F5344CB8AC3E}">
-        <p14:creationId xmlns:p14="http://schemas.microsoft.com/office/powerpoint/2010/main" val="1221938147"/>
+        <p14:creationId xmlns:p14="http://schemas.microsoft.com/office/powerpoint/2010/main" xmlns:p="http://schemas.openxmlformats.org/presentationml/2006/main" xmlns:r="http://schemas.openxmlformats.org/officeDocument/2006/relationships" xmlns:a="http://schemas.openxmlformats.org/drawingml/2006/main" xmlns="" val="1221938147"/>
       </p:ext>
     </p:extLst>
   </p:cSld>
@@ -11172,7 +11021,7 @@
 </file>
 
 <file path=ppt/slides/slide15.xml><?xml version="1.0" encoding="utf-8"?>
-<p:sld xmlns:a="http://schemas.openxmlformats.org/drawingml/2006/main" xmlns:r="http://schemas.openxmlformats.org/officeDocument/2006/relationships" xmlns:p="http://schemas.openxmlformats.org/presentationml/2006/main">
+<p:sld xmlns:a="http://schemas.openxmlformats.org/drawingml/2006/main" xmlns:r="http://schemas.openxmlformats.org/officeDocument/2006/relationships" xmlns:mc="http://schemas.openxmlformats.org/markup-compatibility/2006" xmlns:mv="urn:schemas-microsoft-com:mac:vml" xmlns:p="http://schemas.openxmlformats.org/presentationml/2006/main" mc:Ignorable="mv" mc:PreserveAttributes="mv:*">
   <p:cSld>
     <p:spTree>
       <p:nvGrpSpPr>
@@ -11318,7 +11167,7 @@
     </p:spTree>
     <p:extLst>
       <p:ext uri="{BB962C8B-B14F-4D97-AF65-F5344CB8AC3E}">
-        <p14:creationId xmlns:p14="http://schemas.microsoft.com/office/powerpoint/2010/main" val="2135493620"/>
+        <p14:creationId xmlns:p14="http://schemas.microsoft.com/office/powerpoint/2010/main" xmlns:p="http://schemas.openxmlformats.org/presentationml/2006/main" xmlns:r="http://schemas.openxmlformats.org/officeDocument/2006/relationships" xmlns:a="http://schemas.openxmlformats.org/drawingml/2006/main" xmlns="" val="2135493620"/>
       </p:ext>
     </p:extLst>
   </p:cSld>
@@ -11329,7 +11178,7 @@
 </file>
 
 <file path=ppt/slides/slide16.xml><?xml version="1.0" encoding="utf-8"?>
-<p:sld xmlns:a="http://schemas.openxmlformats.org/drawingml/2006/main" xmlns:r="http://schemas.openxmlformats.org/officeDocument/2006/relationships" xmlns:p="http://schemas.openxmlformats.org/presentationml/2006/main">
+<p:sld xmlns:a="http://schemas.openxmlformats.org/drawingml/2006/main" xmlns:r="http://schemas.openxmlformats.org/officeDocument/2006/relationships" xmlns:mc="http://schemas.openxmlformats.org/markup-compatibility/2006" xmlns:mv="urn:schemas-microsoft-com:mac:vml" xmlns:p="http://schemas.openxmlformats.org/presentationml/2006/main" mc:Ignorable="mv" mc:PreserveAttributes="mv:*">
   <p:cSld>
     <p:spTree>
       <p:nvGrpSpPr>
@@ -11456,7 +11305,7 @@
           <a:blip r:embed="rId3">
             <a:extLst>
               <a:ext uri="{28A0092B-C50C-407E-A947-70E740481C1C}">
-                <a14:useLocalDpi xmlns:a14="http://schemas.microsoft.com/office/drawing/2010/main" val="0"/>
+                <a14:useLocalDpi xmlns:a14="http://schemas.microsoft.com/office/drawing/2010/main" xmlns:p="http://schemas.openxmlformats.org/presentationml/2006/main" xmlns:r="http://schemas.openxmlformats.org/officeDocument/2006/relationships" xmlns:a="http://schemas.openxmlformats.org/drawingml/2006/main" xmlns="" val="0"/>
               </a:ext>
             </a:extLst>
           </a:blip>
@@ -11516,7 +11365,7 @@
           <a:blip r:embed="rId4">
             <a:extLst>
               <a:ext uri="{28A0092B-C50C-407E-A947-70E740481C1C}">
-                <a14:useLocalDpi xmlns:a14="http://schemas.microsoft.com/office/drawing/2010/main" val="0"/>
+                <a14:useLocalDpi xmlns:a14="http://schemas.microsoft.com/office/drawing/2010/main" xmlns:p="http://schemas.openxmlformats.org/presentationml/2006/main" xmlns:r="http://schemas.openxmlformats.org/officeDocument/2006/relationships" xmlns:a="http://schemas.openxmlformats.org/drawingml/2006/main" xmlns="" val="0"/>
               </a:ext>
             </a:extLst>
           </a:blip>
@@ -11646,7 +11495,7 @@
           <a:blip r:embed="rId5">
             <a:extLst>
               <a:ext uri="{28A0092B-C50C-407E-A947-70E740481C1C}">
-                <a14:useLocalDpi xmlns:a14="http://schemas.microsoft.com/office/drawing/2010/main" val="0"/>
+                <a14:useLocalDpi xmlns:a14="http://schemas.microsoft.com/office/drawing/2010/main" xmlns:p="http://schemas.openxmlformats.org/presentationml/2006/main" xmlns:r="http://schemas.openxmlformats.org/officeDocument/2006/relationships" xmlns:a="http://schemas.openxmlformats.org/drawingml/2006/main" xmlns="" val="0"/>
               </a:ext>
             </a:extLst>
           </a:blip>
@@ -11667,7 +11516,7 @@
     </p:spTree>
     <p:extLst>
       <p:ext uri="{BB962C8B-B14F-4D97-AF65-F5344CB8AC3E}">
-        <p14:creationId xmlns:p14="http://schemas.microsoft.com/office/powerpoint/2010/main" val="721009559"/>
+        <p14:creationId xmlns:p14="http://schemas.microsoft.com/office/powerpoint/2010/main" xmlns:p="http://schemas.openxmlformats.org/presentationml/2006/main" xmlns:r="http://schemas.openxmlformats.org/officeDocument/2006/relationships" xmlns:a="http://schemas.openxmlformats.org/drawingml/2006/main" xmlns="" val="721009559"/>
       </p:ext>
     </p:extLst>
   </p:cSld>
@@ -11685,7 +11534,7 @@
 </file>
 
 <file path=ppt/slides/slide17.xml><?xml version="1.0" encoding="utf-8"?>
-<p:sld xmlns:a="http://schemas.openxmlformats.org/drawingml/2006/main" xmlns:r="http://schemas.openxmlformats.org/officeDocument/2006/relationships" xmlns:p="http://schemas.openxmlformats.org/presentationml/2006/main">
+<p:sld xmlns:a="http://schemas.openxmlformats.org/drawingml/2006/main" xmlns:r="http://schemas.openxmlformats.org/officeDocument/2006/relationships" xmlns:mc="http://schemas.openxmlformats.org/markup-compatibility/2006" xmlns:mv="urn:schemas-microsoft-com:mac:vml" xmlns:p="http://schemas.openxmlformats.org/presentationml/2006/main" mc:Ignorable="mv" mc:PreserveAttributes="mv:*">
   <p:cSld>
     <p:spTree>
       <p:nvGrpSpPr>
@@ -11789,7 +11638,7 @@
     </p:spTree>
     <p:extLst>
       <p:ext uri="{BB962C8B-B14F-4D97-AF65-F5344CB8AC3E}">
-        <p14:creationId xmlns:p14="http://schemas.microsoft.com/office/powerpoint/2010/main" val="1013969935"/>
+        <p14:creationId xmlns:p14="http://schemas.microsoft.com/office/powerpoint/2010/main" xmlns:p="http://schemas.openxmlformats.org/presentationml/2006/main" xmlns:r="http://schemas.openxmlformats.org/officeDocument/2006/relationships" xmlns:a="http://schemas.openxmlformats.org/drawingml/2006/main" xmlns="" val="1013969935"/>
       </p:ext>
     </p:extLst>
   </p:cSld>
@@ -11807,7 +11656,7 @@
 </file>
 
 <file path=ppt/slides/slide18.xml><?xml version="1.0" encoding="utf-8"?>
-<p:sld xmlns:a="http://schemas.openxmlformats.org/drawingml/2006/main" xmlns:r="http://schemas.openxmlformats.org/officeDocument/2006/relationships" xmlns:p="http://schemas.openxmlformats.org/presentationml/2006/main">
+<p:sld xmlns:a="http://schemas.openxmlformats.org/drawingml/2006/main" xmlns:r="http://schemas.openxmlformats.org/officeDocument/2006/relationships" xmlns:mc="http://schemas.openxmlformats.org/markup-compatibility/2006" xmlns:mv="urn:schemas-microsoft-com:mac:vml" xmlns:p="http://schemas.openxmlformats.org/presentationml/2006/main" mc:Ignorable="mv" mc:PreserveAttributes="mv:*">
   <p:cSld>
     <p:spTree>
       <p:nvGrpSpPr>
@@ -11906,7 +11755,7 @@
     </p:spTree>
     <p:extLst>
       <p:ext uri="{BB962C8B-B14F-4D97-AF65-F5344CB8AC3E}">
-        <p14:creationId xmlns:p14="http://schemas.microsoft.com/office/powerpoint/2010/main" val="557709769"/>
+        <p14:creationId xmlns:p14="http://schemas.microsoft.com/office/powerpoint/2010/main" xmlns:p="http://schemas.openxmlformats.org/presentationml/2006/main" xmlns:r="http://schemas.openxmlformats.org/officeDocument/2006/relationships" xmlns:a="http://schemas.openxmlformats.org/drawingml/2006/main" xmlns="" val="557709769"/>
       </p:ext>
     </p:extLst>
   </p:cSld>
@@ -11924,7 +11773,7 @@
 </file>
 
 <file path=ppt/slides/slide19.xml><?xml version="1.0" encoding="utf-8"?>
-<p:sld xmlns:a="http://schemas.openxmlformats.org/drawingml/2006/main" xmlns:r="http://schemas.openxmlformats.org/officeDocument/2006/relationships" xmlns:p="http://schemas.openxmlformats.org/presentationml/2006/main">
+<p:sld xmlns:a="http://schemas.openxmlformats.org/drawingml/2006/main" xmlns:r="http://schemas.openxmlformats.org/officeDocument/2006/relationships" xmlns:mc="http://schemas.openxmlformats.org/markup-compatibility/2006" xmlns:mv="urn:schemas-microsoft-com:mac:vml" xmlns:p="http://schemas.openxmlformats.org/presentationml/2006/main" mc:Ignorable="mv" mc:PreserveAttributes="mv:*">
   <p:cSld>
     <p:spTree>
       <p:nvGrpSpPr>
@@ -12135,7 +11984,7 @@
     </p:spTree>
     <p:extLst>
       <p:ext uri="{BB962C8B-B14F-4D97-AF65-F5344CB8AC3E}">
-        <p14:creationId xmlns:p14="http://schemas.microsoft.com/office/powerpoint/2010/main" val="178948511"/>
+        <p14:creationId xmlns:p14="http://schemas.microsoft.com/office/powerpoint/2010/main" xmlns:p="http://schemas.openxmlformats.org/presentationml/2006/main" xmlns:r="http://schemas.openxmlformats.org/officeDocument/2006/relationships" xmlns:a="http://schemas.openxmlformats.org/drawingml/2006/main" xmlns="" val="178948511"/>
       </p:ext>
     </p:extLst>
   </p:cSld>
@@ -12153,7 +12002,7 @@
 </file>
 
 <file path=ppt/slides/slide2.xml><?xml version="1.0" encoding="utf-8"?>
-<p:sld xmlns:a="http://schemas.openxmlformats.org/drawingml/2006/main" xmlns:r="http://schemas.openxmlformats.org/officeDocument/2006/relationships" xmlns:p="http://schemas.openxmlformats.org/presentationml/2006/main">
+<p:sld xmlns:a="http://schemas.openxmlformats.org/drawingml/2006/main" xmlns:r="http://schemas.openxmlformats.org/officeDocument/2006/relationships" xmlns:mc="http://schemas.openxmlformats.org/markup-compatibility/2006" xmlns:mv="urn:schemas-microsoft-com:mac:vml" xmlns:p="http://schemas.openxmlformats.org/presentationml/2006/main" mc:Ignorable="mv" mc:PreserveAttributes="mv:*">
   <p:cSld>
     <p:spTree>
       <p:nvGrpSpPr>
@@ -12243,7 +12092,7 @@
     </p:spTree>
     <p:extLst>
       <p:ext uri="{BB962C8B-B14F-4D97-AF65-F5344CB8AC3E}">
-        <p14:creationId xmlns:p14="http://schemas.microsoft.com/office/powerpoint/2010/main" val="67347756"/>
+        <p14:creationId xmlns:p14="http://schemas.microsoft.com/office/powerpoint/2010/main" xmlns:p="http://schemas.openxmlformats.org/presentationml/2006/main" xmlns:r="http://schemas.openxmlformats.org/officeDocument/2006/relationships" xmlns:a="http://schemas.openxmlformats.org/drawingml/2006/main" xmlns="" val="67347756"/>
       </p:ext>
     </p:extLst>
   </p:cSld>
@@ -12254,7 +12103,7 @@
 </file>
 
 <file path=ppt/slides/slide20.xml><?xml version="1.0" encoding="utf-8"?>
-<p:sld xmlns:a="http://schemas.openxmlformats.org/drawingml/2006/main" xmlns:r="http://schemas.openxmlformats.org/officeDocument/2006/relationships" xmlns:p="http://schemas.openxmlformats.org/presentationml/2006/main">
+<p:sld xmlns:a="http://schemas.openxmlformats.org/drawingml/2006/main" xmlns:r="http://schemas.openxmlformats.org/officeDocument/2006/relationships" xmlns:mc="http://schemas.openxmlformats.org/markup-compatibility/2006" xmlns:mv="urn:schemas-microsoft-com:mac:vml" xmlns:p="http://schemas.openxmlformats.org/presentationml/2006/main" mc:Ignorable="mv" mc:PreserveAttributes="mv:*">
   <p:cSld>
     <p:spTree>
       <p:nvGrpSpPr>
@@ -12377,7 +12226,7 @@
           <a:blip r:embed="rId3">
             <a:extLst>
               <a:ext uri="{28A0092B-C50C-407E-A947-70E740481C1C}">
-                <a14:useLocalDpi xmlns:a14="http://schemas.microsoft.com/office/drawing/2010/main" val="0"/>
+                <a14:useLocalDpi xmlns:a14="http://schemas.microsoft.com/office/drawing/2010/main" xmlns:p="http://schemas.openxmlformats.org/presentationml/2006/main" xmlns:r="http://schemas.openxmlformats.org/officeDocument/2006/relationships" xmlns:a="http://schemas.openxmlformats.org/drawingml/2006/main" xmlns="" val="0"/>
               </a:ext>
             </a:extLst>
           </a:blip>
@@ -12437,7 +12286,7 @@
           <a:blip r:embed="rId3">
             <a:extLst>
               <a:ext uri="{28A0092B-C50C-407E-A947-70E740481C1C}">
-                <a14:useLocalDpi xmlns:a14="http://schemas.microsoft.com/office/drawing/2010/main" val="0"/>
+                <a14:useLocalDpi xmlns:a14="http://schemas.microsoft.com/office/drawing/2010/main" xmlns:p="http://schemas.openxmlformats.org/presentationml/2006/main" xmlns:r="http://schemas.openxmlformats.org/officeDocument/2006/relationships" xmlns:a="http://schemas.openxmlformats.org/drawingml/2006/main" xmlns="" val="0"/>
               </a:ext>
             </a:extLst>
           </a:blip>
@@ -12547,7 +12396,7 @@
           <a:blip r:embed="rId4">
             <a:extLst>
               <a:ext uri="{28A0092B-C50C-407E-A947-70E740481C1C}">
-                <a14:useLocalDpi xmlns:a14="http://schemas.microsoft.com/office/drawing/2010/main" val="0"/>
+                <a14:useLocalDpi xmlns:a14="http://schemas.microsoft.com/office/drawing/2010/main" xmlns:p="http://schemas.openxmlformats.org/presentationml/2006/main" xmlns:r="http://schemas.openxmlformats.org/officeDocument/2006/relationships" xmlns:a="http://schemas.openxmlformats.org/drawingml/2006/main" xmlns="" val="0"/>
               </a:ext>
             </a:extLst>
           </a:blip>
@@ -12568,7 +12417,7 @@
     </p:spTree>
     <p:extLst>
       <p:ext uri="{BB962C8B-B14F-4D97-AF65-F5344CB8AC3E}">
-        <p14:creationId xmlns:p14="http://schemas.microsoft.com/office/powerpoint/2010/main" val="1705604458"/>
+        <p14:creationId xmlns:p14="http://schemas.microsoft.com/office/powerpoint/2010/main" xmlns:p="http://schemas.openxmlformats.org/presentationml/2006/main" xmlns:r="http://schemas.openxmlformats.org/officeDocument/2006/relationships" xmlns:a="http://schemas.openxmlformats.org/drawingml/2006/main" xmlns="" val="1705604458"/>
       </p:ext>
     </p:extLst>
   </p:cSld>
@@ -12586,7 +12435,7 @@
 </file>
 
 <file path=ppt/slides/slide21.xml><?xml version="1.0" encoding="utf-8"?>
-<p:sld xmlns:a="http://schemas.openxmlformats.org/drawingml/2006/main" xmlns:r="http://schemas.openxmlformats.org/officeDocument/2006/relationships" xmlns:p="http://schemas.openxmlformats.org/presentationml/2006/main">
+<p:sld xmlns:a="http://schemas.openxmlformats.org/drawingml/2006/main" xmlns:r="http://schemas.openxmlformats.org/officeDocument/2006/relationships" xmlns:mc="http://schemas.openxmlformats.org/markup-compatibility/2006" xmlns:mv="urn:schemas-microsoft-com:mac:vml" xmlns:p="http://schemas.openxmlformats.org/presentationml/2006/main" mc:Ignorable="mv" mc:PreserveAttributes="mv:*">
   <p:cSld>
     <p:spTree>
       <p:nvGrpSpPr>
@@ -12675,7 +12524,7 @@
     </p:spTree>
     <p:extLst>
       <p:ext uri="{BB962C8B-B14F-4D97-AF65-F5344CB8AC3E}">
-        <p14:creationId xmlns:p14="http://schemas.microsoft.com/office/powerpoint/2010/main" val="2045736504"/>
+        <p14:creationId xmlns:p14="http://schemas.microsoft.com/office/powerpoint/2010/main" xmlns:p="http://schemas.openxmlformats.org/presentationml/2006/main" xmlns:r="http://schemas.openxmlformats.org/officeDocument/2006/relationships" xmlns:a="http://schemas.openxmlformats.org/drawingml/2006/main" xmlns="" val="2045736504"/>
       </p:ext>
     </p:extLst>
   </p:cSld>
@@ -12693,7 +12542,7 @@
 </file>
 
 <file path=ppt/slides/slide22.xml><?xml version="1.0" encoding="utf-8"?>
-<p:sld xmlns:a="http://schemas.openxmlformats.org/drawingml/2006/main" xmlns:r="http://schemas.openxmlformats.org/officeDocument/2006/relationships" xmlns:p="http://schemas.openxmlformats.org/presentationml/2006/main">
+<p:sld xmlns:a="http://schemas.openxmlformats.org/drawingml/2006/main" xmlns:r="http://schemas.openxmlformats.org/officeDocument/2006/relationships" xmlns:mc="http://schemas.openxmlformats.org/markup-compatibility/2006" xmlns:mv="urn:schemas-microsoft-com:mac:vml" xmlns:p="http://schemas.openxmlformats.org/presentationml/2006/main" mc:Ignorable="mv" mc:PreserveAttributes="mv:*">
   <p:cSld>
     <p:spTree>
       <p:nvGrpSpPr>
@@ -12721,7 +12570,7 @@
           <a:blip r:embed="rId3">
             <a:extLst>
               <a:ext uri="{28A0092B-C50C-407E-A947-70E740481C1C}">
-                <a14:useLocalDpi xmlns:a14="http://schemas.microsoft.com/office/drawing/2010/main" val="0"/>
+                <a14:useLocalDpi xmlns:a14="http://schemas.microsoft.com/office/drawing/2010/main" xmlns:p="http://schemas.openxmlformats.org/presentationml/2006/main" xmlns:r="http://schemas.openxmlformats.org/officeDocument/2006/relationships" xmlns:a="http://schemas.openxmlformats.org/drawingml/2006/main" xmlns="" val="0"/>
               </a:ext>
             </a:extLst>
           </a:blip>
@@ -12751,7 +12600,7 @@
           <a:blip r:embed="rId4">
             <a:extLst>
               <a:ext uri="{28A0092B-C50C-407E-A947-70E740481C1C}">
-                <a14:useLocalDpi xmlns:a14="http://schemas.microsoft.com/office/drawing/2010/main" val="0"/>
+                <a14:useLocalDpi xmlns:a14="http://schemas.microsoft.com/office/drawing/2010/main" xmlns:p="http://schemas.openxmlformats.org/presentationml/2006/main" xmlns:r="http://schemas.openxmlformats.org/officeDocument/2006/relationships" xmlns:a="http://schemas.openxmlformats.org/drawingml/2006/main" xmlns="" val="0"/>
               </a:ext>
             </a:extLst>
           </a:blip>
@@ -12811,7 +12660,7 @@
           <a:blip r:embed="rId5">
             <a:extLst>
               <a:ext uri="{28A0092B-C50C-407E-A947-70E740481C1C}">
-                <a14:useLocalDpi xmlns:a14="http://schemas.microsoft.com/office/drawing/2010/main" val="0"/>
+                <a14:useLocalDpi xmlns:a14="http://schemas.microsoft.com/office/drawing/2010/main" xmlns:p="http://schemas.openxmlformats.org/presentationml/2006/main" xmlns:r="http://schemas.openxmlformats.org/officeDocument/2006/relationships" xmlns:a="http://schemas.openxmlformats.org/drawingml/2006/main" xmlns="" val="0"/>
               </a:ext>
             </a:extLst>
           </a:blip>
@@ -12832,7 +12681,7 @@
     </p:spTree>
     <p:extLst>
       <p:ext uri="{BB962C8B-B14F-4D97-AF65-F5344CB8AC3E}">
-        <p14:creationId xmlns:p14="http://schemas.microsoft.com/office/powerpoint/2010/main" val="231676306"/>
+        <p14:creationId xmlns:p14="http://schemas.microsoft.com/office/powerpoint/2010/main" xmlns:p="http://schemas.openxmlformats.org/presentationml/2006/main" xmlns:r="http://schemas.openxmlformats.org/officeDocument/2006/relationships" xmlns:a="http://schemas.openxmlformats.org/drawingml/2006/main" xmlns="" val="231676306"/>
       </p:ext>
     </p:extLst>
   </p:cSld>
@@ -12850,7 +12699,7 @@
 </file>
 
 <file path=ppt/slides/slide23.xml><?xml version="1.0" encoding="utf-8"?>
-<p:sld xmlns:a="http://schemas.openxmlformats.org/drawingml/2006/main" xmlns:r="http://schemas.openxmlformats.org/officeDocument/2006/relationships" xmlns:p="http://schemas.openxmlformats.org/presentationml/2006/main">
+<p:sld xmlns:a="http://schemas.openxmlformats.org/drawingml/2006/main" xmlns:r="http://schemas.openxmlformats.org/officeDocument/2006/relationships" xmlns:mc="http://schemas.openxmlformats.org/markup-compatibility/2006" xmlns:mv="urn:schemas-microsoft-com:mac:vml" xmlns:p="http://schemas.openxmlformats.org/presentationml/2006/main" mc:Ignorable="mv" mc:PreserveAttributes="mv:*">
   <p:cSld>
     <p:spTree>
       <p:nvGrpSpPr>
@@ -13083,7 +12932,7 @@
     </p:spTree>
     <p:extLst>
       <p:ext uri="{BB962C8B-B14F-4D97-AF65-F5344CB8AC3E}">
-        <p14:creationId xmlns:p14="http://schemas.microsoft.com/office/powerpoint/2010/main" val="701688603"/>
+        <p14:creationId xmlns:p14="http://schemas.microsoft.com/office/powerpoint/2010/main" xmlns:p="http://schemas.openxmlformats.org/presentationml/2006/main" xmlns:r="http://schemas.openxmlformats.org/officeDocument/2006/relationships" xmlns:a="http://schemas.openxmlformats.org/drawingml/2006/main" xmlns="" val="701688603"/>
       </p:ext>
     </p:extLst>
   </p:cSld>
@@ -13101,7 +12950,7 @@
 </file>
 
 <file path=ppt/slides/slide24.xml><?xml version="1.0" encoding="utf-8"?>
-<p:sld xmlns:a="http://schemas.openxmlformats.org/drawingml/2006/main" xmlns:r="http://schemas.openxmlformats.org/officeDocument/2006/relationships" xmlns:p="http://schemas.openxmlformats.org/presentationml/2006/main">
+<p:sld xmlns:a="http://schemas.openxmlformats.org/drawingml/2006/main" xmlns:r="http://schemas.openxmlformats.org/officeDocument/2006/relationships" xmlns:mc="http://schemas.openxmlformats.org/markup-compatibility/2006" xmlns:mv="urn:schemas-microsoft-com:mac:vml" xmlns:p="http://schemas.openxmlformats.org/presentationml/2006/main" mc:Ignorable="mv" mc:PreserveAttributes="mv:*">
   <p:cSld>
     <p:spTree>
       <p:nvGrpSpPr>
@@ -13286,7 +13135,7 @@
     </p:spTree>
     <p:extLst>
       <p:ext uri="{BB962C8B-B14F-4D97-AF65-F5344CB8AC3E}">
-        <p14:creationId xmlns:p14="http://schemas.microsoft.com/office/powerpoint/2010/main" val="2114367108"/>
+        <p14:creationId xmlns:p14="http://schemas.microsoft.com/office/powerpoint/2010/main" xmlns:p="http://schemas.openxmlformats.org/presentationml/2006/main" xmlns:r="http://schemas.openxmlformats.org/officeDocument/2006/relationships" xmlns:a="http://schemas.openxmlformats.org/drawingml/2006/main" xmlns="" val="2114367108"/>
       </p:ext>
     </p:extLst>
   </p:cSld>
@@ -13304,7 +13153,7 @@
 </file>
 
 <file path=ppt/slides/slide25.xml><?xml version="1.0" encoding="utf-8"?>
-<p:sld xmlns:a="http://schemas.openxmlformats.org/drawingml/2006/main" xmlns:r="http://schemas.openxmlformats.org/officeDocument/2006/relationships" xmlns:p="http://schemas.openxmlformats.org/presentationml/2006/main">
+<p:sld xmlns:a="http://schemas.openxmlformats.org/drawingml/2006/main" xmlns:r="http://schemas.openxmlformats.org/officeDocument/2006/relationships" xmlns:mc="http://schemas.openxmlformats.org/markup-compatibility/2006" xmlns:mv="urn:schemas-microsoft-com:mac:vml" xmlns:p="http://schemas.openxmlformats.org/presentationml/2006/main" mc:Ignorable="mv" mc:PreserveAttributes="mv:*">
   <p:cSld>
     <p:spTree>
       <p:nvGrpSpPr>
@@ -13386,7 +13235,7 @@
           <a:blip r:embed="rId3">
             <a:extLst>
               <a:ext uri="{28A0092B-C50C-407E-A947-70E740481C1C}">
-                <a14:useLocalDpi xmlns:a14="http://schemas.microsoft.com/office/drawing/2010/main" val="0"/>
+                <a14:useLocalDpi xmlns:a14="http://schemas.microsoft.com/office/drawing/2010/main" xmlns:p="http://schemas.openxmlformats.org/presentationml/2006/main" xmlns:r="http://schemas.openxmlformats.org/officeDocument/2006/relationships" xmlns:a="http://schemas.openxmlformats.org/drawingml/2006/main" xmlns="" val="0"/>
               </a:ext>
             </a:extLst>
           </a:blip>
@@ -13416,7 +13265,7 @@
           <a:blip r:embed="rId4">
             <a:extLst>
               <a:ext uri="{28A0092B-C50C-407E-A947-70E740481C1C}">
-                <a14:useLocalDpi xmlns:a14="http://schemas.microsoft.com/office/drawing/2010/main" val="0"/>
+                <a14:useLocalDpi xmlns:a14="http://schemas.microsoft.com/office/drawing/2010/main" xmlns:p="http://schemas.openxmlformats.org/presentationml/2006/main" xmlns:r="http://schemas.openxmlformats.org/officeDocument/2006/relationships" xmlns:a="http://schemas.openxmlformats.org/drawingml/2006/main" xmlns="" val="0"/>
               </a:ext>
             </a:extLst>
           </a:blip>
@@ -13539,7 +13388,7 @@
     </p:spTree>
     <p:extLst>
       <p:ext uri="{BB962C8B-B14F-4D97-AF65-F5344CB8AC3E}">
-        <p14:creationId xmlns:p14="http://schemas.microsoft.com/office/powerpoint/2010/main" val="2069377225"/>
+        <p14:creationId xmlns:p14="http://schemas.microsoft.com/office/powerpoint/2010/main" xmlns:p="http://schemas.openxmlformats.org/presentationml/2006/main" xmlns:r="http://schemas.openxmlformats.org/officeDocument/2006/relationships" xmlns:a="http://schemas.openxmlformats.org/drawingml/2006/main" xmlns="" val="2069377225"/>
       </p:ext>
     </p:extLst>
   </p:cSld>
@@ -13557,7 +13406,7 @@
 </file>
 
 <file path=ppt/slides/slide26.xml><?xml version="1.0" encoding="utf-8"?>
-<p:sld xmlns:a="http://schemas.openxmlformats.org/drawingml/2006/main" xmlns:r="http://schemas.openxmlformats.org/officeDocument/2006/relationships" xmlns:p="http://schemas.openxmlformats.org/presentationml/2006/main">
+<p:sld xmlns:a="http://schemas.openxmlformats.org/drawingml/2006/main" xmlns:r="http://schemas.openxmlformats.org/officeDocument/2006/relationships" xmlns:mc="http://schemas.openxmlformats.org/markup-compatibility/2006" xmlns:mv="urn:schemas-microsoft-com:mac:vml" xmlns:p="http://schemas.openxmlformats.org/presentationml/2006/main" mc:Ignorable="mv" mc:PreserveAttributes="mv:*">
   <p:cSld>
     <p:spTree>
       <p:nvGrpSpPr>
@@ -13800,7 +13649,7 @@
           <a:blip r:embed="rId3">
             <a:extLst>
               <a:ext uri="{28A0092B-C50C-407E-A947-70E740481C1C}">
-                <a14:useLocalDpi xmlns:a14="http://schemas.microsoft.com/office/drawing/2010/main" val="0"/>
+                <a14:useLocalDpi xmlns:a14="http://schemas.microsoft.com/office/drawing/2010/main" xmlns:p="http://schemas.openxmlformats.org/presentationml/2006/main" xmlns:r="http://schemas.openxmlformats.org/officeDocument/2006/relationships" xmlns:a="http://schemas.openxmlformats.org/drawingml/2006/main" xmlns="" val="0"/>
               </a:ext>
             </a:extLst>
           </a:blip>
@@ -13821,7 +13670,7 @@
     </p:spTree>
     <p:extLst>
       <p:ext uri="{BB962C8B-B14F-4D97-AF65-F5344CB8AC3E}">
-        <p14:creationId xmlns:p14="http://schemas.microsoft.com/office/powerpoint/2010/main" val="746424979"/>
+        <p14:creationId xmlns:p14="http://schemas.microsoft.com/office/powerpoint/2010/main" xmlns:p="http://schemas.openxmlformats.org/presentationml/2006/main" xmlns:r="http://schemas.openxmlformats.org/officeDocument/2006/relationships" xmlns:a="http://schemas.openxmlformats.org/drawingml/2006/main" xmlns="" val="746424979"/>
       </p:ext>
     </p:extLst>
   </p:cSld>
@@ -13839,7 +13688,7 @@
 </file>
 
 <file path=ppt/slides/slide27.xml><?xml version="1.0" encoding="utf-8"?>
-<p:sld xmlns:a="http://schemas.openxmlformats.org/drawingml/2006/main" xmlns:r="http://schemas.openxmlformats.org/officeDocument/2006/relationships" xmlns:p="http://schemas.openxmlformats.org/presentationml/2006/main">
+<p:sld xmlns:a="http://schemas.openxmlformats.org/drawingml/2006/main" xmlns:r="http://schemas.openxmlformats.org/officeDocument/2006/relationships" xmlns:mc="http://schemas.openxmlformats.org/markup-compatibility/2006" xmlns:mv="urn:schemas-microsoft-com:mac:vml" xmlns:p="http://schemas.openxmlformats.org/presentationml/2006/main" mc:Ignorable="mv" mc:PreserveAttributes="mv:*">
   <p:cSld>
     <p:spTree>
       <p:nvGrpSpPr>
@@ -13890,7 +13739,7 @@
           <a:blip r:embed="rId3">
             <a:extLst>
               <a:ext uri="{28A0092B-C50C-407E-A947-70E740481C1C}">
-                <a14:useLocalDpi xmlns:a14="http://schemas.microsoft.com/office/drawing/2010/main" val="0"/>
+                <a14:useLocalDpi xmlns:a14="http://schemas.microsoft.com/office/drawing/2010/main" xmlns:p="http://schemas.openxmlformats.org/presentationml/2006/main" xmlns:r="http://schemas.openxmlformats.org/officeDocument/2006/relationships" xmlns:a="http://schemas.openxmlformats.org/drawingml/2006/main" xmlns="" val="0"/>
               </a:ext>
             </a:extLst>
           </a:blip>
@@ -14078,7 +13927,7 @@
           <a:blip r:embed="rId4">
             <a:extLst>
               <a:ext uri="{28A0092B-C50C-407E-A947-70E740481C1C}">
-                <a14:useLocalDpi xmlns:a14="http://schemas.microsoft.com/office/drawing/2010/main" val="0"/>
+                <a14:useLocalDpi xmlns:a14="http://schemas.microsoft.com/office/drawing/2010/main" xmlns:p="http://schemas.openxmlformats.org/presentationml/2006/main" xmlns:r="http://schemas.openxmlformats.org/officeDocument/2006/relationships" xmlns:a="http://schemas.openxmlformats.org/drawingml/2006/main" xmlns="" val="0"/>
               </a:ext>
             </a:extLst>
           </a:blip>
@@ -14108,7 +13957,7 @@
           <a:blip r:embed="rId5">
             <a:extLst>
               <a:ext uri="{28A0092B-C50C-407E-A947-70E740481C1C}">
-                <a14:useLocalDpi xmlns:a14="http://schemas.microsoft.com/office/drawing/2010/main" val="0"/>
+                <a14:useLocalDpi xmlns:a14="http://schemas.microsoft.com/office/drawing/2010/main" xmlns:p="http://schemas.openxmlformats.org/presentationml/2006/main" xmlns:r="http://schemas.openxmlformats.org/officeDocument/2006/relationships" xmlns:a="http://schemas.openxmlformats.org/drawingml/2006/main" xmlns="" val="0"/>
               </a:ext>
             </a:extLst>
           </a:blip>
@@ -14189,7 +14038,7 @@
     </p:spTree>
     <p:extLst>
       <p:ext uri="{BB962C8B-B14F-4D97-AF65-F5344CB8AC3E}">
-        <p14:creationId xmlns:p14="http://schemas.microsoft.com/office/powerpoint/2010/main" val="1429079060"/>
+        <p14:creationId xmlns:p14="http://schemas.microsoft.com/office/powerpoint/2010/main" xmlns:p="http://schemas.openxmlformats.org/presentationml/2006/main" xmlns:r="http://schemas.openxmlformats.org/officeDocument/2006/relationships" xmlns:a="http://schemas.openxmlformats.org/drawingml/2006/main" xmlns="" val="1429079060"/>
       </p:ext>
     </p:extLst>
   </p:cSld>
@@ -14207,7 +14056,7 @@
 </file>
 
 <file path=ppt/slides/slide28.xml><?xml version="1.0" encoding="utf-8"?>
-<p:sld xmlns:a="http://schemas.openxmlformats.org/drawingml/2006/main" xmlns:r="http://schemas.openxmlformats.org/officeDocument/2006/relationships" xmlns:p="http://schemas.openxmlformats.org/presentationml/2006/main">
+<p:sld xmlns:a="http://schemas.openxmlformats.org/drawingml/2006/main" xmlns:r="http://schemas.openxmlformats.org/officeDocument/2006/relationships" xmlns:mc="http://schemas.openxmlformats.org/markup-compatibility/2006" xmlns:mv="urn:schemas-microsoft-com:mac:vml" xmlns:p="http://schemas.openxmlformats.org/presentationml/2006/main" mc:Ignorable="mv" mc:PreserveAttributes="mv:*">
   <p:cSld>
     <p:spTree>
       <p:nvGrpSpPr>
@@ -14565,7 +14414,7 @@
     </p:spTree>
     <p:extLst>
       <p:ext uri="{BB962C8B-B14F-4D97-AF65-F5344CB8AC3E}">
-        <p14:creationId xmlns:p14="http://schemas.microsoft.com/office/powerpoint/2010/main" val="1697602590"/>
+        <p14:creationId xmlns:p14="http://schemas.microsoft.com/office/powerpoint/2010/main" xmlns:p="http://schemas.openxmlformats.org/presentationml/2006/main" xmlns:r="http://schemas.openxmlformats.org/officeDocument/2006/relationships" xmlns:a="http://schemas.openxmlformats.org/drawingml/2006/main" xmlns="" val="1697602590"/>
       </p:ext>
     </p:extLst>
   </p:cSld>
@@ -14583,7 +14432,7 @@
 </file>
 
 <file path=ppt/slides/slide29.xml><?xml version="1.0" encoding="utf-8"?>
-<p:sld xmlns:a="http://schemas.openxmlformats.org/drawingml/2006/main" xmlns:r="http://schemas.openxmlformats.org/officeDocument/2006/relationships" xmlns:p="http://schemas.openxmlformats.org/presentationml/2006/main">
+<p:sld xmlns:a="http://schemas.openxmlformats.org/drawingml/2006/main" xmlns:r="http://schemas.openxmlformats.org/officeDocument/2006/relationships" xmlns:mc="http://schemas.openxmlformats.org/markup-compatibility/2006" xmlns:mv="urn:schemas-microsoft-com:mac:vml" xmlns:p="http://schemas.openxmlformats.org/presentationml/2006/main" mc:Ignorable="mv" mc:PreserveAttributes="mv:*">
   <p:cSld>
     <p:spTree>
       <p:nvGrpSpPr>
@@ -14944,7 +14793,7 @@
     </p:spTree>
     <p:extLst>
       <p:ext uri="{BB962C8B-B14F-4D97-AF65-F5344CB8AC3E}">
-        <p14:creationId xmlns:p14="http://schemas.microsoft.com/office/powerpoint/2010/main" val="247700720"/>
+        <p14:creationId xmlns:p14="http://schemas.microsoft.com/office/powerpoint/2010/main" xmlns:p="http://schemas.openxmlformats.org/presentationml/2006/main" xmlns:r="http://schemas.openxmlformats.org/officeDocument/2006/relationships" xmlns:a="http://schemas.openxmlformats.org/drawingml/2006/main" xmlns="" val="247700720"/>
       </p:ext>
     </p:extLst>
   </p:cSld>
@@ -14962,7 +14811,7 @@
 </file>
 
 <file path=ppt/slides/slide3.xml><?xml version="1.0" encoding="utf-8"?>
-<p:sld xmlns:a="http://schemas.openxmlformats.org/drawingml/2006/main" xmlns:r="http://schemas.openxmlformats.org/officeDocument/2006/relationships" xmlns:p="http://schemas.openxmlformats.org/presentationml/2006/main">
+<p:sld xmlns:a="http://schemas.openxmlformats.org/drawingml/2006/main" xmlns:r="http://schemas.openxmlformats.org/officeDocument/2006/relationships" xmlns:mc="http://schemas.openxmlformats.org/markup-compatibility/2006" xmlns:mv="urn:schemas-microsoft-com:mac:vml" xmlns:p="http://schemas.openxmlformats.org/presentationml/2006/main" mc:Ignorable="mv" mc:PreserveAttributes="mv:*">
   <p:cSld>
     <p:spTree>
       <p:nvGrpSpPr>
@@ -15151,7 +15000,7 @@
     </p:spTree>
     <p:extLst>
       <p:ext uri="{BB962C8B-B14F-4D97-AF65-F5344CB8AC3E}">
-        <p14:creationId xmlns:p14="http://schemas.microsoft.com/office/powerpoint/2010/main" val="681947218"/>
+        <p14:creationId xmlns:p14="http://schemas.microsoft.com/office/powerpoint/2010/main" xmlns:p="http://schemas.openxmlformats.org/presentationml/2006/main" xmlns:r="http://schemas.openxmlformats.org/officeDocument/2006/relationships" xmlns:a="http://schemas.openxmlformats.org/drawingml/2006/main" xmlns="" val="681947218"/>
       </p:ext>
     </p:extLst>
   </p:cSld>
@@ -15169,7 +15018,7 @@
 </file>
 
 <file path=ppt/slides/slide30.xml><?xml version="1.0" encoding="utf-8"?>
-<p:sld xmlns:a="http://schemas.openxmlformats.org/drawingml/2006/main" xmlns:r="http://schemas.openxmlformats.org/officeDocument/2006/relationships" xmlns:p="http://schemas.openxmlformats.org/presentationml/2006/main">
+<p:sld xmlns:a="http://schemas.openxmlformats.org/drawingml/2006/main" xmlns:r="http://schemas.openxmlformats.org/officeDocument/2006/relationships" xmlns:mc="http://schemas.openxmlformats.org/markup-compatibility/2006" xmlns:mv="urn:schemas-microsoft-com:mac:vml" xmlns:p="http://schemas.openxmlformats.org/presentationml/2006/main" mc:Ignorable="mv" mc:PreserveAttributes="mv:*">
   <p:cSld>
     <p:spTree>
       <p:nvGrpSpPr>
@@ -15668,7 +15517,7 @@
     </p:spTree>
     <p:extLst>
       <p:ext uri="{BB962C8B-B14F-4D97-AF65-F5344CB8AC3E}">
-        <p14:creationId xmlns:p14="http://schemas.microsoft.com/office/powerpoint/2010/main" val="916509501"/>
+        <p14:creationId xmlns:p14="http://schemas.microsoft.com/office/powerpoint/2010/main" xmlns:p="http://schemas.openxmlformats.org/presentationml/2006/main" xmlns:r="http://schemas.openxmlformats.org/officeDocument/2006/relationships" xmlns:a="http://schemas.openxmlformats.org/drawingml/2006/main" xmlns="" val="916509501"/>
       </p:ext>
     </p:extLst>
   </p:cSld>
@@ -15686,7 +15535,7 @@
 </file>
 
 <file path=ppt/slides/slide31.xml><?xml version="1.0" encoding="utf-8"?>
-<p:sld xmlns:a="http://schemas.openxmlformats.org/drawingml/2006/main" xmlns:r="http://schemas.openxmlformats.org/officeDocument/2006/relationships" xmlns:p="http://schemas.openxmlformats.org/presentationml/2006/main">
+<p:sld xmlns:a="http://schemas.openxmlformats.org/drawingml/2006/main" xmlns:r="http://schemas.openxmlformats.org/officeDocument/2006/relationships" xmlns:mc="http://schemas.openxmlformats.org/markup-compatibility/2006" xmlns:mv="urn:schemas-microsoft-com:mac:vml" xmlns:p="http://schemas.openxmlformats.org/presentationml/2006/main" mc:Ignorable="mv" mc:PreserveAttributes="mv:*">
   <p:cSld>
     <p:spTree>
       <p:nvGrpSpPr>
@@ -16023,7 +15872,7 @@
     </p:spTree>
     <p:extLst>
       <p:ext uri="{BB962C8B-B14F-4D97-AF65-F5344CB8AC3E}">
-        <p14:creationId xmlns:p14="http://schemas.microsoft.com/office/powerpoint/2010/main" val="1698253457"/>
+        <p14:creationId xmlns:p14="http://schemas.microsoft.com/office/powerpoint/2010/main" xmlns:p="http://schemas.openxmlformats.org/presentationml/2006/main" xmlns:r="http://schemas.openxmlformats.org/officeDocument/2006/relationships" xmlns:a="http://schemas.openxmlformats.org/drawingml/2006/main" xmlns="" val="1698253457"/>
       </p:ext>
     </p:extLst>
   </p:cSld>
@@ -16041,7 +15890,7 @@
 </file>
 
 <file path=ppt/slides/slide32.xml><?xml version="1.0" encoding="utf-8"?>
-<p:sld xmlns:a="http://schemas.openxmlformats.org/drawingml/2006/main" xmlns:r="http://schemas.openxmlformats.org/officeDocument/2006/relationships" xmlns:p="http://schemas.openxmlformats.org/presentationml/2006/main">
+<p:sld xmlns:a="http://schemas.openxmlformats.org/drawingml/2006/main" xmlns:r="http://schemas.openxmlformats.org/officeDocument/2006/relationships" xmlns:mc="http://schemas.openxmlformats.org/markup-compatibility/2006" xmlns:mv="urn:schemas-microsoft-com:mac:vml" xmlns:p="http://schemas.openxmlformats.org/presentationml/2006/main" mc:Ignorable="mv" mc:PreserveAttributes="mv:*">
   <p:cSld>
     <p:spTree>
       <p:nvGrpSpPr>
@@ -16440,7 +16289,7 @@
     </p:spTree>
     <p:extLst>
       <p:ext uri="{BB962C8B-B14F-4D97-AF65-F5344CB8AC3E}">
-        <p14:creationId xmlns:p14="http://schemas.microsoft.com/office/powerpoint/2010/main" val="1139894538"/>
+        <p14:creationId xmlns:p14="http://schemas.microsoft.com/office/powerpoint/2010/main" xmlns:p="http://schemas.openxmlformats.org/presentationml/2006/main" xmlns:r="http://schemas.openxmlformats.org/officeDocument/2006/relationships" xmlns:a="http://schemas.openxmlformats.org/drawingml/2006/main" xmlns="" val="1139894538"/>
       </p:ext>
     </p:extLst>
   </p:cSld>
@@ -16458,7 +16307,7 @@
 </file>
 
 <file path=ppt/slides/slide33.xml><?xml version="1.0" encoding="utf-8"?>
-<p:sld xmlns:a="http://schemas.openxmlformats.org/drawingml/2006/main" xmlns:r="http://schemas.openxmlformats.org/officeDocument/2006/relationships" xmlns:p="http://schemas.openxmlformats.org/presentationml/2006/main">
+<p:sld xmlns:a="http://schemas.openxmlformats.org/drawingml/2006/main" xmlns:r="http://schemas.openxmlformats.org/officeDocument/2006/relationships" xmlns:mc="http://schemas.openxmlformats.org/markup-compatibility/2006" xmlns:mv="urn:schemas-microsoft-com:mac:vml" xmlns:p="http://schemas.openxmlformats.org/presentationml/2006/main" mc:Ignorable="mv" mc:PreserveAttributes="mv:*">
   <p:cSld>
     <p:spTree>
       <p:nvGrpSpPr>
@@ -16746,7 +16595,7 @@
     </p:spTree>
     <p:extLst>
       <p:ext uri="{BB962C8B-B14F-4D97-AF65-F5344CB8AC3E}">
-        <p14:creationId xmlns:p14="http://schemas.microsoft.com/office/powerpoint/2010/main" val="1007558359"/>
+        <p14:creationId xmlns:p14="http://schemas.microsoft.com/office/powerpoint/2010/main" xmlns:p="http://schemas.openxmlformats.org/presentationml/2006/main" xmlns:r="http://schemas.openxmlformats.org/officeDocument/2006/relationships" xmlns:a="http://schemas.openxmlformats.org/drawingml/2006/main" xmlns="" val="1007558359"/>
       </p:ext>
     </p:extLst>
   </p:cSld>
@@ -16764,7 +16613,7 @@
 </file>
 
 <file path=ppt/slides/slide34.xml><?xml version="1.0" encoding="utf-8"?>
-<p:sld xmlns:a="http://schemas.openxmlformats.org/drawingml/2006/main" xmlns:r="http://schemas.openxmlformats.org/officeDocument/2006/relationships" xmlns:p="http://schemas.openxmlformats.org/presentationml/2006/main">
+<p:sld xmlns:a="http://schemas.openxmlformats.org/drawingml/2006/main" xmlns:r="http://schemas.openxmlformats.org/officeDocument/2006/relationships" xmlns:mc="http://schemas.openxmlformats.org/markup-compatibility/2006" xmlns:mv="urn:schemas-microsoft-com:mac:vml" xmlns:p="http://schemas.openxmlformats.org/presentationml/2006/main" mc:Ignorable="mv" mc:PreserveAttributes="mv:*">
   <p:cSld>
     <p:spTree>
       <p:nvGrpSpPr>
@@ -16806,7 +16655,7 @@
     </p:spTree>
     <p:extLst>
       <p:ext uri="{BB962C8B-B14F-4D97-AF65-F5344CB8AC3E}">
-        <p14:creationId xmlns:p14="http://schemas.microsoft.com/office/powerpoint/2010/main" val="1047632536"/>
+        <p14:creationId xmlns:p14="http://schemas.microsoft.com/office/powerpoint/2010/main" xmlns:p="http://schemas.openxmlformats.org/presentationml/2006/main" xmlns:r="http://schemas.openxmlformats.org/officeDocument/2006/relationships" xmlns:a="http://schemas.openxmlformats.org/drawingml/2006/main" xmlns="" val="1047632536"/>
       </p:ext>
     </p:extLst>
   </p:cSld>
@@ -16824,7 +16673,7 @@
 </file>
 
 <file path=ppt/slides/slide35.xml><?xml version="1.0" encoding="utf-8"?>
-<p:sld xmlns:a="http://schemas.openxmlformats.org/drawingml/2006/main" xmlns:r="http://schemas.openxmlformats.org/officeDocument/2006/relationships" xmlns:p="http://schemas.openxmlformats.org/presentationml/2006/main">
+<p:sld xmlns:a="http://schemas.openxmlformats.org/drawingml/2006/main" xmlns:r="http://schemas.openxmlformats.org/officeDocument/2006/relationships" xmlns:mc="http://schemas.openxmlformats.org/markup-compatibility/2006" xmlns:mv="urn:schemas-microsoft-com:mac:vml" xmlns:p="http://schemas.openxmlformats.org/presentationml/2006/main" mc:Ignorable="mv" mc:PreserveAttributes="mv:*">
   <p:cSld>
     <p:spTree>
       <p:nvGrpSpPr>
@@ -16866,7 +16715,7 @@
     </p:spTree>
     <p:extLst>
       <p:ext uri="{BB962C8B-B14F-4D97-AF65-F5344CB8AC3E}">
-        <p14:creationId xmlns:p14="http://schemas.microsoft.com/office/powerpoint/2010/main" val="1065250353"/>
+        <p14:creationId xmlns:p14="http://schemas.microsoft.com/office/powerpoint/2010/main" xmlns:p="http://schemas.openxmlformats.org/presentationml/2006/main" xmlns:r="http://schemas.openxmlformats.org/officeDocument/2006/relationships" xmlns:a="http://schemas.openxmlformats.org/drawingml/2006/main" xmlns="" val="1065250353"/>
       </p:ext>
     </p:extLst>
   </p:cSld>
@@ -16884,7 +16733,7 @@
 </file>
 
 <file path=ppt/slides/slide36.xml><?xml version="1.0" encoding="utf-8"?>
-<p:sld xmlns:a="http://schemas.openxmlformats.org/drawingml/2006/main" xmlns:r="http://schemas.openxmlformats.org/officeDocument/2006/relationships" xmlns:p="http://schemas.openxmlformats.org/presentationml/2006/main">
+<p:sld xmlns:a="http://schemas.openxmlformats.org/drawingml/2006/main" xmlns:r="http://schemas.openxmlformats.org/officeDocument/2006/relationships" xmlns:mc="http://schemas.openxmlformats.org/markup-compatibility/2006" xmlns:mv="urn:schemas-microsoft-com:mac:vml" xmlns:p="http://schemas.openxmlformats.org/presentationml/2006/main" mc:Ignorable="mv" mc:PreserveAttributes="mv:*">
   <p:cSld>
     <p:spTree>
       <p:nvGrpSpPr>
@@ -16991,7 +16840,7 @@
     </p:spTree>
     <p:extLst>
       <p:ext uri="{BB962C8B-B14F-4D97-AF65-F5344CB8AC3E}">
-        <p14:creationId xmlns:p14="http://schemas.microsoft.com/office/powerpoint/2010/main" val="1188070149"/>
+        <p14:creationId xmlns:p14="http://schemas.microsoft.com/office/powerpoint/2010/main" xmlns:p="http://schemas.openxmlformats.org/presentationml/2006/main" xmlns:r="http://schemas.openxmlformats.org/officeDocument/2006/relationships" xmlns:a="http://schemas.openxmlformats.org/drawingml/2006/main" xmlns="" val="1188070149"/>
       </p:ext>
     </p:extLst>
   </p:cSld>
@@ -17009,7 +16858,7 @@
 </file>
 
 <file path=ppt/slides/slide37.xml><?xml version="1.0" encoding="utf-8"?>
-<p:sld xmlns:a="http://schemas.openxmlformats.org/drawingml/2006/main" xmlns:r="http://schemas.openxmlformats.org/officeDocument/2006/relationships" xmlns:p="http://schemas.openxmlformats.org/presentationml/2006/main">
+<p:sld xmlns:a="http://schemas.openxmlformats.org/drawingml/2006/main" xmlns:r="http://schemas.openxmlformats.org/officeDocument/2006/relationships" xmlns:mc="http://schemas.openxmlformats.org/markup-compatibility/2006" xmlns:mv="urn:schemas-microsoft-com:mac:vml" xmlns:p="http://schemas.openxmlformats.org/presentationml/2006/main" mc:Ignorable="mv" mc:PreserveAttributes="mv:*">
   <p:cSld>
     <p:spTree>
       <p:nvGrpSpPr>
@@ -17060,7 +16909,7 @@
           <a:blip r:embed="rId3">
             <a:extLst>
               <a:ext uri="{28A0092B-C50C-407E-A947-70E740481C1C}">
-                <a14:useLocalDpi xmlns:a14="http://schemas.microsoft.com/office/drawing/2010/main" val="0"/>
+                <a14:useLocalDpi xmlns:a14="http://schemas.microsoft.com/office/drawing/2010/main" xmlns:p="http://schemas.openxmlformats.org/presentationml/2006/main" xmlns:r="http://schemas.openxmlformats.org/officeDocument/2006/relationships" xmlns:a="http://schemas.openxmlformats.org/drawingml/2006/main" xmlns="" val="0"/>
               </a:ext>
             </a:extLst>
           </a:blip>
@@ -17129,7 +16978,7 @@
           <a:blip r:embed="rId4">
             <a:extLst>
               <a:ext uri="{28A0092B-C50C-407E-A947-70E740481C1C}">
-                <a14:useLocalDpi xmlns:a14="http://schemas.microsoft.com/office/drawing/2010/main" val="0"/>
+                <a14:useLocalDpi xmlns:a14="http://schemas.microsoft.com/office/drawing/2010/main" xmlns:p="http://schemas.openxmlformats.org/presentationml/2006/main" xmlns:r="http://schemas.openxmlformats.org/officeDocument/2006/relationships" xmlns:a="http://schemas.openxmlformats.org/drawingml/2006/main" xmlns="" val="0"/>
               </a:ext>
             </a:extLst>
           </a:blip>
@@ -17219,7 +17068,7 @@
     </p:spTree>
     <p:extLst>
       <p:ext uri="{BB962C8B-B14F-4D97-AF65-F5344CB8AC3E}">
-        <p14:creationId xmlns:p14="http://schemas.microsoft.com/office/powerpoint/2010/main" val="420560106"/>
+        <p14:creationId xmlns:p14="http://schemas.microsoft.com/office/powerpoint/2010/main" xmlns:p="http://schemas.openxmlformats.org/presentationml/2006/main" xmlns:r="http://schemas.openxmlformats.org/officeDocument/2006/relationships" xmlns:a="http://schemas.openxmlformats.org/drawingml/2006/main" xmlns="" val="420560106"/>
       </p:ext>
     </p:extLst>
   </p:cSld>
@@ -17237,7 +17086,7 @@
 </file>
 
 <file path=ppt/slides/slide38.xml><?xml version="1.0" encoding="utf-8"?>
-<p:sld xmlns:a="http://schemas.openxmlformats.org/drawingml/2006/main" xmlns:r="http://schemas.openxmlformats.org/officeDocument/2006/relationships" xmlns:p="http://schemas.openxmlformats.org/presentationml/2006/main">
+<p:sld xmlns:a="http://schemas.openxmlformats.org/drawingml/2006/main" xmlns:r="http://schemas.openxmlformats.org/officeDocument/2006/relationships" xmlns:mc="http://schemas.openxmlformats.org/markup-compatibility/2006" xmlns:mv="urn:schemas-microsoft-com:mac:vml" xmlns:p="http://schemas.openxmlformats.org/presentationml/2006/main" mc:Ignorable="mv" mc:PreserveAttributes="mv:*">
   <p:cSld>
     <p:spTree>
       <p:nvGrpSpPr>
@@ -17288,7 +17137,7 @@
           <a:blip r:embed="rId3">
             <a:extLst>
               <a:ext uri="{28A0092B-C50C-407E-A947-70E740481C1C}">
-                <a14:useLocalDpi xmlns:a14="http://schemas.microsoft.com/office/drawing/2010/main" val="0"/>
+                <a14:useLocalDpi xmlns:a14="http://schemas.microsoft.com/office/drawing/2010/main" xmlns:p="http://schemas.openxmlformats.org/presentationml/2006/main" xmlns:r="http://schemas.openxmlformats.org/officeDocument/2006/relationships" xmlns:a="http://schemas.openxmlformats.org/drawingml/2006/main" xmlns="" val="0"/>
               </a:ext>
             </a:extLst>
           </a:blip>
@@ -17489,7 +17338,7 @@
     </p:spTree>
     <p:extLst>
       <p:ext uri="{BB962C8B-B14F-4D97-AF65-F5344CB8AC3E}">
-        <p14:creationId xmlns:p14="http://schemas.microsoft.com/office/powerpoint/2010/main" val="1585635513"/>
+        <p14:creationId xmlns:p14="http://schemas.microsoft.com/office/powerpoint/2010/main" xmlns:p="http://schemas.openxmlformats.org/presentationml/2006/main" xmlns:r="http://schemas.openxmlformats.org/officeDocument/2006/relationships" xmlns:a="http://schemas.openxmlformats.org/drawingml/2006/main" xmlns="" val="1585635513"/>
       </p:ext>
     </p:extLst>
   </p:cSld>
@@ -17507,7 +17356,7 @@
 </file>
 
 <file path=ppt/slides/slide39.xml><?xml version="1.0" encoding="utf-8"?>
-<p:sld xmlns:a="http://schemas.openxmlformats.org/drawingml/2006/main" xmlns:r="http://schemas.openxmlformats.org/officeDocument/2006/relationships" xmlns:p="http://schemas.openxmlformats.org/presentationml/2006/main">
+<p:sld xmlns:a="http://schemas.openxmlformats.org/drawingml/2006/main" xmlns:r="http://schemas.openxmlformats.org/officeDocument/2006/relationships" xmlns:mc="http://schemas.openxmlformats.org/markup-compatibility/2006" xmlns:mv="urn:schemas-microsoft-com:mac:vml" xmlns:p="http://schemas.openxmlformats.org/presentationml/2006/main" mc:Ignorable="mv" mc:PreserveAttributes="mv:*">
   <p:cSld>
     <p:spTree>
       <p:nvGrpSpPr>
@@ -17601,7 +17450,7 @@
           <a:blip r:embed="rId3">
             <a:extLst>
               <a:ext uri="{28A0092B-C50C-407E-A947-70E740481C1C}">
-                <a14:useLocalDpi xmlns:a14="http://schemas.microsoft.com/office/drawing/2010/main" val="0"/>
+                <a14:useLocalDpi xmlns:a14="http://schemas.microsoft.com/office/drawing/2010/main" xmlns:p="http://schemas.openxmlformats.org/presentationml/2006/main" xmlns:r="http://schemas.openxmlformats.org/officeDocument/2006/relationships" xmlns:a="http://schemas.openxmlformats.org/drawingml/2006/main" xmlns="" val="0"/>
               </a:ext>
             </a:extLst>
           </a:blip>
@@ -17631,7 +17480,7 @@
           <a:blip r:embed="rId4">
             <a:extLst>
               <a:ext uri="{28A0092B-C50C-407E-A947-70E740481C1C}">
-                <a14:useLocalDpi xmlns:a14="http://schemas.microsoft.com/office/drawing/2010/main" val="0"/>
+                <a14:useLocalDpi xmlns:a14="http://schemas.microsoft.com/office/drawing/2010/main" xmlns:p="http://schemas.openxmlformats.org/presentationml/2006/main" xmlns:r="http://schemas.openxmlformats.org/officeDocument/2006/relationships" xmlns:a="http://schemas.openxmlformats.org/drawingml/2006/main" xmlns="" val="0"/>
               </a:ext>
             </a:extLst>
           </a:blip>
@@ -17712,7 +17561,7 @@
     </p:spTree>
     <p:extLst>
       <p:ext uri="{BB962C8B-B14F-4D97-AF65-F5344CB8AC3E}">
-        <p14:creationId xmlns:p14="http://schemas.microsoft.com/office/powerpoint/2010/main" val="190712800"/>
+        <p14:creationId xmlns:p14="http://schemas.microsoft.com/office/powerpoint/2010/main" xmlns:p="http://schemas.openxmlformats.org/presentationml/2006/main" xmlns:r="http://schemas.openxmlformats.org/officeDocument/2006/relationships" xmlns:a="http://schemas.openxmlformats.org/drawingml/2006/main" xmlns="" val="190712800"/>
       </p:ext>
     </p:extLst>
   </p:cSld>
@@ -17730,7 +17579,7 @@
 </file>
 
 <file path=ppt/slides/slide4.xml><?xml version="1.0" encoding="utf-8"?>
-<p:sld xmlns:a="http://schemas.openxmlformats.org/drawingml/2006/main" xmlns:r="http://schemas.openxmlformats.org/officeDocument/2006/relationships" xmlns:p="http://schemas.openxmlformats.org/presentationml/2006/main">
+<p:sld xmlns:a="http://schemas.openxmlformats.org/drawingml/2006/main" xmlns:r="http://schemas.openxmlformats.org/officeDocument/2006/relationships" xmlns:mc="http://schemas.openxmlformats.org/markup-compatibility/2006" xmlns:mv="urn:schemas-microsoft-com:mac:vml" xmlns:p="http://schemas.openxmlformats.org/presentationml/2006/main" mc:Ignorable="mv" mc:PreserveAttributes="mv:*">
   <p:cSld>
     <p:spTree>
       <p:nvGrpSpPr>
@@ -17857,7 +17706,7 @@
           <a:blip r:embed="rId3">
             <a:extLst>
               <a:ext uri="{28A0092B-C50C-407E-A947-70E740481C1C}">
-                <a14:useLocalDpi xmlns:a14="http://schemas.microsoft.com/office/drawing/2010/main" val="0"/>
+                <a14:useLocalDpi xmlns:a14="http://schemas.microsoft.com/office/drawing/2010/main" xmlns:p="http://schemas.openxmlformats.org/presentationml/2006/main" xmlns:r="http://schemas.openxmlformats.org/officeDocument/2006/relationships" xmlns:a="http://schemas.openxmlformats.org/drawingml/2006/main" xmlns="" val="0"/>
               </a:ext>
             </a:extLst>
           </a:blip>
@@ -17878,7 +17727,7 @@
     </p:spTree>
     <p:extLst>
       <p:ext uri="{BB962C8B-B14F-4D97-AF65-F5344CB8AC3E}">
-        <p14:creationId xmlns:p14="http://schemas.microsoft.com/office/powerpoint/2010/main" val="589906508"/>
+        <p14:creationId xmlns:p14="http://schemas.microsoft.com/office/powerpoint/2010/main" xmlns:p="http://schemas.openxmlformats.org/presentationml/2006/main" xmlns:r="http://schemas.openxmlformats.org/officeDocument/2006/relationships" xmlns:a="http://schemas.openxmlformats.org/drawingml/2006/main" xmlns="" val="589906508"/>
       </p:ext>
     </p:extLst>
   </p:cSld>
@@ -17896,7 +17745,7 @@
 </file>
 
 <file path=ppt/slides/slide40.xml><?xml version="1.0" encoding="utf-8"?>
-<p:sld xmlns:a="http://schemas.openxmlformats.org/drawingml/2006/main" xmlns:r="http://schemas.openxmlformats.org/officeDocument/2006/relationships" xmlns:p="http://schemas.openxmlformats.org/presentationml/2006/main">
+<p:sld xmlns:a="http://schemas.openxmlformats.org/drawingml/2006/main" xmlns:r="http://schemas.openxmlformats.org/officeDocument/2006/relationships" xmlns:mc="http://schemas.openxmlformats.org/markup-compatibility/2006" xmlns:mv="urn:schemas-microsoft-com:mac:vml" xmlns:p="http://schemas.openxmlformats.org/presentationml/2006/main" mc:Ignorable="mv" mc:PreserveAttributes="mv:*">
   <p:cSld>
     <p:spTree>
       <p:nvGrpSpPr>
@@ -18029,7 +17878,7 @@
     </p:spTree>
     <p:extLst>
       <p:ext uri="{BB962C8B-B14F-4D97-AF65-F5344CB8AC3E}">
-        <p14:creationId xmlns:p14="http://schemas.microsoft.com/office/powerpoint/2010/main" val="1962145869"/>
+        <p14:creationId xmlns:p14="http://schemas.microsoft.com/office/powerpoint/2010/main" xmlns:p="http://schemas.openxmlformats.org/presentationml/2006/main" xmlns:r="http://schemas.openxmlformats.org/officeDocument/2006/relationships" xmlns:a="http://schemas.openxmlformats.org/drawingml/2006/main" xmlns="" val="1962145869"/>
       </p:ext>
     </p:extLst>
   </p:cSld>
@@ -18047,7 +17896,7 @@
 </file>
 
 <file path=ppt/slides/slide41.xml><?xml version="1.0" encoding="utf-8"?>
-<p:sld xmlns:a="http://schemas.openxmlformats.org/drawingml/2006/main" xmlns:r="http://schemas.openxmlformats.org/officeDocument/2006/relationships" xmlns:p="http://schemas.openxmlformats.org/presentationml/2006/main">
+<p:sld xmlns:a="http://schemas.openxmlformats.org/drawingml/2006/main" xmlns:r="http://schemas.openxmlformats.org/officeDocument/2006/relationships" xmlns:mc="http://schemas.openxmlformats.org/markup-compatibility/2006" xmlns:mv="urn:schemas-microsoft-com:mac:vml" xmlns:p="http://schemas.openxmlformats.org/presentationml/2006/main" mc:Ignorable="mv" mc:PreserveAttributes="mv:*">
   <p:cSld>
     <p:spTree>
       <p:nvGrpSpPr>
@@ -18150,7 +17999,7 @@
     </p:spTree>
     <p:extLst>
       <p:ext uri="{BB962C8B-B14F-4D97-AF65-F5344CB8AC3E}">
-        <p14:creationId xmlns:p14="http://schemas.microsoft.com/office/powerpoint/2010/main" val="407593370"/>
+        <p14:creationId xmlns:p14="http://schemas.microsoft.com/office/powerpoint/2010/main" xmlns:p="http://schemas.openxmlformats.org/presentationml/2006/main" xmlns:r="http://schemas.openxmlformats.org/officeDocument/2006/relationships" xmlns:a="http://schemas.openxmlformats.org/drawingml/2006/main" xmlns="" val="407593370"/>
       </p:ext>
     </p:extLst>
   </p:cSld>
@@ -18168,7 +18017,7 @@
 </file>
 
 <file path=ppt/slides/slide42.xml><?xml version="1.0" encoding="utf-8"?>
-<p:sld xmlns:a="http://schemas.openxmlformats.org/drawingml/2006/main" xmlns:r="http://schemas.openxmlformats.org/officeDocument/2006/relationships" xmlns:p="http://schemas.openxmlformats.org/presentationml/2006/main">
+<p:sld xmlns:a="http://schemas.openxmlformats.org/drawingml/2006/main" xmlns:r="http://schemas.openxmlformats.org/officeDocument/2006/relationships" xmlns:mc="http://schemas.openxmlformats.org/markup-compatibility/2006" xmlns:mv="urn:schemas-microsoft-com:mac:vml" xmlns:p="http://schemas.openxmlformats.org/presentationml/2006/main" mc:Ignorable="mv" mc:PreserveAttributes="mv:*">
   <p:cSld>
     <p:spTree>
       <p:nvGrpSpPr>
@@ -18206,7 +18055,7 @@
     </p:spTree>
     <p:extLst>
       <p:ext uri="{BB962C8B-B14F-4D97-AF65-F5344CB8AC3E}">
-        <p14:creationId xmlns:p14="http://schemas.microsoft.com/office/powerpoint/2010/main" val="1954272061"/>
+        <p14:creationId xmlns:p14="http://schemas.microsoft.com/office/powerpoint/2010/main" xmlns:p="http://schemas.openxmlformats.org/presentationml/2006/main" xmlns:r="http://schemas.openxmlformats.org/officeDocument/2006/relationships" xmlns:a="http://schemas.openxmlformats.org/drawingml/2006/main" xmlns="" val="1954272061"/>
       </p:ext>
     </p:extLst>
   </p:cSld>
@@ -18224,7 +18073,7 @@
 </file>
 
 <file path=ppt/slides/slide43.xml><?xml version="1.0" encoding="utf-8"?>
-<p:sld xmlns:a="http://schemas.openxmlformats.org/drawingml/2006/main" xmlns:r="http://schemas.openxmlformats.org/officeDocument/2006/relationships" xmlns:p="http://schemas.openxmlformats.org/presentationml/2006/main">
+<p:sld xmlns:a="http://schemas.openxmlformats.org/drawingml/2006/main" xmlns:r="http://schemas.openxmlformats.org/officeDocument/2006/relationships" xmlns:mc="http://schemas.openxmlformats.org/markup-compatibility/2006" xmlns:mv="urn:schemas-microsoft-com:mac:vml" xmlns:p="http://schemas.openxmlformats.org/presentationml/2006/main" mc:Ignorable="mv" mc:PreserveAttributes="mv:*">
   <p:cSld>
     <p:spTree>
       <p:nvGrpSpPr>
@@ -18243,7 +18092,7 @@
     </p:spTree>
     <p:extLst>
       <p:ext uri="{BB962C8B-B14F-4D97-AF65-F5344CB8AC3E}">
-        <p14:creationId xmlns:p14="http://schemas.microsoft.com/office/powerpoint/2010/main" val="1835632009"/>
+        <p14:creationId xmlns:p14="http://schemas.microsoft.com/office/powerpoint/2010/main" xmlns:p="http://schemas.openxmlformats.org/presentationml/2006/main" xmlns:r="http://schemas.openxmlformats.org/officeDocument/2006/relationships" xmlns:a="http://schemas.openxmlformats.org/drawingml/2006/main" xmlns="" val="1835632009"/>
       </p:ext>
     </p:extLst>
   </p:cSld>
@@ -18261,7 +18110,7 @@
 </file>
 
 <file path=ppt/slides/slide44.xml><?xml version="1.0" encoding="utf-8"?>
-<p:sld xmlns:a="http://schemas.openxmlformats.org/drawingml/2006/main" xmlns:r="http://schemas.openxmlformats.org/officeDocument/2006/relationships" xmlns:p="http://schemas.openxmlformats.org/presentationml/2006/main">
+<p:sld xmlns:a="http://schemas.openxmlformats.org/drawingml/2006/main" xmlns:r="http://schemas.openxmlformats.org/officeDocument/2006/relationships" xmlns:mc="http://schemas.openxmlformats.org/markup-compatibility/2006" xmlns:mv="urn:schemas-microsoft-com:mac:vml" xmlns:p="http://schemas.openxmlformats.org/presentationml/2006/main" mc:Ignorable="mv" mc:PreserveAttributes="mv:*">
   <p:cSld>
     <p:spTree>
       <p:nvGrpSpPr>
@@ -18628,7 +18477,7 @@
     </p:spTree>
     <p:extLst>
       <p:ext uri="{BB962C8B-B14F-4D97-AF65-F5344CB8AC3E}">
-        <p14:creationId xmlns:p14="http://schemas.microsoft.com/office/powerpoint/2010/main" val="4193510302"/>
+        <p14:creationId xmlns:p14="http://schemas.microsoft.com/office/powerpoint/2010/main" xmlns:p="http://schemas.openxmlformats.org/presentationml/2006/main" xmlns:r="http://schemas.openxmlformats.org/officeDocument/2006/relationships" xmlns:a="http://schemas.openxmlformats.org/drawingml/2006/main" xmlns="" val="4193510302"/>
       </p:ext>
     </p:extLst>
   </p:cSld>
@@ -18646,7 +18495,7 @@
 </file>
 
 <file path=ppt/slides/slide45.xml><?xml version="1.0" encoding="utf-8"?>
-<p:sld xmlns:a="http://schemas.openxmlformats.org/drawingml/2006/main" xmlns:r="http://schemas.openxmlformats.org/officeDocument/2006/relationships" xmlns:p="http://schemas.openxmlformats.org/presentationml/2006/main">
+<p:sld xmlns:a="http://schemas.openxmlformats.org/drawingml/2006/main" xmlns:r="http://schemas.openxmlformats.org/officeDocument/2006/relationships" xmlns:mc="http://schemas.openxmlformats.org/markup-compatibility/2006" xmlns:mv="urn:schemas-microsoft-com:mac:vml" xmlns:p="http://schemas.openxmlformats.org/presentationml/2006/main" mc:Ignorable="mv" mc:PreserveAttributes="mv:*">
   <p:cSld>
     <p:spTree>
       <p:nvGrpSpPr>
@@ -19114,7 +18963,7 @@
           <a:blip r:embed="rId3">
             <a:extLst>
               <a:ext uri="{28A0092B-C50C-407E-A947-70E740481C1C}">
-                <a14:useLocalDpi xmlns:a14="http://schemas.microsoft.com/office/drawing/2010/main" val="0"/>
+                <a14:useLocalDpi xmlns:a14="http://schemas.microsoft.com/office/drawing/2010/main" xmlns:p="http://schemas.openxmlformats.org/presentationml/2006/main" xmlns:r="http://schemas.openxmlformats.org/officeDocument/2006/relationships" xmlns:a="http://schemas.openxmlformats.org/drawingml/2006/main" xmlns="" val="0"/>
               </a:ext>
             </a:extLst>
           </a:blip>
@@ -19179,7 +19028,7 @@
     </p:spTree>
     <p:extLst>
       <p:ext uri="{BB962C8B-B14F-4D97-AF65-F5344CB8AC3E}">
-        <p14:creationId xmlns:p14="http://schemas.microsoft.com/office/powerpoint/2010/main" val="4184592893"/>
+        <p14:creationId xmlns:p14="http://schemas.microsoft.com/office/powerpoint/2010/main" xmlns:p="http://schemas.openxmlformats.org/presentationml/2006/main" xmlns:r="http://schemas.openxmlformats.org/officeDocument/2006/relationships" xmlns:a="http://schemas.openxmlformats.org/drawingml/2006/main" xmlns="" val="4184592893"/>
       </p:ext>
     </p:extLst>
   </p:cSld>
@@ -19197,7 +19046,7 @@
 </file>
 
 <file path=ppt/slides/slide46.xml><?xml version="1.0" encoding="utf-8"?>
-<p:sld xmlns:a="http://schemas.openxmlformats.org/drawingml/2006/main" xmlns:r="http://schemas.openxmlformats.org/officeDocument/2006/relationships" xmlns:p="http://schemas.openxmlformats.org/presentationml/2006/main">
+<p:sld xmlns:a="http://schemas.openxmlformats.org/drawingml/2006/main" xmlns:r="http://schemas.openxmlformats.org/officeDocument/2006/relationships" xmlns:mc="http://schemas.openxmlformats.org/markup-compatibility/2006" xmlns:mv="urn:schemas-microsoft-com:mac:vml" xmlns:p="http://schemas.openxmlformats.org/presentationml/2006/main" mc:Ignorable="mv" mc:PreserveAttributes="mv:*">
   <p:cSld>
     <p:spTree>
       <p:nvGrpSpPr>
@@ -19507,7 +19356,7 @@
           <a:blip r:embed="rId3">
             <a:extLst>
               <a:ext uri="{28A0092B-C50C-407E-A947-70E740481C1C}">
-                <a14:useLocalDpi xmlns:a14="http://schemas.microsoft.com/office/drawing/2010/main" val="0"/>
+                <a14:useLocalDpi xmlns:a14="http://schemas.microsoft.com/office/drawing/2010/main" xmlns:p="http://schemas.openxmlformats.org/presentationml/2006/main" xmlns:r="http://schemas.openxmlformats.org/officeDocument/2006/relationships" xmlns:a="http://schemas.openxmlformats.org/drawingml/2006/main" xmlns="" val="0"/>
               </a:ext>
             </a:extLst>
           </a:blip>
@@ -19572,7 +19421,7 @@
     </p:spTree>
     <p:extLst>
       <p:ext uri="{BB962C8B-B14F-4D97-AF65-F5344CB8AC3E}">
-        <p14:creationId xmlns:p14="http://schemas.microsoft.com/office/powerpoint/2010/main" val="4042946778"/>
+        <p14:creationId xmlns:p14="http://schemas.microsoft.com/office/powerpoint/2010/main" xmlns:p="http://schemas.openxmlformats.org/presentationml/2006/main" xmlns:r="http://schemas.openxmlformats.org/officeDocument/2006/relationships" xmlns:a="http://schemas.openxmlformats.org/drawingml/2006/main" xmlns="" val="4042946778"/>
       </p:ext>
     </p:extLst>
   </p:cSld>
@@ -19590,7 +19439,7 @@
 </file>
 
 <file path=ppt/slides/slide47.xml><?xml version="1.0" encoding="utf-8"?>
-<p:sld xmlns:a="http://schemas.openxmlformats.org/drawingml/2006/main" xmlns:r="http://schemas.openxmlformats.org/officeDocument/2006/relationships" xmlns:p="http://schemas.openxmlformats.org/presentationml/2006/main">
+<p:sld xmlns:a="http://schemas.openxmlformats.org/drawingml/2006/main" xmlns:r="http://schemas.openxmlformats.org/officeDocument/2006/relationships" xmlns:mc="http://schemas.openxmlformats.org/markup-compatibility/2006" xmlns:mv="urn:schemas-microsoft-com:mac:vml" xmlns:p="http://schemas.openxmlformats.org/presentationml/2006/main" mc:Ignorable="mv" mc:PreserveAttributes="mv:*">
   <p:cSld>
     <p:spTree>
       <p:nvGrpSpPr>
@@ -19655,7 +19504,7 @@
             <a:blip r:embed="rId2">
               <a:extLst>
                 <a:ext uri="{28A0092B-C50C-407E-A947-70E740481C1C}">
-                  <a14:useLocalDpi xmlns:a14="http://schemas.microsoft.com/office/drawing/2010/main" val="0"/>
+                  <a14:useLocalDpi xmlns:a14="http://schemas.microsoft.com/office/drawing/2010/main" xmlns:p="http://schemas.openxmlformats.org/presentationml/2006/main" xmlns:r="http://schemas.openxmlformats.org/officeDocument/2006/relationships" xmlns:a="http://schemas.openxmlformats.org/drawingml/2006/main" xmlns="" val="0"/>
                 </a:ext>
               </a:extLst>
             </a:blip>
@@ -19685,7 +19534,7 @@
             <a:blip r:embed="rId3">
               <a:extLst>
                 <a:ext uri="{28A0092B-C50C-407E-A947-70E740481C1C}">
-                  <a14:useLocalDpi xmlns:a14="http://schemas.microsoft.com/office/drawing/2010/main" val="0"/>
+                  <a14:useLocalDpi xmlns:a14="http://schemas.microsoft.com/office/drawing/2010/main" xmlns:p="http://schemas.openxmlformats.org/presentationml/2006/main" xmlns:r="http://schemas.openxmlformats.org/officeDocument/2006/relationships" xmlns:a="http://schemas.openxmlformats.org/drawingml/2006/main" xmlns="" val="0"/>
                 </a:ext>
               </a:extLst>
             </a:blip>
@@ -19730,7 +19579,7 @@
             <a:blip r:embed="rId4">
               <a:extLst>
                 <a:ext uri="{28A0092B-C50C-407E-A947-70E740481C1C}">
-                  <a14:useLocalDpi xmlns:a14="http://schemas.microsoft.com/office/drawing/2010/main" val="0"/>
+                  <a14:useLocalDpi xmlns:a14="http://schemas.microsoft.com/office/drawing/2010/main" xmlns:p="http://schemas.openxmlformats.org/presentationml/2006/main" xmlns:r="http://schemas.openxmlformats.org/officeDocument/2006/relationships" xmlns:a="http://schemas.openxmlformats.org/drawingml/2006/main" xmlns="" val="0"/>
                 </a:ext>
               </a:extLst>
             </a:blip>
@@ -19760,7 +19609,7 @@
             <a:blip r:embed="rId5">
               <a:extLst>
                 <a:ext uri="{28A0092B-C50C-407E-A947-70E740481C1C}">
-                  <a14:useLocalDpi xmlns:a14="http://schemas.microsoft.com/office/drawing/2010/main" val="0"/>
+                  <a14:useLocalDpi xmlns:a14="http://schemas.microsoft.com/office/drawing/2010/main" xmlns:p="http://schemas.openxmlformats.org/presentationml/2006/main" xmlns:r="http://schemas.openxmlformats.org/officeDocument/2006/relationships" xmlns:a="http://schemas.openxmlformats.org/drawingml/2006/main" xmlns="" val="0"/>
                 </a:ext>
               </a:extLst>
             </a:blip>
@@ -19790,7 +19639,7 @@
             <a:blip r:embed="rId6">
               <a:extLst>
                 <a:ext uri="{28A0092B-C50C-407E-A947-70E740481C1C}">
-                  <a14:useLocalDpi xmlns:a14="http://schemas.microsoft.com/office/drawing/2010/main" val="0"/>
+                  <a14:useLocalDpi xmlns:a14="http://schemas.microsoft.com/office/drawing/2010/main" xmlns:p="http://schemas.openxmlformats.org/presentationml/2006/main" xmlns:r="http://schemas.openxmlformats.org/officeDocument/2006/relationships" xmlns:a="http://schemas.openxmlformats.org/drawingml/2006/main" xmlns="" val="0"/>
                 </a:ext>
               </a:extLst>
             </a:blip>
@@ -19835,7 +19684,7 @@
             <a:blip r:embed="rId7">
               <a:extLst>
                 <a:ext uri="{28A0092B-C50C-407E-A947-70E740481C1C}">
-                  <a14:useLocalDpi xmlns:a14="http://schemas.microsoft.com/office/drawing/2010/main" val="0"/>
+                  <a14:useLocalDpi xmlns:a14="http://schemas.microsoft.com/office/drawing/2010/main" xmlns:p="http://schemas.openxmlformats.org/presentationml/2006/main" xmlns:r="http://schemas.openxmlformats.org/officeDocument/2006/relationships" xmlns:a="http://schemas.openxmlformats.org/drawingml/2006/main" xmlns="" val="0"/>
                 </a:ext>
               </a:extLst>
             </a:blip>
@@ -19865,7 +19714,7 @@
             <a:blip r:embed="rId8">
               <a:extLst>
                 <a:ext uri="{28A0092B-C50C-407E-A947-70E740481C1C}">
-                  <a14:useLocalDpi xmlns:a14="http://schemas.microsoft.com/office/drawing/2010/main" val="0"/>
+                  <a14:useLocalDpi xmlns:a14="http://schemas.microsoft.com/office/drawing/2010/main" xmlns:p="http://schemas.openxmlformats.org/presentationml/2006/main" xmlns:r="http://schemas.openxmlformats.org/officeDocument/2006/relationships" xmlns:a="http://schemas.openxmlformats.org/drawingml/2006/main" xmlns="" val="0"/>
                 </a:ext>
               </a:extLst>
             </a:blip>
@@ -19910,7 +19759,7 @@
             <a:blip r:embed="rId9">
               <a:extLst>
                 <a:ext uri="{28A0092B-C50C-407E-A947-70E740481C1C}">
-                  <a14:useLocalDpi xmlns:a14="http://schemas.microsoft.com/office/drawing/2010/main" val="0"/>
+                  <a14:useLocalDpi xmlns:a14="http://schemas.microsoft.com/office/drawing/2010/main" xmlns:p="http://schemas.openxmlformats.org/presentationml/2006/main" xmlns:r="http://schemas.openxmlformats.org/officeDocument/2006/relationships" xmlns:a="http://schemas.openxmlformats.org/drawingml/2006/main" xmlns="" val="0"/>
                 </a:ext>
               </a:extLst>
             </a:blip>
@@ -19940,7 +19789,7 @@
             <a:blip r:embed="rId10">
               <a:extLst>
                 <a:ext uri="{28A0092B-C50C-407E-A947-70E740481C1C}">
-                  <a14:useLocalDpi xmlns:a14="http://schemas.microsoft.com/office/drawing/2010/main" val="0"/>
+                  <a14:useLocalDpi xmlns:a14="http://schemas.microsoft.com/office/drawing/2010/main" xmlns:p="http://schemas.openxmlformats.org/presentationml/2006/main" xmlns:r="http://schemas.openxmlformats.org/officeDocument/2006/relationships" xmlns:a="http://schemas.openxmlformats.org/drawingml/2006/main" xmlns="" val="0"/>
                 </a:ext>
               </a:extLst>
             </a:blip>
@@ -20154,7 +20003,7 @@
           <a:blip r:embed="rId2">
             <a:extLst>
               <a:ext uri="{28A0092B-C50C-407E-A947-70E740481C1C}">
-                <a14:useLocalDpi xmlns:a14="http://schemas.microsoft.com/office/drawing/2010/main" val="0"/>
+                <a14:useLocalDpi xmlns:a14="http://schemas.microsoft.com/office/drawing/2010/main" xmlns:p="http://schemas.openxmlformats.org/presentationml/2006/main" xmlns:r="http://schemas.openxmlformats.org/officeDocument/2006/relationships" xmlns:a="http://schemas.openxmlformats.org/drawingml/2006/main" xmlns="" val="0"/>
               </a:ext>
             </a:extLst>
           </a:blip>
@@ -20184,7 +20033,7 @@
           <a:blip r:embed="rId3">
             <a:extLst>
               <a:ext uri="{28A0092B-C50C-407E-A947-70E740481C1C}">
-                <a14:useLocalDpi xmlns:a14="http://schemas.microsoft.com/office/drawing/2010/main" val="0"/>
+                <a14:useLocalDpi xmlns:a14="http://schemas.microsoft.com/office/drawing/2010/main" xmlns:p="http://schemas.openxmlformats.org/presentationml/2006/main" xmlns:r="http://schemas.openxmlformats.org/officeDocument/2006/relationships" xmlns:a="http://schemas.openxmlformats.org/drawingml/2006/main" xmlns="" val="0"/>
               </a:ext>
             </a:extLst>
           </a:blip>
@@ -20214,7 +20063,7 @@
           <a:blip r:embed="rId4">
             <a:extLst>
               <a:ext uri="{28A0092B-C50C-407E-A947-70E740481C1C}">
-                <a14:useLocalDpi xmlns:a14="http://schemas.microsoft.com/office/drawing/2010/main" val="0"/>
+                <a14:useLocalDpi xmlns:a14="http://schemas.microsoft.com/office/drawing/2010/main" xmlns:p="http://schemas.openxmlformats.org/presentationml/2006/main" xmlns:r="http://schemas.openxmlformats.org/officeDocument/2006/relationships" xmlns:a="http://schemas.openxmlformats.org/drawingml/2006/main" xmlns="" val="0"/>
               </a:ext>
             </a:extLst>
           </a:blip>
@@ -20244,7 +20093,7 @@
           <a:blip r:embed="rId5">
             <a:extLst>
               <a:ext uri="{28A0092B-C50C-407E-A947-70E740481C1C}">
-                <a14:useLocalDpi xmlns:a14="http://schemas.microsoft.com/office/drawing/2010/main" val="0"/>
+                <a14:useLocalDpi xmlns:a14="http://schemas.microsoft.com/office/drawing/2010/main" xmlns:p="http://schemas.openxmlformats.org/presentationml/2006/main" xmlns:r="http://schemas.openxmlformats.org/officeDocument/2006/relationships" xmlns:a="http://schemas.openxmlformats.org/drawingml/2006/main" xmlns="" val="0"/>
               </a:ext>
             </a:extLst>
           </a:blip>
@@ -20274,7 +20123,7 @@
           <a:blip r:embed="rId6">
             <a:extLst>
               <a:ext uri="{28A0092B-C50C-407E-A947-70E740481C1C}">
-                <a14:useLocalDpi xmlns:a14="http://schemas.microsoft.com/office/drawing/2010/main" val="0"/>
+                <a14:useLocalDpi xmlns:a14="http://schemas.microsoft.com/office/drawing/2010/main" xmlns:p="http://schemas.openxmlformats.org/presentationml/2006/main" xmlns:r="http://schemas.openxmlformats.org/officeDocument/2006/relationships" xmlns:a="http://schemas.openxmlformats.org/drawingml/2006/main" xmlns="" val="0"/>
               </a:ext>
             </a:extLst>
           </a:blip>
@@ -20304,7 +20153,7 @@
           <a:blip r:embed="rId7">
             <a:extLst>
               <a:ext uri="{28A0092B-C50C-407E-A947-70E740481C1C}">
-                <a14:useLocalDpi xmlns:a14="http://schemas.microsoft.com/office/drawing/2010/main" val="0"/>
+                <a14:useLocalDpi xmlns:a14="http://schemas.microsoft.com/office/drawing/2010/main" xmlns:p="http://schemas.openxmlformats.org/presentationml/2006/main" xmlns:r="http://schemas.openxmlformats.org/officeDocument/2006/relationships" xmlns:a="http://schemas.openxmlformats.org/drawingml/2006/main" xmlns="" val="0"/>
               </a:ext>
             </a:extLst>
           </a:blip>
@@ -20334,7 +20183,7 @@
           <a:blip r:embed="rId8">
             <a:extLst>
               <a:ext uri="{28A0092B-C50C-407E-A947-70E740481C1C}">
-                <a14:useLocalDpi xmlns:a14="http://schemas.microsoft.com/office/drawing/2010/main" val="0"/>
+                <a14:useLocalDpi xmlns:a14="http://schemas.microsoft.com/office/drawing/2010/main" xmlns:p="http://schemas.openxmlformats.org/presentationml/2006/main" xmlns:r="http://schemas.openxmlformats.org/officeDocument/2006/relationships" xmlns:a="http://schemas.openxmlformats.org/drawingml/2006/main" xmlns="" val="0"/>
               </a:ext>
             </a:extLst>
           </a:blip>
@@ -20364,7 +20213,7 @@
           <a:blip r:embed="rId9">
             <a:extLst>
               <a:ext uri="{28A0092B-C50C-407E-A947-70E740481C1C}">
-                <a14:useLocalDpi xmlns:a14="http://schemas.microsoft.com/office/drawing/2010/main" val="0"/>
+                <a14:useLocalDpi xmlns:a14="http://schemas.microsoft.com/office/drawing/2010/main" xmlns:p="http://schemas.openxmlformats.org/presentationml/2006/main" xmlns:r="http://schemas.openxmlformats.org/officeDocument/2006/relationships" xmlns:a="http://schemas.openxmlformats.org/drawingml/2006/main" xmlns="" val="0"/>
               </a:ext>
             </a:extLst>
           </a:blip>
@@ -20394,7 +20243,7 @@
           <a:blip r:embed="rId10">
             <a:extLst>
               <a:ext uri="{28A0092B-C50C-407E-A947-70E740481C1C}">
-                <a14:useLocalDpi xmlns:a14="http://schemas.microsoft.com/office/drawing/2010/main" val="0"/>
+                <a14:useLocalDpi xmlns:a14="http://schemas.microsoft.com/office/drawing/2010/main" xmlns:p="http://schemas.openxmlformats.org/presentationml/2006/main" xmlns:r="http://schemas.openxmlformats.org/officeDocument/2006/relationships" xmlns:a="http://schemas.openxmlformats.org/drawingml/2006/main" xmlns="" val="0"/>
               </a:ext>
             </a:extLst>
           </a:blip>
@@ -22035,7 +21884,7 @@
     </p:spTree>
     <p:extLst>
       <p:ext uri="{BB962C8B-B14F-4D97-AF65-F5344CB8AC3E}">
-        <p14:creationId xmlns:p14="http://schemas.microsoft.com/office/powerpoint/2010/main" val="1030899907"/>
+        <p14:creationId xmlns:p14="http://schemas.microsoft.com/office/powerpoint/2010/main" xmlns:p="http://schemas.openxmlformats.org/presentationml/2006/main" xmlns:r="http://schemas.openxmlformats.org/officeDocument/2006/relationships" xmlns:a="http://schemas.openxmlformats.org/drawingml/2006/main" xmlns="" val="1030899907"/>
       </p:ext>
     </p:extLst>
   </p:cSld>
@@ -22053,7 +21902,7 @@
 </file>
 
 <file path=ppt/slides/slide48.xml><?xml version="1.0" encoding="utf-8"?>
-<p:sld xmlns:a="http://schemas.openxmlformats.org/drawingml/2006/main" xmlns:r="http://schemas.openxmlformats.org/officeDocument/2006/relationships" xmlns:p="http://schemas.openxmlformats.org/presentationml/2006/main">
+<p:sld xmlns:a="http://schemas.openxmlformats.org/drawingml/2006/main" xmlns:r="http://schemas.openxmlformats.org/officeDocument/2006/relationships" xmlns:mc="http://schemas.openxmlformats.org/markup-compatibility/2006" xmlns:mv="urn:schemas-microsoft-com:mac:vml" xmlns:p="http://schemas.openxmlformats.org/presentationml/2006/main" mc:Ignorable="mv" mc:PreserveAttributes="mv:*">
   <p:cSld>
     <p:spTree>
       <p:nvGrpSpPr>
@@ -22287,7 +22136,7 @@
           <a:blip r:embed="rId2">
             <a:extLst>
               <a:ext uri="{28A0092B-C50C-407E-A947-70E740481C1C}">
-                <a14:useLocalDpi xmlns:a14="http://schemas.microsoft.com/office/drawing/2010/main" val="0"/>
+                <a14:useLocalDpi xmlns:a14="http://schemas.microsoft.com/office/drawing/2010/main" xmlns:p="http://schemas.openxmlformats.org/presentationml/2006/main" xmlns:r="http://schemas.openxmlformats.org/officeDocument/2006/relationships" xmlns:a="http://schemas.openxmlformats.org/drawingml/2006/main" xmlns="" val="0"/>
               </a:ext>
             </a:extLst>
           </a:blip>
@@ -22317,7 +22166,7 @@
           <a:blip r:embed="rId2">
             <a:extLst>
               <a:ext uri="{28A0092B-C50C-407E-A947-70E740481C1C}">
-                <a14:useLocalDpi xmlns:a14="http://schemas.microsoft.com/office/drawing/2010/main" val="0"/>
+                <a14:useLocalDpi xmlns:a14="http://schemas.microsoft.com/office/drawing/2010/main" xmlns:p="http://schemas.openxmlformats.org/presentationml/2006/main" xmlns:r="http://schemas.openxmlformats.org/officeDocument/2006/relationships" xmlns:a="http://schemas.openxmlformats.org/drawingml/2006/main" xmlns="" val="0"/>
               </a:ext>
             </a:extLst>
           </a:blip>
@@ -22720,7 +22569,7 @@
     </p:spTree>
     <p:extLst>
       <p:ext uri="{BB962C8B-B14F-4D97-AF65-F5344CB8AC3E}">
-        <p14:creationId xmlns:p14="http://schemas.microsoft.com/office/powerpoint/2010/main" val="2088642547"/>
+        <p14:creationId xmlns:p14="http://schemas.microsoft.com/office/powerpoint/2010/main" xmlns:p="http://schemas.openxmlformats.org/presentationml/2006/main" xmlns:r="http://schemas.openxmlformats.org/officeDocument/2006/relationships" xmlns:a="http://schemas.openxmlformats.org/drawingml/2006/main" xmlns="" val="2088642547"/>
       </p:ext>
     </p:extLst>
   </p:cSld>
@@ -22738,7 +22587,7 @@
 </file>
 
 <file path=ppt/slides/slide49.xml><?xml version="1.0" encoding="utf-8"?>
-<p:sld xmlns:a="http://schemas.openxmlformats.org/drawingml/2006/main" xmlns:r="http://schemas.openxmlformats.org/officeDocument/2006/relationships" xmlns:p="http://schemas.openxmlformats.org/presentationml/2006/main">
+<p:sld xmlns:a="http://schemas.openxmlformats.org/drawingml/2006/main" xmlns:r="http://schemas.openxmlformats.org/officeDocument/2006/relationships" xmlns:mc="http://schemas.openxmlformats.org/markup-compatibility/2006" xmlns:mv="urn:schemas-microsoft-com:mac:vml" xmlns:p="http://schemas.openxmlformats.org/presentationml/2006/main" mc:Ignorable="mv" mc:PreserveAttributes="mv:*">
   <p:cSld>
     <p:spTree>
       <p:nvGrpSpPr>
@@ -22837,7 +22686,7 @@
     </p:spTree>
     <p:extLst>
       <p:ext uri="{BB962C8B-B14F-4D97-AF65-F5344CB8AC3E}">
-        <p14:creationId xmlns:p14="http://schemas.microsoft.com/office/powerpoint/2010/main" val="1060988173"/>
+        <p14:creationId xmlns:p14="http://schemas.microsoft.com/office/powerpoint/2010/main" xmlns:p="http://schemas.openxmlformats.org/presentationml/2006/main" xmlns:r="http://schemas.openxmlformats.org/officeDocument/2006/relationships" xmlns:a="http://schemas.openxmlformats.org/drawingml/2006/main" xmlns="" val="1060988173"/>
       </p:ext>
     </p:extLst>
   </p:cSld>
@@ -22855,7 +22704,7 @@
 </file>
 
 <file path=ppt/slides/slide5.xml><?xml version="1.0" encoding="utf-8"?>
-<p:sld xmlns:a="http://schemas.openxmlformats.org/drawingml/2006/main" xmlns:r="http://schemas.openxmlformats.org/officeDocument/2006/relationships" xmlns:p="http://schemas.openxmlformats.org/presentationml/2006/main">
+<p:sld xmlns:a="http://schemas.openxmlformats.org/drawingml/2006/main" xmlns:r="http://schemas.openxmlformats.org/officeDocument/2006/relationships" xmlns:mc="http://schemas.openxmlformats.org/markup-compatibility/2006" xmlns:mv="urn:schemas-microsoft-com:mac:vml" xmlns:p="http://schemas.openxmlformats.org/presentationml/2006/main" mc:Ignorable="mv" mc:PreserveAttributes="mv:*">
   <p:cSld>
     <p:spTree>
       <p:nvGrpSpPr>
@@ -22905,7 +22754,7 @@
     </p:spTree>
     <p:extLst>
       <p:ext uri="{BB962C8B-B14F-4D97-AF65-F5344CB8AC3E}">
-        <p14:creationId xmlns:p14="http://schemas.microsoft.com/office/powerpoint/2010/main" val="730746052"/>
+        <p14:creationId xmlns:p14="http://schemas.microsoft.com/office/powerpoint/2010/main" xmlns:p="http://schemas.openxmlformats.org/presentationml/2006/main" xmlns:r="http://schemas.openxmlformats.org/officeDocument/2006/relationships" xmlns:a="http://schemas.openxmlformats.org/drawingml/2006/main" xmlns="" val="730746052"/>
       </p:ext>
     </p:extLst>
   </p:cSld>
@@ -22923,7 +22772,7 @@
 </file>
 
 <file path=ppt/slides/slide50.xml><?xml version="1.0" encoding="utf-8"?>
-<p:sld xmlns:a="http://schemas.openxmlformats.org/drawingml/2006/main" xmlns:r="http://schemas.openxmlformats.org/officeDocument/2006/relationships" xmlns:p="http://schemas.openxmlformats.org/presentationml/2006/main">
+<p:sld xmlns:a="http://schemas.openxmlformats.org/drawingml/2006/main" xmlns:r="http://schemas.openxmlformats.org/officeDocument/2006/relationships" xmlns:mc="http://schemas.openxmlformats.org/markup-compatibility/2006" xmlns:mv="urn:schemas-microsoft-com:mac:vml" xmlns:p="http://schemas.openxmlformats.org/presentationml/2006/main" mc:Ignorable="mv" mc:PreserveAttributes="mv:*">
   <p:cSld>
     <p:spTree>
       <p:nvGrpSpPr>
@@ -22961,7 +22810,7 @@
     </p:spTree>
     <p:extLst>
       <p:ext uri="{BB962C8B-B14F-4D97-AF65-F5344CB8AC3E}">
-        <p14:creationId xmlns:p14="http://schemas.microsoft.com/office/powerpoint/2010/main" val="2403161794"/>
+        <p14:creationId xmlns:p14="http://schemas.microsoft.com/office/powerpoint/2010/main" xmlns:p="http://schemas.openxmlformats.org/presentationml/2006/main" xmlns:r="http://schemas.openxmlformats.org/officeDocument/2006/relationships" xmlns:a="http://schemas.openxmlformats.org/drawingml/2006/main" xmlns="" val="2403161794"/>
       </p:ext>
     </p:extLst>
   </p:cSld>
@@ -22972,7 +22821,7 @@
 </file>
 
 <file path=ppt/slides/slide51.xml><?xml version="1.0" encoding="utf-8"?>
-<p:sld xmlns:a="http://schemas.openxmlformats.org/drawingml/2006/main" xmlns:r="http://schemas.openxmlformats.org/officeDocument/2006/relationships" xmlns:p="http://schemas.openxmlformats.org/presentationml/2006/main">
+<p:sld xmlns:a="http://schemas.openxmlformats.org/drawingml/2006/main" xmlns:r="http://schemas.openxmlformats.org/officeDocument/2006/relationships" xmlns:mc="http://schemas.openxmlformats.org/markup-compatibility/2006" xmlns:mv="urn:schemas-microsoft-com:mac:vml" xmlns:p="http://schemas.openxmlformats.org/presentationml/2006/main" mc:Ignorable="mv" mc:PreserveAttributes="mv:*">
   <p:cSld>
     <p:spTree>
       <p:nvGrpSpPr>
@@ -23014,7 +22863,7 @@
     </p:spTree>
     <p:extLst>
       <p:ext uri="{BB962C8B-B14F-4D97-AF65-F5344CB8AC3E}">
-        <p14:creationId xmlns:p14="http://schemas.microsoft.com/office/powerpoint/2010/main" val="1522136710"/>
+        <p14:creationId xmlns:p14="http://schemas.microsoft.com/office/powerpoint/2010/main" xmlns:p="http://schemas.openxmlformats.org/presentationml/2006/main" xmlns:r="http://schemas.openxmlformats.org/officeDocument/2006/relationships" xmlns:a="http://schemas.openxmlformats.org/drawingml/2006/main" xmlns="" val="1522136710"/>
       </p:ext>
     </p:extLst>
   </p:cSld>
@@ -23032,7 +22881,7 @@
 </file>
 
 <file path=ppt/slides/slide52.xml><?xml version="1.0" encoding="utf-8"?>
-<p:sld xmlns:a="http://schemas.openxmlformats.org/drawingml/2006/main" xmlns:r="http://schemas.openxmlformats.org/officeDocument/2006/relationships" xmlns:p="http://schemas.openxmlformats.org/presentationml/2006/main">
+<p:sld xmlns:a="http://schemas.openxmlformats.org/drawingml/2006/main" xmlns:r="http://schemas.openxmlformats.org/officeDocument/2006/relationships" xmlns:mc="http://schemas.openxmlformats.org/markup-compatibility/2006" xmlns:mv="urn:schemas-microsoft-com:mac:vml" xmlns:p="http://schemas.openxmlformats.org/presentationml/2006/main" mc:Ignorable="mv" mc:PreserveAttributes="mv:*">
   <p:cSld>
     <p:spTree>
       <p:nvGrpSpPr>
@@ -23093,7 +22942,7 @@
     </p:spTree>
     <p:extLst>
       <p:ext uri="{BB962C8B-B14F-4D97-AF65-F5344CB8AC3E}">
-        <p14:creationId xmlns:p14="http://schemas.microsoft.com/office/powerpoint/2010/main" val="2399798731"/>
+        <p14:creationId xmlns:p14="http://schemas.microsoft.com/office/powerpoint/2010/main" xmlns:p="http://schemas.openxmlformats.org/presentationml/2006/main" xmlns:r="http://schemas.openxmlformats.org/officeDocument/2006/relationships" xmlns:a="http://schemas.openxmlformats.org/drawingml/2006/main" xmlns="" val="2399798731"/>
       </p:ext>
     </p:extLst>
   </p:cSld>
@@ -23111,7 +22960,7 @@
 </file>
 
 <file path=ppt/slides/slide53.xml><?xml version="1.0" encoding="utf-8"?>
-<p:sld xmlns:a="http://schemas.openxmlformats.org/drawingml/2006/main" xmlns:r="http://schemas.openxmlformats.org/officeDocument/2006/relationships" xmlns:p="http://schemas.openxmlformats.org/presentationml/2006/main">
+<p:sld xmlns:a="http://schemas.openxmlformats.org/drawingml/2006/main" xmlns:r="http://schemas.openxmlformats.org/officeDocument/2006/relationships" xmlns:mc="http://schemas.openxmlformats.org/markup-compatibility/2006" xmlns:mv="urn:schemas-microsoft-com:mac:vml" xmlns:p="http://schemas.openxmlformats.org/presentationml/2006/main" mc:Ignorable="mv" mc:PreserveAttributes="mv:*">
   <p:cSld>
     <p:spTree>
       <p:nvGrpSpPr>
@@ -23168,7 +23017,7 @@
     </p:spTree>
     <p:extLst>
       <p:ext uri="{BB962C8B-B14F-4D97-AF65-F5344CB8AC3E}">
-        <p14:creationId xmlns:p14="http://schemas.microsoft.com/office/powerpoint/2010/main" val="2607461392"/>
+        <p14:creationId xmlns:p14="http://schemas.microsoft.com/office/powerpoint/2010/main" xmlns:p="http://schemas.openxmlformats.org/presentationml/2006/main" xmlns:r="http://schemas.openxmlformats.org/officeDocument/2006/relationships" xmlns:a="http://schemas.openxmlformats.org/drawingml/2006/main" xmlns="" val="2607461392"/>
       </p:ext>
     </p:extLst>
   </p:cSld>
@@ -23179,7 +23028,7 @@
 </file>
 
 <file path=ppt/slides/slide54.xml><?xml version="1.0" encoding="utf-8"?>
-<p:sld xmlns:a="http://schemas.openxmlformats.org/drawingml/2006/main" xmlns:r="http://schemas.openxmlformats.org/officeDocument/2006/relationships" xmlns:p="http://schemas.openxmlformats.org/presentationml/2006/main">
+<p:sld xmlns:a="http://schemas.openxmlformats.org/drawingml/2006/main" xmlns:r="http://schemas.openxmlformats.org/officeDocument/2006/relationships" xmlns:mc="http://schemas.openxmlformats.org/markup-compatibility/2006" xmlns:mv="urn:schemas-microsoft-com:mac:vml" xmlns:p="http://schemas.openxmlformats.org/presentationml/2006/main" mc:Ignorable="mv" mc:PreserveAttributes="mv:*">
   <p:cSld>
     <p:spTree>
       <p:nvGrpSpPr>
@@ -23221,7 +23070,7 @@
     </p:spTree>
     <p:extLst>
       <p:ext uri="{BB962C8B-B14F-4D97-AF65-F5344CB8AC3E}">
-        <p14:creationId xmlns:p14="http://schemas.microsoft.com/office/powerpoint/2010/main" val="1916182223"/>
+        <p14:creationId xmlns:p14="http://schemas.microsoft.com/office/powerpoint/2010/main" xmlns:p="http://schemas.openxmlformats.org/presentationml/2006/main" xmlns:r="http://schemas.openxmlformats.org/officeDocument/2006/relationships" xmlns:a="http://schemas.openxmlformats.org/drawingml/2006/main" xmlns="" val="1916182223"/>
       </p:ext>
     </p:extLst>
   </p:cSld>
@@ -23239,7 +23088,7 @@
 </file>
 
 <file path=ppt/slides/slide55.xml><?xml version="1.0" encoding="utf-8"?>
-<p:sld xmlns:a="http://schemas.openxmlformats.org/drawingml/2006/main" xmlns:r="http://schemas.openxmlformats.org/officeDocument/2006/relationships" xmlns:p="http://schemas.openxmlformats.org/presentationml/2006/main">
+<p:sld xmlns:a="http://schemas.openxmlformats.org/drawingml/2006/main" xmlns:r="http://schemas.openxmlformats.org/officeDocument/2006/relationships" xmlns:mc="http://schemas.openxmlformats.org/markup-compatibility/2006" xmlns:mv="urn:schemas-microsoft-com:mac:vml" xmlns:p="http://schemas.openxmlformats.org/presentationml/2006/main" mc:Ignorable="mv" mc:PreserveAttributes="mv:*">
   <p:cSld>
     <p:spTree>
       <p:nvGrpSpPr>
@@ -23319,7 +23168,7 @@
     </p:spTree>
     <p:extLst>
       <p:ext uri="{BB962C8B-B14F-4D97-AF65-F5344CB8AC3E}">
-        <p14:creationId xmlns:p14="http://schemas.microsoft.com/office/powerpoint/2010/main" val="8609580"/>
+        <p14:creationId xmlns:p14="http://schemas.microsoft.com/office/powerpoint/2010/main" xmlns:p="http://schemas.openxmlformats.org/presentationml/2006/main" xmlns:r="http://schemas.openxmlformats.org/officeDocument/2006/relationships" xmlns:a="http://schemas.openxmlformats.org/drawingml/2006/main" xmlns="" val="8609580"/>
       </p:ext>
     </p:extLst>
   </p:cSld>
@@ -23337,7 +23186,7 @@
 </file>
 
 <file path=ppt/slides/slide56.xml><?xml version="1.0" encoding="utf-8"?>
-<p:sld xmlns:a="http://schemas.openxmlformats.org/drawingml/2006/main" xmlns:r="http://schemas.openxmlformats.org/officeDocument/2006/relationships" xmlns:p="http://schemas.openxmlformats.org/presentationml/2006/main">
+<p:sld xmlns:a="http://schemas.openxmlformats.org/drawingml/2006/main" xmlns:r="http://schemas.openxmlformats.org/officeDocument/2006/relationships" xmlns:mc="http://schemas.openxmlformats.org/markup-compatibility/2006" xmlns:mv="urn:schemas-microsoft-com:mac:vml" xmlns:p="http://schemas.openxmlformats.org/presentationml/2006/main" mc:Ignorable="mv" mc:PreserveAttributes="mv:*">
   <p:cSld>
     <p:spTree>
       <p:nvGrpSpPr>
@@ -23455,7 +23304,7 @@
     </p:spTree>
     <p:extLst>
       <p:ext uri="{BB962C8B-B14F-4D97-AF65-F5344CB8AC3E}">
-        <p14:creationId xmlns:p14="http://schemas.microsoft.com/office/powerpoint/2010/main" val="1795932434"/>
+        <p14:creationId xmlns:p14="http://schemas.microsoft.com/office/powerpoint/2010/main" xmlns:p="http://schemas.openxmlformats.org/presentationml/2006/main" xmlns:r="http://schemas.openxmlformats.org/officeDocument/2006/relationships" xmlns:a="http://schemas.openxmlformats.org/drawingml/2006/main" xmlns="" val="1795932434"/>
       </p:ext>
     </p:extLst>
   </p:cSld>
@@ -23473,7 +23322,7 @@
 </file>
 
 <file path=ppt/slides/slide57.xml><?xml version="1.0" encoding="utf-8"?>
-<p:sld xmlns:a="http://schemas.openxmlformats.org/drawingml/2006/main" xmlns:r="http://schemas.openxmlformats.org/officeDocument/2006/relationships" xmlns:p="http://schemas.openxmlformats.org/presentationml/2006/main">
+<p:sld xmlns:a="http://schemas.openxmlformats.org/drawingml/2006/main" xmlns:r="http://schemas.openxmlformats.org/officeDocument/2006/relationships" xmlns:mc="http://schemas.openxmlformats.org/markup-compatibility/2006" xmlns:mv="urn:schemas-microsoft-com:mac:vml" xmlns:p="http://schemas.openxmlformats.org/presentationml/2006/main" mc:Ignorable="mv" mc:PreserveAttributes="mv:*">
   <p:cSld>
     <p:spTree>
       <p:nvGrpSpPr>
@@ -23572,7 +23421,7 @@
     </p:spTree>
     <p:extLst>
       <p:ext uri="{BB962C8B-B14F-4D97-AF65-F5344CB8AC3E}">
-        <p14:creationId xmlns:p14="http://schemas.microsoft.com/office/powerpoint/2010/main" val="4033552047"/>
+        <p14:creationId xmlns:p14="http://schemas.microsoft.com/office/powerpoint/2010/main" xmlns:p="http://schemas.openxmlformats.org/presentationml/2006/main" xmlns:r="http://schemas.openxmlformats.org/officeDocument/2006/relationships" xmlns:a="http://schemas.openxmlformats.org/drawingml/2006/main" xmlns="" val="4033552047"/>
       </p:ext>
     </p:extLst>
   </p:cSld>
@@ -23590,7 +23439,7 @@
 </file>
 
 <file path=ppt/slides/slide58.xml><?xml version="1.0" encoding="utf-8"?>
-<p:sld xmlns:a="http://schemas.openxmlformats.org/drawingml/2006/main" xmlns:r="http://schemas.openxmlformats.org/officeDocument/2006/relationships" xmlns:p="http://schemas.openxmlformats.org/presentationml/2006/main">
+<p:sld xmlns:a="http://schemas.openxmlformats.org/drawingml/2006/main" xmlns:r="http://schemas.openxmlformats.org/officeDocument/2006/relationships" xmlns:mc="http://schemas.openxmlformats.org/markup-compatibility/2006" xmlns:mv="urn:schemas-microsoft-com:mac:vml" xmlns:p="http://schemas.openxmlformats.org/presentationml/2006/main" mc:Ignorable="mv" mc:PreserveAttributes="mv:*">
   <p:cSld>
     <p:spTree>
       <p:nvGrpSpPr>
@@ -23756,7 +23605,7 @@
     </p:spTree>
     <p:extLst>
       <p:ext uri="{BB962C8B-B14F-4D97-AF65-F5344CB8AC3E}">
-        <p14:creationId xmlns:p14="http://schemas.microsoft.com/office/powerpoint/2010/main" val="220248659"/>
+        <p14:creationId xmlns:p14="http://schemas.microsoft.com/office/powerpoint/2010/main" xmlns:p="http://schemas.openxmlformats.org/presentationml/2006/main" xmlns:r="http://schemas.openxmlformats.org/officeDocument/2006/relationships" xmlns:a="http://schemas.openxmlformats.org/drawingml/2006/main" xmlns="" val="220248659"/>
       </p:ext>
     </p:extLst>
   </p:cSld>
@@ -23774,7 +23623,7 @@
 </file>
 
 <file path=ppt/slides/slide59.xml><?xml version="1.0" encoding="utf-8"?>
-<p:sld xmlns:a="http://schemas.openxmlformats.org/drawingml/2006/main" xmlns:r="http://schemas.openxmlformats.org/officeDocument/2006/relationships" xmlns:p="http://schemas.openxmlformats.org/presentationml/2006/main">
+<p:sld xmlns:a="http://schemas.openxmlformats.org/drawingml/2006/main" xmlns:r="http://schemas.openxmlformats.org/officeDocument/2006/relationships" xmlns:mc="http://schemas.openxmlformats.org/markup-compatibility/2006" xmlns:mv="urn:schemas-microsoft-com:mac:vml" xmlns:p="http://schemas.openxmlformats.org/presentationml/2006/main" mc:Ignorable="mv" mc:PreserveAttributes="mv:*">
   <p:cSld>
     <p:spTree>
       <p:nvGrpSpPr>
@@ -24002,7 +23851,7 @@
     </p:spTree>
     <p:extLst>
       <p:ext uri="{BB962C8B-B14F-4D97-AF65-F5344CB8AC3E}">
-        <p14:creationId xmlns:p14="http://schemas.microsoft.com/office/powerpoint/2010/main" val="3284264482"/>
+        <p14:creationId xmlns:p14="http://schemas.microsoft.com/office/powerpoint/2010/main" xmlns:p="http://schemas.openxmlformats.org/presentationml/2006/main" xmlns:r="http://schemas.openxmlformats.org/officeDocument/2006/relationships" xmlns:a="http://schemas.openxmlformats.org/drawingml/2006/main" xmlns="" val="3284264482"/>
       </p:ext>
     </p:extLst>
   </p:cSld>
@@ -24020,7 +23869,7 @@
 </file>
 
 <file path=ppt/slides/slide6.xml><?xml version="1.0" encoding="utf-8"?>
-<p:sld xmlns:a="http://schemas.openxmlformats.org/drawingml/2006/main" xmlns:r="http://schemas.openxmlformats.org/officeDocument/2006/relationships" xmlns:p="http://schemas.openxmlformats.org/presentationml/2006/main">
+<p:sld xmlns:a="http://schemas.openxmlformats.org/drawingml/2006/main" xmlns:r="http://schemas.openxmlformats.org/officeDocument/2006/relationships" xmlns:mc="http://schemas.openxmlformats.org/markup-compatibility/2006" xmlns:mv="urn:schemas-microsoft-com:mac:vml" xmlns:p="http://schemas.openxmlformats.org/presentationml/2006/main" mc:Ignorable="mv" mc:PreserveAttributes="mv:*">
   <p:cSld>
     <p:spTree>
       <p:nvGrpSpPr>
@@ -24109,7 +23958,7 @@
     </p:spTree>
     <p:extLst>
       <p:ext uri="{BB962C8B-B14F-4D97-AF65-F5344CB8AC3E}">
-        <p14:creationId xmlns:p14="http://schemas.microsoft.com/office/powerpoint/2010/main" val="1108981616"/>
+        <p14:creationId xmlns:p14="http://schemas.microsoft.com/office/powerpoint/2010/main" xmlns:p="http://schemas.openxmlformats.org/presentationml/2006/main" xmlns:r="http://schemas.openxmlformats.org/officeDocument/2006/relationships" xmlns:a="http://schemas.openxmlformats.org/drawingml/2006/main" xmlns="" val="1108981616"/>
       </p:ext>
     </p:extLst>
   </p:cSld>
@@ -24127,7 +23976,7 @@
 </file>
 
 <file path=ppt/slides/slide60.xml><?xml version="1.0" encoding="utf-8"?>
-<p:sld xmlns:a="http://schemas.openxmlformats.org/drawingml/2006/main" xmlns:r="http://schemas.openxmlformats.org/officeDocument/2006/relationships" xmlns:p="http://schemas.openxmlformats.org/presentationml/2006/main">
+<p:sld xmlns:a="http://schemas.openxmlformats.org/drawingml/2006/main" xmlns:r="http://schemas.openxmlformats.org/officeDocument/2006/relationships" xmlns:mc="http://schemas.openxmlformats.org/markup-compatibility/2006" xmlns:mv="urn:schemas-microsoft-com:mac:vml" xmlns:p="http://schemas.openxmlformats.org/presentationml/2006/main" mc:Ignorable="mv" mc:PreserveAttributes="mv:*">
   <p:cSld>
     <p:spTree>
       <p:nvGrpSpPr>
@@ -24165,7 +24014,7 @@
     </p:spTree>
     <p:extLst>
       <p:ext uri="{BB962C8B-B14F-4D97-AF65-F5344CB8AC3E}">
-        <p14:creationId xmlns:p14="http://schemas.microsoft.com/office/powerpoint/2010/main" val="1682920946"/>
+        <p14:creationId xmlns:p14="http://schemas.microsoft.com/office/powerpoint/2010/main" xmlns:p="http://schemas.openxmlformats.org/presentationml/2006/main" xmlns:r="http://schemas.openxmlformats.org/officeDocument/2006/relationships" xmlns:a="http://schemas.openxmlformats.org/drawingml/2006/main" xmlns="" val="1682920946"/>
       </p:ext>
     </p:extLst>
   </p:cSld>
@@ -24183,7 +24032,7 @@
 </file>
 
 <file path=ppt/slides/slide61.xml><?xml version="1.0" encoding="utf-8"?>
-<p:sld xmlns:a="http://schemas.openxmlformats.org/drawingml/2006/main" xmlns:r="http://schemas.openxmlformats.org/officeDocument/2006/relationships" xmlns:p="http://schemas.openxmlformats.org/presentationml/2006/main">
+<p:sld xmlns:a="http://schemas.openxmlformats.org/drawingml/2006/main" xmlns:r="http://schemas.openxmlformats.org/officeDocument/2006/relationships" xmlns:mc="http://schemas.openxmlformats.org/markup-compatibility/2006" xmlns:mv="urn:schemas-microsoft-com:mac:vml" xmlns:p="http://schemas.openxmlformats.org/presentationml/2006/main" mc:Ignorable="mv" mc:PreserveAttributes="mv:*">
   <p:cSld>
     <p:spTree>
       <p:nvGrpSpPr>
@@ -24202,7 +24051,7 @@
     </p:spTree>
     <p:extLst>
       <p:ext uri="{BB962C8B-B14F-4D97-AF65-F5344CB8AC3E}">
-        <p14:creationId xmlns:p14="http://schemas.microsoft.com/office/powerpoint/2010/main" val="3718186732"/>
+        <p14:creationId xmlns:p14="http://schemas.microsoft.com/office/powerpoint/2010/main" xmlns:p="http://schemas.openxmlformats.org/presentationml/2006/main" xmlns:r="http://schemas.openxmlformats.org/officeDocument/2006/relationships" xmlns:a="http://schemas.openxmlformats.org/drawingml/2006/main" xmlns="" val="3718186732"/>
       </p:ext>
     </p:extLst>
   </p:cSld>
@@ -24220,7 +24069,7 @@
 </file>
 
 <file path=ppt/slides/slide62.xml><?xml version="1.0" encoding="utf-8"?>
-<p:sld xmlns:a="http://schemas.openxmlformats.org/drawingml/2006/main" xmlns:r="http://schemas.openxmlformats.org/officeDocument/2006/relationships" xmlns:p="http://schemas.openxmlformats.org/presentationml/2006/main">
+<p:sld xmlns:a="http://schemas.openxmlformats.org/drawingml/2006/main" xmlns:r="http://schemas.openxmlformats.org/officeDocument/2006/relationships" xmlns:mc="http://schemas.openxmlformats.org/markup-compatibility/2006" xmlns:mv="urn:schemas-microsoft-com:mac:vml" xmlns:p="http://schemas.openxmlformats.org/presentationml/2006/main" mc:Ignorable="mv" mc:PreserveAttributes="mv:*">
   <p:cSld>
     <p:spTree>
       <p:nvGrpSpPr>
@@ -24258,7 +24107,7 @@
     </p:spTree>
     <p:extLst>
       <p:ext uri="{BB962C8B-B14F-4D97-AF65-F5344CB8AC3E}">
-        <p14:creationId xmlns:p14="http://schemas.microsoft.com/office/powerpoint/2010/main" val="1642846382"/>
+        <p14:creationId xmlns:p14="http://schemas.microsoft.com/office/powerpoint/2010/main" xmlns:p="http://schemas.openxmlformats.org/presentationml/2006/main" xmlns:r="http://schemas.openxmlformats.org/officeDocument/2006/relationships" xmlns:a="http://schemas.openxmlformats.org/drawingml/2006/main" xmlns="" val="1642846382"/>
       </p:ext>
     </p:extLst>
   </p:cSld>
@@ -24276,7 +24125,7 @@
 </file>
 
 <file path=ppt/slides/slide7.xml><?xml version="1.0" encoding="utf-8"?>
-<p:sld xmlns:a="http://schemas.openxmlformats.org/drawingml/2006/main" xmlns:r="http://schemas.openxmlformats.org/officeDocument/2006/relationships" xmlns:p="http://schemas.openxmlformats.org/presentationml/2006/main">
+<p:sld xmlns:a="http://schemas.openxmlformats.org/drawingml/2006/main" xmlns:r="http://schemas.openxmlformats.org/officeDocument/2006/relationships" xmlns:mc="http://schemas.openxmlformats.org/markup-compatibility/2006" xmlns:mv="urn:schemas-microsoft-com:mac:vml" xmlns:p="http://schemas.openxmlformats.org/presentationml/2006/main" mc:Ignorable="mv" mc:PreserveAttributes="mv:*">
   <p:cSld>
     <p:spTree>
       <p:nvGrpSpPr>
@@ -24377,7 +24226,7 @@
     </p:spTree>
     <p:extLst>
       <p:ext uri="{BB962C8B-B14F-4D97-AF65-F5344CB8AC3E}">
-        <p14:creationId xmlns:p14="http://schemas.microsoft.com/office/powerpoint/2010/main" val="1441032778"/>
+        <p14:creationId xmlns:p14="http://schemas.microsoft.com/office/powerpoint/2010/main" xmlns:p="http://schemas.openxmlformats.org/presentationml/2006/main" xmlns:r="http://schemas.openxmlformats.org/officeDocument/2006/relationships" xmlns:a="http://schemas.openxmlformats.org/drawingml/2006/main" xmlns="" val="1441032778"/>
       </p:ext>
     </p:extLst>
   </p:cSld>
@@ -24395,7 +24244,7 @@
 </file>
 
 <file path=ppt/slides/slide8.xml><?xml version="1.0" encoding="utf-8"?>
-<p:sld xmlns:a="http://schemas.openxmlformats.org/drawingml/2006/main" xmlns:r="http://schemas.openxmlformats.org/officeDocument/2006/relationships" xmlns:p="http://schemas.openxmlformats.org/presentationml/2006/main">
+<p:sld xmlns:a="http://schemas.openxmlformats.org/drawingml/2006/main" xmlns:r="http://schemas.openxmlformats.org/officeDocument/2006/relationships" xmlns:mc="http://schemas.openxmlformats.org/markup-compatibility/2006" xmlns:mv="urn:schemas-microsoft-com:mac:vml" xmlns:p="http://schemas.openxmlformats.org/presentationml/2006/main" mc:Ignorable="mv" mc:PreserveAttributes="mv:*">
   <p:cSld>
     <p:spTree>
       <p:nvGrpSpPr>
@@ -24512,7 +24361,7 @@
     </p:spTree>
     <p:extLst>
       <p:ext uri="{BB962C8B-B14F-4D97-AF65-F5344CB8AC3E}">
-        <p14:creationId xmlns:p14="http://schemas.microsoft.com/office/powerpoint/2010/main" val="711675961"/>
+        <p14:creationId xmlns:p14="http://schemas.microsoft.com/office/powerpoint/2010/main" xmlns:p="http://schemas.openxmlformats.org/presentationml/2006/main" xmlns:r="http://schemas.openxmlformats.org/officeDocument/2006/relationships" xmlns:a="http://schemas.openxmlformats.org/drawingml/2006/main" xmlns="" val="711675961"/>
       </p:ext>
     </p:extLst>
   </p:cSld>
@@ -24530,7 +24379,7 @@
 </file>
 
 <file path=ppt/slides/slide9.xml><?xml version="1.0" encoding="utf-8"?>
-<p:sld xmlns:a="http://schemas.openxmlformats.org/drawingml/2006/main" xmlns:r="http://schemas.openxmlformats.org/officeDocument/2006/relationships" xmlns:p="http://schemas.openxmlformats.org/presentationml/2006/main">
+<p:sld xmlns:a="http://schemas.openxmlformats.org/drawingml/2006/main" xmlns:r="http://schemas.openxmlformats.org/officeDocument/2006/relationships" xmlns:mc="http://schemas.openxmlformats.org/markup-compatibility/2006" xmlns:mv="urn:schemas-microsoft-com:mac:vml" xmlns:p="http://schemas.openxmlformats.org/presentationml/2006/main" mc:Ignorable="mv" mc:PreserveAttributes="mv:*">
   <p:cSld>
     <p:spTree>
       <p:nvGrpSpPr>
@@ -24647,7 +24496,7 @@
     </p:spTree>
     <p:extLst>
       <p:ext uri="{BB962C8B-B14F-4D97-AF65-F5344CB8AC3E}">
-        <p14:creationId xmlns:p14="http://schemas.microsoft.com/office/powerpoint/2010/main" val="1541192887"/>
+        <p14:creationId xmlns:p14="http://schemas.microsoft.com/office/powerpoint/2010/main" xmlns:p="http://schemas.openxmlformats.org/presentationml/2006/main" xmlns:r="http://schemas.openxmlformats.org/officeDocument/2006/relationships" xmlns:a="http://schemas.openxmlformats.org/drawingml/2006/main" xmlns="" val="1541192887"/>
       </p:ext>
     </p:extLst>
   </p:cSld>
@@ -24995,7 +24844,7 @@
   <a:extraClrSchemeLst/>
   <a:extLst>
     <a:ext uri="{05A4C25C-085E-4340-85A3-A5531E510DB2}">
-      <thm15:themeFamily xmlns:thm15="http://schemas.microsoft.com/office/thememl/2012/main" name="reinvent2015-template-light" id="{347E3041-9385-4346-9DC4-E740F718428B}" vid="{42D8A2EF-AA2C-2C4C-8867-3F36DEEE7EEC}"/>
+      <thm15:themeFamily xmlns:thm15="http://schemas.microsoft.com/office/thememl/2012/main" xmlns:a="http://schemas.openxmlformats.org/drawingml/2006/main" xmlns="" name="reinvent2015-template-light" id="{347E3041-9385-4346-9DC4-E740F718428B}" vid="{42D8A2EF-AA2C-2C4C-8867-3F36DEEE7EEC}"/>
     </a:ext>
   </a:extLst>
 </a:theme>

</xml_diff>